<commit_message>
New Version of the Powerpoint
</commit_message>
<xml_diff>
--- a/Git-und-GitHub.pptx
+++ b/Git-und-GitHub.pptx
@@ -5,16 +5,18 @@
     <p:sldMasterId id="2147483660" r:id="rId1"/>
   </p:sldMasterIdLst>
   <p:notesMasterIdLst>
-    <p:notesMasterId r:id="rId9"/>
+    <p:notesMasterId r:id="rId11"/>
   </p:notesMasterIdLst>
   <p:sldIdLst>
     <p:sldId id="256" r:id="rId2"/>
     <p:sldId id="257" r:id="rId3"/>
     <p:sldId id="258" r:id="rId4"/>
-    <p:sldId id="259" r:id="rId5"/>
-    <p:sldId id="260" r:id="rId6"/>
+    <p:sldId id="264" r:id="rId5"/>
+    <p:sldId id="266" r:id="rId6"/>
     <p:sldId id="261" r:id="rId7"/>
-    <p:sldId id="262" r:id="rId8"/>
+    <p:sldId id="268" r:id="rId8"/>
+    <p:sldId id="263" r:id="rId9"/>
+    <p:sldId id="262" r:id="rId10"/>
   </p:sldIdLst>
   <p:sldSz cx="9144000" cy="6858000" type="screen4x3"/>
   <p:notesSz cx="6858000" cy="9144000"/>
@@ -113,6 +115,22 @@
       </a:defRPr>
     </a:lvl9pPr>
   </p:defaultTextStyle>
+  <p:extLst>
+    <p:ext uri="{EFAFB233-063F-42B5-8137-9DF3F51BA10A}">
+      <p15:sldGuideLst xmlns:p15="http://schemas.microsoft.com/office/powerpoint/2012/main">
+        <p15:guide id="1" orient="horz" pos="2160">
+          <p15:clr>
+            <a:srgbClr val="A4A3A4"/>
+          </p15:clr>
+        </p15:guide>
+        <p15:guide id="2" pos="2880">
+          <p15:clr>
+            <a:srgbClr val="A4A3A4"/>
+          </p15:clr>
+        </p15:guide>
+      </p15:sldGuideLst>
+    </p:ext>
+  </p:extLst>
 </p:presentation>
 </file>
 
@@ -198,7 +216,7 @@
           <a:p>
             <a:fld id="{D33A1A6D-234A-42C6-88C5-85D1460EE3B8}" type="datetimeFigureOut">
               <a:rPr lang="de-DE" smtClean="0"/>
-              <a:t>10.10.2015</a:t>
+              <a:t>11.10.2015</a:t>
             </a:fld>
             <a:endParaRPr lang="de-DE"/>
           </a:p>
@@ -604,6 +622,295 @@
 </p:notes>
 </file>
 
+<file path=ppt/notesSlides/notesSlide2.xml><?xml version="1.0" encoding="utf-8"?>
+<p:notes xmlns:a="http://schemas.openxmlformats.org/drawingml/2006/main" xmlns:r="http://schemas.openxmlformats.org/officeDocument/2006/relationships" xmlns:p="http://schemas.openxmlformats.org/presentationml/2006/main">
+  <p:cSld>
+    <p:spTree>
+      <p:nvGrpSpPr>
+        <p:cNvPr id="1" name=""/>
+        <p:cNvGrpSpPr/>
+        <p:nvPr/>
+      </p:nvGrpSpPr>
+      <p:grpSpPr>
+        <a:xfrm>
+          <a:off x="0" y="0"/>
+          <a:ext cx="0" cy="0"/>
+          <a:chOff x="0" y="0"/>
+          <a:chExt cx="0" cy="0"/>
+        </a:xfrm>
+      </p:grpSpPr>
+      <p:sp>
+        <p:nvSpPr>
+          <p:cNvPr id="2" name="Folienbildplatzhalter 1"/>
+          <p:cNvSpPr>
+            <a:spLocks noGrp="1" noRot="1" noChangeAspect="1"/>
+          </p:cNvSpPr>
+          <p:nvPr>
+            <p:ph type="sldImg"/>
+          </p:nvPr>
+        </p:nvSpPr>
+        <p:spPr/>
+      </p:sp>
+      <p:sp>
+        <p:nvSpPr>
+          <p:cNvPr id="3" name="Notizenplatzhalter 2"/>
+          <p:cNvSpPr>
+            <a:spLocks noGrp="1"/>
+          </p:cNvSpPr>
+          <p:nvPr>
+            <p:ph type="body" idx="1"/>
+          </p:nvPr>
+        </p:nvSpPr>
+        <p:spPr/>
+        <p:txBody>
+          <a:bodyPr/>
+          <a:lstStyle/>
+          <a:p>
+            <a:r>
+              <a:rPr lang="de-DE" dirty="0" smtClean="0"/>
+              <a:t>Die verteilte Versionsverwaltung verwendet kein zentrales Repository mehr. Jeder, der an dem verwalteten Projekt arbeitet, hat sein eigenes Repository und kann dieses mit jedem beliebigen anderen Repository abgleichen. Die Versionsgeschichte ist dadurch genauso verteilt. Änderungen können lokal verfolgt werden, ohne eine Verbindung zu einem Server aufbauen zu müssen.</a:t>
+            </a:r>
+            <a:endParaRPr lang="de-DE" dirty="0"/>
+          </a:p>
+        </p:txBody>
+      </p:sp>
+      <p:sp>
+        <p:nvSpPr>
+          <p:cNvPr id="4" name="Foliennummernplatzhalter 3"/>
+          <p:cNvSpPr>
+            <a:spLocks noGrp="1"/>
+          </p:cNvSpPr>
+          <p:nvPr>
+            <p:ph type="sldNum" sz="quarter" idx="10"/>
+          </p:nvPr>
+        </p:nvSpPr>
+        <p:spPr/>
+        <p:txBody>
+          <a:bodyPr/>
+          <a:lstStyle/>
+          <a:p>
+            <a:fld id="{4A505144-3BC5-4B32-83CF-491494C34331}" type="slidenum">
+              <a:rPr lang="de-DE" smtClean="0"/>
+              <a:t>3</a:t>
+            </a:fld>
+            <a:endParaRPr lang="de-DE"/>
+          </a:p>
+        </p:txBody>
+      </p:sp>
+    </p:spTree>
+    <p:extLst>
+      <p:ext uri="{BB962C8B-B14F-4D97-AF65-F5344CB8AC3E}">
+        <p14:creationId xmlns:p14="http://schemas.microsoft.com/office/powerpoint/2010/main" val="2458812328"/>
+      </p:ext>
+    </p:extLst>
+  </p:cSld>
+  <p:clrMapOvr>
+    <a:masterClrMapping/>
+  </p:clrMapOvr>
+</p:notes>
+</file>
+
+<file path=ppt/notesSlides/notesSlide3.xml><?xml version="1.0" encoding="utf-8"?>
+<p:notes xmlns:a="http://schemas.openxmlformats.org/drawingml/2006/main" xmlns:r="http://schemas.openxmlformats.org/officeDocument/2006/relationships" xmlns:p="http://schemas.openxmlformats.org/presentationml/2006/main">
+  <p:cSld>
+    <p:spTree>
+      <p:nvGrpSpPr>
+        <p:cNvPr id="1" name=""/>
+        <p:cNvGrpSpPr/>
+        <p:nvPr/>
+      </p:nvGrpSpPr>
+      <p:grpSpPr>
+        <a:xfrm>
+          <a:off x="0" y="0"/>
+          <a:ext cx="0" cy="0"/>
+          <a:chOff x="0" y="0"/>
+          <a:chExt cx="0" cy="0"/>
+        </a:xfrm>
+      </p:grpSpPr>
+      <p:sp>
+        <p:nvSpPr>
+          <p:cNvPr id="2" name="Folienbildplatzhalter 1"/>
+          <p:cNvSpPr>
+            <a:spLocks noGrp="1" noRot="1" noChangeAspect="1"/>
+          </p:cNvSpPr>
+          <p:nvPr>
+            <p:ph type="sldImg"/>
+          </p:nvPr>
+        </p:nvSpPr>
+        <p:spPr/>
+      </p:sp>
+      <p:sp>
+        <p:nvSpPr>
+          <p:cNvPr id="3" name="Notizenplatzhalter 2"/>
+          <p:cNvSpPr>
+            <a:spLocks noGrp="1"/>
+          </p:cNvSpPr>
+          <p:nvPr>
+            <p:ph type="body" idx="1"/>
+          </p:nvPr>
+        </p:nvSpPr>
+        <p:spPr/>
+        <p:txBody>
+          <a:bodyPr/>
+          <a:lstStyle/>
+          <a:p>
+            <a:pPr lvl="0"/>
+            <a:r>
+              <a:rPr lang="de-DE" dirty="0" smtClean="0"/>
+              <a:t>Nicht-lineare Entwicklung: Schnelles </a:t>
+            </a:r>
+            <a:r>
+              <a:rPr lang="de-DE" dirty="0" err="1" smtClean="0"/>
+              <a:t>branching</a:t>
+            </a:r>
+            <a:r>
+              <a:rPr lang="de-DE" dirty="0" smtClean="0"/>
+              <a:t> und </a:t>
+            </a:r>
+            <a:r>
+              <a:rPr lang="de-DE" dirty="0" err="1" smtClean="0"/>
+              <a:t>merching</a:t>
+            </a:r>
+            <a:r>
+              <a:rPr lang="de-DE" dirty="0" smtClean="0"/>
+              <a:t>.</a:t>
+            </a:r>
+            <a:r>
+              <a:rPr lang="de-DE" baseline="0" dirty="0" smtClean="0"/>
+              <a:t> </a:t>
+            </a:r>
+            <a:r>
+              <a:rPr lang="de-DE" dirty="0" smtClean="0"/>
+              <a:t>visualisierte Navigation durch die nicht-lineare Entwicklungshistorie</a:t>
+            </a:r>
+          </a:p>
+          <a:p>
+            <a:pPr marL="0" marR="0" lvl="0" indent="0" algn="l" defTabSz="914400" rtl="0" eaLnBrk="1" fontAlgn="auto" latinLnBrk="0" hangingPunct="1">
+              <a:lnSpc>
+                <a:spcPct val="100000"/>
+              </a:lnSpc>
+              <a:spcBef>
+                <a:spcPts val="0"/>
+              </a:spcBef>
+              <a:spcAft>
+                <a:spcPts val="0"/>
+              </a:spcAft>
+              <a:buClrTx/>
+              <a:buSzTx/>
+              <a:buFontTx/>
+              <a:buNone/>
+              <a:tabLst/>
+              <a:defRPr/>
+            </a:pPr>
+            <a:r>
+              <a:rPr lang="de-DE" dirty="0" smtClean="0"/>
+              <a:t>Verteilte Entwicklung: lokale Kopie vom Repository und der ganzen Entwicklungshistorie</a:t>
+            </a:r>
+          </a:p>
+          <a:p>
+            <a:pPr marL="0" marR="0" lvl="0" indent="0" algn="l" defTabSz="914400" rtl="0" eaLnBrk="1" fontAlgn="auto" latinLnBrk="0" hangingPunct="1">
+              <a:lnSpc>
+                <a:spcPct val="100000"/>
+              </a:lnSpc>
+              <a:spcBef>
+                <a:spcPts val="0"/>
+              </a:spcBef>
+              <a:spcAft>
+                <a:spcPts val="0"/>
+              </a:spcAft>
+              <a:buClrTx/>
+              <a:buSzTx/>
+              <a:buFontTx/>
+              <a:buNone/>
+              <a:tabLst/>
+              <a:defRPr/>
+            </a:pPr>
+            <a:r>
+              <a:rPr lang="de-DE" dirty="0" smtClean="0"/>
+              <a:t>Kompatibilität</a:t>
+            </a:r>
+            <a:r>
+              <a:rPr lang="de-DE" baseline="0" dirty="0" smtClean="0"/>
+              <a:t> mit vorhandenen Systemen/Protokollen: </a:t>
+            </a:r>
+            <a:r>
+              <a:rPr lang="de-DE" dirty="0" smtClean="0"/>
+              <a:t>Datentransfer zwischen </a:t>
+            </a:r>
+            <a:r>
+              <a:rPr lang="de-DE" dirty="0" err="1" smtClean="0"/>
+              <a:t>Repositories</a:t>
+            </a:r>
+            <a:r>
+              <a:rPr lang="de-DE" dirty="0" smtClean="0"/>
+              <a:t> via HTTP, FTP, SSH, …</a:t>
+            </a:r>
+          </a:p>
+          <a:p>
+            <a:pPr marL="0" marR="0" lvl="0" indent="0" algn="l" defTabSz="914400" rtl="0" eaLnBrk="1" fontAlgn="auto" latinLnBrk="0" hangingPunct="1">
+              <a:lnSpc>
+                <a:spcPct val="100000"/>
+              </a:lnSpc>
+              <a:spcBef>
+                <a:spcPts val="0"/>
+              </a:spcBef>
+              <a:spcAft>
+                <a:spcPts val="0"/>
+              </a:spcAft>
+              <a:buClrTx/>
+              <a:buSzTx/>
+              <a:buFontTx/>
+              <a:buNone/>
+              <a:tabLst/>
+              <a:defRPr/>
+            </a:pPr>
+            <a:endParaRPr lang="de-DE" dirty="0" smtClean="0"/>
+          </a:p>
+          <a:p>
+            <a:pPr lvl="0"/>
+            <a:endParaRPr lang="de-DE" dirty="0" smtClean="0"/>
+          </a:p>
+          <a:p>
+            <a:endParaRPr lang="de-DE" dirty="0" smtClean="0"/>
+          </a:p>
+        </p:txBody>
+      </p:sp>
+      <p:sp>
+        <p:nvSpPr>
+          <p:cNvPr id="4" name="Foliennummernplatzhalter 3"/>
+          <p:cNvSpPr>
+            <a:spLocks noGrp="1"/>
+          </p:cNvSpPr>
+          <p:nvPr>
+            <p:ph type="sldNum" sz="quarter" idx="10"/>
+          </p:nvPr>
+        </p:nvSpPr>
+        <p:spPr/>
+        <p:txBody>
+          <a:bodyPr/>
+          <a:lstStyle/>
+          <a:p>
+            <a:fld id="{4A505144-3BC5-4B32-83CF-491494C34331}" type="slidenum">
+              <a:rPr lang="de-DE" smtClean="0"/>
+              <a:t>4</a:t>
+            </a:fld>
+            <a:endParaRPr lang="de-DE"/>
+          </a:p>
+        </p:txBody>
+      </p:sp>
+    </p:spTree>
+    <p:extLst>
+      <p:ext uri="{BB962C8B-B14F-4D97-AF65-F5344CB8AC3E}">
+        <p14:creationId xmlns:p14="http://schemas.microsoft.com/office/powerpoint/2010/main" val="4235070633"/>
+      </p:ext>
+    </p:extLst>
+  </p:cSld>
+  <p:clrMapOvr>
+    <a:masterClrMapping/>
+  </p:clrMapOvr>
+</p:notes>
+</file>
+
 <file path=ppt/slideLayouts/slideLayout1.xml><?xml version="1.0" encoding="utf-8"?>
 <p:sldLayout xmlns:a="http://schemas.openxmlformats.org/drawingml/2006/main" xmlns:r="http://schemas.openxmlformats.org/officeDocument/2006/relationships" xmlns:p="http://schemas.openxmlformats.org/presentationml/2006/main" showMasterSp="0" type="title" preserve="1">
   <p:cSld name="Titelfolie">
@@ -747,7 +1054,7 @@
           <a:p>
             <a:fld id="{D74EE171-6FB9-44C2-999A-3C78585CC55F}" type="datetime1">
               <a:rPr lang="de-DE" smtClean="0"/>
-              <a:t>10.10.2015</a:t>
+              <a:t>11.10.2015</a:t>
             </a:fld>
             <a:endParaRPr lang="de-DE"/>
           </a:p>
@@ -1110,7 +1417,7 @@
           <a:p>
             <a:fld id="{966EF4C5-04F6-4CAA-916B-E3B314346F2C}" type="datetime1">
               <a:rPr lang="de-DE" smtClean="0"/>
-              <a:t>10.10.2015</a:t>
+              <a:t>11.10.2015</a:t>
             </a:fld>
             <a:endParaRPr lang="de-DE"/>
           </a:p>
@@ -1289,7 +1596,7 @@
           <a:p>
             <a:fld id="{D4A1C9C1-76E8-482F-AC38-46CD1EA3A4C9}" type="datetime1">
               <a:rPr lang="de-DE" smtClean="0"/>
-              <a:t>10.10.2015</a:t>
+              <a:t>11.10.2015</a:t>
             </a:fld>
             <a:endParaRPr lang="de-DE"/>
           </a:p>
@@ -1528,7 +1835,7 @@
           <a:p>
             <a:fld id="{09957CAC-BFF1-498D-82E7-9462D790BC9E}" type="datetime1">
               <a:rPr lang="de-DE" smtClean="0"/>
-              <a:t>10.10.2015</a:t>
+              <a:t>11.10.2015</a:t>
             </a:fld>
             <a:endParaRPr lang="de-DE"/>
           </a:p>
@@ -1801,7 +2108,7 @@
           <a:p>
             <a:fld id="{67E9C1B2-C123-4CB8-B829-0B1DE6516455}" type="datetime1">
               <a:rPr lang="de-DE" smtClean="0"/>
-              <a:t>10.10.2015</a:t>
+              <a:t>11.10.2015</a:t>
             </a:fld>
             <a:endParaRPr lang="de-DE"/>
           </a:p>
@@ -2025,7 +2332,7 @@
           <a:p>
             <a:fld id="{5F82951D-51DD-43CB-9395-2CD87029427A}" type="datetime1">
               <a:rPr lang="de-DE" smtClean="0"/>
-              <a:t>10.10.2015</a:t>
+              <a:t>11.10.2015</a:t>
             </a:fld>
             <a:endParaRPr lang="de-DE"/>
           </a:p>
@@ -2381,7 +2688,7 @@
           <a:p>
             <a:fld id="{F75640B3-CD2F-468A-9D6A-8FCCA521EAD8}" type="datetime1">
               <a:rPr lang="de-DE" smtClean="0"/>
-              <a:t>10.10.2015</a:t>
+              <a:t>11.10.2015</a:t>
             </a:fld>
             <a:endParaRPr lang="de-DE"/>
           </a:p>
@@ -2617,7 +2924,7 @@
           <a:p>
             <a:fld id="{66B70435-1AE2-40EE-BD35-BF23134777A3}" type="datetime1">
               <a:rPr lang="de-DE" smtClean="0"/>
-              <a:t>10.10.2015</a:t>
+              <a:t>11.10.2015</a:t>
             </a:fld>
             <a:endParaRPr lang="de-DE"/>
           </a:p>
@@ -2761,7 +3068,7 @@
           <a:p>
             <a:fld id="{8264DE6B-16CC-45D3-A85A-C342E3C400B1}" type="datetime1">
               <a:rPr lang="de-DE" smtClean="0"/>
-              <a:t>10.10.2015</a:t>
+              <a:t>11.10.2015</a:t>
             </a:fld>
             <a:endParaRPr lang="de-DE"/>
           </a:p>
@@ -3042,7 +3349,7 @@
           <a:p>
             <a:fld id="{3012F5FB-2D99-4EE6-8329-8BC403EF3BB7}" type="datetime1">
               <a:rPr lang="de-DE" smtClean="0"/>
-              <a:t>10.10.2015</a:t>
+              <a:t>11.10.2015</a:t>
             </a:fld>
             <a:endParaRPr lang="de-DE"/>
           </a:p>
@@ -3453,7 +3760,7 @@
           <a:p>
             <a:fld id="{4ACBB3FE-65F3-496E-9475-85FAF27CCA0A}" type="datetime1">
               <a:rPr lang="de-DE" smtClean="0"/>
-              <a:t>10.10.2015</a:t>
+              <a:t>11.10.2015</a:t>
             </a:fld>
             <a:endParaRPr lang="de-DE"/>
           </a:p>
@@ -3795,7 +4102,7 @@
           <a:p>
             <a:fld id="{1198494A-36A3-42DF-97C6-C12EB15310DD}" type="datetime1">
               <a:rPr lang="de-DE" smtClean="0"/>
-              <a:t>10.10.2015</a:t>
+              <a:t>11.10.2015</a:t>
             </a:fld>
             <a:endParaRPr lang="de-DE"/>
           </a:p>
@@ -4347,12 +4654,16 @@
           <a:lstStyle/>
           <a:p>
             <a:r>
+              <a:rPr lang="de-DE" dirty="0" err="1"/>
+              <a:t>g</a:t>
+            </a:r>
+            <a:r>
               <a:rPr lang="de-DE" dirty="0" err="1" smtClean="0"/>
-              <a:t>Git</a:t>
+              <a:t>it</a:t>
             </a:r>
             <a:r>
               <a:rPr lang="de-DE" dirty="0" smtClean="0"/>
-              <a:t> und </a:t>
+              <a:t> &amp; </a:t>
             </a:r>
             <a:r>
               <a:rPr lang="de-DE" dirty="0" err="1" smtClean="0"/>
@@ -4399,6 +4710,13 @@
   <p:clrMapOvr>
     <a:masterClrMapping/>
   </p:clrMapOvr>
+  <p:timing>
+    <p:tnLst>
+      <p:par>
+        <p:cTn id="1" dur="indefinite" restart="never" nodeType="tmRoot"/>
+      </p:par>
+    </p:tnLst>
+  </p:timing>
 </p:sld>
 </file>
 
@@ -4463,7 +4781,11 @@
             </a:pPr>
             <a:r>
               <a:rPr lang="de-DE" dirty="0" err="1" smtClean="0"/>
-              <a:t>Git</a:t>
+              <a:t>g</a:t>
+            </a:r>
+            <a:r>
+              <a:rPr lang="de-DE" dirty="0" err="1" smtClean="0"/>
+              <a:t>it</a:t>
             </a:r>
             <a:endParaRPr lang="de-DE" dirty="0" smtClean="0"/>
           </a:p>
@@ -4484,8 +4806,19 @@
             </a:pPr>
             <a:r>
               <a:rPr lang="de-DE" dirty="0" smtClean="0"/>
+              <a:t>Eigenschaften</a:t>
+            </a:r>
+          </a:p>
+          <a:p>
+            <a:pPr marL="788670" lvl="1" indent="-514350">
+              <a:buFont typeface="+mj-lt"/>
+              <a:buAutoNum type="arabicPeriod"/>
+            </a:pPr>
+            <a:r>
+              <a:rPr lang="de-DE" dirty="0" smtClean="0"/>
               <a:t>Funktionsweise</a:t>
             </a:r>
+            <a:endParaRPr lang="de-DE" dirty="0" smtClean="0"/>
           </a:p>
           <a:p>
             <a:pPr marL="514350" indent="-514350">
@@ -4499,26 +4832,6 @@
             <a:endParaRPr lang="de-DE" dirty="0" smtClean="0"/>
           </a:p>
           <a:p>
-            <a:pPr marL="788670" lvl="1" indent="-514350">
-              <a:buFont typeface="+mj-lt"/>
-              <a:buAutoNum type="arabicPeriod"/>
-            </a:pPr>
-            <a:r>
-              <a:rPr lang="de-DE" dirty="0" smtClean="0"/>
-              <a:t>Idee</a:t>
-            </a:r>
-          </a:p>
-          <a:p>
-            <a:pPr marL="788670" lvl="1" indent="-514350">
-              <a:buFont typeface="+mj-lt"/>
-              <a:buAutoNum type="arabicPeriod"/>
-            </a:pPr>
-            <a:r>
-              <a:rPr lang="de-DE" dirty="0" smtClean="0"/>
-              <a:t>Funktionsweise</a:t>
-            </a:r>
-          </a:p>
-          <a:p>
             <a:pPr marL="514350" indent="-514350">
               <a:buFont typeface="+mj-lt"/>
               <a:buAutoNum type="arabicPeriod"/>
@@ -4527,6 +4840,7 @@
               <a:rPr lang="de-DE" dirty="0" smtClean="0"/>
               <a:t>Demo </a:t>
             </a:r>
+            <a:endParaRPr lang="de-DE" dirty="0" smtClean="0"/>
           </a:p>
           <a:p>
             <a:pPr marL="514350" indent="-514350">
@@ -4537,6 +4851,7 @@
               <a:rPr lang="de-DE" dirty="0" smtClean="0"/>
               <a:t>Übung</a:t>
             </a:r>
+            <a:endParaRPr lang="de-DE" dirty="0" smtClean="0"/>
           </a:p>
           <a:p>
             <a:pPr marL="514350" indent="-514350">
@@ -4603,6 +4918,13 @@
   <p:clrMapOvr>
     <a:masterClrMapping/>
   </p:clrMapOvr>
+  <p:timing>
+    <p:tnLst>
+      <p:par>
+        <p:cTn id="1" dur="indefinite" restart="never" nodeType="tmRoot"/>
+      </p:par>
+    </p:tnLst>
+  </p:timing>
 </p:sld>
 </file>
 
@@ -4642,7 +4964,11 @@
           <a:p>
             <a:r>
               <a:rPr lang="de-DE" dirty="0" smtClean="0"/>
-              <a:t>            - Idee</a:t>
+              <a:t>           </a:t>
+            </a:r>
+            <a:r>
+              <a:rPr lang="de-DE" dirty="0" smtClean="0"/>
+              <a:t>- Idee</a:t>
             </a:r>
             <a:endParaRPr lang="de-DE" dirty="0"/>
           </a:p>
@@ -4664,10 +4990,14 @@
           <a:lstStyle/>
           <a:p>
             <a:r>
-              <a:rPr lang="de-DE" smtClean="0"/>
-              <a:t>ePortfolio von Mehmet Ali Incekara</a:t>
-            </a:r>
-            <a:endParaRPr lang="de-DE"/>
+              <a:rPr lang="de-DE" dirty="0" err="1" smtClean="0"/>
+              <a:t>ePortfolio</a:t>
+            </a:r>
+            <a:r>
+              <a:rPr lang="de-DE" dirty="0" smtClean="0"/>
+              <a:t> von Mehmet Ali Incekara</a:t>
+            </a:r>
+            <a:endParaRPr lang="de-DE" dirty="0"/>
           </a:p>
         </p:txBody>
       </p:sp>
@@ -4704,80 +5034,32 @@
             <p:ph sz="quarter" idx="1"/>
           </p:nvPr>
         </p:nvSpPr>
-        <p:spPr/>
-        <p:txBody>
-          <a:bodyPr/>
-          <a:lstStyle/>
-          <a:p>
-            <a:r>
-              <a:rPr lang="de-DE" dirty="0"/>
-              <a:t>k</a:t>
-            </a:r>
-            <a:r>
-              <a:rPr lang="de-DE" dirty="0" smtClean="0"/>
-              <a:t>ostenlos und open </a:t>
-            </a:r>
-            <a:r>
-              <a:rPr lang="de-DE" dirty="0" err="1" smtClean="0"/>
-              <a:t>source</a:t>
-            </a:r>
-            <a:endParaRPr lang="de-DE" dirty="0" smtClean="0"/>
-          </a:p>
-          <a:p>
-            <a:endParaRPr lang="de-DE" dirty="0" smtClean="0"/>
-          </a:p>
-          <a:p>
+        <p:spPr>
+          <a:xfrm>
+            <a:off x="2750804" y="6021288"/>
+            <a:ext cx="3642392" cy="319864"/>
+          </a:xfrm>
+        </p:spPr>
+        <p:txBody>
+          <a:bodyPr>
+            <a:normAutofit fontScale="70000" lnSpcReduction="20000"/>
+          </a:bodyPr>
+          <a:lstStyle/>
+          <a:p>
+            <a:pPr marL="0" indent="0">
+              <a:buNone/>
+            </a:pPr>
             <a:r>
               <a:rPr lang="de-DE" dirty="0" smtClean="0"/>
               <a:t>verteiltes Versionsverwaltungssystem </a:t>
             </a:r>
+            <a:endParaRPr lang="de-DE" dirty="0" smtClean="0"/>
           </a:p>
         </p:txBody>
       </p:sp>
       <p:pic>
         <p:nvPicPr>
           <p:cNvPr id="1026" name="Picture 2" descr="Logo"/>
-          <p:cNvPicPr>
-            <a:picLocks noChangeAspect="1" noChangeArrowheads="1"/>
-          </p:cNvPicPr>
-          <p:nvPr/>
-        </p:nvPicPr>
-        <p:blipFill>
-          <a:blip r:embed="rId2">
-            <a:extLst>
-              <a:ext uri="{28A0092B-C50C-407E-A947-70E740481C1C}">
-                <a14:useLocalDpi xmlns:a14="http://schemas.microsoft.com/office/drawing/2010/main" val="0"/>
-              </a:ext>
-            </a:extLst>
-          </a:blip>
-          <a:srcRect/>
-          <a:stretch>
-            <a:fillRect/>
-          </a:stretch>
-        </p:blipFill>
-        <p:spPr bwMode="auto">
-          <a:xfrm>
-            <a:off x="550962" y="524668"/>
-            <a:ext cx="1428750" cy="600076"/>
-          </a:xfrm>
-          <a:prstGeom prst="rect">
-            <a:avLst/>
-          </a:prstGeom>
-          <a:noFill/>
-          <a:extLst>
-            <a:ext uri="{909E8E84-426E-40DD-AFC4-6F175D3DCCD1}">
-              <a14:hiddenFill xmlns:a14="http://schemas.microsoft.com/office/drawing/2010/main">
-                <a:solidFill>
-                  <a:srgbClr val="FFFFFF"/>
-                </a:solidFill>
-              </a14:hiddenFill>
-            </a:ext>
-          </a:extLst>
-        </p:spPr>
-      </p:pic>
-      <p:pic>
-        <p:nvPicPr>
-          <p:cNvPr id="1028" name="Picture 4" descr="Workflow A"/>
           <p:cNvPicPr>
             <a:picLocks noChangeAspect="1" noChangeArrowheads="1"/>
           </p:cNvPicPr>
@@ -4798,8 +5080,49 @@
         </p:blipFill>
         <p:spPr bwMode="auto">
           <a:xfrm>
-            <a:off x="2015716" y="3374517"/>
-            <a:ext cx="5112568" cy="2574763"/>
+            <a:off x="457200" y="519429"/>
+            <a:ext cx="1428750" cy="600076"/>
+          </a:xfrm>
+          <a:prstGeom prst="rect">
+            <a:avLst/>
+          </a:prstGeom>
+          <a:noFill/>
+          <a:extLst>
+            <a:ext uri="{909E8E84-426E-40DD-AFC4-6F175D3DCCD1}">
+              <a14:hiddenFill xmlns:a14="http://schemas.microsoft.com/office/drawing/2010/main">
+                <a:solidFill>
+                  <a:srgbClr val="FFFFFF"/>
+                </a:solidFill>
+              </a14:hiddenFill>
+            </a:ext>
+          </a:extLst>
+        </p:spPr>
+      </p:pic>
+      <p:pic>
+        <p:nvPicPr>
+          <p:cNvPr id="8" name="Picture 2" descr="http://git-scm.com/figures/18333fig0103-tn.png"/>
+          <p:cNvPicPr>
+            <a:picLocks noChangeAspect="1" noChangeArrowheads="1"/>
+          </p:cNvPicPr>
+          <p:nvPr/>
+        </p:nvPicPr>
+        <p:blipFill>
+          <a:blip r:embed="rId4">
+            <a:extLst>
+              <a:ext uri="{28A0092B-C50C-407E-A947-70E740481C1C}">
+                <a14:useLocalDpi xmlns:a14="http://schemas.microsoft.com/office/drawing/2010/main" val="0"/>
+              </a:ext>
+            </a:extLst>
+          </a:blip>
+          <a:srcRect/>
+          <a:stretch>
+            <a:fillRect/>
+          </a:stretch>
+        </p:blipFill>
+        <p:spPr bwMode="auto">
+          <a:xfrm>
+            <a:off x="2502231" y="1266268"/>
+            <a:ext cx="4139538" cy="4683012"/>
           </a:xfrm>
           <a:prstGeom prst="rect">
             <a:avLst/>
@@ -4826,6 +5149,13 @@
   <p:clrMapOvr>
     <a:masterClrMapping/>
   </p:clrMapOvr>
+  <p:timing>
+    <p:tnLst>
+      <p:par>
+        <p:cTn id="1" dur="indefinite" restart="never" nodeType="tmRoot"/>
+      </p:par>
+    </p:tnLst>
+  </p:timing>
 </p:sld>
 </file>
 
@@ -4865,7 +5195,11 @@
           <a:p>
             <a:r>
               <a:rPr lang="de-DE" dirty="0" smtClean="0"/>
-              <a:t>            - Funktionsweise</a:t>
+              <a:t>           </a:t>
+            </a:r>
+            <a:r>
+              <a:rPr lang="de-DE" dirty="0" smtClean="0"/>
+              <a:t>- Eigenschaften</a:t>
             </a:r>
             <a:endParaRPr lang="de-DE" dirty="0"/>
           </a:p>
@@ -4932,10 +5266,773 @@
           <a:bodyPr/>
           <a:lstStyle/>
           <a:p>
+            <a:r>
+              <a:rPr lang="de-DE" dirty="0"/>
+              <a:t>n</a:t>
+            </a:r>
+            <a:r>
+              <a:rPr lang="de-DE" dirty="0" smtClean="0"/>
+              <a:t>icht-lineare Entwicklung</a:t>
+            </a:r>
+          </a:p>
+          <a:p>
+            <a:pPr marL="0" indent="0">
+              <a:buNone/>
+            </a:pPr>
             <a:endParaRPr lang="de-DE" dirty="0"/>
           </a:p>
-        </p:txBody>
-      </p:sp>
+          <a:p>
+            <a:r>
+              <a:rPr lang="de-DE" dirty="0"/>
+              <a:t>v</a:t>
+            </a:r>
+            <a:r>
+              <a:rPr lang="de-DE" dirty="0" smtClean="0"/>
+              <a:t>erteilte Entwicklung</a:t>
+            </a:r>
+          </a:p>
+          <a:p>
+            <a:endParaRPr lang="de-DE" dirty="0"/>
+          </a:p>
+          <a:p>
+            <a:r>
+              <a:rPr lang="de-DE" dirty="0" smtClean="0"/>
+              <a:t>Datentransfer zwischen </a:t>
+            </a:r>
+            <a:r>
+              <a:rPr lang="de-DE" dirty="0" err="1" smtClean="0"/>
+              <a:t>Repositories</a:t>
+            </a:r>
+            <a:endParaRPr lang="de-DE" dirty="0" smtClean="0"/>
+          </a:p>
+          <a:p>
+            <a:endParaRPr lang="de-DE" dirty="0"/>
+          </a:p>
+          <a:p>
+            <a:r>
+              <a:rPr lang="de-DE" dirty="0" smtClean="0"/>
+              <a:t>kryptografische </a:t>
+            </a:r>
+            <a:r>
+              <a:rPr lang="de-DE" dirty="0"/>
+              <a:t>Sicherheit der </a:t>
+            </a:r>
+            <a:r>
+              <a:rPr lang="de-DE" dirty="0" smtClean="0"/>
+              <a:t>Historie</a:t>
+            </a:r>
+            <a:endParaRPr lang="de-DE" dirty="0"/>
+          </a:p>
+          <a:p>
+            <a:endParaRPr lang="de-DE" dirty="0" smtClean="0"/>
+          </a:p>
+          <a:p>
+            <a:r>
+              <a:rPr lang="de-DE" dirty="0" smtClean="0"/>
+              <a:t>effiziente Bearbeitung von großen Projekten</a:t>
+            </a:r>
+            <a:endParaRPr lang="de-DE" dirty="0"/>
+          </a:p>
+        </p:txBody>
+      </p:sp>
+      <p:pic>
+        <p:nvPicPr>
+          <p:cNvPr id="1026" name="Picture 2" descr="Logo"/>
+          <p:cNvPicPr>
+            <a:picLocks noChangeAspect="1" noChangeArrowheads="1"/>
+          </p:cNvPicPr>
+          <p:nvPr/>
+        </p:nvPicPr>
+        <p:blipFill>
+          <a:blip r:embed="rId3">
+            <a:extLst>
+              <a:ext uri="{28A0092B-C50C-407E-A947-70E740481C1C}">
+                <a14:useLocalDpi xmlns:a14="http://schemas.microsoft.com/office/drawing/2010/main" val="0"/>
+              </a:ext>
+            </a:extLst>
+          </a:blip>
+          <a:srcRect/>
+          <a:stretch>
+            <a:fillRect/>
+          </a:stretch>
+        </p:blipFill>
+        <p:spPr bwMode="auto">
+          <a:xfrm>
+            <a:off x="457200" y="519429"/>
+            <a:ext cx="1428750" cy="600076"/>
+          </a:xfrm>
+          <a:prstGeom prst="rect">
+            <a:avLst/>
+          </a:prstGeom>
+          <a:noFill/>
+          <a:extLst>
+            <a:ext uri="{909E8E84-426E-40DD-AFC4-6F175D3DCCD1}">
+              <a14:hiddenFill xmlns:a14="http://schemas.microsoft.com/office/drawing/2010/main">
+                <a:solidFill>
+                  <a:srgbClr val="FFFFFF"/>
+                </a:solidFill>
+              </a14:hiddenFill>
+            </a:ext>
+          </a:extLst>
+        </p:spPr>
+      </p:pic>
+    </p:spTree>
+    <p:extLst>
+      <p:ext uri="{BB962C8B-B14F-4D97-AF65-F5344CB8AC3E}">
+        <p14:creationId xmlns:p14="http://schemas.microsoft.com/office/powerpoint/2010/main" val="1592800576"/>
+      </p:ext>
+    </p:extLst>
+  </p:cSld>
+  <p:clrMapOvr>
+    <a:masterClrMapping/>
+  </p:clrMapOvr>
+  <p:timing>
+    <p:tnLst>
+      <p:par>
+        <p:cTn id="1" dur="indefinite" restart="never" nodeType="tmRoot">
+          <p:childTnLst>
+            <p:seq concurrent="1" nextAc="seek">
+              <p:cTn id="2" dur="indefinite" nodeType="mainSeq">
+                <p:childTnLst>
+                  <p:par>
+                    <p:cTn id="3" fill="hold">
+                      <p:stCondLst>
+                        <p:cond delay="indefinite"/>
+                      </p:stCondLst>
+                      <p:childTnLst>
+                        <p:par>
+                          <p:cTn id="4" fill="hold">
+                            <p:stCondLst>
+                              <p:cond delay="0"/>
+                            </p:stCondLst>
+                            <p:childTnLst>
+                              <p:par>
+                                <p:cTn id="5" presetID="10" presetClass="entr" presetSubtype="0" fill="hold" grpId="0" nodeType="clickEffect">
+                                  <p:stCondLst>
+                                    <p:cond delay="0"/>
+                                  </p:stCondLst>
+                                  <p:childTnLst>
+                                    <p:set>
+                                      <p:cBhvr>
+                                        <p:cTn id="6" dur="1" fill="hold">
+                                          <p:stCondLst>
+                                            <p:cond delay="0"/>
+                                          </p:stCondLst>
+                                        </p:cTn>
+                                        <p:tgtEl>
+                                          <p:spTgt spid="5">
+                                            <p:txEl>
+                                              <p:pRg st="0" end="0"/>
+                                            </p:txEl>
+                                          </p:spTgt>
+                                        </p:tgtEl>
+                                        <p:attrNameLst>
+                                          <p:attrName>style.visibility</p:attrName>
+                                        </p:attrNameLst>
+                                      </p:cBhvr>
+                                      <p:to>
+                                        <p:strVal val="visible"/>
+                                      </p:to>
+                                    </p:set>
+                                    <p:animEffect transition="in" filter="fade">
+                                      <p:cBhvr>
+                                        <p:cTn id="7" dur="500"/>
+                                        <p:tgtEl>
+                                          <p:spTgt spid="5">
+                                            <p:txEl>
+                                              <p:pRg st="0" end="0"/>
+                                            </p:txEl>
+                                          </p:spTgt>
+                                        </p:tgtEl>
+                                      </p:cBhvr>
+                                    </p:animEffect>
+                                  </p:childTnLst>
+                                </p:cTn>
+                              </p:par>
+                            </p:childTnLst>
+                          </p:cTn>
+                        </p:par>
+                      </p:childTnLst>
+                    </p:cTn>
+                  </p:par>
+                  <p:par>
+                    <p:cTn id="8" fill="hold">
+                      <p:stCondLst>
+                        <p:cond delay="indefinite"/>
+                      </p:stCondLst>
+                      <p:childTnLst>
+                        <p:par>
+                          <p:cTn id="9" fill="hold">
+                            <p:stCondLst>
+                              <p:cond delay="0"/>
+                            </p:stCondLst>
+                            <p:childTnLst>
+                              <p:par>
+                                <p:cTn id="10" presetID="10" presetClass="entr" presetSubtype="0" fill="hold" grpId="0" nodeType="clickEffect">
+                                  <p:stCondLst>
+                                    <p:cond delay="0"/>
+                                  </p:stCondLst>
+                                  <p:childTnLst>
+                                    <p:set>
+                                      <p:cBhvr>
+                                        <p:cTn id="11" dur="1" fill="hold">
+                                          <p:stCondLst>
+                                            <p:cond delay="0"/>
+                                          </p:stCondLst>
+                                        </p:cTn>
+                                        <p:tgtEl>
+                                          <p:spTgt spid="5">
+                                            <p:txEl>
+                                              <p:pRg st="2" end="2"/>
+                                            </p:txEl>
+                                          </p:spTgt>
+                                        </p:tgtEl>
+                                        <p:attrNameLst>
+                                          <p:attrName>style.visibility</p:attrName>
+                                        </p:attrNameLst>
+                                      </p:cBhvr>
+                                      <p:to>
+                                        <p:strVal val="visible"/>
+                                      </p:to>
+                                    </p:set>
+                                    <p:animEffect transition="in" filter="fade">
+                                      <p:cBhvr>
+                                        <p:cTn id="12" dur="500"/>
+                                        <p:tgtEl>
+                                          <p:spTgt spid="5">
+                                            <p:txEl>
+                                              <p:pRg st="2" end="2"/>
+                                            </p:txEl>
+                                          </p:spTgt>
+                                        </p:tgtEl>
+                                      </p:cBhvr>
+                                    </p:animEffect>
+                                  </p:childTnLst>
+                                </p:cTn>
+                              </p:par>
+                            </p:childTnLst>
+                          </p:cTn>
+                        </p:par>
+                      </p:childTnLst>
+                    </p:cTn>
+                  </p:par>
+                  <p:par>
+                    <p:cTn id="13" fill="hold">
+                      <p:stCondLst>
+                        <p:cond delay="indefinite"/>
+                      </p:stCondLst>
+                      <p:childTnLst>
+                        <p:par>
+                          <p:cTn id="14" fill="hold">
+                            <p:stCondLst>
+                              <p:cond delay="0"/>
+                            </p:stCondLst>
+                            <p:childTnLst>
+                              <p:par>
+                                <p:cTn id="15" presetID="10" presetClass="entr" presetSubtype="0" fill="hold" grpId="0" nodeType="clickEffect">
+                                  <p:stCondLst>
+                                    <p:cond delay="0"/>
+                                  </p:stCondLst>
+                                  <p:childTnLst>
+                                    <p:set>
+                                      <p:cBhvr>
+                                        <p:cTn id="16" dur="1" fill="hold">
+                                          <p:stCondLst>
+                                            <p:cond delay="0"/>
+                                          </p:stCondLst>
+                                        </p:cTn>
+                                        <p:tgtEl>
+                                          <p:spTgt spid="5">
+                                            <p:txEl>
+                                              <p:pRg st="4" end="4"/>
+                                            </p:txEl>
+                                          </p:spTgt>
+                                        </p:tgtEl>
+                                        <p:attrNameLst>
+                                          <p:attrName>style.visibility</p:attrName>
+                                        </p:attrNameLst>
+                                      </p:cBhvr>
+                                      <p:to>
+                                        <p:strVal val="visible"/>
+                                      </p:to>
+                                    </p:set>
+                                    <p:animEffect transition="in" filter="fade">
+                                      <p:cBhvr>
+                                        <p:cTn id="17" dur="500"/>
+                                        <p:tgtEl>
+                                          <p:spTgt spid="5">
+                                            <p:txEl>
+                                              <p:pRg st="4" end="4"/>
+                                            </p:txEl>
+                                          </p:spTgt>
+                                        </p:tgtEl>
+                                      </p:cBhvr>
+                                    </p:animEffect>
+                                  </p:childTnLst>
+                                </p:cTn>
+                              </p:par>
+                            </p:childTnLst>
+                          </p:cTn>
+                        </p:par>
+                      </p:childTnLst>
+                    </p:cTn>
+                  </p:par>
+                  <p:par>
+                    <p:cTn id="18" fill="hold">
+                      <p:stCondLst>
+                        <p:cond delay="indefinite"/>
+                      </p:stCondLst>
+                      <p:childTnLst>
+                        <p:par>
+                          <p:cTn id="19" fill="hold">
+                            <p:stCondLst>
+                              <p:cond delay="0"/>
+                            </p:stCondLst>
+                            <p:childTnLst>
+                              <p:par>
+                                <p:cTn id="20" presetID="10" presetClass="entr" presetSubtype="0" fill="hold" grpId="0" nodeType="clickEffect">
+                                  <p:stCondLst>
+                                    <p:cond delay="0"/>
+                                  </p:stCondLst>
+                                  <p:childTnLst>
+                                    <p:set>
+                                      <p:cBhvr>
+                                        <p:cTn id="21" dur="1" fill="hold">
+                                          <p:stCondLst>
+                                            <p:cond delay="0"/>
+                                          </p:stCondLst>
+                                        </p:cTn>
+                                        <p:tgtEl>
+                                          <p:spTgt spid="5">
+                                            <p:txEl>
+                                              <p:pRg st="6" end="6"/>
+                                            </p:txEl>
+                                          </p:spTgt>
+                                        </p:tgtEl>
+                                        <p:attrNameLst>
+                                          <p:attrName>style.visibility</p:attrName>
+                                        </p:attrNameLst>
+                                      </p:cBhvr>
+                                      <p:to>
+                                        <p:strVal val="visible"/>
+                                      </p:to>
+                                    </p:set>
+                                    <p:animEffect transition="in" filter="fade">
+                                      <p:cBhvr>
+                                        <p:cTn id="22" dur="500"/>
+                                        <p:tgtEl>
+                                          <p:spTgt spid="5">
+                                            <p:txEl>
+                                              <p:pRg st="6" end="6"/>
+                                            </p:txEl>
+                                          </p:spTgt>
+                                        </p:tgtEl>
+                                      </p:cBhvr>
+                                    </p:animEffect>
+                                  </p:childTnLst>
+                                </p:cTn>
+                              </p:par>
+                            </p:childTnLst>
+                          </p:cTn>
+                        </p:par>
+                      </p:childTnLst>
+                    </p:cTn>
+                  </p:par>
+                  <p:par>
+                    <p:cTn id="23" fill="hold">
+                      <p:stCondLst>
+                        <p:cond delay="indefinite"/>
+                      </p:stCondLst>
+                      <p:childTnLst>
+                        <p:par>
+                          <p:cTn id="24" fill="hold">
+                            <p:stCondLst>
+                              <p:cond delay="0"/>
+                            </p:stCondLst>
+                            <p:childTnLst>
+                              <p:par>
+                                <p:cTn id="25" presetID="10" presetClass="entr" presetSubtype="0" fill="hold" grpId="0" nodeType="clickEffect">
+                                  <p:stCondLst>
+                                    <p:cond delay="0"/>
+                                  </p:stCondLst>
+                                  <p:childTnLst>
+                                    <p:set>
+                                      <p:cBhvr>
+                                        <p:cTn id="26" dur="1" fill="hold">
+                                          <p:stCondLst>
+                                            <p:cond delay="0"/>
+                                          </p:stCondLst>
+                                        </p:cTn>
+                                        <p:tgtEl>
+                                          <p:spTgt spid="5">
+                                            <p:txEl>
+                                              <p:pRg st="8" end="8"/>
+                                            </p:txEl>
+                                          </p:spTgt>
+                                        </p:tgtEl>
+                                        <p:attrNameLst>
+                                          <p:attrName>style.visibility</p:attrName>
+                                        </p:attrNameLst>
+                                      </p:cBhvr>
+                                      <p:to>
+                                        <p:strVal val="visible"/>
+                                      </p:to>
+                                    </p:set>
+                                    <p:animEffect transition="in" filter="fade">
+                                      <p:cBhvr>
+                                        <p:cTn id="27" dur="500"/>
+                                        <p:tgtEl>
+                                          <p:spTgt spid="5">
+                                            <p:txEl>
+                                              <p:pRg st="8" end="8"/>
+                                            </p:txEl>
+                                          </p:spTgt>
+                                        </p:tgtEl>
+                                      </p:cBhvr>
+                                    </p:animEffect>
+                                  </p:childTnLst>
+                                </p:cTn>
+                              </p:par>
+                            </p:childTnLst>
+                          </p:cTn>
+                        </p:par>
+                      </p:childTnLst>
+                    </p:cTn>
+                  </p:par>
+                </p:childTnLst>
+              </p:cTn>
+              <p:prevCondLst>
+                <p:cond evt="onPrev" delay="0">
+                  <p:tgtEl>
+                    <p:sldTgt/>
+                  </p:tgtEl>
+                </p:cond>
+              </p:prevCondLst>
+              <p:nextCondLst>
+                <p:cond evt="onNext" delay="0">
+                  <p:tgtEl>
+                    <p:sldTgt/>
+                  </p:tgtEl>
+                </p:cond>
+              </p:nextCondLst>
+            </p:seq>
+          </p:childTnLst>
+        </p:cTn>
+      </p:par>
+    </p:tnLst>
+    <p:bldLst>
+      <p:bldP spid="5" grpId="0" build="p"/>
+    </p:bldLst>
+  </p:timing>
+</p:sld>
+</file>
+
+<file path=ppt/slides/slide5.xml><?xml version="1.0" encoding="utf-8"?>
+<p:sld xmlns:a="http://schemas.openxmlformats.org/drawingml/2006/main" xmlns:r="http://schemas.openxmlformats.org/officeDocument/2006/relationships" xmlns:p="http://schemas.openxmlformats.org/presentationml/2006/main">
+  <p:cSld>
+    <p:spTree>
+      <p:nvGrpSpPr>
+        <p:cNvPr id="1" name=""/>
+        <p:cNvGrpSpPr/>
+        <p:nvPr/>
+      </p:nvGrpSpPr>
+      <p:grpSpPr>
+        <a:xfrm>
+          <a:off x="0" y="0"/>
+          <a:ext cx="0" cy="0"/>
+          <a:chOff x="0" y="0"/>
+          <a:chExt cx="0" cy="0"/>
+        </a:xfrm>
+      </p:grpSpPr>
+      <p:sp>
+        <p:nvSpPr>
+          <p:cNvPr id="2" name="Titel 1"/>
+          <p:cNvSpPr>
+            <a:spLocks noGrp="1"/>
+          </p:cNvSpPr>
+          <p:nvPr>
+            <p:ph type="title"/>
+          </p:nvPr>
+        </p:nvSpPr>
+        <p:spPr/>
+        <p:txBody>
+          <a:bodyPr>
+            <a:normAutofit/>
+          </a:bodyPr>
+          <a:lstStyle/>
+          <a:p>
+            <a:r>
+              <a:rPr lang="de-DE" dirty="0" smtClean="0"/>
+              <a:t>           </a:t>
+            </a:r>
+            <a:r>
+              <a:rPr lang="de-DE" dirty="0" smtClean="0"/>
+              <a:t>- Funktionsweise</a:t>
+            </a:r>
+            <a:endParaRPr lang="de-DE" dirty="0"/>
+          </a:p>
+        </p:txBody>
+      </p:sp>
+      <p:sp>
+        <p:nvSpPr>
+          <p:cNvPr id="3" name="Fußzeilenplatzhalter 2"/>
+          <p:cNvSpPr>
+            <a:spLocks noGrp="1"/>
+          </p:cNvSpPr>
+          <p:nvPr>
+            <p:ph type="ftr" sz="quarter" idx="11"/>
+          </p:nvPr>
+        </p:nvSpPr>
+        <p:spPr/>
+        <p:txBody>
+          <a:bodyPr/>
+          <a:lstStyle/>
+          <a:p>
+            <a:r>
+              <a:rPr lang="de-DE" smtClean="0"/>
+              <a:t>ePortfolio von Mehmet Ali Incekara</a:t>
+            </a:r>
+            <a:endParaRPr lang="de-DE"/>
+          </a:p>
+        </p:txBody>
+      </p:sp>
+      <p:sp>
+        <p:nvSpPr>
+          <p:cNvPr id="4" name="Foliennummernplatzhalter 3"/>
+          <p:cNvSpPr>
+            <a:spLocks noGrp="1"/>
+          </p:cNvSpPr>
+          <p:nvPr>
+            <p:ph type="sldNum" sz="quarter" idx="12"/>
+          </p:nvPr>
+        </p:nvSpPr>
+        <p:spPr/>
+        <p:txBody>
+          <a:bodyPr/>
+          <a:lstStyle/>
+          <a:p>
+            <a:fld id="{32988457-9EFF-4998-891D-85ECFB4B79A4}" type="slidenum">
+              <a:rPr lang="de-DE" smtClean="0"/>
+              <a:t>5</a:t>
+            </a:fld>
+            <a:endParaRPr lang="de-DE"/>
+          </a:p>
+        </p:txBody>
+      </p:sp>
+      <p:graphicFrame>
+        <p:nvGraphicFramePr>
+          <p:cNvPr id="6" name="Inhaltsplatzhalter 5"/>
+          <p:cNvGraphicFramePr>
+            <a:graphicFrameLocks noGrp="1"/>
+          </p:cNvGraphicFramePr>
+          <p:nvPr>
+            <p:ph sz="quarter" idx="1"/>
+            <p:extLst>
+              <p:ext uri="{D42A27DB-BD31-4B8C-83A1-F6EECF244321}">
+                <p14:modId xmlns:p14="http://schemas.microsoft.com/office/powerpoint/2010/main" val="4134528985"/>
+              </p:ext>
+            </p:extLst>
+          </p:nvPr>
+        </p:nvGraphicFramePr>
+        <p:xfrm>
+          <a:off x="457200" y="1305064"/>
+          <a:ext cx="8229600" cy="1407160"/>
+        </p:xfrm>
+        <a:graphic>
+          <a:graphicData uri="http://schemas.openxmlformats.org/drawingml/2006/table">
+            <a:tbl>
+              <a:tblPr firstRow="1" bandRow="1">
+                <a:tableStyleId>{BC89EF96-8CEA-46FF-86C4-4CE0E7609802}</a:tableStyleId>
+              </a:tblPr>
+              <a:tblGrid>
+                <a:gridCol w="1738536"/>
+                <a:gridCol w="6491064"/>
+              </a:tblGrid>
+              <a:tr h="370840">
+                <a:tc>
+                  <a:txBody>
+                    <a:bodyPr/>
+                    <a:lstStyle/>
+                    <a:p>
+                      <a:r>
+                        <a:rPr lang="de-DE" sz="1400" b="0" dirty="0" err="1" smtClean="0"/>
+                        <a:t>working</a:t>
+                      </a:r>
+                      <a:r>
+                        <a:rPr lang="de-DE" sz="1400" b="0" dirty="0" smtClean="0"/>
+                        <a:t> </a:t>
+                      </a:r>
+                      <a:r>
+                        <a:rPr lang="de-DE" sz="1400" b="0" dirty="0" err="1" smtClean="0"/>
+                        <a:t>directory</a:t>
+                      </a:r>
+                      <a:endParaRPr lang="de-DE" sz="1400" b="0" dirty="0"/>
+                    </a:p>
+                  </a:txBody>
+                  <a:tcPr/>
+                </a:tc>
+                <a:tc>
+                  <a:txBody>
+                    <a:bodyPr/>
+                    <a:lstStyle/>
+                    <a:p>
+                      <a:r>
+                        <a:rPr lang="de-DE" sz="1400" b="0" dirty="0" smtClean="0"/>
+                        <a:t>Du bearbeitest Dateien in deinem lokalen</a:t>
+                      </a:r>
+                      <a:r>
+                        <a:rPr lang="de-DE" sz="1400" b="0" baseline="0" dirty="0" smtClean="0"/>
+                        <a:t> Arbeitsverzeichnis.</a:t>
+                      </a:r>
+                      <a:endParaRPr lang="de-DE" sz="1400" b="0" dirty="0"/>
+                    </a:p>
+                  </a:txBody>
+                  <a:tcPr/>
+                </a:tc>
+              </a:tr>
+              <a:tr h="370840">
+                <a:tc>
+                  <a:txBody>
+                    <a:bodyPr/>
+                    <a:lstStyle/>
+                    <a:p>
+                      <a:r>
+                        <a:rPr lang="de-DE" sz="1400" b="0" dirty="0" err="1" smtClean="0"/>
+                        <a:t>staging</a:t>
+                      </a:r>
+                      <a:r>
+                        <a:rPr lang="de-DE" sz="1400" b="0" dirty="0" smtClean="0"/>
+                        <a:t> </a:t>
+                      </a:r>
+                      <a:r>
+                        <a:rPr lang="de-DE" sz="1400" b="0" dirty="0" err="1" smtClean="0"/>
+                        <a:t>area</a:t>
+                      </a:r>
+                      <a:endParaRPr lang="de-DE" sz="1400" b="0" dirty="0"/>
+                    </a:p>
+                  </a:txBody>
+                  <a:tcPr/>
+                </a:tc>
+                <a:tc>
+                  <a:txBody>
+                    <a:bodyPr/>
+                    <a:lstStyle/>
+                    <a:p>
+                      <a:r>
+                        <a:rPr lang="de-DE" sz="1400" b="0" dirty="0" smtClean="0"/>
+                        <a:t>Du markierst</a:t>
+                      </a:r>
+                      <a:r>
+                        <a:rPr lang="de-DE" sz="1400" b="0" baseline="0" dirty="0" smtClean="0"/>
+                        <a:t> Dateien für den nächsten Commit, indem Snapshots zur </a:t>
+                      </a:r>
+                      <a:r>
+                        <a:rPr lang="de-DE" sz="1400" b="0" baseline="0" dirty="0" err="1" smtClean="0"/>
+                        <a:t>staging</a:t>
+                      </a:r>
+                      <a:r>
+                        <a:rPr lang="de-DE" sz="1400" b="0" baseline="0" dirty="0" smtClean="0"/>
+                        <a:t> </a:t>
+                      </a:r>
+                      <a:r>
+                        <a:rPr lang="de-DE" sz="1400" b="0" baseline="0" dirty="0" err="1" smtClean="0"/>
+                        <a:t>are</a:t>
+                      </a:r>
+                      <a:r>
+                        <a:rPr lang="de-DE" sz="1400" b="0" baseline="0" dirty="0" smtClean="0"/>
+                        <a:t> hinzugefügt werden</a:t>
+                      </a:r>
+                      <a:endParaRPr lang="de-DE" sz="1400" b="0" dirty="0"/>
+                    </a:p>
+                  </a:txBody>
+                  <a:tcPr/>
+                </a:tc>
+              </a:tr>
+              <a:tr h="370840">
+                <a:tc>
+                  <a:txBody>
+                    <a:bodyPr/>
+                    <a:lstStyle/>
+                    <a:p>
+                      <a:r>
+                        <a:rPr lang="de-DE" sz="1400" b="0" dirty="0" err="1" smtClean="0"/>
+                        <a:t>Git</a:t>
+                      </a:r>
+                      <a:r>
+                        <a:rPr lang="de-DE" sz="1400" b="0" dirty="0" smtClean="0"/>
+                        <a:t> </a:t>
+                      </a:r>
+                      <a:r>
+                        <a:rPr lang="de-DE" sz="1400" b="0" dirty="0" err="1" smtClean="0"/>
+                        <a:t>directory</a:t>
+                      </a:r>
+                      <a:r>
+                        <a:rPr lang="de-DE" sz="1400" b="0" dirty="0" smtClean="0"/>
+                        <a:t/>
+                      </a:r>
+                      <a:br>
+                        <a:rPr lang="de-DE" sz="1400" b="0" dirty="0" smtClean="0"/>
+                      </a:br>
+                      <a:r>
+                        <a:rPr lang="de-DE" sz="1400" b="0" dirty="0" smtClean="0"/>
+                        <a:t>(</a:t>
+                      </a:r>
+                      <a:r>
+                        <a:rPr lang="de-DE" sz="1400" b="0" dirty="0" err="1" smtClean="0"/>
+                        <a:t>repository</a:t>
+                      </a:r>
+                      <a:r>
+                        <a:rPr lang="de-DE" sz="1400" b="0" dirty="0" smtClean="0"/>
+                        <a:t>)</a:t>
+                      </a:r>
+                      <a:endParaRPr lang="de-DE" sz="1400" b="0" dirty="0"/>
+                    </a:p>
+                  </a:txBody>
+                  <a:tcPr/>
+                </a:tc>
+                <a:tc>
+                  <a:txBody>
+                    <a:bodyPr/>
+                    <a:lstStyle/>
+                    <a:p>
+                      <a:r>
+                        <a:rPr lang="de-DE" sz="1400" b="0" dirty="0" smtClean="0"/>
+                        <a:t>Die in der </a:t>
+                      </a:r>
+                      <a:r>
+                        <a:rPr lang="de-DE" sz="1400" b="0" dirty="0" err="1" smtClean="0"/>
+                        <a:t>staging</a:t>
+                      </a:r>
+                      <a:r>
+                        <a:rPr lang="de-DE" sz="1400" b="0" baseline="0" dirty="0" smtClean="0"/>
+                        <a:t> </a:t>
+                      </a:r>
+                      <a:r>
+                        <a:rPr lang="de-DE" sz="1400" b="0" baseline="0" dirty="0" err="1" smtClean="0"/>
+                        <a:t>area</a:t>
+                      </a:r>
+                      <a:r>
+                        <a:rPr lang="de-DE" sz="1400" b="0" baseline="0" dirty="0" smtClean="0"/>
+                        <a:t> vorgemerkten Snapshots werden dauerhaft im </a:t>
+                      </a:r>
+                      <a:r>
+                        <a:rPr lang="de-DE" sz="1400" b="0" baseline="0" dirty="0" err="1" smtClean="0"/>
+                        <a:t>Git</a:t>
+                      </a:r>
+                      <a:r>
+                        <a:rPr lang="de-DE" sz="1400" b="0" baseline="0" dirty="0" smtClean="0"/>
+                        <a:t> Verzeichnis (d.h. der lokalen Datenbank) abgespeichert</a:t>
+                      </a:r>
+                      <a:endParaRPr lang="de-DE" sz="1400" b="0" dirty="0"/>
+                    </a:p>
+                  </a:txBody>
+                  <a:tcPr/>
+                </a:tc>
+              </a:tr>
+            </a:tbl>
+          </a:graphicData>
+        </a:graphic>
+      </p:graphicFrame>
       <p:pic>
         <p:nvPicPr>
           <p:cNvPr id="1026" name="Picture 2" descr="Logo"/>
@@ -4959,8 +6056,301 @@
         </p:blipFill>
         <p:spPr bwMode="auto">
           <a:xfrm>
-            <a:off x="550962" y="524668"/>
+            <a:off x="457200" y="519429"/>
             <a:ext cx="1428750" cy="600076"/>
+          </a:xfrm>
+          <a:prstGeom prst="rect">
+            <a:avLst/>
+          </a:prstGeom>
+          <a:noFill/>
+          <a:extLst>
+            <a:ext uri="{909E8E84-426E-40DD-AFC4-6F175D3DCCD1}">
+              <a14:hiddenFill xmlns:a14="http://schemas.microsoft.com/office/drawing/2010/main">
+                <a:solidFill>
+                  <a:srgbClr val="FFFFFF"/>
+                </a:solidFill>
+              </a14:hiddenFill>
+            </a:ext>
+          </a:extLst>
+        </p:spPr>
+      </p:pic>
+      <p:pic>
+        <p:nvPicPr>
+          <p:cNvPr id="3076" name="Picture 4" descr="http://git-scm.com/figures/18333fig0106-tn.png"/>
+          <p:cNvPicPr>
+            <a:picLocks noChangeAspect="1" noChangeArrowheads="1"/>
+          </p:cNvPicPr>
+          <p:nvPr/>
+        </p:nvPicPr>
+        <p:blipFill>
+          <a:blip r:embed="rId3">
+            <a:extLst>
+              <a:ext uri="{28A0092B-C50C-407E-A947-70E740481C1C}">
+                <a14:useLocalDpi xmlns:a14="http://schemas.microsoft.com/office/drawing/2010/main" val="0"/>
+              </a:ext>
+            </a:extLst>
+          </a:blip>
+          <a:srcRect/>
+          <a:stretch>
+            <a:fillRect/>
+          </a:stretch>
+        </p:blipFill>
+        <p:spPr bwMode="auto">
+          <a:xfrm>
+            <a:off x="2822872" y="2924844"/>
+            <a:ext cx="3498256" cy="3218397"/>
+          </a:xfrm>
+          <a:prstGeom prst="rect">
+            <a:avLst/>
+          </a:prstGeom>
+          <a:noFill/>
+          <a:extLst>
+            <a:ext uri="{909E8E84-426E-40DD-AFC4-6F175D3DCCD1}">
+              <a14:hiddenFill xmlns:a14="http://schemas.microsoft.com/office/drawing/2010/main">
+                <a:solidFill>
+                  <a:srgbClr val="FFFFFF"/>
+                </a:solidFill>
+              </a14:hiddenFill>
+            </a:ext>
+          </a:extLst>
+        </p:spPr>
+      </p:pic>
+    </p:spTree>
+    <p:extLst>
+      <p:ext uri="{BB962C8B-B14F-4D97-AF65-F5344CB8AC3E}">
+        <p14:creationId xmlns:p14="http://schemas.microsoft.com/office/powerpoint/2010/main" val="85592459"/>
+      </p:ext>
+    </p:extLst>
+  </p:cSld>
+  <p:clrMapOvr>
+    <a:masterClrMapping/>
+  </p:clrMapOvr>
+  <p:timing>
+    <p:tnLst>
+      <p:par>
+        <p:cTn id="1" dur="indefinite" restart="never" nodeType="tmRoot"/>
+      </p:par>
+    </p:tnLst>
+  </p:timing>
+</p:sld>
+</file>
+
+<file path=ppt/slides/slide6.xml><?xml version="1.0" encoding="utf-8"?>
+<p:sld xmlns:a="http://schemas.openxmlformats.org/drawingml/2006/main" xmlns:r="http://schemas.openxmlformats.org/officeDocument/2006/relationships" xmlns:p="http://schemas.openxmlformats.org/presentationml/2006/main">
+  <p:cSld>
+    <p:spTree>
+      <p:nvGrpSpPr>
+        <p:cNvPr id="1" name=""/>
+        <p:cNvGrpSpPr/>
+        <p:nvPr/>
+      </p:nvGrpSpPr>
+      <p:grpSpPr>
+        <a:xfrm>
+          <a:off x="0" y="0"/>
+          <a:ext cx="0" cy="0"/>
+          <a:chOff x="0" y="0"/>
+          <a:chExt cx="0" cy="0"/>
+        </a:xfrm>
+      </p:grpSpPr>
+      <p:sp>
+        <p:nvSpPr>
+          <p:cNvPr id="2" name="Titel 1"/>
+          <p:cNvSpPr>
+            <a:spLocks noGrp="1"/>
+          </p:cNvSpPr>
+          <p:nvPr>
+            <p:ph type="title"/>
+          </p:nvPr>
+        </p:nvSpPr>
+        <p:spPr/>
+        <p:txBody>
+          <a:bodyPr>
+            <a:normAutofit/>
+          </a:bodyPr>
+          <a:lstStyle/>
+          <a:p>
+            <a:r>
+              <a:rPr lang="de-DE" dirty="0" smtClean="0"/>
+              <a:t>            </a:t>
+            </a:r>
+            <a:r>
+              <a:rPr lang="de-DE" dirty="0"/>
+              <a:t> </a:t>
+            </a:r>
+            <a:r>
+              <a:rPr lang="de-DE" dirty="0" smtClean="0"/>
+              <a:t>   - Idee</a:t>
+            </a:r>
+            <a:endParaRPr lang="de-DE" dirty="0"/>
+          </a:p>
+        </p:txBody>
+      </p:sp>
+      <p:sp>
+        <p:nvSpPr>
+          <p:cNvPr id="3" name="Fußzeilenplatzhalter 2"/>
+          <p:cNvSpPr>
+            <a:spLocks noGrp="1"/>
+          </p:cNvSpPr>
+          <p:nvPr>
+            <p:ph type="ftr" sz="quarter" idx="11"/>
+          </p:nvPr>
+        </p:nvSpPr>
+        <p:spPr/>
+        <p:txBody>
+          <a:bodyPr/>
+          <a:lstStyle/>
+          <a:p>
+            <a:r>
+              <a:rPr lang="de-DE" smtClean="0"/>
+              <a:t>ePortfolio von Mehmet Ali Incekara</a:t>
+            </a:r>
+            <a:endParaRPr lang="de-DE"/>
+          </a:p>
+        </p:txBody>
+      </p:sp>
+      <p:sp>
+        <p:nvSpPr>
+          <p:cNvPr id="4" name="Foliennummernplatzhalter 3"/>
+          <p:cNvSpPr>
+            <a:spLocks noGrp="1"/>
+          </p:cNvSpPr>
+          <p:nvPr>
+            <p:ph type="sldNum" sz="quarter" idx="12"/>
+          </p:nvPr>
+        </p:nvSpPr>
+        <p:spPr/>
+        <p:txBody>
+          <a:bodyPr/>
+          <a:lstStyle/>
+          <a:p>
+            <a:fld id="{32988457-9EFF-4998-891D-85ECFB4B79A4}" type="slidenum">
+              <a:rPr lang="de-DE" smtClean="0"/>
+              <a:t>6</a:t>
+            </a:fld>
+            <a:endParaRPr lang="de-DE"/>
+          </a:p>
+        </p:txBody>
+      </p:sp>
+      <p:sp>
+        <p:nvSpPr>
+          <p:cNvPr id="5" name="Inhaltsplatzhalter 4"/>
+          <p:cNvSpPr>
+            <a:spLocks noGrp="1"/>
+          </p:cNvSpPr>
+          <p:nvPr>
+            <p:ph sz="quarter" idx="1"/>
+          </p:nvPr>
+        </p:nvSpPr>
+        <p:spPr/>
+        <p:txBody>
+          <a:bodyPr/>
+          <a:lstStyle/>
+          <a:p>
+            <a:r>
+              <a:rPr lang="de-DE" dirty="0" smtClean="0"/>
+              <a:t>webbasierter </a:t>
+            </a:r>
+            <a:r>
+              <a:rPr lang="de-DE" dirty="0" err="1" smtClean="0"/>
+              <a:t>Hostingservice</a:t>
+            </a:r>
+            <a:r>
+              <a:rPr lang="de-DE" dirty="0" smtClean="0"/>
+              <a:t> </a:t>
+            </a:r>
+          </a:p>
+          <a:p>
+            <a:endParaRPr lang="de-DE" dirty="0" smtClean="0"/>
+          </a:p>
+          <a:p>
+            <a:r>
+              <a:rPr lang="de-DE" dirty="0" err="1" smtClean="0"/>
+              <a:t>Git</a:t>
+            </a:r>
+            <a:r>
+              <a:rPr lang="de-DE" dirty="0" smtClean="0"/>
+              <a:t> als grafische Oberfläche</a:t>
+            </a:r>
+          </a:p>
+          <a:p>
+            <a:endParaRPr lang="de-DE" dirty="0" smtClean="0"/>
+          </a:p>
+          <a:p>
+            <a:r>
+              <a:rPr lang="de-DE" dirty="0" smtClean="0"/>
+              <a:t>Erweiterung um Komponenten von Sozialen </a:t>
+            </a:r>
+            <a:r>
+              <a:rPr lang="de-DE" dirty="0" smtClean="0"/>
+              <a:t>Netzwerken</a:t>
+            </a:r>
+          </a:p>
+          <a:p>
+            <a:endParaRPr lang="de-DE" dirty="0" smtClean="0"/>
+          </a:p>
+          <a:p>
+            <a:r>
+              <a:rPr lang="de-DE" dirty="0" smtClean="0"/>
+              <a:t>Tools für </a:t>
+            </a:r>
+            <a:r>
+              <a:rPr lang="de-DE" dirty="0" smtClean="0"/>
+              <a:t>Projektmanagement</a:t>
+            </a:r>
+          </a:p>
+          <a:p>
+            <a:endParaRPr lang="de-DE" dirty="0"/>
+          </a:p>
+          <a:p>
+            <a:r>
+              <a:rPr lang="de-DE" dirty="0" smtClean="0"/>
+              <a:t>Alternativen: </a:t>
+            </a:r>
+            <a:r>
+              <a:rPr lang="de-DE" dirty="0" err="1" smtClean="0"/>
+              <a:t>Gitlab</a:t>
+            </a:r>
+            <a:r>
+              <a:rPr lang="de-DE" dirty="0" smtClean="0"/>
+              <a:t>, </a:t>
+            </a:r>
+            <a:r>
+              <a:rPr lang="de-DE" dirty="0" err="1" smtClean="0"/>
+              <a:t>Bitbucket</a:t>
+            </a:r>
+            <a:r>
+              <a:rPr lang="de-DE" dirty="0" smtClean="0"/>
+              <a:t>, …</a:t>
+            </a:r>
+            <a:endParaRPr lang="de-DE" dirty="0"/>
+          </a:p>
+        </p:txBody>
+      </p:sp>
+      <p:pic>
+        <p:nvPicPr>
+          <p:cNvPr id="2050" name="Picture 2" descr="GitHub logo 2013 padded.svg"/>
+          <p:cNvPicPr>
+            <a:picLocks noChangeAspect="1" noChangeArrowheads="1"/>
+          </p:cNvPicPr>
+          <p:nvPr/>
+        </p:nvPicPr>
+        <p:blipFill>
+          <a:blip r:embed="rId2">
+            <a:extLst>
+              <a:ext uri="{28A0092B-C50C-407E-A947-70E740481C1C}">
+                <a14:useLocalDpi xmlns:a14="http://schemas.microsoft.com/office/drawing/2010/main" val="0"/>
+              </a:ext>
+            </a:extLst>
+          </a:blip>
+          <a:srcRect/>
+          <a:stretch>
+            <a:fillRect/>
+          </a:stretch>
+        </p:blipFill>
+        <p:spPr bwMode="auto">
+          <a:xfrm>
+            <a:off x="457200" y="405600"/>
+            <a:ext cx="2095500" cy="619126"/>
           </a:xfrm>
           <a:prstGeom prst="rect">
             <a:avLst/>
@@ -4987,10 +6377,17 @@
   <p:clrMapOvr>
     <a:masterClrMapping/>
   </p:clrMapOvr>
+  <p:timing>
+    <p:tnLst>
+      <p:par>
+        <p:cTn id="1" dur="indefinite" restart="never" nodeType="tmRoot"/>
+      </p:par>
+    </p:tnLst>
+  </p:timing>
 </p:sld>
 </file>
 
-<file path=ppt/slides/slide5.xml><?xml version="1.0" encoding="utf-8"?>
+<file path=ppt/slides/slide7.xml><?xml version="1.0" encoding="utf-8"?>
 <p:sld xmlns:a="http://schemas.openxmlformats.org/drawingml/2006/main" xmlns:r="http://schemas.openxmlformats.org/officeDocument/2006/relationships" xmlns:p="http://schemas.openxmlformats.org/presentationml/2006/main">
   <p:cSld>
     <p:spTree>
@@ -5026,7 +6423,11 @@
           <a:p>
             <a:r>
               <a:rPr lang="de-DE" dirty="0" smtClean="0"/>
-              <a:t>            - Idee</a:t>
+              <a:t>           </a:t>
+            </a:r>
+            <a:r>
+              <a:rPr lang="de-DE" dirty="0" smtClean="0"/>
+              <a:t>- Befehle</a:t>
             </a:r>
             <a:endParaRPr lang="de-DE" dirty="0"/>
           </a:p>
@@ -5072,7 +6473,7 @@
           <a:p>
             <a:fld id="{32988457-9EFF-4998-891D-85ECFB4B79A4}" type="slidenum">
               <a:rPr lang="de-DE" smtClean="0"/>
-              <a:t>5</a:t>
+              <a:t>7</a:t>
             </a:fld>
             <a:endParaRPr lang="de-DE"/>
           </a:p>
@@ -5093,7 +6494,103 @@
           <a:bodyPr/>
           <a:lstStyle/>
           <a:p>
-            <a:endParaRPr lang="de-DE"/>
+            <a:r>
+              <a:rPr lang="de-DE" dirty="0" err="1">
+                <a:latin typeface="Arial Unicode MS" panose="020B0604020202020204" pitchFamily="34" charset="-128"/>
+                <a:ea typeface="Arial Unicode MS" panose="020B0604020202020204" pitchFamily="34" charset="-128"/>
+                <a:cs typeface="Arial Unicode MS" panose="020B0604020202020204" pitchFamily="34" charset="-128"/>
+              </a:rPr>
+              <a:t>Git</a:t>
+            </a:r>
+            <a:r>
+              <a:rPr lang="de-DE" dirty="0">
+                <a:latin typeface="Arial Unicode MS" panose="020B0604020202020204" pitchFamily="34" charset="-128"/>
+                <a:ea typeface="Arial Unicode MS" panose="020B0604020202020204" pitchFamily="34" charset="-128"/>
+                <a:cs typeface="Arial Unicode MS" panose="020B0604020202020204" pitchFamily="34" charset="-128"/>
+              </a:rPr>
+              <a:t> log –</a:t>
+            </a:r>
+            <a:r>
+              <a:rPr lang="de-DE" dirty="0" err="1">
+                <a:latin typeface="Arial Unicode MS" panose="020B0604020202020204" pitchFamily="34" charset="-128"/>
+                <a:ea typeface="Arial Unicode MS" panose="020B0604020202020204" pitchFamily="34" charset="-128"/>
+                <a:cs typeface="Arial Unicode MS" panose="020B0604020202020204" pitchFamily="34" charset="-128"/>
+              </a:rPr>
+              <a:t>oneline</a:t>
+            </a:r>
+            <a:endParaRPr lang="de-DE" dirty="0">
+              <a:latin typeface="Arial Unicode MS" panose="020B0604020202020204" pitchFamily="34" charset="-128"/>
+              <a:ea typeface="Arial Unicode MS" panose="020B0604020202020204" pitchFamily="34" charset="-128"/>
+              <a:cs typeface="Arial Unicode MS" panose="020B0604020202020204" pitchFamily="34" charset="-128"/>
+            </a:endParaRPr>
+          </a:p>
+          <a:p>
+            <a:r>
+              <a:rPr lang="de-DE" dirty="0" err="1">
+                <a:latin typeface="Arial Unicode MS" panose="020B0604020202020204" pitchFamily="34" charset="-128"/>
+                <a:ea typeface="Arial Unicode MS" panose="020B0604020202020204" pitchFamily="34" charset="-128"/>
+                <a:cs typeface="Arial Unicode MS" panose="020B0604020202020204" pitchFamily="34" charset="-128"/>
+              </a:rPr>
+              <a:t>Git</a:t>
+            </a:r>
+            <a:r>
+              <a:rPr lang="de-DE" dirty="0">
+                <a:latin typeface="Arial Unicode MS" panose="020B0604020202020204" pitchFamily="34" charset="-128"/>
+                <a:ea typeface="Arial Unicode MS" panose="020B0604020202020204" pitchFamily="34" charset="-128"/>
+                <a:cs typeface="Arial Unicode MS" panose="020B0604020202020204" pitchFamily="34" charset="-128"/>
+              </a:rPr>
+              <a:t> </a:t>
+            </a:r>
+            <a:r>
+              <a:rPr lang="de-DE" dirty="0" err="1">
+                <a:latin typeface="Arial Unicode MS" panose="020B0604020202020204" pitchFamily="34" charset="-128"/>
+                <a:ea typeface="Arial Unicode MS" panose="020B0604020202020204" pitchFamily="34" charset="-128"/>
+                <a:cs typeface="Arial Unicode MS" panose="020B0604020202020204" pitchFamily="34" charset="-128"/>
+              </a:rPr>
+              <a:t>checkout</a:t>
+            </a:r>
+            <a:r>
+              <a:rPr lang="de-DE" dirty="0">
+                <a:latin typeface="Arial Unicode MS" panose="020B0604020202020204" pitchFamily="34" charset="-128"/>
+                <a:ea typeface="Arial Unicode MS" panose="020B0604020202020204" pitchFamily="34" charset="-128"/>
+                <a:cs typeface="Arial Unicode MS" panose="020B0604020202020204" pitchFamily="34" charset="-128"/>
+              </a:rPr>
+              <a:t> &lt;</a:t>
+            </a:r>
+            <a:r>
+              <a:rPr lang="de-DE" dirty="0" err="1">
+                <a:latin typeface="Arial Unicode MS" panose="020B0604020202020204" pitchFamily="34" charset="-128"/>
+                <a:ea typeface="Arial Unicode MS" panose="020B0604020202020204" pitchFamily="34" charset="-128"/>
+                <a:cs typeface="Arial Unicode MS" panose="020B0604020202020204" pitchFamily="34" charset="-128"/>
+              </a:rPr>
+              <a:t>lognr</a:t>
+            </a:r>
+            <a:r>
+              <a:rPr lang="de-DE" dirty="0">
+                <a:latin typeface="Arial Unicode MS" panose="020B0604020202020204" pitchFamily="34" charset="-128"/>
+                <a:ea typeface="Arial Unicode MS" panose="020B0604020202020204" pitchFamily="34" charset="-128"/>
+                <a:cs typeface="Arial Unicode MS" panose="020B0604020202020204" pitchFamily="34" charset="-128"/>
+              </a:rPr>
+              <a:t>&gt;</a:t>
+            </a:r>
+          </a:p>
+          <a:p>
+            <a:r>
+              <a:rPr lang="de-DE" dirty="0" err="1">
+                <a:latin typeface="Arial Unicode MS" panose="020B0604020202020204" pitchFamily="34" charset="-128"/>
+                <a:ea typeface="Arial Unicode MS" panose="020B0604020202020204" pitchFamily="34" charset="-128"/>
+                <a:cs typeface="Arial Unicode MS" panose="020B0604020202020204" pitchFamily="34" charset="-128"/>
+              </a:rPr>
+              <a:t>gitk</a:t>
+            </a:r>
+            <a:endParaRPr lang="de-DE" dirty="0">
+              <a:latin typeface="Arial Unicode MS" panose="020B0604020202020204" pitchFamily="34" charset="-128"/>
+              <a:ea typeface="Arial Unicode MS" panose="020B0604020202020204" pitchFamily="34" charset="-128"/>
+              <a:cs typeface="Arial Unicode MS" panose="020B0604020202020204" pitchFamily="34" charset="-128"/>
+            </a:endParaRPr>
+          </a:p>
+          <a:p>
+            <a:endParaRPr lang="de-DE" dirty="0" smtClean="0"/>
           </a:p>
         </p:txBody>
       </p:sp>
@@ -5120,7 +6617,7 @@
         </p:blipFill>
         <p:spPr bwMode="auto">
           <a:xfrm>
-            <a:off x="550962" y="524668"/>
+            <a:off x="457200" y="519429"/>
             <a:ext cx="1428750" cy="600076"/>
           </a:xfrm>
           <a:prstGeom prst="rect">
@@ -5141,17 +6638,24 @@
     </p:spTree>
     <p:extLst>
       <p:ext uri="{BB962C8B-B14F-4D97-AF65-F5344CB8AC3E}">
-        <p14:creationId xmlns:p14="http://schemas.microsoft.com/office/powerpoint/2010/main" val="2121389670"/>
+        <p14:creationId xmlns:p14="http://schemas.microsoft.com/office/powerpoint/2010/main" val="668462337"/>
       </p:ext>
     </p:extLst>
   </p:cSld>
   <p:clrMapOvr>
     <a:masterClrMapping/>
   </p:clrMapOvr>
+  <p:timing>
+    <p:tnLst>
+      <p:par>
+        <p:cTn id="1" dur="indefinite" restart="never" nodeType="tmRoot"/>
+      </p:par>
+    </p:tnLst>
+  </p:timing>
 </p:sld>
 </file>
 
-<file path=ppt/slides/slide6.xml><?xml version="1.0" encoding="utf-8"?>
+<file path=ppt/slides/slide8.xml><?xml version="1.0" encoding="utf-8"?>
 <p:sld xmlns:a="http://schemas.openxmlformats.org/drawingml/2006/main" xmlns:r="http://schemas.openxmlformats.org/officeDocument/2006/relationships" xmlns:p="http://schemas.openxmlformats.org/presentationml/2006/main">
   <p:cSld>
     <p:spTree>
@@ -5187,7 +6691,7 @@
           <a:p>
             <a:r>
               <a:rPr lang="de-DE" dirty="0" smtClean="0"/>
-              <a:t>            - Idee</a:t>
+              <a:t>Befehle</a:t>
             </a:r>
             <a:endParaRPr lang="de-DE" dirty="0"/>
           </a:p>
@@ -5233,7 +6737,7 @@
           <a:p>
             <a:fld id="{32988457-9EFF-4998-891D-85ECFB4B79A4}" type="slidenum">
               <a:rPr lang="de-DE" smtClean="0"/>
-              <a:t>6</a:t>
+              <a:t>8</a:t>
             </a:fld>
             <a:endParaRPr lang="de-DE"/>
           </a:p>
@@ -5251,68 +6755,587 @@
         </p:nvSpPr>
         <p:spPr/>
         <p:txBody>
-          <a:bodyPr/>
-          <a:lstStyle/>
-          <a:p>
-            <a:endParaRPr lang="de-DE"/>
-          </a:p>
-        </p:txBody>
-      </p:sp>
-      <p:pic>
-        <p:nvPicPr>
-          <p:cNvPr id="1026" name="Picture 2" descr="Logo"/>
-          <p:cNvPicPr>
-            <a:picLocks noChangeAspect="1" noChangeArrowheads="1"/>
-          </p:cNvPicPr>
-          <p:nvPr/>
-        </p:nvPicPr>
-        <p:blipFill>
-          <a:blip r:embed="rId2">
-            <a:extLst>
-              <a:ext uri="{28A0092B-C50C-407E-A947-70E740481C1C}">
-                <a14:useLocalDpi xmlns:a14="http://schemas.microsoft.com/office/drawing/2010/main" val="0"/>
-              </a:ext>
-            </a:extLst>
-          </a:blip>
-          <a:srcRect/>
-          <a:stretch>
-            <a:fillRect/>
-          </a:stretch>
-        </p:blipFill>
-        <p:spPr bwMode="auto">
-          <a:xfrm>
-            <a:off x="550962" y="524668"/>
-            <a:ext cx="1428750" cy="600076"/>
-          </a:xfrm>
-          <a:prstGeom prst="rect">
-            <a:avLst/>
-          </a:prstGeom>
-          <a:noFill/>
-          <a:extLst>
-            <a:ext uri="{909E8E84-426E-40DD-AFC4-6F175D3DCCD1}">
-              <a14:hiddenFill xmlns:a14="http://schemas.microsoft.com/office/drawing/2010/main">
-                <a:solidFill>
-                  <a:srgbClr val="FFFFFF"/>
-                </a:solidFill>
-              </a14:hiddenFill>
-            </a:ext>
-          </a:extLst>
-        </p:spPr>
-      </p:pic>
+          <a:bodyPr>
+            <a:normAutofit fontScale="92500" lnSpcReduction="20000"/>
+          </a:bodyPr>
+          <a:lstStyle/>
+          <a:p>
+            <a:r>
+              <a:rPr lang="de-DE" dirty="0" err="1">
+                <a:latin typeface="Arial Unicode MS" panose="020B0604020202020204" pitchFamily="34" charset="-128"/>
+                <a:ea typeface="Arial Unicode MS" panose="020B0604020202020204" pitchFamily="34" charset="-128"/>
+                <a:cs typeface="Arial Unicode MS" panose="020B0604020202020204" pitchFamily="34" charset="-128"/>
+              </a:rPr>
+              <a:t>g</a:t>
+            </a:r>
+            <a:r>
+              <a:rPr lang="de-DE" dirty="0" err="1" smtClean="0">
+                <a:latin typeface="Arial Unicode MS" panose="020B0604020202020204" pitchFamily="34" charset="-128"/>
+                <a:ea typeface="Arial Unicode MS" panose="020B0604020202020204" pitchFamily="34" charset="-128"/>
+                <a:cs typeface="Arial Unicode MS" panose="020B0604020202020204" pitchFamily="34" charset="-128"/>
+              </a:rPr>
+              <a:t>it</a:t>
+            </a:r>
+            <a:r>
+              <a:rPr lang="de-DE" dirty="0" smtClean="0">
+                <a:latin typeface="Arial Unicode MS" panose="020B0604020202020204" pitchFamily="34" charset="-128"/>
+                <a:ea typeface="Arial Unicode MS" panose="020B0604020202020204" pitchFamily="34" charset="-128"/>
+                <a:cs typeface="Arial Unicode MS" panose="020B0604020202020204" pitchFamily="34" charset="-128"/>
+              </a:rPr>
+              <a:t> </a:t>
+            </a:r>
+            <a:r>
+              <a:rPr lang="de-DE" dirty="0" err="1" smtClean="0">
+                <a:latin typeface="Arial Unicode MS" panose="020B0604020202020204" pitchFamily="34" charset="-128"/>
+                <a:ea typeface="Arial Unicode MS" panose="020B0604020202020204" pitchFamily="34" charset="-128"/>
+                <a:cs typeface="Arial Unicode MS" panose="020B0604020202020204" pitchFamily="34" charset="-128"/>
+              </a:rPr>
+              <a:t>init</a:t>
+            </a:r>
+            <a:endParaRPr lang="de-DE" dirty="0" smtClean="0">
+              <a:latin typeface="Arial Unicode MS" panose="020B0604020202020204" pitchFamily="34" charset="-128"/>
+              <a:ea typeface="Arial Unicode MS" panose="020B0604020202020204" pitchFamily="34" charset="-128"/>
+              <a:cs typeface="Arial Unicode MS" panose="020B0604020202020204" pitchFamily="34" charset="-128"/>
+            </a:endParaRPr>
+          </a:p>
+          <a:p>
+            <a:r>
+              <a:rPr lang="de-DE" dirty="0" err="1" smtClean="0">
+                <a:latin typeface="Arial Unicode MS" panose="020B0604020202020204" pitchFamily="34" charset="-128"/>
+                <a:ea typeface="Arial Unicode MS" panose="020B0604020202020204" pitchFamily="34" charset="-128"/>
+                <a:cs typeface="Arial Unicode MS" panose="020B0604020202020204" pitchFamily="34" charset="-128"/>
+              </a:rPr>
+              <a:t>Git</a:t>
+            </a:r>
+            <a:r>
+              <a:rPr lang="de-DE" dirty="0" smtClean="0">
+                <a:latin typeface="Arial Unicode MS" panose="020B0604020202020204" pitchFamily="34" charset="-128"/>
+                <a:ea typeface="Arial Unicode MS" panose="020B0604020202020204" pitchFamily="34" charset="-128"/>
+                <a:cs typeface="Arial Unicode MS" panose="020B0604020202020204" pitchFamily="34" charset="-128"/>
+              </a:rPr>
+              <a:t> </a:t>
+            </a:r>
+            <a:r>
+              <a:rPr lang="de-DE" dirty="0" err="1" smtClean="0">
+                <a:latin typeface="Arial Unicode MS" panose="020B0604020202020204" pitchFamily="34" charset="-128"/>
+                <a:ea typeface="Arial Unicode MS" panose="020B0604020202020204" pitchFamily="34" charset="-128"/>
+                <a:cs typeface="Arial Unicode MS" panose="020B0604020202020204" pitchFamily="34" charset="-128"/>
+              </a:rPr>
+              <a:t>clone</a:t>
+            </a:r>
+            <a:endParaRPr lang="de-DE" dirty="0">
+              <a:latin typeface="Arial Unicode MS" panose="020B0604020202020204" pitchFamily="34" charset="-128"/>
+              <a:ea typeface="Arial Unicode MS" panose="020B0604020202020204" pitchFamily="34" charset="-128"/>
+              <a:cs typeface="Arial Unicode MS" panose="020B0604020202020204" pitchFamily="34" charset="-128"/>
+            </a:endParaRPr>
+          </a:p>
+          <a:p>
+            <a:r>
+              <a:rPr lang="de-DE" dirty="0" err="1" smtClean="0">
+                <a:latin typeface="Arial Unicode MS" panose="020B0604020202020204" pitchFamily="34" charset="-128"/>
+                <a:ea typeface="Arial Unicode MS" panose="020B0604020202020204" pitchFamily="34" charset="-128"/>
+                <a:cs typeface="Arial Unicode MS" panose="020B0604020202020204" pitchFamily="34" charset="-128"/>
+              </a:rPr>
+              <a:t>Git</a:t>
+            </a:r>
+            <a:r>
+              <a:rPr lang="de-DE" dirty="0" smtClean="0">
+                <a:latin typeface="Arial Unicode MS" panose="020B0604020202020204" pitchFamily="34" charset="-128"/>
+                <a:ea typeface="Arial Unicode MS" panose="020B0604020202020204" pitchFamily="34" charset="-128"/>
+                <a:cs typeface="Arial Unicode MS" panose="020B0604020202020204" pitchFamily="34" charset="-128"/>
+              </a:rPr>
+              <a:t> </a:t>
+            </a:r>
+            <a:r>
+              <a:rPr lang="de-DE" dirty="0" err="1" smtClean="0">
+                <a:latin typeface="Arial Unicode MS" panose="020B0604020202020204" pitchFamily="34" charset="-128"/>
+                <a:ea typeface="Arial Unicode MS" panose="020B0604020202020204" pitchFamily="34" charset="-128"/>
+                <a:cs typeface="Arial Unicode MS" panose="020B0604020202020204" pitchFamily="34" charset="-128"/>
+              </a:rPr>
+              <a:t>add</a:t>
+            </a:r>
+            <a:endParaRPr lang="de-DE" dirty="0">
+              <a:latin typeface="Arial Unicode MS" panose="020B0604020202020204" pitchFamily="34" charset="-128"/>
+              <a:ea typeface="Arial Unicode MS" panose="020B0604020202020204" pitchFamily="34" charset="-128"/>
+              <a:cs typeface="Arial Unicode MS" panose="020B0604020202020204" pitchFamily="34" charset="-128"/>
+            </a:endParaRPr>
+          </a:p>
+          <a:p>
+            <a:r>
+              <a:rPr lang="de-DE" dirty="0" err="1" smtClean="0">
+                <a:latin typeface="Arial Unicode MS" panose="020B0604020202020204" pitchFamily="34" charset="-128"/>
+                <a:ea typeface="Arial Unicode MS" panose="020B0604020202020204" pitchFamily="34" charset="-128"/>
+                <a:cs typeface="Arial Unicode MS" panose="020B0604020202020204" pitchFamily="34" charset="-128"/>
+              </a:rPr>
+              <a:t>Git</a:t>
+            </a:r>
+            <a:r>
+              <a:rPr lang="de-DE" dirty="0" smtClean="0">
+                <a:latin typeface="Arial Unicode MS" panose="020B0604020202020204" pitchFamily="34" charset="-128"/>
+                <a:ea typeface="Arial Unicode MS" panose="020B0604020202020204" pitchFamily="34" charset="-128"/>
+                <a:cs typeface="Arial Unicode MS" panose="020B0604020202020204" pitchFamily="34" charset="-128"/>
+              </a:rPr>
+              <a:t> </a:t>
+            </a:r>
+            <a:r>
+              <a:rPr lang="de-DE" dirty="0" err="1" smtClean="0">
+                <a:latin typeface="Arial Unicode MS" panose="020B0604020202020204" pitchFamily="34" charset="-128"/>
+                <a:ea typeface="Arial Unicode MS" panose="020B0604020202020204" pitchFamily="34" charset="-128"/>
+                <a:cs typeface="Arial Unicode MS" panose="020B0604020202020204" pitchFamily="34" charset="-128"/>
+              </a:rPr>
+              <a:t>commit</a:t>
+            </a:r>
+            <a:r>
+              <a:rPr lang="de-DE" dirty="0" smtClean="0">
+                <a:latin typeface="Arial Unicode MS" panose="020B0604020202020204" pitchFamily="34" charset="-128"/>
+                <a:ea typeface="Arial Unicode MS" panose="020B0604020202020204" pitchFamily="34" charset="-128"/>
+                <a:cs typeface="Arial Unicode MS" panose="020B0604020202020204" pitchFamily="34" charset="-128"/>
+              </a:rPr>
+              <a:t> –m ““</a:t>
+            </a:r>
+          </a:p>
+          <a:p>
+            <a:r>
+              <a:rPr lang="de-DE" dirty="0" err="1" smtClean="0">
+                <a:latin typeface="Arial Unicode MS" panose="020B0604020202020204" pitchFamily="34" charset="-128"/>
+                <a:ea typeface="Arial Unicode MS" panose="020B0604020202020204" pitchFamily="34" charset="-128"/>
+                <a:cs typeface="Arial Unicode MS" panose="020B0604020202020204" pitchFamily="34" charset="-128"/>
+              </a:rPr>
+              <a:t>Git</a:t>
+            </a:r>
+            <a:r>
+              <a:rPr lang="de-DE" dirty="0" smtClean="0">
+                <a:latin typeface="Arial Unicode MS" panose="020B0604020202020204" pitchFamily="34" charset="-128"/>
+                <a:ea typeface="Arial Unicode MS" panose="020B0604020202020204" pitchFamily="34" charset="-128"/>
+                <a:cs typeface="Arial Unicode MS" panose="020B0604020202020204" pitchFamily="34" charset="-128"/>
+              </a:rPr>
+              <a:t> </a:t>
+            </a:r>
+            <a:r>
+              <a:rPr lang="de-DE" dirty="0" smtClean="0">
+                <a:latin typeface="Arial Unicode MS" panose="020B0604020202020204" pitchFamily="34" charset="-128"/>
+                <a:ea typeface="Arial Unicode MS" panose="020B0604020202020204" pitchFamily="34" charset="-128"/>
+                <a:cs typeface="Arial Unicode MS" panose="020B0604020202020204" pitchFamily="34" charset="-128"/>
+              </a:rPr>
+              <a:t>push </a:t>
+            </a:r>
+            <a:r>
+              <a:rPr lang="de-DE" dirty="0" err="1" smtClean="0">
+                <a:latin typeface="Arial Unicode MS" panose="020B0604020202020204" pitchFamily="34" charset="-128"/>
+                <a:ea typeface="Arial Unicode MS" panose="020B0604020202020204" pitchFamily="34" charset="-128"/>
+                <a:cs typeface="Arial Unicode MS" panose="020B0604020202020204" pitchFamily="34" charset="-128"/>
+              </a:rPr>
+              <a:t>origin</a:t>
+            </a:r>
+            <a:r>
+              <a:rPr lang="de-DE" dirty="0" smtClean="0">
+                <a:latin typeface="Arial Unicode MS" panose="020B0604020202020204" pitchFamily="34" charset="-128"/>
+                <a:ea typeface="Arial Unicode MS" panose="020B0604020202020204" pitchFamily="34" charset="-128"/>
+                <a:cs typeface="Arial Unicode MS" panose="020B0604020202020204" pitchFamily="34" charset="-128"/>
+              </a:rPr>
+              <a:t> </a:t>
+            </a:r>
+            <a:r>
+              <a:rPr lang="de-DE" dirty="0" err="1" smtClean="0">
+                <a:latin typeface="Arial Unicode MS" panose="020B0604020202020204" pitchFamily="34" charset="-128"/>
+                <a:ea typeface="Arial Unicode MS" panose="020B0604020202020204" pitchFamily="34" charset="-128"/>
+                <a:cs typeface="Arial Unicode MS" panose="020B0604020202020204" pitchFamily="34" charset="-128"/>
+              </a:rPr>
+              <a:t>master</a:t>
+            </a:r>
+            <a:endParaRPr lang="de-DE" dirty="0" smtClean="0">
+              <a:latin typeface="Arial Unicode MS" panose="020B0604020202020204" pitchFamily="34" charset="-128"/>
+              <a:ea typeface="Arial Unicode MS" panose="020B0604020202020204" pitchFamily="34" charset="-128"/>
+              <a:cs typeface="Arial Unicode MS" panose="020B0604020202020204" pitchFamily="34" charset="-128"/>
+            </a:endParaRPr>
+          </a:p>
+          <a:p>
+            <a:r>
+              <a:rPr lang="de-DE" dirty="0" err="1" smtClean="0">
+                <a:latin typeface="Arial Unicode MS" panose="020B0604020202020204" pitchFamily="34" charset="-128"/>
+                <a:ea typeface="Arial Unicode MS" panose="020B0604020202020204" pitchFamily="34" charset="-128"/>
+                <a:cs typeface="Arial Unicode MS" panose="020B0604020202020204" pitchFamily="34" charset="-128"/>
+              </a:rPr>
+              <a:t>Git</a:t>
+            </a:r>
+            <a:r>
+              <a:rPr lang="de-DE" dirty="0" smtClean="0">
+                <a:latin typeface="Arial Unicode MS" panose="020B0604020202020204" pitchFamily="34" charset="-128"/>
+                <a:ea typeface="Arial Unicode MS" panose="020B0604020202020204" pitchFamily="34" charset="-128"/>
+                <a:cs typeface="Arial Unicode MS" panose="020B0604020202020204" pitchFamily="34" charset="-128"/>
+              </a:rPr>
+              <a:t> remote </a:t>
+            </a:r>
+            <a:r>
+              <a:rPr lang="de-DE" dirty="0" err="1" smtClean="0">
+                <a:latin typeface="Arial Unicode MS" panose="020B0604020202020204" pitchFamily="34" charset="-128"/>
+                <a:ea typeface="Arial Unicode MS" panose="020B0604020202020204" pitchFamily="34" charset="-128"/>
+                <a:cs typeface="Arial Unicode MS" panose="020B0604020202020204" pitchFamily="34" charset="-128"/>
+              </a:rPr>
+              <a:t>add</a:t>
+            </a:r>
+            <a:r>
+              <a:rPr lang="de-DE" dirty="0" smtClean="0">
+                <a:latin typeface="Arial Unicode MS" panose="020B0604020202020204" pitchFamily="34" charset="-128"/>
+                <a:ea typeface="Arial Unicode MS" panose="020B0604020202020204" pitchFamily="34" charset="-128"/>
+                <a:cs typeface="Arial Unicode MS" panose="020B0604020202020204" pitchFamily="34" charset="-128"/>
+              </a:rPr>
+              <a:t> </a:t>
+            </a:r>
+            <a:r>
+              <a:rPr lang="de-DE" dirty="0" err="1" smtClean="0">
+                <a:latin typeface="Arial Unicode MS" panose="020B0604020202020204" pitchFamily="34" charset="-128"/>
+                <a:ea typeface="Arial Unicode MS" panose="020B0604020202020204" pitchFamily="34" charset="-128"/>
+                <a:cs typeface="Arial Unicode MS" panose="020B0604020202020204" pitchFamily="34" charset="-128"/>
+              </a:rPr>
+              <a:t>origin</a:t>
+            </a:r>
+            <a:r>
+              <a:rPr lang="de-DE" dirty="0" smtClean="0">
+                <a:latin typeface="Arial Unicode MS" panose="020B0604020202020204" pitchFamily="34" charset="-128"/>
+                <a:ea typeface="Arial Unicode MS" panose="020B0604020202020204" pitchFamily="34" charset="-128"/>
+                <a:cs typeface="Arial Unicode MS" panose="020B0604020202020204" pitchFamily="34" charset="-128"/>
+              </a:rPr>
+              <a:t> &lt;</a:t>
+            </a:r>
+            <a:r>
+              <a:rPr lang="de-DE" dirty="0" err="1" smtClean="0">
+                <a:latin typeface="Arial Unicode MS" panose="020B0604020202020204" pitchFamily="34" charset="-128"/>
+                <a:ea typeface="Arial Unicode MS" panose="020B0604020202020204" pitchFamily="34" charset="-128"/>
+                <a:cs typeface="Arial Unicode MS" panose="020B0604020202020204" pitchFamily="34" charset="-128"/>
+              </a:rPr>
+              <a:t>server</a:t>
+            </a:r>
+            <a:r>
+              <a:rPr lang="de-DE" dirty="0" smtClean="0">
+                <a:latin typeface="Arial Unicode MS" panose="020B0604020202020204" pitchFamily="34" charset="-128"/>
+                <a:ea typeface="Arial Unicode MS" panose="020B0604020202020204" pitchFamily="34" charset="-128"/>
+                <a:cs typeface="Arial Unicode MS" panose="020B0604020202020204" pitchFamily="34" charset="-128"/>
+              </a:rPr>
+              <a:t>&gt;</a:t>
+            </a:r>
+          </a:p>
+          <a:p>
+            <a:r>
+              <a:rPr lang="de-DE" dirty="0" err="1" smtClean="0">
+                <a:latin typeface="Arial Unicode MS" panose="020B0604020202020204" pitchFamily="34" charset="-128"/>
+                <a:ea typeface="Arial Unicode MS" panose="020B0604020202020204" pitchFamily="34" charset="-128"/>
+                <a:cs typeface="Arial Unicode MS" panose="020B0604020202020204" pitchFamily="34" charset="-128"/>
+              </a:rPr>
+              <a:t>Git</a:t>
+            </a:r>
+            <a:r>
+              <a:rPr lang="de-DE" dirty="0" smtClean="0">
+                <a:latin typeface="Arial Unicode MS" panose="020B0604020202020204" pitchFamily="34" charset="-128"/>
+                <a:ea typeface="Arial Unicode MS" panose="020B0604020202020204" pitchFamily="34" charset="-128"/>
+                <a:cs typeface="Arial Unicode MS" panose="020B0604020202020204" pitchFamily="34" charset="-128"/>
+              </a:rPr>
+              <a:t> </a:t>
+            </a:r>
+            <a:r>
+              <a:rPr lang="de-DE" dirty="0" err="1" smtClean="0">
+                <a:latin typeface="Arial Unicode MS" panose="020B0604020202020204" pitchFamily="34" charset="-128"/>
+                <a:ea typeface="Arial Unicode MS" panose="020B0604020202020204" pitchFamily="34" charset="-128"/>
+                <a:cs typeface="Arial Unicode MS" panose="020B0604020202020204" pitchFamily="34" charset="-128"/>
+              </a:rPr>
+              <a:t>checkout</a:t>
+            </a:r>
+            <a:r>
+              <a:rPr lang="de-DE" dirty="0" smtClean="0">
+                <a:latin typeface="Arial Unicode MS" panose="020B0604020202020204" pitchFamily="34" charset="-128"/>
+                <a:ea typeface="Arial Unicode MS" panose="020B0604020202020204" pitchFamily="34" charset="-128"/>
+                <a:cs typeface="Arial Unicode MS" panose="020B0604020202020204" pitchFamily="34" charset="-128"/>
+              </a:rPr>
+              <a:t> –b </a:t>
+            </a:r>
+            <a:r>
+              <a:rPr lang="de-DE" dirty="0" err="1" smtClean="0">
+                <a:latin typeface="Arial Unicode MS" panose="020B0604020202020204" pitchFamily="34" charset="-128"/>
+                <a:ea typeface="Arial Unicode MS" panose="020B0604020202020204" pitchFamily="34" charset="-128"/>
+                <a:cs typeface="Arial Unicode MS" panose="020B0604020202020204" pitchFamily="34" charset="-128"/>
+              </a:rPr>
+              <a:t>name</a:t>
+            </a:r>
+            <a:endParaRPr lang="de-DE" dirty="0" smtClean="0">
+              <a:latin typeface="Arial Unicode MS" panose="020B0604020202020204" pitchFamily="34" charset="-128"/>
+              <a:ea typeface="Arial Unicode MS" panose="020B0604020202020204" pitchFamily="34" charset="-128"/>
+              <a:cs typeface="Arial Unicode MS" panose="020B0604020202020204" pitchFamily="34" charset="-128"/>
+            </a:endParaRPr>
+          </a:p>
+          <a:p>
+            <a:r>
+              <a:rPr lang="de-DE" dirty="0" err="1" smtClean="0">
+                <a:latin typeface="Arial Unicode MS" panose="020B0604020202020204" pitchFamily="34" charset="-128"/>
+                <a:ea typeface="Arial Unicode MS" panose="020B0604020202020204" pitchFamily="34" charset="-128"/>
+                <a:cs typeface="Arial Unicode MS" panose="020B0604020202020204" pitchFamily="34" charset="-128"/>
+              </a:rPr>
+              <a:t>Git</a:t>
+            </a:r>
+            <a:r>
+              <a:rPr lang="de-DE" dirty="0" smtClean="0">
+                <a:latin typeface="Arial Unicode MS" panose="020B0604020202020204" pitchFamily="34" charset="-128"/>
+                <a:ea typeface="Arial Unicode MS" panose="020B0604020202020204" pitchFamily="34" charset="-128"/>
+                <a:cs typeface="Arial Unicode MS" panose="020B0604020202020204" pitchFamily="34" charset="-128"/>
+              </a:rPr>
+              <a:t> </a:t>
+            </a:r>
+            <a:r>
+              <a:rPr lang="de-DE" dirty="0" err="1" smtClean="0">
+                <a:latin typeface="Arial Unicode MS" panose="020B0604020202020204" pitchFamily="34" charset="-128"/>
+                <a:ea typeface="Arial Unicode MS" panose="020B0604020202020204" pitchFamily="34" charset="-128"/>
+                <a:cs typeface="Arial Unicode MS" panose="020B0604020202020204" pitchFamily="34" charset="-128"/>
+              </a:rPr>
+              <a:t>checkout</a:t>
+            </a:r>
+            <a:r>
+              <a:rPr lang="de-DE" dirty="0" smtClean="0">
+                <a:latin typeface="Arial Unicode MS" panose="020B0604020202020204" pitchFamily="34" charset="-128"/>
+                <a:ea typeface="Arial Unicode MS" panose="020B0604020202020204" pitchFamily="34" charset="-128"/>
+                <a:cs typeface="Arial Unicode MS" panose="020B0604020202020204" pitchFamily="34" charset="-128"/>
+              </a:rPr>
+              <a:t> </a:t>
+            </a:r>
+            <a:r>
+              <a:rPr lang="de-DE" dirty="0" err="1" smtClean="0">
+                <a:latin typeface="Arial Unicode MS" panose="020B0604020202020204" pitchFamily="34" charset="-128"/>
+                <a:ea typeface="Arial Unicode MS" panose="020B0604020202020204" pitchFamily="34" charset="-128"/>
+                <a:cs typeface="Arial Unicode MS" panose="020B0604020202020204" pitchFamily="34" charset="-128"/>
+              </a:rPr>
+              <a:t>master</a:t>
+            </a:r>
+            <a:endParaRPr lang="de-DE" dirty="0" smtClean="0">
+              <a:latin typeface="Arial Unicode MS" panose="020B0604020202020204" pitchFamily="34" charset="-128"/>
+              <a:ea typeface="Arial Unicode MS" panose="020B0604020202020204" pitchFamily="34" charset="-128"/>
+              <a:cs typeface="Arial Unicode MS" panose="020B0604020202020204" pitchFamily="34" charset="-128"/>
+            </a:endParaRPr>
+          </a:p>
+          <a:p>
+            <a:r>
+              <a:rPr lang="de-DE" dirty="0" err="1" smtClean="0">
+                <a:latin typeface="Arial Unicode MS" panose="020B0604020202020204" pitchFamily="34" charset="-128"/>
+                <a:ea typeface="Arial Unicode MS" panose="020B0604020202020204" pitchFamily="34" charset="-128"/>
+                <a:cs typeface="Arial Unicode MS" panose="020B0604020202020204" pitchFamily="34" charset="-128"/>
+              </a:rPr>
+              <a:t>Git</a:t>
+            </a:r>
+            <a:r>
+              <a:rPr lang="de-DE" dirty="0" smtClean="0">
+                <a:latin typeface="Arial Unicode MS" panose="020B0604020202020204" pitchFamily="34" charset="-128"/>
+                <a:ea typeface="Arial Unicode MS" panose="020B0604020202020204" pitchFamily="34" charset="-128"/>
+                <a:cs typeface="Arial Unicode MS" panose="020B0604020202020204" pitchFamily="34" charset="-128"/>
+              </a:rPr>
+              <a:t> </a:t>
+            </a:r>
+            <a:r>
+              <a:rPr lang="de-DE" dirty="0" err="1" smtClean="0">
+                <a:latin typeface="Arial Unicode MS" panose="020B0604020202020204" pitchFamily="34" charset="-128"/>
+                <a:ea typeface="Arial Unicode MS" panose="020B0604020202020204" pitchFamily="34" charset="-128"/>
+                <a:cs typeface="Arial Unicode MS" panose="020B0604020202020204" pitchFamily="34" charset="-128"/>
+              </a:rPr>
+              <a:t>branche</a:t>
+            </a:r>
+            <a:r>
+              <a:rPr lang="de-DE" dirty="0" smtClean="0">
+                <a:latin typeface="Arial Unicode MS" panose="020B0604020202020204" pitchFamily="34" charset="-128"/>
+                <a:ea typeface="Arial Unicode MS" panose="020B0604020202020204" pitchFamily="34" charset="-128"/>
+                <a:cs typeface="Arial Unicode MS" panose="020B0604020202020204" pitchFamily="34" charset="-128"/>
+              </a:rPr>
+              <a:t> –d </a:t>
+            </a:r>
+            <a:r>
+              <a:rPr lang="de-DE" dirty="0" err="1" smtClean="0">
+                <a:latin typeface="Arial Unicode MS" panose="020B0604020202020204" pitchFamily="34" charset="-128"/>
+                <a:ea typeface="Arial Unicode MS" panose="020B0604020202020204" pitchFamily="34" charset="-128"/>
+                <a:cs typeface="Arial Unicode MS" panose="020B0604020202020204" pitchFamily="34" charset="-128"/>
+              </a:rPr>
+              <a:t>feature</a:t>
+            </a:r>
+            <a:endParaRPr lang="de-DE" dirty="0" smtClean="0">
+              <a:latin typeface="Arial Unicode MS" panose="020B0604020202020204" pitchFamily="34" charset="-128"/>
+              <a:ea typeface="Arial Unicode MS" panose="020B0604020202020204" pitchFamily="34" charset="-128"/>
+              <a:cs typeface="Arial Unicode MS" panose="020B0604020202020204" pitchFamily="34" charset="-128"/>
+            </a:endParaRPr>
+          </a:p>
+          <a:p>
+            <a:r>
+              <a:rPr lang="de-DE" dirty="0" err="1" smtClean="0">
+                <a:latin typeface="Arial Unicode MS" panose="020B0604020202020204" pitchFamily="34" charset="-128"/>
+                <a:ea typeface="Arial Unicode MS" panose="020B0604020202020204" pitchFamily="34" charset="-128"/>
+                <a:cs typeface="Arial Unicode MS" panose="020B0604020202020204" pitchFamily="34" charset="-128"/>
+              </a:rPr>
+              <a:t>Git</a:t>
+            </a:r>
+            <a:r>
+              <a:rPr lang="de-DE" dirty="0" smtClean="0">
+                <a:latin typeface="Arial Unicode MS" panose="020B0604020202020204" pitchFamily="34" charset="-128"/>
+                <a:ea typeface="Arial Unicode MS" panose="020B0604020202020204" pitchFamily="34" charset="-128"/>
+                <a:cs typeface="Arial Unicode MS" panose="020B0604020202020204" pitchFamily="34" charset="-128"/>
+              </a:rPr>
+              <a:t> push </a:t>
+            </a:r>
+            <a:r>
+              <a:rPr lang="de-DE" dirty="0" err="1" smtClean="0">
+                <a:latin typeface="Arial Unicode MS" panose="020B0604020202020204" pitchFamily="34" charset="-128"/>
+                <a:ea typeface="Arial Unicode MS" panose="020B0604020202020204" pitchFamily="34" charset="-128"/>
+                <a:cs typeface="Arial Unicode MS" panose="020B0604020202020204" pitchFamily="34" charset="-128"/>
+              </a:rPr>
+              <a:t>origin</a:t>
+            </a:r>
+            <a:r>
+              <a:rPr lang="de-DE" dirty="0" smtClean="0">
+                <a:latin typeface="Arial Unicode MS" panose="020B0604020202020204" pitchFamily="34" charset="-128"/>
+                <a:ea typeface="Arial Unicode MS" panose="020B0604020202020204" pitchFamily="34" charset="-128"/>
+                <a:cs typeface="Arial Unicode MS" panose="020B0604020202020204" pitchFamily="34" charset="-128"/>
+              </a:rPr>
+              <a:t> &lt;</a:t>
+            </a:r>
+            <a:r>
+              <a:rPr lang="de-DE" dirty="0" err="1" smtClean="0">
+                <a:latin typeface="Arial Unicode MS" panose="020B0604020202020204" pitchFamily="34" charset="-128"/>
+                <a:ea typeface="Arial Unicode MS" panose="020B0604020202020204" pitchFamily="34" charset="-128"/>
+                <a:cs typeface="Arial Unicode MS" panose="020B0604020202020204" pitchFamily="34" charset="-128"/>
+              </a:rPr>
+              <a:t>branche</a:t>
+            </a:r>
+            <a:r>
+              <a:rPr lang="de-DE" dirty="0" smtClean="0">
+                <a:latin typeface="Arial Unicode MS" panose="020B0604020202020204" pitchFamily="34" charset="-128"/>
+                <a:ea typeface="Arial Unicode MS" panose="020B0604020202020204" pitchFamily="34" charset="-128"/>
+                <a:cs typeface="Arial Unicode MS" panose="020B0604020202020204" pitchFamily="34" charset="-128"/>
+              </a:rPr>
+              <a:t>&gt;</a:t>
+            </a:r>
+          </a:p>
+          <a:p>
+            <a:r>
+              <a:rPr lang="de-DE" dirty="0" err="1" smtClean="0">
+                <a:latin typeface="Arial Unicode MS" panose="020B0604020202020204" pitchFamily="34" charset="-128"/>
+                <a:ea typeface="Arial Unicode MS" panose="020B0604020202020204" pitchFamily="34" charset="-128"/>
+                <a:cs typeface="Arial Unicode MS" panose="020B0604020202020204" pitchFamily="34" charset="-128"/>
+              </a:rPr>
+              <a:t>Git</a:t>
+            </a:r>
+            <a:r>
+              <a:rPr lang="de-DE" dirty="0" smtClean="0">
+                <a:latin typeface="Arial Unicode MS" panose="020B0604020202020204" pitchFamily="34" charset="-128"/>
+                <a:ea typeface="Arial Unicode MS" panose="020B0604020202020204" pitchFamily="34" charset="-128"/>
+                <a:cs typeface="Arial Unicode MS" panose="020B0604020202020204" pitchFamily="34" charset="-128"/>
+              </a:rPr>
+              <a:t> pull</a:t>
+            </a:r>
+          </a:p>
+          <a:p>
+            <a:r>
+              <a:rPr lang="de-DE" dirty="0" err="1" smtClean="0">
+                <a:latin typeface="Arial Unicode MS" panose="020B0604020202020204" pitchFamily="34" charset="-128"/>
+                <a:ea typeface="Arial Unicode MS" panose="020B0604020202020204" pitchFamily="34" charset="-128"/>
+                <a:cs typeface="Arial Unicode MS" panose="020B0604020202020204" pitchFamily="34" charset="-128"/>
+              </a:rPr>
+              <a:t>Git</a:t>
+            </a:r>
+            <a:r>
+              <a:rPr lang="de-DE" dirty="0" smtClean="0">
+                <a:latin typeface="Arial Unicode MS" panose="020B0604020202020204" pitchFamily="34" charset="-128"/>
+                <a:ea typeface="Arial Unicode MS" panose="020B0604020202020204" pitchFamily="34" charset="-128"/>
+                <a:cs typeface="Arial Unicode MS" panose="020B0604020202020204" pitchFamily="34" charset="-128"/>
+              </a:rPr>
+              <a:t> </a:t>
+            </a:r>
+            <a:r>
+              <a:rPr lang="de-DE" dirty="0" err="1" smtClean="0">
+                <a:latin typeface="Arial Unicode MS" panose="020B0604020202020204" pitchFamily="34" charset="-128"/>
+                <a:ea typeface="Arial Unicode MS" panose="020B0604020202020204" pitchFamily="34" charset="-128"/>
+                <a:cs typeface="Arial Unicode MS" panose="020B0604020202020204" pitchFamily="34" charset="-128"/>
+              </a:rPr>
+              <a:t>merge</a:t>
+            </a:r>
+            <a:r>
+              <a:rPr lang="de-DE" dirty="0" smtClean="0">
+                <a:latin typeface="Arial Unicode MS" panose="020B0604020202020204" pitchFamily="34" charset="-128"/>
+                <a:ea typeface="Arial Unicode MS" panose="020B0604020202020204" pitchFamily="34" charset="-128"/>
+                <a:cs typeface="Arial Unicode MS" panose="020B0604020202020204" pitchFamily="34" charset="-128"/>
+              </a:rPr>
+              <a:t> &lt;</a:t>
+            </a:r>
+            <a:r>
+              <a:rPr lang="de-DE" dirty="0" err="1" smtClean="0">
+                <a:latin typeface="Arial Unicode MS" panose="020B0604020202020204" pitchFamily="34" charset="-128"/>
+                <a:ea typeface="Arial Unicode MS" panose="020B0604020202020204" pitchFamily="34" charset="-128"/>
+                <a:cs typeface="Arial Unicode MS" panose="020B0604020202020204" pitchFamily="34" charset="-128"/>
+              </a:rPr>
+              <a:t>branch</a:t>
+            </a:r>
+            <a:r>
+              <a:rPr lang="de-DE" dirty="0" smtClean="0">
+                <a:latin typeface="Arial Unicode MS" panose="020B0604020202020204" pitchFamily="34" charset="-128"/>
+                <a:ea typeface="Arial Unicode MS" panose="020B0604020202020204" pitchFamily="34" charset="-128"/>
+                <a:cs typeface="Arial Unicode MS" panose="020B0604020202020204" pitchFamily="34" charset="-128"/>
+              </a:rPr>
+              <a:t>&gt;</a:t>
+            </a:r>
+          </a:p>
+          <a:p>
+            <a:r>
+              <a:rPr lang="de-DE" dirty="0" err="1" smtClean="0">
+                <a:latin typeface="Arial Unicode MS" panose="020B0604020202020204" pitchFamily="34" charset="-128"/>
+                <a:ea typeface="Arial Unicode MS" panose="020B0604020202020204" pitchFamily="34" charset="-128"/>
+                <a:cs typeface="Arial Unicode MS" panose="020B0604020202020204" pitchFamily="34" charset="-128"/>
+              </a:rPr>
+              <a:t>Git</a:t>
+            </a:r>
+            <a:r>
+              <a:rPr lang="de-DE" dirty="0" smtClean="0">
+                <a:latin typeface="Arial Unicode MS" panose="020B0604020202020204" pitchFamily="34" charset="-128"/>
+                <a:ea typeface="Arial Unicode MS" panose="020B0604020202020204" pitchFamily="34" charset="-128"/>
+                <a:cs typeface="Arial Unicode MS" panose="020B0604020202020204" pitchFamily="34" charset="-128"/>
+              </a:rPr>
+              <a:t> </a:t>
+            </a:r>
+            <a:r>
+              <a:rPr lang="de-DE" dirty="0" err="1" smtClean="0">
+                <a:latin typeface="Arial Unicode MS" panose="020B0604020202020204" pitchFamily="34" charset="-128"/>
+                <a:ea typeface="Arial Unicode MS" panose="020B0604020202020204" pitchFamily="34" charset="-128"/>
+                <a:cs typeface="Arial Unicode MS" panose="020B0604020202020204" pitchFamily="34" charset="-128"/>
+              </a:rPr>
+              <a:t>diff</a:t>
+            </a:r>
+            <a:r>
+              <a:rPr lang="de-DE" dirty="0" smtClean="0">
+                <a:latin typeface="Arial Unicode MS" panose="020B0604020202020204" pitchFamily="34" charset="-128"/>
+                <a:ea typeface="Arial Unicode MS" panose="020B0604020202020204" pitchFamily="34" charset="-128"/>
+                <a:cs typeface="Arial Unicode MS" panose="020B0604020202020204" pitchFamily="34" charset="-128"/>
+              </a:rPr>
+              <a:t> &lt;quell&gt;&lt;ziel&gt;</a:t>
+            </a:r>
+            <a:endParaRPr lang="de-DE" dirty="0">
+              <a:latin typeface="Arial Unicode MS" panose="020B0604020202020204" pitchFamily="34" charset="-128"/>
+              <a:ea typeface="Arial Unicode MS" panose="020B0604020202020204" pitchFamily="34" charset="-128"/>
+              <a:cs typeface="Arial Unicode MS" panose="020B0604020202020204" pitchFamily="34" charset="-128"/>
+            </a:endParaRPr>
+          </a:p>
+        </p:txBody>
+      </p:sp>
     </p:spTree>
     <p:extLst>
       <p:ext uri="{BB962C8B-B14F-4D97-AF65-F5344CB8AC3E}">
-        <p14:creationId xmlns:p14="http://schemas.microsoft.com/office/powerpoint/2010/main" val="2121389670"/>
+        <p14:creationId xmlns:p14="http://schemas.microsoft.com/office/powerpoint/2010/main" val="234912132"/>
       </p:ext>
     </p:extLst>
   </p:cSld>
   <p:clrMapOvr>
     <a:masterClrMapping/>
   </p:clrMapOvr>
+  <p:timing>
+    <p:tnLst>
+      <p:par>
+        <p:cTn id="1" dur="indefinite" restart="never" nodeType="tmRoot"/>
+      </p:par>
+    </p:tnLst>
+  </p:timing>
 </p:sld>
 </file>
 
-<file path=ppt/slides/slide7.xml><?xml version="1.0" encoding="utf-8"?>
+<file path=ppt/slides/slide9.xml><?xml version="1.0" encoding="utf-8"?>
 <p:sld xmlns:a="http://schemas.openxmlformats.org/drawingml/2006/main" xmlns:r="http://schemas.openxmlformats.org/officeDocument/2006/relationships" xmlns:p="http://schemas.openxmlformats.org/presentationml/2006/main">
   <p:cSld>
     <p:spTree>
@@ -5392,7 +7415,7 @@
           <a:p>
             <a:fld id="{32988457-9EFF-4998-891D-85ECFB4B79A4}" type="slidenum">
               <a:rPr lang="de-DE" smtClean="0"/>
-              <a:t>7</a:t>
+              <a:t>9</a:t>
             </a:fld>
             <a:endParaRPr lang="de-DE"/>
           </a:p>
@@ -5410,18 +7433,152 @@
         </p:nvSpPr>
         <p:spPr/>
         <p:txBody>
-          <a:bodyPr/>
-          <a:lstStyle/>
-          <a:p>
-            <a:r>
-              <a:rPr lang="de-DE" dirty="0"/>
-              <a:t>https://git-scm.com/about</a:t>
-            </a:r>
-            <a:r>
-              <a:rPr lang="de-DE" dirty="0" smtClean="0"/>
+          <a:bodyPr>
+            <a:normAutofit/>
+          </a:bodyPr>
+          <a:lstStyle/>
+          <a:p>
+            <a:pPr marL="0" indent="0">
+              <a:buNone/>
+            </a:pPr>
+            <a:r>
+              <a:rPr lang="de-DE" sz="2000" dirty="0" err="1" smtClean="0"/>
+              <a:t>git</a:t>
+            </a:r>
+            <a:r>
+              <a:rPr lang="de-DE" sz="2000" dirty="0" smtClean="0"/>
+              <a:t>:</a:t>
+            </a:r>
+          </a:p>
+          <a:p>
+            <a:r>
+              <a:rPr lang="de-DE" sz="2000" dirty="0" smtClean="0"/>
+              <a:t>https</a:t>
+            </a:r>
+            <a:r>
+              <a:rPr lang="de-DE" sz="2000" dirty="0"/>
+              <a:t>://</a:t>
+            </a:r>
+            <a:r>
+              <a:rPr lang="de-DE" sz="2000" dirty="0" smtClean="0"/>
+              <a:t>git-scm.com/about </a:t>
+            </a:r>
+            <a:r>
+              <a:rPr lang="de-DE" sz="1200" dirty="0"/>
+              <a:t>(11.10.2015)</a:t>
+            </a:r>
+            <a:endParaRPr lang="de-DE" sz="1200" dirty="0" smtClean="0"/>
+          </a:p>
+          <a:p>
+            <a:r>
+              <a:rPr lang="de-DE" sz="2000" dirty="0"/>
+              <a:t>http://git-scm.com/book/de/v1</a:t>
+            </a:r>
+            <a:r>
+              <a:rPr lang="de-DE" sz="2000" dirty="0" smtClean="0"/>
+              <a:t>/ </a:t>
+            </a:r>
+            <a:r>
+              <a:rPr lang="de-DE" sz="1200" dirty="0" smtClean="0"/>
+              <a:t>(11.10.2015)</a:t>
+            </a:r>
+            <a:endParaRPr lang="de-DE" sz="2000" dirty="0" smtClean="0"/>
+          </a:p>
+          <a:p>
+            <a:r>
+              <a:rPr lang="de-DE" sz="2000" dirty="0" smtClean="0"/>
+              <a:t>https</a:t>
+            </a:r>
+            <a:r>
+              <a:rPr lang="de-DE" sz="2000" dirty="0"/>
+              <a:t>://en.wikipedia.org/wiki/Git_%</a:t>
+            </a:r>
+            <a:r>
+              <a:rPr lang="de-DE" sz="2000" dirty="0" smtClean="0"/>
+              <a:t>28software%29 </a:t>
+            </a:r>
+            <a:r>
+              <a:rPr lang="de-DE" sz="1200" dirty="0" smtClean="0"/>
+              <a:t>(11.10.2015)</a:t>
+            </a:r>
+            <a:endParaRPr lang="de-DE" sz="2000" dirty="0"/>
+          </a:p>
+          <a:p>
+            <a:r>
+              <a:rPr lang="de-DE" sz="2000" dirty="0"/>
+              <a:t>https://</a:t>
+            </a:r>
+            <a:r>
+              <a:rPr lang="de-DE" sz="2000" dirty="0" smtClean="0"/>
+              <a:t>rogerdudler.github.io/git-guide/index.de.html</a:t>
+            </a:r>
+          </a:p>
+          <a:p>
+            <a:pPr marL="0" indent="0">
+              <a:buNone/>
+            </a:pPr>
+            <a:r>
+              <a:rPr lang="de-DE" sz="2000" dirty="0" err="1" smtClean="0"/>
+              <a:t>GitHub</a:t>
+            </a:r>
+            <a:r>
+              <a:rPr lang="de-DE" sz="2000" dirty="0"/>
+              <a:t>:</a:t>
+            </a:r>
+            <a:endParaRPr lang="de-DE" sz="2000" dirty="0" smtClean="0"/>
+          </a:p>
+          <a:p>
+            <a:r>
+              <a:rPr lang="de-DE" sz="2000" dirty="0"/>
+              <a:t>https://help.github.com/articles/set-up-git</a:t>
+            </a:r>
+            <a:r>
+              <a:rPr lang="de-DE" sz="2000" dirty="0" smtClean="0"/>
               <a:t>/</a:t>
             </a:r>
-            <a:endParaRPr lang="de-DE" dirty="0"/>
+          </a:p>
+          <a:p>
+            <a:r>
+              <a:rPr lang="de-DE" sz="2000" dirty="0"/>
+              <a:t>https://</a:t>
+            </a:r>
+            <a:r>
+              <a:rPr lang="de-DE" sz="2000" dirty="0" smtClean="0"/>
+              <a:t>github.com/features</a:t>
+            </a:r>
+          </a:p>
+          <a:p>
+            <a:pPr marL="0" indent="0">
+              <a:buNone/>
+            </a:pPr>
+            <a:r>
+              <a:rPr lang="de-DE" sz="2000" dirty="0" smtClean="0"/>
+              <a:t>Bilder:</a:t>
+            </a:r>
+            <a:endParaRPr lang="de-DE" sz="2000" dirty="0"/>
+          </a:p>
+          <a:p>
+            <a:r>
+              <a:rPr lang="de-DE" sz="2000" dirty="0"/>
+              <a:t>http://</a:t>
+            </a:r>
+            <a:r>
+              <a:rPr lang="de-DE" sz="2000" dirty="0" smtClean="0"/>
+              <a:t>git-scm.com/figures/18333fig0103-tn.png</a:t>
+            </a:r>
+          </a:p>
+          <a:p>
+            <a:r>
+              <a:rPr lang="de-DE" sz="2000" dirty="0"/>
+              <a:t>http://</a:t>
+            </a:r>
+            <a:r>
+              <a:rPr lang="de-DE" sz="2000" dirty="0" smtClean="0"/>
+              <a:t>git-scm.com/figures/18333fig0106-tn.png</a:t>
+            </a:r>
+          </a:p>
+          <a:p>
+            <a:endParaRPr lang="de-DE" sz="2000" dirty="0" smtClean="0"/>
           </a:p>
         </p:txBody>
       </p:sp>
@@ -5435,6 +7592,13 @@
   <p:clrMapOvr>
     <a:masterClrMapping/>
   </p:clrMapOvr>
+  <p:timing>
+    <p:tnLst>
+      <p:par>
+        <p:cTn id="1" dur="indefinite" restart="never" nodeType="tmRoot"/>
+      </p:par>
+    </p:tnLst>
+  </p:timing>
 </p:sld>
 </file>
 

</xml_diff>

<commit_message>
### Revision 001 - Version 1.3 of PPP ###
</commit_message>
<xml_diff>
--- a/Git-und-GitHub.pptx
+++ b/Git-und-GitHub.pptx
@@ -5,7 +5,7 @@
     <p:sldMasterId id="2147483660" r:id="rId1"/>
   </p:sldMasterIdLst>
   <p:notesMasterIdLst>
-    <p:notesMasterId r:id="rId17"/>
+    <p:notesMasterId r:id="rId16"/>
   </p:notesMasterIdLst>
   <p:sldIdLst>
     <p:sldId id="256" r:id="rId2"/>
@@ -21,8 +21,7 @@
     <p:sldId id="274" r:id="rId12"/>
     <p:sldId id="275" r:id="rId13"/>
     <p:sldId id="268" r:id="rId14"/>
-    <p:sldId id="269" r:id="rId15"/>
-    <p:sldId id="262" r:id="rId16"/>
+    <p:sldId id="262" r:id="rId15"/>
   </p:sldIdLst>
   <p:sldSz cx="9144000" cy="6858000" type="screen4x3"/>
   <p:notesSz cx="6858000" cy="9144000"/>
@@ -222,7 +221,7 @@
           <a:p>
             <a:fld id="{D33A1A6D-234A-42C6-88C5-85D1460EE3B8}" type="datetimeFigureOut">
               <a:rPr lang="de-DE" smtClean="0"/>
-              <a:t>12.10.2015</a:t>
+              <a:t>13.10.2015</a:t>
             </a:fld>
             <a:endParaRPr lang="de-DE"/>
           </a:p>
@@ -1732,7 +1731,7 @@
           <a:p>
             <a:fld id="{D74EE171-6FB9-44C2-999A-3C78585CC55F}" type="datetime1">
               <a:rPr lang="de-DE" smtClean="0"/>
-              <a:t>12.10.2015</a:t>
+              <a:t>13.10.2015</a:t>
             </a:fld>
             <a:endParaRPr lang="de-DE"/>
           </a:p>
@@ -2095,7 +2094,7 @@
           <a:p>
             <a:fld id="{966EF4C5-04F6-4CAA-916B-E3B314346F2C}" type="datetime1">
               <a:rPr lang="de-DE" smtClean="0"/>
-              <a:t>12.10.2015</a:t>
+              <a:t>13.10.2015</a:t>
             </a:fld>
             <a:endParaRPr lang="de-DE"/>
           </a:p>
@@ -2274,7 +2273,7 @@
           <a:p>
             <a:fld id="{D4A1C9C1-76E8-482F-AC38-46CD1EA3A4C9}" type="datetime1">
               <a:rPr lang="de-DE" smtClean="0"/>
-              <a:t>12.10.2015</a:t>
+              <a:t>13.10.2015</a:t>
             </a:fld>
             <a:endParaRPr lang="de-DE"/>
           </a:p>
@@ -2513,7 +2512,7 @@
           <a:p>
             <a:fld id="{09957CAC-BFF1-498D-82E7-9462D790BC9E}" type="datetime1">
               <a:rPr lang="de-DE" smtClean="0"/>
-              <a:t>12.10.2015</a:t>
+              <a:t>13.10.2015</a:t>
             </a:fld>
             <a:endParaRPr lang="de-DE"/>
           </a:p>
@@ -2786,7 +2785,7 @@
           <a:p>
             <a:fld id="{67E9C1B2-C123-4CB8-B829-0B1DE6516455}" type="datetime1">
               <a:rPr lang="de-DE" smtClean="0"/>
-              <a:t>12.10.2015</a:t>
+              <a:t>13.10.2015</a:t>
             </a:fld>
             <a:endParaRPr lang="de-DE"/>
           </a:p>
@@ -3010,7 +3009,7 @@
           <a:p>
             <a:fld id="{5F82951D-51DD-43CB-9395-2CD87029427A}" type="datetime1">
               <a:rPr lang="de-DE" smtClean="0"/>
-              <a:t>12.10.2015</a:t>
+              <a:t>13.10.2015</a:t>
             </a:fld>
             <a:endParaRPr lang="de-DE"/>
           </a:p>
@@ -3366,7 +3365,7 @@
           <a:p>
             <a:fld id="{F75640B3-CD2F-468A-9D6A-8FCCA521EAD8}" type="datetime1">
               <a:rPr lang="de-DE" smtClean="0"/>
-              <a:t>12.10.2015</a:t>
+              <a:t>13.10.2015</a:t>
             </a:fld>
             <a:endParaRPr lang="de-DE"/>
           </a:p>
@@ -3602,7 +3601,7 @@
           <a:p>
             <a:fld id="{66B70435-1AE2-40EE-BD35-BF23134777A3}" type="datetime1">
               <a:rPr lang="de-DE" smtClean="0"/>
-              <a:t>12.10.2015</a:t>
+              <a:t>13.10.2015</a:t>
             </a:fld>
             <a:endParaRPr lang="de-DE"/>
           </a:p>
@@ -3746,7 +3745,7 @@
           <a:p>
             <a:fld id="{8264DE6B-16CC-45D3-A85A-C342E3C400B1}" type="datetime1">
               <a:rPr lang="de-DE" smtClean="0"/>
-              <a:t>12.10.2015</a:t>
+              <a:t>13.10.2015</a:t>
             </a:fld>
             <a:endParaRPr lang="de-DE"/>
           </a:p>
@@ -4027,7 +4026,7 @@
           <a:p>
             <a:fld id="{3012F5FB-2D99-4EE6-8329-8BC403EF3BB7}" type="datetime1">
               <a:rPr lang="de-DE" smtClean="0"/>
-              <a:t>12.10.2015</a:t>
+              <a:t>13.10.2015</a:t>
             </a:fld>
             <a:endParaRPr lang="de-DE"/>
           </a:p>
@@ -4438,7 +4437,7 @@
           <a:p>
             <a:fld id="{4ACBB3FE-65F3-496E-9475-85FAF27CCA0A}" type="datetime1">
               <a:rPr lang="de-DE" smtClean="0"/>
-              <a:t>12.10.2015</a:t>
+              <a:t>13.10.2015</a:t>
             </a:fld>
             <a:endParaRPr lang="de-DE"/>
           </a:p>
@@ -4780,7 +4779,7 @@
           <a:p>
             <a:fld id="{1198494A-36A3-42DF-97C6-C12EB15310DD}" type="datetime1">
               <a:rPr lang="de-DE" smtClean="0"/>
-              <a:t>12.10.2015</a:t>
+              <a:t>13.10.2015</a:t>
             </a:fld>
             <a:endParaRPr lang="de-DE"/>
           </a:p>
@@ -5444,7 +5443,6 @@
               <a:rPr lang="de-DE" dirty="0"/>
               <a:t> Workflow</a:t>
             </a:r>
-            <a:endParaRPr lang="de-DE" dirty="0"/>
           </a:p>
         </p:txBody>
       </p:sp>
@@ -5636,7 +5634,6 @@
               <a:rPr lang="de-DE" dirty="0"/>
               <a:t> Workflow</a:t>
             </a:r>
-            <a:endParaRPr lang="de-DE" dirty="0"/>
           </a:p>
         </p:txBody>
       </p:sp>
@@ -5825,7 +5822,6 @@
               <a:rPr lang="de-DE" dirty="0"/>
               <a:t> Workflow</a:t>
             </a:r>
-            <a:endParaRPr lang="de-DE" dirty="0"/>
           </a:p>
         </p:txBody>
       </p:sp>
@@ -5890,10 +5886,6 @@
           <a:bodyPr/>
           <a:lstStyle/>
           <a:p>
-            <a:r>
-              <a:rPr lang="de-DE" dirty="0" err="1" smtClean="0"/>
-              <a:t>sd</a:t>
-            </a:r>
             <a:endParaRPr lang="de-DE" dirty="0" smtClean="0"/>
           </a:p>
           <a:p>
@@ -6011,7 +6003,11 @@
           <a:p>
             <a:r>
               <a:rPr lang="de-DE" dirty="0" smtClean="0"/>
-              <a:t>           - Befehle</a:t>
+              <a:t>           - </a:t>
+            </a:r>
+            <a:r>
+              <a:rPr lang="de-DE" dirty="0" smtClean="0"/>
+              <a:t>Befehlsübersicht</a:t>
             </a:r>
             <a:endParaRPr lang="de-DE" dirty="0"/>
           </a:p>
@@ -6063,121 +6059,738 @@
           </a:p>
         </p:txBody>
       </p:sp>
-      <p:sp>
-        <p:nvSpPr>
-          <p:cNvPr id="5" name="Inhaltsplatzhalter 4"/>
-          <p:cNvSpPr>
-            <a:spLocks noGrp="1"/>
-          </p:cNvSpPr>
+      <p:graphicFrame>
+        <p:nvGraphicFramePr>
+          <p:cNvPr id="6" name="Inhaltsplatzhalter 5"/>
+          <p:cNvGraphicFramePr>
+            <a:graphicFrameLocks noGrp="1"/>
+          </p:cNvGraphicFramePr>
           <p:nvPr>
             <p:ph sz="quarter" idx="1"/>
-          </p:nvPr>
-        </p:nvSpPr>
-        <p:spPr/>
-        <p:txBody>
-          <a:bodyPr/>
-          <a:lstStyle/>
-          <a:p>
-            <a:r>
-              <a:rPr lang="de-DE" dirty="0" err="1">
-                <a:latin typeface="Arial Unicode MS" panose="020B0604020202020204" pitchFamily="34" charset="-128"/>
-                <a:ea typeface="Arial Unicode MS" panose="020B0604020202020204" pitchFamily="34" charset="-128"/>
-                <a:cs typeface="Arial Unicode MS" panose="020B0604020202020204" pitchFamily="34" charset="-128"/>
-              </a:rPr>
-              <a:t>Git</a:t>
-            </a:r>
-            <a:r>
-              <a:rPr lang="de-DE" dirty="0">
-                <a:latin typeface="Arial Unicode MS" panose="020B0604020202020204" pitchFamily="34" charset="-128"/>
-                <a:ea typeface="Arial Unicode MS" panose="020B0604020202020204" pitchFamily="34" charset="-128"/>
-                <a:cs typeface="Arial Unicode MS" panose="020B0604020202020204" pitchFamily="34" charset="-128"/>
-              </a:rPr>
-              <a:t> log –</a:t>
-            </a:r>
-            <a:r>
-              <a:rPr lang="de-DE" dirty="0" err="1">
-                <a:latin typeface="Arial Unicode MS" panose="020B0604020202020204" pitchFamily="34" charset="-128"/>
-                <a:ea typeface="Arial Unicode MS" panose="020B0604020202020204" pitchFamily="34" charset="-128"/>
-                <a:cs typeface="Arial Unicode MS" panose="020B0604020202020204" pitchFamily="34" charset="-128"/>
-              </a:rPr>
-              <a:t>oneline</a:t>
-            </a:r>
-            <a:endParaRPr lang="de-DE" dirty="0">
-              <a:latin typeface="Arial Unicode MS" panose="020B0604020202020204" pitchFamily="34" charset="-128"/>
-              <a:ea typeface="Arial Unicode MS" panose="020B0604020202020204" pitchFamily="34" charset="-128"/>
-              <a:cs typeface="Arial Unicode MS" panose="020B0604020202020204" pitchFamily="34" charset="-128"/>
-            </a:endParaRPr>
-          </a:p>
-          <a:p>
-            <a:r>
-              <a:rPr lang="de-DE" dirty="0" err="1">
-                <a:latin typeface="Arial Unicode MS" panose="020B0604020202020204" pitchFamily="34" charset="-128"/>
-                <a:ea typeface="Arial Unicode MS" panose="020B0604020202020204" pitchFamily="34" charset="-128"/>
-                <a:cs typeface="Arial Unicode MS" panose="020B0604020202020204" pitchFamily="34" charset="-128"/>
-              </a:rPr>
-              <a:t>Git</a:t>
-            </a:r>
-            <a:r>
-              <a:rPr lang="de-DE" dirty="0">
-                <a:latin typeface="Arial Unicode MS" panose="020B0604020202020204" pitchFamily="34" charset="-128"/>
-                <a:ea typeface="Arial Unicode MS" panose="020B0604020202020204" pitchFamily="34" charset="-128"/>
-                <a:cs typeface="Arial Unicode MS" panose="020B0604020202020204" pitchFamily="34" charset="-128"/>
-              </a:rPr>
-              <a:t> </a:t>
-            </a:r>
-            <a:r>
-              <a:rPr lang="de-DE" dirty="0" err="1">
-                <a:latin typeface="Arial Unicode MS" panose="020B0604020202020204" pitchFamily="34" charset="-128"/>
-                <a:ea typeface="Arial Unicode MS" panose="020B0604020202020204" pitchFamily="34" charset="-128"/>
-                <a:cs typeface="Arial Unicode MS" panose="020B0604020202020204" pitchFamily="34" charset="-128"/>
-              </a:rPr>
-              <a:t>checkout</a:t>
-            </a:r>
-            <a:r>
-              <a:rPr lang="de-DE" dirty="0">
-                <a:latin typeface="Arial Unicode MS" panose="020B0604020202020204" pitchFamily="34" charset="-128"/>
-                <a:ea typeface="Arial Unicode MS" panose="020B0604020202020204" pitchFamily="34" charset="-128"/>
-                <a:cs typeface="Arial Unicode MS" panose="020B0604020202020204" pitchFamily="34" charset="-128"/>
-              </a:rPr>
-              <a:t> &lt;</a:t>
-            </a:r>
-            <a:r>
-              <a:rPr lang="de-DE" dirty="0" err="1">
-                <a:latin typeface="Arial Unicode MS" panose="020B0604020202020204" pitchFamily="34" charset="-128"/>
-                <a:ea typeface="Arial Unicode MS" panose="020B0604020202020204" pitchFamily="34" charset="-128"/>
-                <a:cs typeface="Arial Unicode MS" panose="020B0604020202020204" pitchFamily="34" charset="-128"/>
-              </a:rPr>
-              <a:t>lognr</a:t>
-            </a:r>
-            <a:r>
-              <a:rPr lang="de-DE" dirty="0">
-                <a:latin typeface="Arial Unicode MS" panose="020B0604020202020204" pitchFamily="34" charset="-128"/>
-                <a:ea typeface="Arial Unicode MS" panose="020B0604020202020204" pitchFamily="34" charset="-128"/>
-                <a:cs typeface="Arial Unicode MS" panose="020B0604020202020204" pitchFamily="34" charset="-128"/>
-              </a:rPr>
-              <a:t>&gt;</a:t>
-            </a:r>
-          </a:p>
-          <a:p>
-            <a:r>
-              <a:rPr lang="de-DE" dirty="0" err="1">
-                <a:latin typeface="Arial Unicode MS" panose="020B0604020202020204" pitchFamily="34" charset="-128"/>
-                <a:ea typeface="Arial Unicode MS" panose="020B0604020202020204" pitchFamily="34" charset="-128"/>
-                <a:cs typeface="Arial Unicode MS" panose="020B0604020202020204" pitchFamily="34" charset="-128"/>
-              </a:rPr>
-              <a:t>gitk</a:t>
-            </a:r>
-            <a:endParaRPr lang="de-DE" dirty="0">
-              <a:latin typeface="Arial Unicode MS" panose="020B0604020202020204" pitchFamily="34" charset="-128"/>
-              <a:ea typeface="Arial Unicode MS" panose="020B0604020202020204" pitchFamily="34" charset="-128"/>
-              <a:cs typeface="Arial Unicode MS" panose="020B0604020202020204" pitchFamily="34" charset="-128"/>
-            </a:endParaRPr>
-          </a:p>
-          <a:p>
-            <a:endParaRPr lang="de-DE" dirty="0" smtClean="0"/>
-          </a:p>
-        </p:txBody>
-      </p:sp>
+            <p:extLst>
+              <p:ext uri="{D42A27DB-BD31-4B8C-83A1-F6EECF244321}">
+                <p14:modId xmlns:p14="http://schemas.microsoft.com/office/powerpoint/2010/main" val="1386026627"/>
+              </p:ext>
+            </p:extLst>
+          </p:nvPr>
+        </p:nvGraphicFramePr>
+        <p:xfrm>
+          <a:off x="457200" y="1219200"/>
+          <a:ext cx="8229600" cy="4998720"/>
+        </p:xfrm>
+        <a:graphic>
+          <a:graphicData uri="http://schemas.openxmlformats.org/drawingml/2006/table">
+            <a:tbl>
+              <a:tblPr firstRow="1" bandRow="1">
+                <a:tableStyleId>{5C22544A-7EE6-4342-B048-85BDC9FD1C3A}</a:tableStyleId>
+              </a:tblPr>
+              <a:tblGrid>
+                <a:gridCol w="2746648"/>
+                <a:gridCol w="5482952"/>
+              </a:tblGrid>
+              <a:tr h="370840">
+                <a:tc>
+                  <a:txBody>
+                    <a:bodyPr/>
+                    <a:lstStyle/>
+                    <a:p>
+                      <a:r>
+                        <a:rPr lang="de-DE" sz="1500" dirty="0" err="1" smtClean="0"/>
+                        <a:t>git</a:t>
+                      </a:r>
+                      <a:r>
+                        <a:rPr lang="de-DE" sz="1500" dirty="0" smtClean="0"/>
+                        <a:t>-Befehl</a:t>
+                      </a:r>
+                      <a:endParaRPr lang="de-DE" sz="1500" dirty="0"/>
+                    </a:p>
+                  </a:txBody>
+                  <a:tcPr/>
+                </a:tc>
+                <a:tc>
+                  <a:txBody>
+                    <a:bodyPr/>
+                    <a:lstStyle/>
+                    <a:p>
+                      <a:r>
+                        <a:rPr lang="de-DE" sz="1500" dirty="0" smtClean="0"/>
+                        <a:t>Funktion</a:t>
+                      </a:r>
+                      <a:endParaRPr lang="de-DE" sz="1500" dirty="0"/>
+                    </a:p>
+                  </a:txBody>
+                  <a:tcPr/>
+                </a:tc>
+              </a:tr>
+              <a:tr h="370840">
+                <a:tc>
+                  <a:txBody>
+                    <a:bodyPr/>
+                    <a:lstStyle/>
+                    <a:p>
+                      <a:r>
+                        <a:rPr lang="de-DE" sz="1500" dirty="0" err="1" smtClean="0"/>
+                        <a:t>git</a:t>
+                      </a:r>
+                      <a:r>
+                        <a:rPr lang="de-DE" sz="1500" baseline="0" dirty="0" smtClean="0"/>
+                        <a:t> </a:t>
+                      </a:r>
+                      <a:r>
+                        <a:rPr lang="de-DE" sz="1500" baseline="0" dirty="0" err="1" smtClean="0"/>
+                        <a:t>config</a:t>
+                      </a:r>
+                      <a:r>
+                        <a:rPr lang="de-DE" sz="1500" baseline="0" dirty="0" smtClean="0"/>
+                        <a:t> user.name “ “</a:t>
+                      </a:r>
+                    </a:p>
+                    <a:p>
+                      <a:pPr marL="0" marR="0" indent="0" algn="l" defTabSz="914400" rtl="0" eaLnBrk="1" fontAlgn="auto" latinLnBrk="0" hangingPunct="1">
+                        <a:lnSpc>
+                          <a:spcPct val="100000"/>
+                        </a:lnSpc>
+                        <a:spcBef>
+                          <a:spcPts val="0"/>
+                        </a:spcBef>
+                        <a:spcAft>
+                          <a:spcPts val="0"/>
+                        </a:spcAft>
+                        <a:buClrTx/>
+                        <a:buSzTx/>
+                        <a:buFontTx/>
+                        <a:buNone/>
+                        <a:tabLst/>
+                        <a:defRPr/>
+                      </a:pPr>
+                      <a:r>
+                        <a:rPr lang="de-DE" sz="1500" dirty="0" err="1" smtClean="0"/>
+                        <a:t>git</a:t>
+                      </a:r>
+                      <a:r>
+                        <a:rPr lang="de-DE" sz="1500" baseline="0" dirty="0" smtClean="0"/>
+                        <a:t> </a:t>
+                      </a:r>
+                      <a:r>
+                        <a:rPr lang="de-DE" sz="1500" baseline="0" dirty="0" err="1" smtClean="0"/>
+                        <a:t>config</a:t>
+                      </a:r>
+                      <a:r>
+                        <a:rPr lang="de-DE" sz="1500" baseline="0" dirty="0" smtClean="0"/>
+                        <a:t> </a:t>
+                      </a:r>
+                      <a:r>
+                        <a:rPr lang="de-DE" sz="1500" baseline="0" dirty="0" err="1" smtClean="0"/>
+                        <a:t>user.email</a:t>
+                      </a:r>
+                      <a:r>
+                        <a:rPr lang="de-DE" sz="1500" baseline="0" dirty="0" smtClean="0"/>
+                        <a:t> “ “</a:t>
+                      </a:r>
+                      <a:endParaRPr lang="de-DE" sz="1500" dirty="0" smtClean="0"/>
+                    </a:p>
+                  </a:txBody>
+                  <a:tcPr/>
+                </a:tc>
+                <a:tc>
+                  <a:txBody>
+                    <a:bodyPr/>
+                    <a:lstStyle/>
+                    <a:p>
+                      <a:endParaRPr lang="de-DE" sz="1500" dirty="0"/>
+                    </a:p>
+                  </a:txBody>
+                  <a:tcPr/>
+                </a:tc>
+              </a:tr>
+              <a:tr h="370840">
+                <a:tc>
+                  <a:txBody>
+                    <a:bodyPr/>
+                    <a:lstStyle/>
+                    <a:p>
+                      <a:r>
+                        <a:rPr lang="de-DE" sz="1500" b="0" dirty="0" err="1" smtClean="0"/>
+                        <a:t>git</a:t>
+                      </a:r>
+                      <a:r>
+                        <a:rPr lang="de-DE" sz="1500" b="0" baseline="0" dirty="0" smtClean="0"/>
+                        <a:t> </a:t>
+                      </a:r>
+                      <a:r>
+                        <a:rPr lang="de-DE" sz="1500" b="0" baseline="0" dirty="0" err="1" smtClean="0"/>
+                        <a:t>init</a:t>
+                      </a:r>
+                      <a:endParaRPr lang="de-DE" sz="1500" b="0" baseline="0" dirty="0" smtClean="0"/>
+                    </a:p>
+                    <a:p>
+                      <a:r>
+                        <a:rPr lang="de-DE" sz="1500" dirty="0" err="1" smtClean="0">
+                          <a:latin typeface="+mn-lt"/>
+                          <a:ea typeface="Arial Unicode MS" panose="020B0604020202020204" pitchFamily="34" charset="-128"/>
+                          <a:cs typeface="Arial Unicode MS" panose="020B0604020202020204" pitchFamily="34" charset="-128"/>
+                        </a:rPr>
+                        <a:t>git</a:t>
+                      </a:r>
+                      <a:r>
+                        <a:rPr lang="de-DE" sz="1500" dirty="0" smtClean="0">
+                          <a:latin typeface="+mn-lt"/>
+                          <a:ea typeface="Arial Unicode MS" panose="020B0604020202020204" pitchFamily="34" charset="-128"/>
+                          <a:cs typeface="Arial Unicode MS" panose="020B0604020202020204" pitchFamily="34" charset="-128"/>
+                        </a:rPr>
+                        <a:t> remote </a:t>
+                      </a:r>
+                      <a:r>
+                        <a:rPr lang="de-DE" sz="1500" dirty="0" err="1" smtClean="0">
+                          <a:latin typeface="+mn-lt"/>
+                          <a:ea typeface="Arial Unicode MS" panose="020B0604020202020204" pitchFamily="34" charset="-128"/>
+                          <a:cs typeface="Arial Unicode MS" panose="020B0604020202020204" pitchFamily="34" charset="-128"/>
+                        </a:rPr>
+                        <a:t>add</a:t>
+                      </a:r>
+                      <a:r>
+                        <a:rPr lang="de-DE" sz="1500" dirty="0" smtClean="0">
+                          <a:latin typeface="+mn-lt"/>
+                          <a:ea typeface="Arial Unicode MS" panose="020B0604020202020204" pitchFamily="34" charset="-128"/>
+                          <a:cs typeface="Arial Unicode MS" panose="020B0604020202020204" pitchFamily="34" charset="-128"/>
+                        </a:rPr>
+                        <a:t> </a:t>
+                      </a:r>
+                      <a:r>
+                        <a:rPr lang="de-DE" sz="1500" dirty="0" err="1" smtClean="0">
+                          <a:latin typeface="+mn-lt"/>
+                          <a:ea typeface="Arial Unicode MS" panose="020B0604020202020204" pitchFamily="34" charset="-128"/>
+                          <a:cs typeface="Arial Unicode MS" panose="020B0604020202020204" pitchFamily="34" charset="-128"/>
+                        </a:rPr>
+                        <a:t>origin</a:t>
+                      </a:r>
+                      <a:r>
+                        <a:rPr lang="de-DE" sz="1500" dirty="0" smtClean="0">
+                          <a:latin typeface="+mn-lt"/>
+                          <a:ea typeface="Arial Unicode MS" panose="020B0604020202020204" pitchFamily="34" charset="-128"/>
+                          <a:cs typeface="Arial Unicode MS" panose="020B0604020202020204" pitchFamily="34" charset="-128"/>
+                        </a:rPr>
+                        <a:t> </a:t>
+                      </a:r>
+                      <a:endParaRPr lang="de-DE" sz="1500" b="0" baseline="0" dirty="0" smtClean="0">
+                        <a:latin typeface="+mn-lt"/>
+                      </a:endParaRPr>
+                    </a:p>
+                    <a:p>
+                      <a:r>
+                        <a:rPr lang="de-DE" sz="1500" b="0" baseline="0" dirty="0" err="1" smtClean="0"/>
+                        <a:t>git</a:t>
+                      </a:r>
+                      <a:r>
+                        <a:rPr lang="de-DE" sz="1500" b="0" baseline="0" dirty="0" smtClean="0"/>
+                        <a:t> </a:t>
+                      </a:r>
+                      <a:r>
+                        <a:rPr lang="de-DE" sz="1500" b="0" baseline="0" dirty="0" err="1" smtClean="0"/>
+                        <a:t>clone</a:t>
+                      </a:r>
+                      <a:endParaRPr lang="de-DE" sz="1500" b="0" baseline="0" dirty="0" smtClean="0"/>
+                    </a:p>
+                  </a:txBody>
+                  <a:tcPr/>
+                </a:tc>
+                <a:tc>
+                  <a:txBody>
+                    <a:bodyPr/>
+                    <a:lstStyle/>
+                    <a:p>
+                      <a:endParaRPr lang="de-DE" sz="1500" dirty="0"/>
+                    </a:p>
+                  </a:txBody>
+                  <a:tcPr/>
+                </a:tc>
+              </a:tr>
+              <a:tr h="370840">
+                <a:tc>
+                  <a:txBody>
+                    <a:bodyPr/>
+                    <a:lstStyle/>
+                    <a:p>
+                      <a:pPr marL="0" marR="0" indent="0" algn="l" defTabSz="914400" rtl="0" eaLnBrk="1" fontAlgn="auto" latinLnBrk="0" hangingPunct="1">
+                        <a:lnSpc>
+                          <a:spcPct val="100000"/>
+                        </a:lnSpc>
+                        <a:spcBef>
+                          <a:spcPts val="0"/>
+                        </a:spcBef>
+                        <a:spcAft>
+                          <a:spcPts val="0"/>
+                        </a:spcAft>
+                        <a:buClrTx/>
+                        <a:buSzTx/>
+                        <a:buFontTx/>
+                        <a:buNone/>
+                        <a:tabLst/>
+                        <a:defRPr/>
+                      </a:pPr>
+                      <a:r>
+                        <a:rPr lang="de-DE" sz="1500" baseline="0" dirty="0" err="1" smtClean="0"/>
+                        <a:t>git</a:t>
+                      </a:r>
+                      <a:r>
+                        <a:rPr lang="de-DE" sz="1500" baseline="0" dirty="0" smtClean="0"/>
+                        <a:t> </a:t>
+                      </a:r>
+                      <a:r>
+                        <a:rPr lang="de-DE" sz="1500" baseline="0" dirty="0" err="1" smtClean="0"/>
+                        <a:t>status</a:t>
+                      </a:r>
+                      <a:endParaRPr lang="de-DE" sz="1500" dirty="0" smtClean="0"/>
+                    </a:p>
+                  </a:txBody>
+                  <a:tcPr/>
+                </a:tc>
+                <a:tc>
+                  <a:txBody>
+                    <a:bodyPr/>
+                    <a:lstStyle/>
+                    <a:p>
+                      <a:endParaRPr lang="de-DE" sz="1500" dirty="0"/>
+                    </a:p>
+                  </a:txBody>
+                  <a:tcPr/>
+                </a:tc>
+              </a:tr>
+              <a:tr h="370840">
+                <a:tc>
+                  <a:txBody>
+                    <a:bodyPr/>
+                    <a:lstStyle/>
+                    <a:p>
+                      <a:r>
+                        <a:rPr lang="de-DE" sz="1500" dirty="0" err="1" smtClean="0"/>
+                        <a:t>git</a:t>
+                      </a:r>
+                      <a:r>
+                        <a:rPr lang="de-DE" sz="1500" baseline="0" dirty="0" smtClean="0"/>
+                        <a:t> </a:t>
+                      </a:r>
+                      <a:r>
+                        <a:rPr lang="de-DE" sz="1500" baseline="0" dirty="0" err="1" smtClean="0"/>
+                        <a:t>add</a:t>
+                      </a:r>
+                      <a:endParaRPr lang="de-DE" sz="1500" baseline="0" dirty="0" smtClean="0"/>
+                    </a:p>
+                    <a:p>
+                      <a:pPr marL="0" marR="0" indent="0" algn="l" defTabSz="914400" rtl="0" eaLnBrk="1" fontAlgn="auto" latinLnBrk="0" hangingPunct="1">
+                        <a:lnSpc>
+                          <a:spcPct val="100000"/>
+                        </a:lnSpc>
+                        <a:spcBef>
+                          <a:spcPts val="0"/>
+                        </a:spcBef>
+                        <a:spcAft>
+                          <a:spcPts val="0"/>
+                        </a:spcAft>
+                        <a:buClrTx/>
+                        <a:buSzTx/>
+                        <a:buFontTx/>
+                        <a:buNone/>
+                        <a:tabLst/>
+                        <a:defRPr/>
+                      </a:pPr>
+                      <a:r>
+                        <a:rPr lang="de-DE" sz="1500" dirty="0" err="1" smtClean="0"/>
+                        <a:t>git</a:t>
+                      </a:r>
+                      <a:r>
+                        <a:rPr lang="de-DE" sz="1500" baseline="0" dirty="0" smtClean="0"/>
+                        <a:t> </a:t>
+                      </a:r>
+                      <a:r>
+                        <a:rPr lang="de-DE" sz="1500" baseline="0" dirty="0" err="1" smtClean="0"/>
+                        <a:t>commit</a:t>
+                      </a:r>
+                      <a:r>
+                        <a:rPr lang="de-DE" sz="1500" baseline="0" dirty="0" smtClean="0"/>
+                        <a:t> –m ‘ ‘</a:t>
+                      </a:r>
+                    </a:p>
+                    <a:p>
+                      <a:pPr marL="0" marR="0" indent="0" algn="l" defTabSz="914400" rtl="0" eaLnBrk="1" fontAlgn="auto" latinLnBrk="0" hangingPunct="1">
+                        <a:lnSpc>
+                          <a:spcPct val="100000"/>
+                        </a:lnSpc>
+                        <a:spcBef>
+                          <a:spcPts val="0"/>
+                        </a:spcBef>
+                        <a:spcAft>
+                          <a:spcPts val="0"/>
+                        </a:spcAft>
+                        <a:buClrTx/>
+                        <a:buSzTx/>
+                        <a:buFontTx/>
+                        <a:buNone/>
+                        <a:tabLst/>
+                        <a:defRPr/>
+                      </a:pPr>
+                      <a:r>
+                        <a:rPr lang="de-DE" sz="1500" dirty="0" err="1" smtClean="0"/>
+                        <a:t>git</a:t>
+                      </a:r>
+                      <a:r>
+                        <a:rPr lang="de-DE" sz="1500" baseline="0" dirty="0" smtClean="0"/>
+                        <a:t> push</a:t>
+                      </a:r>
+                      <a:endParaRPr lang="de-DE" sz="1500" dirty="0" smtClean="0"/>
+                    </a:p>
+                  </a:txBody>
+                  <a:tcPr/>
+                </a:tc>
+                <a:tc>
+                  <a:txBody>
+                    <a:bodyPr/>
+                    <a:lstStyle/>
+                    <a:p>
+                      <a:endParaRPr lang="de-DE" sz="1500" dirty="0"/>
+                    </a:p>
+                  </a:txBody>
+                  <a:tcPr/>
+                </a:tc>
+              </a:tr>
+              <a:tr h="370840">
+                <a:tc>
+                  <a:txBody>
+                    <a:bodyPr/>
+                    <a:lstStyle/>
+                    <a:p>
+                      <a:r>
+                        <a:rPr lang="de-DE" sz="1500" dirty="0" err="1" smtClean="0"/>
+                        <a:t>git</a:t>
+                      </a:r>
+                      <a:r>
+                        <a:rPr lang="de-DE" sz="1500" baseline="0" dirty="0" smtClean="0"/>
+                        <a:t> pull</a:t>
+                      </a:r>
+                    </a:p>
+                  </a:txBody>
+                  <a:tcPr/>
+                </a:tc>
+                <a:tc>
+                  <a:txBody>
+                    <a:bodyPr/>
+                    <a:lstStyle/>
+                    <a:p>
+                      <a:endParaRPr lang="de-DE" sz="1500" dirty="0"/>
+                    </a:p>
+                  </a:txBody>
+                  <a:tcPr/>
+                </a:tc>
+              </a:tr>
+              <a:tr h="370840">
+                <a:tc>
+                  <a:txBody>
+                    <a:bodyPr/>
+                    <a:lstStyle/>
+                    <a:p>
+                      <a:r>
+                        <a:rPr lang="de-DE" sz="1500" dirty="0" err="1" smtClean="0"/>
+                        <a:t>git</a:t>
+                      </a:r>
+                      <a:r>
+                        <a:rPr lang="de-DE" sz="1500" dirty="0" smtClean="0"/>
+                        <a:t> log –</a:t>
+                      </a:r>
+                      <a:r>
+                        <a:rPr lang="de-DE" sz="1500" dirty="0" err="1" smtClean="0"/>
+                        <a:t>oneline</a:t>
+                      </a:r>
+                      <a:endParaRPr lang="de-DE" sz="1500" dirty="0" smtClean="0"/>
+                    </a:p>
+                    <a:p>
+                      <a:r>
+                        <a:rPr lang="de-DE" sz="1500" dirty="0" err="1" smtClean="0"/>
+                        <a:t>gitk</a:t>
+                      </a:r>
+                      <a:endParaRPr lang="de-DE" sz="1500" dirty="0" smtClean="0"/>
+                    </a:p>
+                  </a:txBody>
+                  <a:tcPr/>
+                </a:tc>
+                <a:tc>
+                  <a:txBody>
+                    <a:bodyPr/>
+                    <a:lstStyle/>
+                    <a:p>
+                      <a:endParaRPr lang="de-DE" sz="1500" dirty="0"/>
+                    </a:p>
+                  </a:txBody>
+                  <a:tcPr/>
+                </a:tc>
+              </a:tr>
+              <a:tr h="370840">
+                <a:tc>
+                  <a:txBody>
+                    <a:bodyPr/>
+                    <a:lstStyle/>
+                    <a:p>
+                      <a:r>
+                        <a:rPr lang="de-DE" sz="1500" dirty="0" err="1" smtClean="0">
+                          <a:latin typeface="+mn-lt"/>
+                          <a:ea typeface="Arial Unicode MS" panose="020B0604020202020204" pitchFamily="34" charset="-128"/>
+                          <a:cs typeface="Arial Unicode MS" panose="020B0604020202020204" pitchFamily="34" charset="-128"/>
+                        </a:rPr>
+                        <a:t>git</a:t>
+                      </a:r>
+                      <a:r>
+                        <a:rPr lang="de-DE" sz="1500" dirty="0" smtClean="0">
+                          <a:latin typeface="+mn-lt"/>
+                          <a:ea typeface="Arial Unicode MS" panose="020B0604020202020204" pitchFamily="34" charset="-128"/>
+                          <a:cs typeface="Arial Unicode MS" panose="020B0604020202020204" pitchFamily="34" charset="-128"/>
+                        </a:rPr>
+                        <a:t> </a:t>
+                      </a:r>
+                      <a:r>
+                        <a:rPr lang="de-DE" sz="1500" dirty="0" err="1" smtClean="0">
+                          <a:latin typeface="+mn-lt"/>
+                          <a:ea typeface="Arial Unicode MS" panose="020B0604020202020204" pitchFamily="34" charset="-128"/>
+                          <a:cs typeface="Arial Unicode MS" panose="020B0604020202020204" pitchFamily="34" charset="-128"/>
+                        </a:rPr>
+                        <a:t>checkout</a:t>
+                      </a:r>
+                      <a:r>
+                        <a:rPr lang="de-DE" sz="1500" dirty="0" smtClean="0">
+                          <a:latin typeface="+mn-lt"/>
+                          <a:ea typeface="Arial Unicode MS" panose="020B0604020202020204" pitchFamily="34" charset="-128"/>
+                          <a:cs typeface="Arial Unicode MS" panose="020B0604020202020204" pitchFamily="34" charset="-128"/>
+                        </a:rPr>
+                        <a:t> –b </a:t>
+                      </a:r>
+                      <a:r>
+                        <a:rPr lang="de-DE" sz="1500" dirty="0" err="1" smtClean="0">
+                          <a:latin typeface="+mn-lt"/>
+                          <a:ea typeface="Arial Unicode MS" panose="020B0604020202020204" pitchFamily="34" charset="-128"/>
+                          <a:cs typeface="Arial Unicode MS" panose="020B0604020202020204" pitchFamily="34" charset="-128"/>
+                        </a:rPr>
+                        <a:t>name</a:t>
+                      </a:r>
+                      <a:endParaRPr lang="de-DE" sz="1500" dirty="0" smtClean="0">
+                        <a:latin typeface="+mn-lt"/>
+                        <a:ea typeface="Arial Unicode MS" panose="020B0604020202020204" pitchFamily="34" charset="-128"/>
+                        <a:cs typeface="Arial Unicode MS" panose="020B0604020202020204" pitchFamily="34" charset="-128"/>
+                      </a:endParaRPr>
+                    </a:p>
+                    <a:p>
+                      <a:r>
+                        <a:rPr lang="de-DE" sz="1500" dirty="0" err="1" smtClean="0">
+                          <a:latin typeface="+mn-lt"/>
+                          <a:ea typeface="Arial Unicode MS" panose="020B0604020202020204" pitchFamily="34" charset="-128"/>
+                          <a:cs typeface="Arial Unicode MS" panose="020B0604020202020204" pitchFamily="34" charset="-128"/>
+                        </a:rPr>
+                        <a:t>git</a:t>
+                      </a:r>
+                      <a:r>
+                        <a:rPr lang="de-DE" sz="1500" dirty="0" smtClean="0">
+                          <a:latin typeface="+mn-lt"/>
+                          <a:ea typeface="Arial Unicode MS" panose="020B0604020202020204" pitchFamily="34" charset="-128"/>
+                          <a:cs typeface="Arial Unicode MS" panose="020B0604020202020204" pitchFamily="34" charset="-128"/>
+                        </a:rPr>
+                        <a:t> </a:t>
+                      </a:r>
+                      <a:r>
+                        <a:rPr lang="de-DE" sz="1500" dirty="0" err="1" smtClean="0">
+                          <a:latin typeface="+mn-lt"/>
+                          <a:ea typeface="Arial Unicode MS" panose="020B0604020202020204" pitchFamily="34" charset="-128"/>
+                          <a:cs typeface="Arial Unicode MS" panose="020B0604020202020204" pitchFamily="34" charset="-128"/>
+                        </a:rPr>
+                        <a:t>checkout</a:t>
+                      </a:r>
+                      <a:r>
+                        <a:rPr lang="de-DE" sz="1500" dirty="0" smtClean="0">
+                          <a:latin typeface="+mn-lt"/>
+                          <a:ea typeface="Arial Unicode MS" panose="020B0604020202020204" pitchFamily="34" charset="-128"/>
+                          <a:cs typeface="Arial Unicode MS" panose="020B0604020202020204" pitchFamily="34" charset="-128"/>
+                        </a:rPr>
+                        <a:t> </a:t>
+                      </a:r>
+                      <a:r>
+                        <a:rPr lang="de-DE" sz="1500" dirty="0" err="1" smtClean="0">
+                          <a:latin typeface="+mn-lt"/>
+                          <a:ea typeface="Arial Unicode MS" panose="020B0604020202020204" pitchFamily="34" charset="-128"/>
+                          <a:cs typeface="Arial Unicode MS" panose="020B0604020202020204" pitchFamily="34" charset="-128"/>
+                        </a:rPr>
+                        <a:t>master</a:t>
+                      </a:r>
+                      <a:endParaRPr lang="de-DE" sz="1500" dirty="0" smtClean="0">
+                        <a:latin typeface="+mn-lt"/>
+                        <a:ea typeface="Arial Unicode MS" panose="020B0604020202020204" pitchFamily="34" charset="-128"/>
+                        <a:cs typeface="Arial Unicode MS" panose="020B0604020202020204" pitchFamily="34" charset="-128"/>
+                      </a:endParaRPr>
+                    </a:p>
+                    <a:p>
+                      <a:pPr marL="0" marR="0" indent="0" algn="l" defTabSz="914400" rtl="0" eaLnBrk="1" fontAlgn="auto" latinLnBrk="0" hangingPunct="1">
+                        <a:lnSpc>
+                          <a:spcPct val="100000"/>
+                        </a:lnSpc>
+                        <a:spcBef>
+                          <a:spcPts val="0"/>
+                        </a:spcBef>
+                        <a:spcAft>
+                          <a:spcPts val="0"/>
+                        </a:spcAft>
+                        <a:buClrTx/>
+                        <a:buSzTx/>
+                        <a:buFontTx/>
+                        <a:buNone/>
+                        <a:tabLst/>
+                        <a:defRPr/>
+                      </a:pPr>
+                      <a:r>
+                        <a:rPr lang="de-DE" sz="1500" dirty="0" err="1" smtClean="0">
+                          <a:latin typeface="+mn-lt"/>
+                          <a:ea typeface="Arial Unicode MS" panose="020B0604020202020204" pitchFamily="34" charset="-128"/>
+                          <a:cs typeface="Arial Unicode MS" panose="020B0604020202020204" pitchFamily="34" charset="-128"/>
+                        </a:rPr>
+                        <a:t>git</a:t>
+                      </a:r>
+                      <a:r>
+                        <a:rPr lang="de-DE" sz="1500" dirty="0" smtClean="0">
+                          <a:latin typeface="+mn-lt"/>
+                          <a:ea typeface="Arial Unicode MS" panose="020B0604020202020204" pitchFamily="34" charset="-128"/>
+                          <a:cs typeface="Arial Unicode MS" panose="020B0604020202020204" pitchFamily="34" charset="-128"/>
+                        </a:rPr>
+                        <a:t> </a:t>
+                      </a:r>
+                      <a:r>
+                        <a:rPr lang="de-DE" sz="1500" dirty="0" err="1" smtClean="0">
+                          <a:latin typeface="+mn-lt"/>
+                          <a:ea typeface="Arial Unicode MS" panose="020B0604020202020204" pitchFamily="34" charset="-128"/>
+                          <a:cs typeface="Arial Unicode MS" panose="020B0604020202020204" pitchFamily="34" charset="-128"/>
+                        </a:rPr>
+                        <a:t>checkout</a:t>
+                      </a:r>
+                      <a:r>
+                        <a:rPr lang="de-DE" sz="1500" dirty="0" smtClean="0">
+                          <a:latin typeface="+mn-lt"/>
+                          <a:ea typeface="Arial Unicode MS" panose="020B0604020202020204" pitchFamily="34" charset="-128"/>
+                          <a:cs typeface="Arial Unicode MS" panose="020B0604020202020204" pitchFamily="34" charset="-128"/>
+                        </a:rPr>
+                        <a:t> &lt;</a:t>
+                      </a:r>
+                      <a:r>
+                        <a:rPr lang="de-DE" sz="1500" dirty="0" err="1" smtClean="0">
+                          <a:latin typeface="+mn-lt"/>
+                          <a:ea typeface="Arial Unicode MS" panose="020B0604020202020204" pitchFamily="34" charset="-128"/>
+                          <a:cs typeface="Arial Unicode MS" panose="020B0604020202020204" pitchFamily="34" charset="-128"/>
+                        </a:rPr>
+                        <a:t>lognr</a:t>
+                      </a:r>
+                      <a:r>
+                        <a:rPr lang="de-DE" sz="1500" dirty="0" smtClean="0">
+                          <a:latin typeface="+mn-lt"/>
+                          <a:ea typeface="Arial Unicode MS" panose="020B0604020202020204" pitchFamily="34" charset="-128"/>
+                          <a:cs typeface="Arial Unicode MS" panose="020B0604020202020204" pitchFamily="34" charset="-128"/>
+                        </a:rPr>
+                        <a:t>&gt;</a:t>
+                      </a:r>
+                    </a:p>
+                    <a:p>
+                      <a:r>
+                        <a:rPr lang="de-DE" sz="1500" dirty="0" err="1" smtClean="0">
+                          <a:latin typeface="+mn-lt"/>
+                          <a:ea typeface="Arial Unicode MS" panose="020B0604020202020204" pitchFamily="34" charset="-128"/>
+                          <a:cs typeface="Arial Unicode MS" panose="020B0604020202020204" pitchFamily="34" charset="-128"/>
+                        </a:rPr>
+                        <a:t>git</a:t>
+                      </a:r>
+                      <a:r>
+                        <a:rPr lang="de-DE" sz="1500" dirty="0" smtClean="0">
+                          <a:latin typeface="+mn-lt"/>
+                          <a:ea typeface="Arial Unicode MS" panose="020B0604020202020204" pitchFamily="34" charset="-128"/>
+                          <a:cs typeface="Arial Unicode MS" panose="020B0604020202020204" pitchFamily="34" charset="-128"/>
+                        </a:rPr>
+                        <a:t> </a:t>
+                      </a:r>
+                      <a:r>
+                        <a:rPr lang="de-DE" sz="1500" dirty="0" err="1" smtClean="0">
+                          <a:latin typeface="+mn-lt"/>
+                          <a:ea typeface="Arial Unicode MS" panose="020B0604020202020204" pitchFamily="34" charset="-128"/>
+                          <a:cs typeface="Arial Unicode MS" panose="020B0604020202020204" pitchFamily="34" charset="-128"/>
+                        </a:rPr>
+                        <a:t>merge</a:t>
+                      </a:r>
+                      <a:r>
+                        <a:rPr lang="de-DE" sz="1500" dirty="0" smtClean="0">
+                          <a:latin typeface="+mn-lt"/>
+                          <a:ea typeface="Arial Unicode MS" panose="020B0604020202020204" pitchFamily="34" charset="-128"/>
+                          <a:cs typeface="Arial Unicode MS" panose="020B0604020202020204" pitchFamily="34" charset="-128"/>
+                        </a:rPr>
+                        <a:t> &lt;</a:t>
+                      </a:r>
+                      <a:r>
+                        <a:rPr lang="de-DE" sz="1500" dirty="0" err="1" smtClean="0">
+                          <a:latin typeface="+mn-lt"/>
+                          <a:ea typeface="Arial Unicode MS" panose="020B0604020202020204" pitchFamily="34" charset="-128"/>
+                          <a:cs typeface="Arial Unicode MS" panose="020B0604020202020204" pitchFamily="34" charset="-128"/>
+                        </a:rPr>
+                        <a:t>branch</a:t>
+                      </a:r>
+                      <a:r>
+                        <a:rPr lang="de-DE" sz="1500" dirty="0" smtClean="0">
+                          <a:latin typeface="+mn-lt"/>
+                          <a:ea typeface="Arial Unicode MS" panose="020B0604020202020204" pitchFamily="34" charset="-128"/>
+                          <a:cs typeface="Arial Unicode MS" panose="020B0604020202020204" pitchFamily="34" charset="-128"/>
+                        </a:rPr>
+                        <a:t>&gt;</a:t>
+                      </a:r>
+                    </a:p>
+                    <a:p>
+                      <a:r>
+                        <a:rPr lang="de-DE" sz="1500" dirty="0" err="1" smtClean="0">
+                          <a:latin typeface="+mn-lt"/>
+                          <a:ea typeface="Arial Unicode MS" panose="020B0604020202020204" pitchFamily="34" charset="-128"/>
+                          <a:cs typeface="Arial Unicode MS" panose="020B0604020202020204" pitchFamily="34" charset="-128"/>
+                        </a:rPr>
+                        <a:t>git</a:t>
+                      </a:r>
+                      <a:r>
+                        <a:rPr lang="de-DE" sz="1500" dirty="0" smtClean="0">
+                          <a:latin typeface="+mn-lt"/>
+                          <a:ea typeface="Arial Unicode MS" panose="020B0604020202020204" pitchFamily="34" charset="-128"/>
+                          <a:cs typeface="Arial Unicode MS" panose="020B0604020202020204" pitchFamily="34" charset="-128"/>
+                        </a:rPr>
+                        <a:t> </a:t>
+                      </a:r>
+                      <a:r>
+                        <a:rPr lang="de-DE" sz="1500" dirty="0" err="1" smtClean="0">
+                          <a:latin typeface="+mn-lt"/>
+                          <a:ea typeface="Arial Unicode MS" panose="020B0604020202020204" pitchFamily="34" charset="-128"/>
+                          <a:cs typeface="Arial Unicode MS" panose="020B0604020202020204" pitchFamily="34" charset="-128"/>
+                        </a:rPr>
+                        <a:t>diff</a:t>
+                      </a:r>
+                      <a:r>
+                        <a:rPr lang="de-DE" sz="1500" dirty="0" smtClean="0">
+                          <a:latin typeface="+mn-lt"/>
+                          <a:ea typeface="Arial Unicode MS" panose="020B0604020202020204" pitchFamily="34" charset="-128"/>
+                          <a:cs typeface="Arial Unicode MS" panose="020B0604020202020204" pitchFamily="34" charset="-128"/>
+                        </a:rPr>
+                        <a:t> &lt;quell&gt;&lt;ziel&gt;</a:t>
+                      </a:r>
+                    </a:p>
+                  </a:txBody>
+                  <a:tcPr/>
+                </a:tc>
+                <a:tc>
+                  <a:txBody>
+                    <a:bodyPr/>
+                    <a:lstStyle/>
+                    <a:p>
+                      <a:endParaRPr lang="de-DE" sz="1500" dirty="0"/>
+                    </a:p>
+                  </a:txBody>
+                  <a:tcPr/>
+                </a:tc>
+              </a:tr>
+            </a:tbl>
+          </a:graphicData>
+        </a:graphic>
+      </p:graphicFrame>
       <p:pic>
         <p:nvPicPr>
           <p:cNvPr id="1026" name="Picture 2" descr="Logo"/>
@@ -6268,678 +6881,6 @@
         </p:nvSpPr>
         <p:spPr/>
         <p:txBody>
-          <a:bodyPr>
-            <a:normAutofit/>
-          </a:bodyPr>
-          <a:lstStyle/>
-          <a:p>
-            <a:r>
-              <a:rPr lang="de-DE" dirty="0" smtClean="0"/>
-              <a:t>Befehle</a:t>
-            </a:r>
-            <a:endParaRPr lang="de-DE" dirty="0"/>
-          </a:p>
-        </p:txBody>
-      </p:sp>
-      <p:sp>
-        <p:nvSpPr>
-          <p:cNvPr id="3" name="Fußzeilenplatzhalter 2"/>
-          <p:cNvSpPr>
-            <a:spLocks noGrp="1"/>
-          </p:cNvSpPr>
-          <p:nvPr>
-            <p:ph type="ftr" sz="quarter" idx="11"/>
-          </p:nvPr>
-        </p:nvSpPr>
-        <p:spPr/>
-        <p:txBody>
-          <a:bodyPr/>
-          <a:lstStyle/>
-          <a:p>
-            <a:r>
-              <a:rPr lang="de-DE" smtClean="0"/>
-              <a:t>ePortfolio von Mehmet Ali Incekara</a:t>
-            </a:r>
-            <a:endParaRPr lang="de-DE"/>
-          </a:p>
-        </p:txBody>
-      </p:sp>
-      <p:sp>
-        <p:nvSpPr>
-          <p:cNvPr id="4" name="Foliennummernplatzhalter 3"/>
-          <p:cNvSpPr>
-            <a:spLocks noGrp="1"/>
-          </p:cNvSpPr>
-          <p:nvPr>
-            <p:ph type="sldNum" sz="quarter" idx="12"/>
-          </p:nvPr>
-        </p:nvSpPr>
-        <p:spPr/>
-        <p:txBody>
-          <a:bodyPr/>
-          <a:lstStyle/>
-          <a:p>
-            <a:fld id="{32988457-9EFF-4998-891D-85ECFB4B79A4}" type="slidenum">
-              <a:rPr lang="de-DE" smtClean="0"/>
-              <a:t>14</a:t>
-            </a:fld>
-            <a:endParaRPr lang="de-DE"/>
-          </a:p>
-        </p:txBody>
-      </p:sp>
-      <p:sp>
-        <p:nvSpPr>
-          <p:cNvPr id="5" name="Inhaltsplatzhalter 4"/>
-          <p:cNvSpPr>
-            <a:spLocks noGrp="1"/>
-          </p:cNvSpPr>
-          <p:nvPr>
-            <p:ph sz="quarter" idx="1"/>
-          </p:nvPr>
-        </p:nvSpPr>
-        <p:spPr/>
-        <p:txBody>
-          <a:bodyPr>
-            <a:normAutofit fontScale="92500" lnSpcReduction="20000"/>
-          </a:bodyPr>
-          <a:lstStyle/>
-          <a:p>
-            <a:r>
-              <a:rPr lang="de-DE" dirty="0" err="1">
-                <a:latin typeface="Arial Unicode MS" panose="020B0604020202020204" pitchFamily="34" charset="-128"/>
-                <a:ea typeface="Arial Unicode MS" panose="020B0604020202020204" pitchFamily="34" charset="-128"/>
-                <a:cs typeface="Arial Unicode MS" panose="020B0604020202020204" pitchFamily="34" charset="-128"/>
-              </a:rPr>
-              <a:t>g</a:t>
-            </a:r>
-            <a:r>
-              <a:rPr lang="de-DE" dirty="0" err="1" smtClean="0">
-                <a:latin typeface="Arial Unicode MS" panose="020B0604020202020204" pitchFamily="34" charset="-128"/>
-                <a:ea typeface="Arial Unicode MS" panose="020B0604020202020204" pitchFamily="34" charset="-128"/>
-                <a:cs typeface="Arial Unicode MS" panose="020B0604020202020204" pitchFamily="34" charset="-128"/>
-              </a:rPr>
-              <a:t>it</a:t>
-            </a:r>
-            <a:r>
-              <a:rPr lang="de-DE" dirty="0" smtClean="0">
-                <a:latin typeface="Arial Unicode MS" panose="020B0604020202020204" pitchFamily="34" charset="-128"/>
-                <a:ea typeface="Arial Unicode MS" panose="020B0604020202020204" pitchFamily="34" charset="-128"/>
-                <a:cs typeface="Arial Unicode MS" panose="020B0604020202020204" pitchFamily="34" charset="-128"/>
-              </a:rPr>
-              <a:t> </a:t>
-            </a:r>
-            <a:r>
-              <a:rPr lang="de-DE" dirty="0" err="1" smtClean="0">
-                <a:latin typeface="Arial Unicode MS" panose="020B0604020202020204" pitchFamily="34" charset="-128"/>
-                <a:ea typeface="Arial Unicode MS" panose="020B0604020202020204" pitchFamily="34" charset="-128"/>
-                <a:cs typeface="Arial Unicode MS" panose="020B0604020202020204" pitchFamily="34" charset="-128"/>
-              </a:rPr>
-              <a:t>init</a:t>
-            </a:r>
-            <a:endParaRPr lang="de-DE" dirty="0" smtClean="0">
-              <a:latin typeface="Arial Unicode MS" panose="020B0604020202020204" pitchFamily="34" charset="-128"/>
-              <a:ea typeface="Arial Unicode MS" panose="020B0604020202020204" pitchFamily="34" charset="-128"/>
-              <a:cs typeface="Arial Unicode MS" panose="020B0604020202020204" pitchFamily="34" charset="-128"/>
-            </a:endParaRPr>
-          </a:p>
-          <a:p>
-            <a:r>
-              <a:rPr lang="de-DE" dirty="0" err="1" smtClean="0">
-                <a:latin typeface="Arial Unicode MS" panose="020B0604020202020204" pitchFamily="34" charset="-128"/>
-                <a:ea typeface="Arial Unicode MS" panose="020B0604020202020204" pitchFamily="34" charset="-128"/>
-                <a:cs typeface="Arial Unicode MS" panose="020B0604020202020204" pitchFamily="34" charset="-128"/>
-              </a:rPr>
-              <a:t>Git</a:t>
-            </a:r>
-            <a:r>
-              <a:rPr lang="de-DE" dirty="0" smtClean="0">
-                <a:latin typeface="Arial Unicode MS" panose="020B0604020202020204" pitchFamily="34" charset="-128"/>
-                <a:ea typeface="Arial Unicode MS" panose="020B0604020202020204" pitchFamily="34" charset="-128"/>
-                <a:cs typeface="Arial Unicode MS" panose="020B0604020202020204" pitchFamily="34" charset="-128"/>
-              </a:rPr>
-              <a:t> </a:t>
-            </a:r>
-            <a:r>
-              <a:rPr lang="de-DE" dirty="0" err="1" smtClean="0">
-                <a:latin typeface="Arial Unicode MS" panose="020B0604020202020204" pitchFamily="34" charset="-128"/>
-                <a:ea typeface="Arial Unicode MS" panose="020B0604020202020204" pitchFamily="34" charset="-128"/>
-                <a:cs typeface="Arial Unicode MS" panose="020B0604020202020204" pitchFamily="34" charset="-128"/>
-              </a:rPr>
-              <a:t>clone</a:t>
-            </a:r>
-            <a:endParaRPr lang="de-DE" dirty="0">
-              <a:latin typeface="Arial Unicode MS" panose="020B0604020202020204" pitchFamily="34" charset="-128"/>
-              <a:ea typeface="Arial Unicode MS" panose="020B0604020202020204" pitchFamily="34" charset="-128"/>
-              <a:cs typeface="Arial Unicode MS" panose="020B0604020202020204" pitchFamily="34" charset="-128"/>
-            </a:endParaRPr>
-          </a:p>
-          <a:p>
-            <a:r>
-              <a:rPr lang="de-DE" dirty="0" err="1" smtClean="0">
-                <a:latin typeface="Arial Unicode MS" panose="020B0604020202020204" pitchFamily="34" charset="-128"/>
-                <a:ea typeface="Arial Unicode MS" panose="020B0604020202020204" pitchFamily="34" charset="-128"/>
-                <a:cs typeface="Arial Unicode MS" panose="020B0604020202020204" pitchFamily="34" charset="-128"/>
-              </a:rPr>
-              <a:t>Git</a:t>
-            </a:r>
-            <a:r>
-              <a:rPr lang="de-DE" dirty="0" smtClean="0">
-                <a:latin typeface="Arial Unicode MS" panose="020B0604020202020204" pitchFamily="34" charset="-128"/>
-                <a:ea typeface="Arial Unicode MS" panose="020B0604020202020204" pitchFamily="34" charset="-128"/>
-                <a:cs typeface="Arial Unicode MS" panose="020B0604020202020204" pitchFamily="34" charset="-128"/>
-              </a:rPr>
-              <a:t> </a:t>
-            </a:r>
-            <a:r>
-              <a:rPr lang="de-DE" dirty="0" err="1" smtClean="0">
-                <a:latin typeface="Arial Unicode MS" panose="020B0604020202020204" pitchFamily="34" charset="-128"/>
-                <a:ea typeface="Arial Unicode MS" panose="020B0604020202020204" pitchFamily="34" charset="-128"/>
-                <a:cs typeface="Arial Unicode MS" panose="020B0604020202020204" pitchFamily="34" charset="-128"/>
-              </a:rPr>
-              <a:t>add</a:t>
-            </a:r>
-            <a:endParaRPr lang="de-DE" dirty="0">
-              <a:latin typeface="Arial Unicode MS" panose="020B0604020202020204" pitchFamily="34" charset="-128"/>
-              <a:ea typeface="Arial Unicode MS" panose="020B0604020202020204" pitchFamily="34" charset="-128"/>
-              <a:cs typeface="Arial Unicode MS" panose="020B0604020202020204" pitchFamily="34" charset="-128"/>
-            </a:endParaRPr>
-          </a:p>
-          <a:p>
-            <a:r>
-              <a:rPr lang="de-DE" dirty="0" err="1" smtClean="0">
-                <a:latin typeface="Arial Unicode MS" panose="020B0604020202020204" pitchFamily="34" charset="-128"/>
-                <a:ea typeface="Arial Unicode MS" panose="020B0604020202020204" pitchFamily="34" charset="-128"/>
-                <a:cs typeface="Arial Unicode MS" panose="020B0604020202020204" pitchFamily="34" charset="-128"/>
-              </a:rPr>
-              <a:t>Git</a:t>
-            </a:r>
-            <a:r>
-              <a:rPr lang="de-DE" dirty="0" smtClean="0">
-                <a:latin typeface="Arial Unicode MS" panose="020B0604020202020204" pitchFamily="34" charset="-128"/>
-                <a:ea typeface="Arial Unicode MS" panose="020B0604020202020204" pitchFamily="34" charset="-128"/>
-                <a:cs typeface="Arial Unicode MS" panose="020B0604020202020204" pitchFamily="34" charset="-128"/>
-              </a:rPr>
-              <a:t> </a:t>
-            </a:r>
-            <a:r>
-              <a:rPr lang="de-DE" dirty="0" err="1" smtClean="0">
-                <a:latin typeface="Arial Unicode MS" panose="020B0604020202020204" pitchFamily="34" charset="-128"/>
-                <a:ea typeface="Arial Unicode MS" panose="020B0604020202020204" pitchFamily="34" charset="-128"/>
-                <a:cs typeface="Arial Unicode MS" panose="020B0604020202020204" pitchFamily="34" charset="-128"/>
-              </a:rPr>
-              <a:t>commit</a:t>
-            </a:r>
-            <a:r>
-              <a:rPr lang="de-DE" dirty="0" smtClean="0">
-                <a:latin typeface="Arial Unicode MS" panose="020B0604020202020204" pitchFamily="34" charset="-128"/>
-                <a:ea typeface="Arial Unicode MS" panose="020B0604020202020204" pitchFamily="34" charset="-128"/>
-                <a:cs typeface="Arial Unicode MS" panose="020B0604020202020204" pitchFamily="34" charset="-128"/>
-              </a:rPr>
-              <a:t> –m ““</a:t>
-            </a:r>
-          </a:p>
-          <a:p>
-            <a:r>
-              <a:rPr lang="de-DE" dirty="0" err="1" smtClean="0">
-                <a:latin typeface="Arial Unicode MS" panose="020B0604020202020204" pitchFamily="34" charset="-128"/>
-                <a:ea typeface="Arial Unicode MS" panose="020B0604020202020204" pitchFamily="34" charset="-128"/>
-                <a:cs typeface="Arial Unicode MS" panose="020B0604020202020204" pitchFamily="34" charset="-128"/>
-              </a:rPr>
-              <a:t>Git</a:t>
-            </a:r>
-            <a:r>
-              <a:rPr lang="de-DE" dirty="0" smtClean="0">
-                <a:latin typeface="Arial Unicode MS" panose="020B0604020202020204" pitchFamily="34" charset="-128"/>
-                <a:ea typeface="Arial Unicode MS" panose="020B0604020202020204" pitchFamily="34" charset="-128"/>
-                <a:cs typeface="Arial Unicode MS" panose="020B0604020202020204" pitchFamily="34" charset="-128"/>
-              </a:rPr>
-              <a:t> push </a:t>
-            </a:r>
-            <a:r>
-              <a:rPr lang="de-DE" dirty="0" err="1" smtClean="0">
-                <a:latin typeface="Arial Unicode MS" panose="020B0604020202020204" pitchFamily="34" charset="-128"/>
-                <a:ea typeface="Arial Unicode MS" panose="020B0604020202020204" pitchFamily="34" charset="-128"/>
-                <a:cs typeface="Arial Unicode MS" panose="020B0604020202020204" pitchFamily="34" charset="-128"/>
-              </a:rPr>
-              <a:t>origin</a:t>
-            </a:r>
-            <a:r>
-              <a:rPr lang="de-DE" dirty="0" smtClean="0">
-                <a:latin typeface="Arial Unicode MS" panose="020B0604020202020204" pitchFamily="34" charset="-128"/>
-                <a:ea typeface="Arial Unicode MS" panose="020B0604020202020204" pitchFamily="34" charset="-128"/>
-                <a:cs typeface="Arial Unicode MS" panose="020B0604020202020204" pitchFamily="34" charset="-128"/>
-              </a:rPr>
-              <a:t> </a:t>
-            </a:r>
-            <a:r>
-              <a:rPr lang="de-DE" dirty="0" err="1" smtClean="0">
-                <a:latin typeface="Arial Unicode MS" panose="020B0604020202020204" pitchFamily="34" charset="-128"/>
-                <a:ea typeface="Arial Unicode MS" panose="020B0604020202020204" pitchFamily="34" charset="-128"/>
-                <a:cs typeface="Arial Unicode MS" panose="020B0604020202020204" pitchFamily="34" charset="-128"/>
-              </a:rPr>
-              <a:t>master</a:t>
-            </a:r>
-            <a:endParaRPr lang="de-DE" dirty="0" smtClean="0">
-              <a:latin typeface="Arial Unicode MS" panose="020B0604020202020204" pitchFamily="34" charset="-128"/>
-              <a:ea typeface="Arial Unicode MS" panose="020B0604020202020204" pitchFamily="34" charset="-128"/>
-              <a:cs typeface="Arial Unicode MS" panose="020B0604020202020204" pitchFamily="34" charset="-128"/>
-            </a:endParaRPr>
-          </a:p>
-          <a:p>
-            <a:r>
-              <a:rPr lang="de-DE" dirty="0" err="1" smtClean="0">
-                <a:latin typeface="Arial Unicode MS" panose="020B0604020202020204" pitchFamily="34" charset="-128"/>
-                <a:ea typeface="Arial Unicode MS" panose="020B0604020202020204" pitchFamily="34" charset="-128"/>
-                <a:cs typeface="Arial Unicode MS" panose="020B0604020202020204" pitchFamily="34" charset="-128"/>
-              </a:rPr>
-              <a:t>Git</a:t>
-            </a:r>
-            <a:r>
-              <a:rPr lang="de-DE" dirty="0" smtClean="0">
-                <a:latin typeface="Arial Unicode MS" panose="020B0604020202020204" pitchFamily="34" charset="-128"/>
-                <a:ea typeface="Arial Unicode MS" panose="020B0604020202020204" pitchFamily="34" charset="-128"/>
-                <a:cs typeface="Arial Unicode MS" panose="020B0604020202020204" pitchFamily="34" charset="-128"/>
-              </a:rPr>
-              <a:t> remote </a:t>
-            </a:r>
-            <a:r>
-              <a:rPr lang="de-DE" dirty="0" err="1" smtClean="0">
-                <a:latin typeface="Arial Unicode MS" panose="020B0604020202020204" pitchFamily="34" charset="-128"/>
-                <a:ea typeface="Arial Unicode MS" panose="020B0604020202020204" pitchFamily="34" charset="-128"/>
-                <a:cs typeface="Arial Unicode MS" panose="020B0604020202020204" pitchFamily="34" charset="-128"/>
-              </a:rPr>
-              <a:t>add</a:t>
-            </a:r>
-            <a:r>
-              <a:rPr lang="de-DE" dirty="0" smtClean="0">
-                <a:latin typeface="Arial Unicode MS" panose="020B0604020202020204" pitchFamily="34" charset="-128"/>
-                <a:ea typeface="Arial Unicode MS" panose="020B0604020202020204" pitchFamily="34" charset="-128"/>
-                <a:cs typeface="Arial Unicode MS" panose="020B0604020202020204" pitchFamily="34" charset="-128"/>
-              </a:rPr>
-              <a:t> </a:t>
-            </a:r>
-            <a:r>
-              <a:rPr lang="de-DE" dirty="0" err="1" smtClean="0">
-                <a:latin typeface="Arial Unicode MS" panose="020B0604020202020204" pitchFamily="34" charset="-128"/>
-                <a:ea typeface="Arial Unicode MS" panose="020B0604020202020204" pitchFamily="34" charset="-128"/>
-                <a:cs typeface="Arial Unicode MS" panose="020B0604020202020204" pitchFamily="34" charset="-128"/>
-              </a:rPr>
-              <a:t>origin</a:t>
-            </a:r>
-            <a:r>
-              <a:rPr lang="de-DE" dirty="0" smtClean="0">
-                <a:latin typeface="Arial Unicode MS" panose="020B0604020202020204" pitchFamily="34" charset="-128"/>
-                <a:ea typeface="Arial Unicode MS" panose="020B0604020202020204" pitchFamily="34" charset="-128"/>
-                <a:cs typeface="Arial Unicode MS" panose="020B0604020202020204" pitchFamily="34" charset="-128"/>
-              </a:rPr>
-              <a:t> &lt;</a:t>
-            </a:r>
-            <a:r>
-              <a:rPr lang="de-DE" dirty="0" err="1" smtClean="0">
-                <a:latin typeface="Arial Unicode MS" panose="020B0604020202020204" pitchFamily="34" charset="-128"/>
-                <a:ea typeface="Arial Unicode MS" panose="020B0604020202020204" pitchFamily="34" charset="-128"/>
-                <a:cs typeface="Arial Unicode MS" panose="020B0604020202020204" pitchFamily="34" charset="-128"/>
-              </a:rPr>
-              <a:t>server</a:t>
-            </a:r>
-            <a:r>
-              <a:rPr lang="de-DE" dirty="0" smtClean="0">
-                <a:latin typeface="Arial Unicode MS" panose="020B0604020202020204" pitchFamily="34" charset="-128"/>
-                <a:ea typeface="Arial Unicode MS" panose="020B0604020202020204" pitchFamily="34" charset="-128"/>
-                <a:cs typeface="Arial Unicode MS" panose="020B0604020202020204" pitchFamily="34" charset="-128"/>
-              </a:rPr>
-              <a:t>&gt;</a:t>
-            </a:r>
-          </a:p>
-          <a:p>
-            <a:r>
-              <a:rPr lang="de-DE" dirty="0" err="1" smtClean="0">
-                <a:latin typeface="Arial Unicode MS" panose="020B0604020202020204" pitchFamily="34" charset="-128"/>
-                <a:ea typeface="Arial Unicode MS" panose="020B0604020202020204" pitchFamily="34" charset="-128"/>
-                <a:cs typeface="Arial Unicode MS" panose="020B0604020202020204" pitchFamily="34" charset="-128"/>
-              </a:rPr>
-              <a:t>Git</a:t>
-            </a:r>
-            <a:r>
-              <a:rPr lang="de-DE" dirty="0" smtClean="0">
-                <a:latin typeface="Arial Unicode MS" panose="020B0604020202020204" pitchFamily="34" charset="-128"/>
-                <a:ea typeface="Arial Unicode MS" panose="020B0604020202020204" pitchFamily="34" charset="-128"/>
-                <a:cs typeface="Arial Unicode MS" panose="020B0604020202020204" pitchFamily="34" charset="-128"/>
-              </a:rPr>
-              <a:t> </a:t>
-            </a:r>
-            <a:r>
-              <a:rPr lang="de-DE" dirty="0" err="1" smtClean="0">
-                <a:latin typeface="Arial Unicode MS" panose="020B0604020202020204" pitchFamily="34" charset="-128"/>
-                <a:ea typeface="Arial Unicode MS" panose="020B0604020202020204" pitchFamily="34" charset="-128"/>
-                <a:cs typeface="Arial Unicode MS" panose="020B0604020202020204" pitchFamily="34" charset="-128"/>
-              </a:rPr>
-              <a:t>checkout</a:t>
-            </a:r>
-            <a:r>
-              <a:rPr lang="de-DE" dirty="0" smtClean="0">
-                <a:latin typeface="Arial Unicode MS" panose="020B0604020202020204" pitchFamily="34" charset="-128"/>
-                <a:ea typeface="Arial Unicode MS" panose="020B0604020202020204" pitchFamily="34" charset="-128"/>
-                <a:cs typeface="Arial Unicode MS" panose="020B0604020202020204" pitchFamily="34" charset="-128"/>
-              </a:rPr>
-              <a:t> –b </a:t>
-            </a:r>
-            <a:r>
-              <a:rPr lang="de-DE" dirty="0" err="1" smtClean="0">
-                <a:latin typeface="Arial Unicode MS" panose="020B0604020202020204" pitchFamily="34" charset="-128"/>
-                <a:ea typeface="Arial Unicode MS" panose="020B0604020202020204" pitchFamily="34" charset="-128"/>
-                <a:cs typeface="Arial Unicode MS" panose="020B0604020202020204" pitchFamily="34" charset="-128"/>
-              </a:rPr>
-              <a:t>name</a:t>
-            </a:r>
-            <a:endParaRPr lang="de-DE" dirty="0" smtClean="0">
-              <a:latin typeface="Arial Unicode MS" panose="020B0604020202020204" pitchFamily="34" charset="-128"/>
-              <a:ea typeface="Arial Unicode MS" panose="020B0604020202020204" pitchFamily="34" charset="-128"/>
-              <a:cs typeface="Arial Unicode MS" panose="020B0604020202020204" pitchFamily="34" charset="-128"/>
-            </a:endParaRPr>
-          </a:p>
-          <a:p>
-            <a:r>
-              <a:rPr lang="de-DE" dirty="0" err="1" smtClean="0">
-                <a:latin typeface="Arial Unicode MS" panose="020B0604020202020204" pitchFamily="34" charset="-128"/>
-                <a:ea typeface="Arial Unicode MS" panose="020B0604020202020204" pitchFamily="34" charset="-128"/>
-                <a:cs typeface="Arial Unicode MS" panose="020B0604020202020204" pitchFamily="34" charset="-128"/>
-              </a:rPr>
-              <a:t>Git</a:t>
-            </a:r>
-            <a:r>
-              <a:rPr lang="de-DE" dirty="0" smtClean="0">
-                <a:latin typeface="Arial Unicode MS" panose="020B0604020202020204" pitchFamily="34" charset="-128"/>
-                <a:ea typeface="Arial Unicode MS" panose="020B0604020202020204" pitchFamily="34" charset="-128"/>
-                <a:cs typeface="Arial Unicode MS" panose="020B0604020202020204" pitchFamily="34" charset="-128"/>
-              </a:rPr>
-              <a:t> </a:t>
-            </a:r>
-            <a:r>
-              <a:rPr lang="de-DE" dirty="0" err="1" smtClean="0">
-                <a:latin typeface="Arial Unicode MS" panose="020B0604020202020204" pitchFamily="34" charset="-128"/>
-                <a:ea typeface="Arial Unicode MS" panose="020B0604020202020204" pitchFamily="34" charset="-128"/>
-                <a:cs typeface="Arial Unicode MS" panose="020B0604020202020204" pitchFamily="34" charset="-128"/>
-              </a:rPr>
-              <a:t>checkout</a:t>
-            </a:r>
-            <a:r>
-              <a:rPr lang="de-DE" dirty="0" smtClean="0">
-                <a:latin typeface="Arial Unicode MS" panose="020B0604020202020204" pitchFamily="34" charset="-128"/>
-                <a:ea typeface="Arial Unicode MS" panose="020B0604020202020204" pitchFamily="34" charset="-128"/>
-                <a:cs typeface="Arial Unicode MS" panose="020B0604020202020204" pitchFamily="34" charset="-128"/>
-              </a:rPr>
-              <a:t> </a:t>
-            </a:r>
-            <a:r>
-              <a:rPr lang="de-DE" dirty="0" err="1" smtClean="0">
-                <a:latin typeface="Arial Unicode MS" panose="020B0604020202020204" pitchFamily="34" charset="-128"/>
-                <a:ea typeface="Arial Unicode MS" panose="020B0604020202020204" pitchFamily="34" charset="-128"/>
-                <a:cs typeface="Arial Unicode MS" panose="020B0604020202020204" pitchFamily="34" charset="-128"/>
-              </a:rPr>
-              <a:t>master</a:t>
-            </a:r>
-            <a:endParaRPr lang="de-DE" dirty="0" smtClean="0">
-              <a:latin typeface="Arial Unicode MS" panose="020B0604020202020204" pitchFamily="34" charset="-128"/>
-              <a:ea typeface="Arial Unicode MS" panose="020B0604020202020204" pitchFamily="34" charset="-128"/>
-              <a:cs typeface="Arial Unicode MS" panose="020B0604020202020204" pitchFamily="34" charset="-128"/>
-            </a:endParaRPr>
-          </a:p>
-          <a:p>
-            <a:r>
-              <a:rPr lang="de-DE" dirty="0" err="1" smtClean="0">
-                <a:latin typeface="Arial Unicode MS" panose="020B0604020202020204" pitchFamily="34" charset="-128"/>
-                <a:ea typeface="Arial Unicode MS" panose="020B0604020202020204" pitchFamily="34" charset="-128"/>
-                <a:cs typeface="Arial Unicode MS" panose="020B0604020202020204" pitchFamily="34" charset="-128"/>
-              </a:rPr>
-              <a:t>Git</a:t>
-            </a:r>
-            <a:r>
-              <a:rPr lang="de-DE" dirty="0" smtClean="0">
-                <a:latin typeface="Arial Unicode MS" panose="020B0604020202020204" pitchFamily="34" charset="-128"/>
-                <a:ea typeface="Arial Unicode MS" panose="020B0604020202020204" pitchFamily="34" charset="-128"/>
-                <a:cs typeface="Arial Unicode MS" panose="020B0604020202020204" pitchFamily="34" charset="-128"/>
-              </a:rPr>
-              <a:t> </a:t>
-            </a:r>
-            <a:r>
-              <a:rPr lang="de-DE" dirty="0" err="1" smtClean="0">
-                <a:latin typeface="Arial Unicode MS" panose="020B0604020202020204" pitchFamily="34" charset="-128"/>
-                <a:ea typeface="Arial Unicode MS" panose="020B0604020202020204" pitchFamily="34" charset="-128"/>
-                <a:cs typeface="Arial Unicode MS" panose="020B0604020202020204" pitchFamily="34" charset="-128"/>
-              </a:rPr>
-              <a:t>branche</a:t>
-            </a:r>
-            <a:r>
-              <a:rPr lang="de-DE" dirty="0" smtClean="0">
-                <a:latin typeface="Arial Unicode MS" panose="020B0604020202020204" pitchFamily="34" charset="-128"/>
-                <a:ea typeface="Arial Unicode MS" panose="020B0604020202020204" pitchFamily="34" charset="-128"/>
-                <a:cs typeface="Arial Unicode MS" panose="020B0604020202020204" pitchFamily="34" charset="-128"/>
-              </a:rPr>
-              <a:t> –d </a:t>
-            </a:r>
-            <a:r>
-              <a:rPr lang="de-DE" dirty="0" err="1" smtClean="0">
-                <a:latin typeface="Arial Unicode MS" panose="020B0604020202020204" pitchFamily="34" charset="-128"/>
-                <a:ea typeface="Arial Unicode MS" panose="020B0604020202020204" pitchFamily="34" charset="-128"/>
-                <a:cs typeface="Arial Unicode MS" panose="020B0604020202020204" pitchFamily="34" charset="-128"/>
-              </a:rPr>
-              <a:t>feature</a:t>
-            </a:r>
-            <a:endParaRPr lang="de-DE" dirty="0" smtClean="0">
-              <a:latin typeface="Arial Unicode MS" panose="020B0604020202020204" pitchFamily="34" charset="-128"/>
-              <a:ea typeface="Arial Unicode MS" panose="020B0604020202020204" pitchFamily="34" charset="-128"/>
-              <a:cs typeface="Arial Unicode MS" panose="020B0604020202020204" pitchFamily="34" charset="-128"/>
-            </a:endParaRPr>
-          </a:p>
-          <a:p>
-            <a:r>
-              <a:rPr lang="de-DE" dirty="0" err="1" smtClean="0">
-                <a:latin typeface="Arial Unicode MS" panose="020B0604020202020204" pitchFamily="34" charset="-128"/>
-                <a:ea typeface="Arial Unicode MS" panose="020B0604020202020204" pitchFamily="34" charset="-128"/>
-                <a:cs typeface="Arial Unicode MS" panose="020B0604020202020204" pitchFamily="34" charset="-128"/>
-              </a:rPr>
-              <a:t>Git</a:t>
-            </a:r>
-            <a:r>
-              <a:rPr lang="de-DE" dirty="0" smtClean="0">
-                <a:latin typeface="Arial Unicode MS" panose="020B0604020202020204" pitchFamily="34" charset="-128"/>
-                <a:ea typeface="Arial Unicode MS" panose="020B0604020202020204" pitchFamily="34" charset="-128"/>
-                <a:cs typeface="Arial Unicode MS" panose="020B0604020202020204" pitchFamily="34" charset="-128"/>
-              </a:rPr>
-              <a:t> push </a:t>
-            </a:r>
-            <a:r>
-              <a:rPr lang="de-DE" dirty="0" err="1" smtClean="0">
-                <a:latin typeface="Arial Unicode MS" panose="020B0604020202020204" pitchFamily="34" charset="-128"/>
-                <a:ea typeface="Arial Unicode MS" panose="020B0604020202020204" pitchFamily="34" charset="-128"/>
-                <a:cs typeface="Arial Unicode MS" panose="020B0604020202020204" pitchFamily="34" charset="-128"/>
-              </a:rPr>
-              <a:t>origin</a:t>
-            </a:r>
-            <a:r>
-              <a:rPr lang="de-DE" dirty="0" smtClean="0">
-                <a:latin typeface="Arial Unicode MS" panose="020B0604020202020204" pitchFamily="34" charset="-128"/>
-                <a:ea typeface="Arial Unicode MS" panose="020B0604020202020204" pitchFamily="34" charset="-128"/>
-                <a:cs typeface="Arial Unicode MS" panose="020B0604020202020204" pitchFamily="34" charset="-128"/>
-              </a:rPr>
-              <a:t> &lt;</a:t>
-            </a:r>
-            <a:r>
-              <a:rPr lang="de-DE" dirty="0" err="1" smtClean="0">
-                <a:latin typeface="Arial Unicode MS" panose="020B0604020202020204" pitchFamily="34" charset="-128"/>
-                <a:ea typeface="Arial Unicode MS" panose="020B0604020202020204" pitchFamily="34" charset="-128"/>
-                <a:cs typeface="Arial Unicode MS" panose="020B0604020202020204" pitchFamily="34" charset="-128"/>
-              </a:rPr>
-              <a:t>branche</a:t>
-            </a:r>
-            <a:r>
-              <a:rPr lang="de-DE" dirty="0" smtClean="0">
-                <a:latin typeface="Arial Unicode MS" panose="020B0604020202020204" pitchFamily="34" charset="-128"/>
-                <a:ea typeface="Arial Unicode MS" panose="020B0604020202020204" pitchFamily="34" charset="-128"/>
-                <a:cs typeface="Arial Unicode MS" panose="020B0604020202020204" pitchFamily="34" charset="-128"/>
-              </a:rPr>
-              <a:t>&gt;</a:t>
-            </a:r>
-          </a:p>
-          <a:p>
-            <a:r>
-              <a:rPr lang="de-DE" dirty="0" err="1" smtClean="0">
-                <a:latin typeface="Arial Unicode MS" panose="020B0604020202020204" pitchFamily="34" charset="-128"/>
-                <a:ea typeface="Arial Unicode MS" panose="020B0604020202020204" pitchFamily="34" charset="-128"/>
-                <a:cs typeface="Arial Unicode MS" panose="020B0604020202020204" pitchFamily="34" charset="-128"/>
-              </a:rPr>
-              <a:t>Git</a:t>
-            </a:r>
-            <a:r>
-              <a:rPr lang="de-DE" dirty="0" smtClean="0">
-                <a:latin typeface="Arial Unicode MS" panose="020B0604020202020204" pitchFamily="34" charset="-128"/>
-                <a:ea typeface="Arial Unicode MS" panose="020B0604020202020204" pitchFamily="34" charset="-128"/>
-                <a:cs typeface="Arial Unicode MS" panose="020B0604020202020204" pitchFamily="34" charset="-128"/>
-              </a:rPr>
-              <a:t> pull</a:t>
-            </a:r>
-          </a:p>
-          <a:p>
-            <a:r>
-              <a:rPr lang="de-DE" dirty="0" err="1" smtClean="0">
-                <a:latin typeface="Arial Unicode MS" panose="020B0604020202020204" pitchFamily="34" charset="-128"/>
-                <a:ea typeface="Arial Unicode MS" panose="020B0604020202020204" pitchFamily="34" charset="-128"/>
-                <a:cs typeface="Arial Unicode MS" panose="020B0604020202020204" pitchFamily="34" charset="-128"/>
-              </a:rPr>
-              <a:t>Git</a:t>
-            </a:r>
-            <a:r>
-              <a:rPr lang="de-DE" dirty="0" smtClean="0">
-                <a:latin typeface="Arial Unicode MS" panose="020B0604020202020204" pitchFamily="34" charset="-128"/>
-                <a:ea typeface="Arial Unicode MS" panose="020B0604020202020204" pitchFamily="34" charset="-128"/>
-                <a:cs typeface="Arial Unicode MS" panose="020B0604020202020204" pitchFamily="34" charset="-128"/>
-              </a:rPr>
-              <a:t> </a:t>
-            </a:r>
-            <a:r>
-              <a:rPr lang="de-DE" dirty="0" err="1" smtClean="0">
-                <a:latin typeface="Arial Unicode MS" panose="020B0604020202020204" pitchFamily="34" charset="-128"/>
-                <a:ea typeface="Arial Unicode MS" panose="020B0604020202020204" pitchFamily="34" charset="-128"/>
-                <a:cs typeface="Arial Unicode MS" panose="020B0604020202020204" pitchFamily="34" charset="-128"/>
-              </a:rPr>
-              <a:t>merge</a:t>
-            </a:r>
-            <a:r>
-              <a:rPr lang="de-DE" dirty="0" smtClean="0">
-                <a:latin typeface="Arial Unicode MS" panose="020B0604020202020204" pitchFamily="34" charset="-128"/>
-                <a:ea typeface="Arial Unicode MS" panose="020B0604020202020204" pitchFamily="34" charset="-128"/>
-                <a:cs typeface="Arial Unicode MS" panose="020B0604020202020204" pitchFamily="34" charset="-128"/>
-              </a:rPr>
-              <a:t> &lt;</a:t>
-            </a:r>
-            <a:r>
-              <a:rPr lang="de-DE" dirty="0" err="1" smtClean="0">
-                <a:latin typeface="Arial Unicode MS" panose="020B0604020202020204" pitchFamily="34" charset="-128"/>
-                <a:ea typeface="Arial Unicode MS" panose="020B0604020202020204" pitchFamily="34" charset="-128"/>
-                <a:cs typeface="Arial Unicode MS" panose="020B0604020202020204" pitchFamily="34" charset="-128"/>
-              </a:rPr>
-              <a:t>branch</a:t>
-            </a:r>
-            <a:r>
-              <a:rPr lang="de-DE" dirty="0" smtClean="0">
-                <a:latin typeface="Arial Unicode MS" panose="020B0604020202020204" pitchFamily="34" charset="-128"/>
-                <a:ea typeface="Arial Unicode MS" panose="020B0604020202020204" pitchFamily="34" charset="-128"/>
-                <a:cs typeface="Arial Unicode MS" panose="020B0604020202020204" pitchFamily="34" charset="-128"/>
-              </a:rPr>
-              <a:t>&gt;</a:t>
-            </a:r>
-          </a:p>
-          <a:p>
-            <a:r>
-              <a:rPr lang="de-DE" dirty="0" err="1" smtClean="0">
-                <a:latin typeface="Arial Unicode MS" panose="020B0604020202020204" pitchFamily="34" charset="-128"/>
-                <a:ea typeface="Arial Unicode MS" panose="020B0604020202020204" pitchFamily="34" charset="-128"/>
-                <a:cs typeface="Arial Unicode MS" panose="020B0604020202020204" pitchFamily="34" charset="-128"/>
-              </a:rPr>
-              <a:t>Git</a:t>
-            </a:r>
-            <a:r>
-              <a:rPr lang="de-DE" dirty="0" smtClean="0">
-                <a:latin typeface="Arial Unicode MS" panose="020B0604020202020204" pitchFamily="34" charset="-128"/>
-                <a:ea typeface="Arial Unicode MS" panose="020B0604020202020204" pitchFamily="34" charset="-128"/>
-                <a:cs typeface="Arial Unicode MS" panose="020B0604020202020204" pitchFamily="34" charset="-128"/>
-              </a:rPr>
-              <a:t> </a:t>
-            </a:r>
-            <a:r>
-              <a:rPr lang="de-DE" dirty="0" err="1" smtClean="0">
-                <a:latin typeface="Arial Unicode MS" panose="020B0604020202020204" pitchFamily="34" charset="-128"/>
-                <a:ea typeface="Arial Unicode MS" panose="020B0604020202020204" pitchFamily="34" charset="-128"/>
-                <a:cs typeface="Arial Unicode MS" panose="020B0604020202020204" pitchFamily="34" charset="-128"/>
-              </a:rPr>
-              <a:t>diff</a:t>
-            </a:r>
-            <a:r>
-              <a:rPr lang="de-DE" dirty="0" smtClean="0">
-                <a:latin typeface="Arial Unicode MS" panose="020B0604020202020204" pitchFamily="34" charset="-128"/>
-                <a:ea typeface="Arial Unicode MS" panose="020B0604020202020204" pitchFamily="34" charset="-128"/>
-                <a:cs typeface="Arial Unicode MS" panose="020B0604020202020204" pitchFamily="34" charset="-128"/>
-              </a:rPr>
-              <a:t> &lt;quell&gt;&lt;ziel&gt;</a:t>
-            </a:r>
-            <a:endParaRPr lang="de-DE" dirty="0">
-              <a:latin typeface="Arial Unicode MS" panose="020B0604020202020204" pitchFamily="34" charset="-128"/>
-              <a:ea typeface="Arial Unicode MS" panose="020B0604020202020204" pitchFamily="34" charset="-128"/>
-              <a:cs typeface="Arial Unicode MS" panose="020B0604020202020204" pitchFamily="34" charset="-128"/>
-            </a:endParaRPr>
-          </a:p>
-        </p:txBody>
-      </p:sp>
-    </p:spTree>
-    <p:extLst>
-      <p:ext uri="{BB962C8B-B14F-4D97-AF65-F5344CB8AC3E}">
-        <p14:creationId xmlns:p14="http://schemas.microsoft.com/office/powerpoint/2010/main" val="2194142462"/>
-      </p:ext>
-    </p:extLst>
-  </p:cSld>
-  <p:clrMapOvr>
-    <a:masterClrMapping/>
-  </p:clrMapOvr>
-  <p:timing>
-    <p:tnLst>
-      <p:par>
-        <p:cTn id="1" dur="indefinite" restart="never" nodeType="tmRoot"/>
-      </p:par>
-    </p:tnLst>
-  </p:timing>
-</p:sld>
-</file>
-
-<file path=ppt/slides/slide15.xml><?xml version="1.0" encoding="utf-8"?>
-<p:sld xmlns:a="http://schemas.openxmlformats.org/drawingml/2006/main" xmlns:r="http://schemas.openxmlformats.org/officeDocument/2006/relationships" xmlns:p="http://schemas.openxmlformats.org/presentationml/2006/main">
-  <p:cSld>
-    <p:spTree>
-      <p:nvGrpSpPr>
-        <p:cNvPr id="1" name=""/>
-        <p:cNvGrpSpPr/>
-        <p:nvPr/>
-      </p:nvGrpSpPr>
-      <p:grpSpPr>
-        <a:xfrm>
-          <a:off x="0" y="0"/>
-          <a:ext cx="0" cy="0"/>
-          <a:chOff x="0" y="0"/>
-          <a:chExt cx="0" cy="0"/>
-        </a:xfrm>
-      </p:grpSpPr>
-      <p:sp>
-        <p:nvSpPr>
-          <p:cNvPr id="2" name="Titel 1"/>
-          <p:cNvSpPr>
-            <a:spLocks noGrp="1"/>
-          </p:cNvSpPr>
-          <p:nvPr>
-            <p:ph type="title"/>
-          </p:nvPr>
-        </p:nvSpPr>
-        <p:spPr/>
-        <p:txBody>
           <a:bodyPr/>
           <a:lstStyle/>
           <a:p>
@@ -6991,7 +6932,7 @@
           <a:p>
             <a:fld id="{32988457-9EFF-4998-891D-85ECFB4B79A4}" type="slidenum">
               <a:rPr lang="de-DE" smtClean="0"/>
-              <a:t>15</a:t>
+              <a:t>14</a:t>
             </a:fld>
             <a:endParaRPr lang="de-DE"/>
           </a:p>
@@ -7312,7 +7253,6 @@
               <a:rPr lang="de-DE" dirty="0" smtClean="0"/>
               <a:t>Nutzung</a:t>
             </a:r>
-            <a:endParaRPr lang="de-DE" dirty="0" smtClean="0"/>
           </a:p>
           <a:p>
             <a:pPr marL="514350" indent="-514350">
@@ -7407,7 +7347,6 @@
               <a:rPr lang="de-DE" dirty="0" smtClean="0"/>
               <a:t>Übung</a:t>
             </a:r>
-            <a:endParaRPr lang="de-DE" dirty="0" smtClean="0"/>
           </a:p>
         </p:txBody>
       </p:sp>
@@ -8959,11 +8898,7 @@
             </a:r>
             <a:r>
               <a:rPr lang="de-DE" dirty="0" smtClean="0"/>
-              <a:t>   - </a:t>
-            </a:r>
-            <a:r>
-              <a:rPr lang="de-DE" dirty="0" smtClean="0"/>
-              <a:t>Nutzung</a:t>
+              <a:t>   - Nutzung</a:t>
             </a:r>
             <a:endParaRPr lang="de-DE" dirty="0"/>
           </a:p>

</xml_diff>

<commit_message>
Version 1.6, neue Bilder
</commit_message>
<xml_diff>
--- a/Git-und-GitHub.pptx
+++ b/Git-und-GitHub.pptx
@@ -5,23 +5,27 @@
     <p:sldMasterId id="2147483660" r:id="rId1"/>
   </p:sldMasterIdLst>
   <p:notesMasterIdLst>
-    <p:notesMasterId r:id="rId16"/>
+    <p:notesMasterId r:id="rId20"/>
   </p:notesMasterIdLst>
   <p:sldIdLst>
     <p:sldId id="256" r:id="rId2"/>
     <p:sldId id="257" r:id="rId3"/>
-    <p:sldId id="258" r:id="rId4"/>
-    <p:sldId id="264" r:id="rId5"/>
-    <p:sldId id="266" r:id="rId6"/>
-    <p:sldId id="261" r:id="rId7"/>
-    <p:sldId id="270" r:id="rId8"/>
-    <p:sldId id="271" r:id="rId9"/>
-    <p:sldId id="272" r:id="rId10"/>
-    <p:sldId id="273" r:id="rId11"/>
-    <p:sldId id="274" r:id="rId12"/>
-    <p:sldId id="275" r:id="rId13"/>
-    <p:sldId id="268" r:id="rId14"/>
-    <p:sldId id="262" r:id="rId15"/>
+    <p:sldId id="280" r:id="rId4"/>
+    <p:sldId id="258" r:id="rId5"/>
+    <p:sldId id="264" r:id="rId6"/>
+    <p:sldId id="266" r:id="rId7"/>
+    <p:sldId id="281" r:id="rId8"/>
+    <p:sldId id="261" r:id="rId9"/>
+    <p:sldId id="270" r:id="rId10"/>
+    <p:sldId id="282" r:id="rId11"/>
+    <p:sldId id="272" r:id="rId12"/>
+    <p:sldId id="273" r:id="rId13"/>
+    <p:sldId id="275" r:id="rId14"/>
+    <p:sldId id="276" r:id="rId15"/>
+    <p:sldId id="268" r:id="rId16"/>
+    <p:sldId id="278" r:id="rId17"/>
+    <p:sldId id="262" r:id="rId18"/>
+    <p:sldId id="279" r:id="rId19"/>
   </p:sldIdLst>
   <p:sldSz cx="9144000" cy="6858000" type="screen4x3"/>
   <p:notesSz cx="6858000" cy="9144000"/>
@@ -122,7 +126,7 @@
   </p:defaultTextStyle>
   <p:extLst>
     <p:ext uri="{EFAFB233-063F-42B5-8137-9DF3F51BA10A}">
-      <p15:sldGuideLst xmlns:p15="http://schemas.microsoft.com/office/powerpoint/2012/main" xmlns="">
+      <p15:sldGuideLst xmlns:p15="http://schemas.microsoft.com/office/powerpoint/2012/main">
         <p15:guide id="1" orient="horz" pos="2160">
           <p15:clr>
             <a:srgbClr val="A4A3A4"/>
@@ -533,60 +537,6 @@
           <a:bodyPr/>
           <a:lstStyle/>
           <a:p>
-            <a:r>
-              <a:rPr lang="de-DE" dirty="0" smtClean="0"/>
-              <a:t>Also, ich habe mir für</a:t>
-            </a:r>
-            <a:r>
-              <a:rPr lang="de-DE" baseline="0" dirty="0" smtClean="0"/>
-              <a:t> das </a:t>
-            </a:r>
-            <a:r>
-              <a:rPr lang="de-DE" baseline="0" dirty="0" err="1" smtClean="0"/>
-              <a:t>ePortfolie</a:t>
-            </a:r>
-            <a:r>
-              <a:rPr lang="de-DE" baseline="0" dirty="0" smtClean="0"/>
-              <a:t> das Thema </a:t>
-            </a:r>
-            <a:r>
-              <a:rPr lang="de-DE" baseline="0" dirty="0" err="1" smtClean="0"/>
-              <a:t>Git</a:t>
-            </a:r>
-            <a:r>
-              <a:rPr lang="de-DE" baseline="0" dirty="0" smtClean="0"/>
-              <a:t> und </a:t>
-            </a:r>
-            <a:r>
-              <a:rPr lang="de-DE" baseline="0" dirty="0" err="1" smtClean="0"/>
-              <a:t>GitHub</a:t>
-            </a:r>
-            <a:r>
-              <a:rPr lang="de-DE" baseline="0" dirty="0" smtClean="0"/>
-              <a:t> ausgesucht.</a:t>
-            </a:r>
-          </a:p>
-          <a:p>
-            <a:r>
-              <a:rPr lang="de-DE" baseline="0" dirty="0" smtClean="0"/>
-              <a:t>Erstmal die Frage: Hat jeder </a:t>
-            </a:r>
-            <a:r>
-              <a:rPr lang="de-DE" baseline="0" dirty="0" err="1" smtClean="0"/>
-              <a:t>Git</a:t>
-            </a:r>
-            <a:r>
-              <a:rPr lang="de-DE" baseline="0" dirty="0" smtClean="0"/>
-              <a:t> installiert und einen </a:t>
-            </a:r>
-            <a:r>
-              <a:rPr lang="de-DE" baseline="0" dirty="0" err="1" smtClean="0"/>
-              <a:t>GitHub</a:t>
-            </a:r>
-            <a:r>
-              <a:rPr lang="de-DE" baseline="0" dirty="0" smtClean="0"/>
-              <a:t> Account?</a:t>
-            </a:r>
             <a:endParaRPr lang="de-DE" dirty="0"/>
           </a:p>
         </p:txBody>
@@ -696,7 +646,7 @@
           <a:p>
             <a:fld id="{4A505144-3BC5-4B32-83CF-491494C34331}" type="slidenum">
               <a:rPr lang="de-DE" smtClean="0"/>
-              <a:t>3</a:t>
+              <a:t>4</a:t>
             </a:fld>
             <a:endParaRPr lang="de-DE"/>
           </a:p>
@@ -897,7 +847,7 @@
           <a:p>
             <a:fld id="{4A505144-3BC5-4B32-83CF-491494C34331}" type="slidenum">
               <a:rPr lang="de-DE" smtClean="0"/>
-              <a:t>4</a:t>
+              <a:t>5</a:t>
             </a:fld>
             <a:endParaRPr lang="de-DE"/>
           </a:p>
@@ -1009,7 +959,7 @@
           <a:p>
             <a:fld id="{4A505144-3BC5-4B32-83CF-491494C34331}" type="slidenum">
               <a:rPr lang="de-DE" smtClean="0"/>
-              <a:t>7</a:t>
+              <a:t>9</a:t>
             </a:fld>
             <a:endParaRPr lang="de-DE"/>
           </a:p>
@@ -1074,33 +1024,18 @@
           <a:p>
             <a:r>
               <a:rPr lang="de-DE" dirty="0" smtClean="0"/>
-              <a:t>Wir </a:t>
-            </a:r>
+              <a:t>Leitlinien und keine festen Vorschriften</a:t>
+            </a:r>
+          </a:p>
+          <a:p>
             <a:r>
               <a:rPr lang="de-DE" dirty="0" err="1" smtClean="0"/>
-              <a:t>studenten</a:t>
+              <a:t>GitHub</a:t>
             </a:r>
             <a:r>
               <a:rPr lang="de-DE" dirty="0" smtClean="0"/>
-              <a:t> können kostenlos private</a:t>
-            </a:r>
-            <a:r>
-              <a:rPr lang="de-DE" baseline="0" dirty="0" smtClean="0"/>
-              <a:t> erstellen – </a:t>
-            </a:r>
-            <a:r>
-              <a:rPr lang="de-DE" baseline="0" dirty="0" err="1" smtClean="0"/>
-              <a:t>micro</a:t>
-            </a:r>
-            <a:r>
-              <a:rPr lang="de-DE" baseline="0" dirty="0" smtClean="0"/>
-              <a:t> </a:t>
-            </a:r>
-            <a:r>
-              <a:rPr lang="de-DE" baseline="0" dirty="0" err="1" smtClean="0"/>
-              <a:t>version</a:t>
-            </a:r>
-            <a:endParaRPr lang="de-DE" dirty="0"/>
+              <a:t> sinnvoll einsetzen, je nach Softwareanforderung und Teamgröße</a:t>
+            </a:r>
           </a:p>
         </p:txBody>
       </p:sp>
@@ -1121,7 +1056,7 @@
           <a:p>
             <a:fld id="{4A505144-3BC5-4B32-83CF-491494C34331}" type="slidenum">
               <a:rPr lang="de-DE" smtClean="0"/>
-              <a:t>8</a:t>
+              <a:t>10</a:t>
             </a:fld>
             <a:endParaRPr lang="de-DE"/>
           </a:p>
@@ -1130,7 +1065,7 @@
     </p:spTree>
     <p:extLst>
       <p:ext uri="{BB962C8B-B14F-4D97-AF65-F5344CB8AC3E}">
-        <p14:creationId xmlns:p14="http://schemas.microsoft.com/office/powerpoint/2010/main" val="1648935321"/>
+        <p14:creationId xmlns:p14="http://schemas.microsoft.com/office/powerpoint/2010/main" val="2473634874"/>
       </p:ext>
     </p:extLst>
   </p:cSld>
@@ -1186,31 +1121,7 @@
           <a:p>
             <a:r>
               <a:rPr lang="de-DE" dirty="0" smtClean="0"/>
-              <a:t>Wir </a:t>
-            </a:r>
-            <a:r>
-              <a:rPr lang="de-DE" dirty="0" err="1" smtClean="0"/>
-              <a:t>studenten</a:t>
-            </a:r>
-            <a:r>
-              <a:rPr lang="de-DE" dirty="0" smtClean="0"/>
-              <a:t> können kostenlos private</a:t>
-            </a:r>
-            <a:r>
-              <a:rPr lang="de-DE" baseline="0" dirty="0" smtClean="0"/>
-              <a:t> erstellen – </a:t>
-            </a:r>
-            <a:r>
-              <a:rPr lang="de-DE" baseline="0" dirty="0" err="1" smtClean="0"/>
-              <a:t>micro</a:t>
-            </a:r>
-            <a:r>
-              <a:rPr lang="de-DE" baseline="0" dirty="0" smtClean="0"/>
-              <a:t> </a:t>
-            </a:r>
-            <a:r>
-              <a:rPr lang="de-DE" baseline="0" dirty="0" err="1" smtClean="0"/>
-              <a:t>version</a:t>
+              <a:t>Sinnvoll bei kleinen gruppen</a:t>
             </a:r>
             <a:endParaRPr lang="de-DE" dirty="0"/>
           </a:p>
@@ -1233,7 +1144,7 @@
           <a:p>
             <a:fld id="{4A505144-3BC5-4B32-83CF-491494C34331}" type="slidenum">
               <a:rPr lang="de-DE" smtClean="0"/>
-              <a:t>9</a:t>
+              <a:t>11</a:t>
             </a:fld>
             <a:endParaRPr lang="de-DE"/>
           </a:p>
@@ -1298,23 +1209,39 @@
           <a:p>
             <a:r>
               <a:rPr lang="de-DE" dirty="0" smtClean="0"/>
-              <a:t>Wir </a:t>
+              <a:t>Master </a:t>
             </a:r>
             <a:r>
               <a:rPr lang="de-DE" dirty="0" err="1" smtClean="0"/>
-              <a:t>studenten</a:t>
+              <a:t>branch</a:t>
             </a:r>
             <a:r>
               <a:rPr lang="de-DE" dirty="0" smtClean="0"/>
-              <a:t> können kostenlos private</a:t>
+              <a:t> hat</a:t>
             </a:r>
             <a:r>
               <a:rPr lang="de-DE" baseline="0" dirty="0" smtClean="0"/>
-              <a:t> erstellen – </a:t>
+              <a:t> keinen unvollständigen </a:t>
             </a:r>
             <a:r>
               <a:rPr lang="de-DE" baseline="0" dirty="0" err="1" smtClean="0"/>
-              <a:t>micro</a:t>
+              <a:t>code</a:t>
+            </a:r>
+            <a:r>
+              <a:rPr lang="de-DE" baseline="0" dirty="0" smtClean="0"/>
+              <a:t>, nur fertige </a:t>
+            </a:r>
+            <a:r>
+              <a:rPr lang="de-DE" baseline="0" dirty="0" err="1" smtClean="0"/>
+              <a:t>features</a:t>
+            </a:r>
+            <a:r>
+              <a:rPr lang="de-DE" baseline="0" dirty="0" smtClean="0"/>
+              <a:t> werden auf den </a:t>
+            </a:r>
+            <a:r>
+              <a:rPr lang="de-DE" baseline="0" dirty="0" err="1" smtClean="0"/>
+              <a:t>master</a:t>
             </a:r>
             <a:r>
               <a:rPr lang="de-DE" baseline="0" dirty="0" smtClean="0"/>
@@ -1322,9 +1249,45 @@
             </a:r>
             <a:r>
               <a:rPr lang="de-DE" baseline="0" dirty="0" err="1" smtClean="0"/>
-              <a:t>version</a:t>
-            </a:r>
-            <a:endParaRPr lang="de-DE" dirty="0"/>
+              <a:t>branch</a:t>
+            </a:r>
+            <a:r>
+              <a:rPr lang="de-DE" baseline="0" dirty="0" smtClean="0"/>
+              <a:t> </a:t>
+            </a:r>
+            <a:r>
+              <a:rPr lang="de-DE" baseline="0" dirty="0" err="1" smtClean="0"/>
+              <a:t>deployed</a:t>
+            </a:r>
+            <a:endParaRPr lang="de-DE" baseline="0" dirty="0" smtClean="0"/>
+          </a:p>
+          <a:p>
+            <a:endParaRPr lang="de-DE" baseline="0" dirty="0" smtClean="0"/>
+          </a:p>
+          <a:p>
+            <a:r>
+              <a:rPr lang="de-DE" baseline="0" dirty="0" smtClean="0"/>
+              <a:t>Sinnvoll bei mehreren beteiligten und wenn </a:t>
+            </a:r>
+            <a:r>
+              <a:rPr lang="de-DE" baseline="0" dirty="0" err="1" smtClean="0"/>
+              <a:t>features</a:t>
+            </a:r>
+            <a:r>
+              <a:rPr lang="de-DE" baseline="0" dirty="0" smtClean="0"/>
+              <a:t> und </a:t>
+            </a:r>
+            <a:r>
+              <a:rPr lang="de-DE" baseline="0" dirty="0" err="1" smtClean="0"/>
+              <a:t>funktionen</a:t>
+            </a:r>
+            <a:r>
+              <a:rPr lang="de-DE" baseline="0" dirty="0" smtClean="0"/>
+              <a:t> aufwändiger sind und mehr zeit benötigen</a:t>
+            </a:r>
+          </a:p>
+          <a:p>
+            <a:endParaRPr lang="de-DE" baseline="0" dirty="0" smtClean="0"/>
           </a:p>
         </p:txBody>
       </p:sp>
@@ -1345,7 +1308,7 @@
           <a:p>
             <a:fld id="{4A505144-3BC5-4B32-83CF-491494C34331}" type="slidenum">
               <a:rPr lang="de-DE" smtClean="0"/>
-              <a:t>10</a:t>
+              <a:t>12</a:t>
             </a:fld>
             <a:endParaRPr lang="de-DE"/>
           </a:p>
@@ -1409,32 +1372,29 @@
           <a:lstStyle/>
           <a:p>
             <a:r>
-              <a:rPr lang="de-DE" dirty="0" smtClean="0"/>
-              <a:t>Wir </a:t>
-            </a:r>
-            <a:r>
               <a:rPr lang="de-DE" dirty="0" err="1" smtClean="0"/>
-              <a:t>studenten</a:t>
-            </a:r>
-            <a:r>
-              <a:rPr lang="de-DE" dirty="0" smtClean="0"/>
-              <a:t> können kostenlos private</a:t>
+              <a:t>Forking</a:t>
             </a:r>
             <a:r>
               <a:rPr lang="de-DE" baseline="0" dirty="0" smtClean="0"/>
-              <a:t> erstellen – </a:t>
+              <a:t> ganz anders zu den bereits kennengelernten Workflows</a:t>
+            </a:r>
+          </a:p>
+          <a:p>
+            <a:endParaRPr lang="de-DE" baseline="0" dirty="0" smtClean="0"/>
+          </a:p>
+          <a:p>
+            <a:r>
+              <a:rPr lang="de-DE" baseline="0" dirty="0" smtClean="0"/>
+              <a:t>Höhere Sicherheit, da nur einer das offizielle </a:t>
             </a:r>
             <a:r>
               <a:rPr lang="de-DE" baseline="0" dirty="0" err="1" smtClean="0"/>
-              <a:t>micro</a:t>
+              <a:t>repo</a:t>
             </a:r>
             <a:r>
               <a:rPr lang="de-DE" baseline="0" dirty="0" smtClean="0"/>
-              <a:t> </a:t>
-            </a:r>
-            <a:r>
-              <a:rPr lang="de-DE" baseline="0" dirty="0" err="1" smtClean="0"/>
-              <a:t>version</a:t>
+              <a:t> pushen kann</a:t>
             </a:r>
             <a:endParaRPr lang="de-DE" dirty="0"/>
           </a:p>
@@ -1457,119 +1417,7 @@
           <a:p>
             <a:fld id="{4A505144-3BC5-4B32-83CF-491494C34331}" type="slidenum">
               <a:rPr lang="de-DE" smtClean="0"/>
-              <a:t>11</a:t>
-            </a:fld>
-            <a:endParaRPr lang="de-DE"/>
-          </a:p>
-        </p:txBody>
-      </p:sp>
-    </p:spTree>
-    <p:extLst>
-      <p:ext uri="{BB962C8B-B14F-4D97-AF65-F5344CB8AC3E}">
-        <p14:creationId xmlns:p14="http://schemas.microsoft.com/office/powerpoint/2010/main" val="1648935321"/>
-      </p:ext>
-    </p:extLst>
-  </p:cSld>
-  <p:clrMapOvr>
-    <a:masterClrMapping/>
-  </p:clrMapOvr>
-</p:notes>
-</file>
-
-<file path=ppt/notesSlides/notesSlide9.xml><?xml version="1.0" encoding="utf-8"?>
-<p:notes xmlns:a="http://schemas.openxmlformats.org/drawingml/2006/main" xmlns:r="http://schemas.openxmlformats.org/officeDocument/2006/relationships" xmlns:p="http://schemas.openxmlformats.org/presentationml/2006/main">
-  <p:cSld>
-    <p:spTree>
-      <p:nvGrpSpPr>
-        <p:cNvPr id="1" name=""/>
-        <p:cNvGrpSpPr/>
-        <p:nvPr/>
-      </p:nvGrpSpPr>
-      <p:grpSpPr>
-        <a:xfrm>
-          <a:off x="0" y="0"/>
-          <a:ext cx="0" cy="0"/>
-          <a:chOff x="0" y="0"/>
-          <a:chExt cx="0" cy="0"/>
-        </a:xfrm>
-      </p:grpSpPr>
-      <p:sp>
-        <p:nvSpPr>
-          <p:cNvPr id="2" name="Folienbildplatzhalter 1"/>
-          <p:cNvSpPr>
-            <a:spLocks noGrp="1" noRot="1" noChangeAspect="1"/>
-          </p:cNvSpPr>
-          <p:nvPr>
-            <p:ph type="sldImg"/>
-          </p:nvPr>
-        </p:nvSpPr>
-        <p:spPr/>
-      </p:sp>
-      <p:sp>
-        <p:nvSpPr>
-          <p:cNvPr id="3" name="Notizenplatzhalter 2"/>
-          <p:cNvSpPr>
-            <a:spLocks noGrp="1"/>
-          </p:cNvSpPr>
-          <p:nvPr>
-            <p:ph type="body" idx="1"/>
-          </p:nvPr>
-        </p:nvSpPr>
-        <p:spPr/>
-        <p:txBody>
-          <a:bodyPr/>
-          <a:lstStyle/>
-          <a:p>
-            <a:r>
-              <a:rPr lang="de-DE" dirty="0" smtClean="0"/>
-              <a:t>Wir </a:t>
-            </a:r>
-            <a:r>
-              <a:rPr lang="de-DE" dirty="0" err="1" smtClean="0"/>
-              <a:t>studenten</a:t>
-            </a:r>
-            <a:r>
-              <a:rPr lang="de-DE" dirty="0" smtClean="0"/>
-              <a:t> können kostenlos private</a:t>
-            </a:r>
-            <a:r>
-              <a:rPr lang="de-DE" baseline="0" dirty="0" smtClean="0"/>
-              <a:t> erstellen – </a:t>
-            </a:r>
-            <a:r>
-              <a:rPr lang="de-DE" baseline="0" dirty="0" err="1" smtClean="0"/>
-              <a:t>micro</a:t>
-            </a:r>
-            <a:r>
-              <a:rPr lang="de-DE" baseline="0" dirty="0" smtClean="0"/>
-              <a:t> </a:t>
-            </a:r>
-            <a:r>
-              <a:rPr lang="de-DE" baseline="0" dirty="0" err="1" smtClean="0"/>
-              <a:t>version</a:t>
-            </a:r>
-            <a:endParaRPr lang="de-DE" dirty="0"/>
-          </a:p>
-        </p:txBody>
-      </p:sp>
-      <p:sp>
-        <p:nvSpPr>
-          <p:cNvPr id="4" name="Foliennummernplatzhalter 3"/>
-          <p:cNvSpPr>
-            <a:spLocks noGrp="1"/>
-          </p:cNvSpPr>
-          <p:nvPr>
-            <p:ph type="sldNum" sz="quarter" idx="10"/>
-          </p:nvPr>
-        </p:nvSpPr>
-        <p:spPr/>
-        <p:txBody>
-          <a:bodyPr/>
-          <a:lstStyle/>
-          <a:p>
-            <a:fld id="{4A505144-3BC5-4B32-83CF-491494C34331}" type="slidenum">
-              <a:rPr lang="de-DE" smtClean="0"/>
-              <a:t>12</a:t>
+              <a:t>13</a:t>
             </a:fld>
             <a:endParaRPr lang="de-DE"/>
           </a:p>
@@ -5426,181 +5274,109 @@
         </p:nvSpPr>
         <p:spPr/>
         <p:txBody>
+          <a:bodyPr/>
+          <a:lstStyle/>
+          <a:p>
+            <a:endParaRPr lang="de-DE"/>
+          </a:p>
+        </p:txBody>
+      </p:sp>
+      <p:sp>
+        <p:nvSpPr>
+          <p:cNvPr id="3" name="Fußzeilenplatzhalter 2"/>
+          <p:cNvSpPr>
+            <a:spLocks noGrp="1"/>
+          </p:cNvSpPr>
+          <p:nvPr>
+            <p:ph type="ftr" sz="quarter" idx="11"/>
+          </p:nvPr>
+        </p:nvSpPr>
+        <p:spPr/>
+        <p:txBody>
+          <a:bodyPr/>
+          <a:lstStyle/>
+          <a:p>
+            <a:r>
+              <a:rPr lang="de-DE" smtClean="0"/>
+              <a:t>ePortfolio von Mehmet Ali Incekara</a:t>
+            </a:r>
+            <a:endParaRPr lang="de-DE"/>
+          </a:p>
+        </p:txBody>
+      </p:sp>
+      <p:sp>
+        <p:nvSpPr>
+          <p:cNvPr id="4" name="Foliennummernplatzhalter 3"/>
+          <p:cNvSpPr>
+            <a:spLocks noGrp="1"/>
+          </p:cNvSpPr>
+          <p:nvPr>
+            <p:ph type="sldNum" sz="quarter" idx="12"/>
+          </p:nvPr>
+        </p:nvSpPr>
+        <p:spPr/>
+        <p:txBody>
+          <a:bodyPr/>
+          <a:lstStyle/>
+          <a:p>
+            <a:fld id="{32988457-9EFF-4998-891D-85ECFB4B79A4}" type="slidenum">
+              <a:rPr lang="de-DE" smtClean="0"/>
+              <a:t>10</a:t>
+            </a:fld>
+            <a:endParaRPr lang="de-DE"/>
+          </a:p>
+        </p:txBody>
+      </p:sp>
+      <p:sp>
+        <p:nvSpPr>
+          <p:cNvPr id="5" name="Inhaltsplatzhalter 4"/>
+          <p:cNvSpPr>
+            <a:spLocks noGrp="1"/>
+          </p:cNvSpPr>
+          <p:nvPr>
+            <p:ph sz="quarter" idx="1"/>
+          </p:nvPr>
+        </p:nvSpPr>
+        <p:spPr/>
+        <p:txBody>
           <a:bodyPr>
             <a:normAutofit/>
           </a:bodyPr>
           <a:lstStyle/>
           <a:p>
-            <a:r>
-              <a:rPr lang="de-DE" dirty="0"/>
-              <a:t>Workflows - Feature </a:t>
-            </a:r>
-            <a:r>
-              <a:rPr lang="de-DE" dirty="0" err="1"/>
-              <a:t>Branch</a:t>
-            </a:r>
-            <a:r>
-              <a:rPr lang="de-DE" dirty="0"/>
-              <a:t> Workflow</a:t>
-            </a:r>
-          </a:p>
-        </p:txBody>
-      </p:sp>
-      <p:sp>
-        <p:nvSpPr>
-          <p:cNvPr id="3" name="Fußzeilenplatzhalter 2"/>
-          <p:cNvSpPr>
-            <a:spLocks noGrp="1"/>
-          </p:cNvSpPr>
-          <p:nvPr>
-            <p:ph type="ftr" sz="quarter" idx="11"/>
-          </p:nvPr>
-        </p:nvSpPr>
-        <p:spPr/>
-        <p:txBody>
-          <a:bodyPr/>
-          <a:lstStyle/>
-          <a:p>
-            <a:r>
-              <a:rPr lang="de-DE" smtClean="0"/>
-              <a:t>ePortfolio von Mehmet Ali Incekara</a:t>
-            </a:r>
-            <a:endParaRPr lang="de-DE"/>
-          </a:p>
-        </p:txBody>
-      </p:sp>
-      <p:sp>
-        <p:nvSpPr>
-          <p:cNvPr id="4" name="Foliennummernplatzhalter 3"/>
-          <p:cNvSpPr>
-            <a:spLocks noGrp="1"/>
-          </p:cNvSpPr>
-          <p:nvPr>
-            <p:ph type="sldNum" sz="quarter" idx="12"/>
-          </p:nvPr>
-        </p:nvSpPr>
-        <p:spPr/>
-        <p:txBody>
-          <a:bodyPr/>
-          <a:lstStyle/>
-          <a:p>
-            <a:fld id="{32988457-9EFF-4998-891D-85ECFB4B79A4}" type="slidenum">
-              <a:rPr lang="de-DE" smtClean="0"/>
-              <a:t>10</a:t>
-            </a:fld>
-            <a:endParaRPr lang="de-DE"/>
-          </a:p>
-        </p:txBody>
-      </p:sp>
-      <p:sp>
-        <p:nvSpPr>
-          <p:cNvPr id="5" name="Inhaltsplatzhalter 4"/>
-          <p:cNvSpPr>
-            <a:spLocks noGrp="1"/>
-          </p:cNvSpPr>
-          <p:nvPr>
-            <p:ph sz="quarter" idx="1"/>
-          </p:nvPr>
-        </p:nvSpPr>
-        <p:spPr/>
-        <p:txBody>
-          <a:bodyPr/>
-          <a:lstStyle/>
-          <a:p>
-            <a:r>
-              <a:rPr lang="de-DE" dirty="0" err="1" smtClean="0"/>
-              <a:t>Erfds</a:t>
-            </a:r>
-            <a:endParaRPr lang="de-DE" dirty="0" smtClean="0"/>
-          </a:p>
-          <a:p>
-            <a:r>
-              <a:rPr lang="de-DE" dirty="0" smtClean="0"/>
-              <a:t>As</a:t>
-            </a:r>
-          </a:p>
-          <a:p>
-            <a:r>
-              <a:rPr lang="de-DE" dirty="0" smtClean="0"/>
-              <a:t>D</a:t>
-            </a:r>
-          </a:p>
-          <a:p>
-            <a:r>
-              <a:rPr lang="de-DE" dirty="0" err="1" smtClean="0"/>
-              <a:t>Asd</a:t>
-            </a:r>
-            <a:endParaRPr lang="de-DE" dirty="0" smtClean="0"/>
-          </a:p>
-          <a:p>
-            <a:pPr marL="0" indent="0">
+            <a:pPr marL="0" indent="0" algn="ctr">
               <a:buNone/>
             </a:pPr>
-            <a:endParaRPr lang="de-DE" dirty="0" smtClean="0"/>
-          </a:p>
-          <a:p>
-            <a:endParaRPr lang="de-DE" dirty="0"/>
-          </a:p>
-        </p:txBody>
-      </p:sp>
-      <p:pic>
-        <p:nvPicPr>
-          <p:cNvPr id="4097" name="Picture 1"/>
-          <p:cNvPicPr>
-            <a:picLocks noChangeAspect="1" noChangeArrowheads="1"/>
-          </p:cNvPicPr>
-          <p:nvPr/>
-        </p:nvPicPr>
-        <p:blipFill>
-          <a:blip r:embed="rId3">
-            <a:extLst>
-              <a:ext uri="{28A0092B-C50C-407E-A947-70E740481C1C}">
-                <a14:useLocalDpi xmlns:a14="http://schemas.microsoft.com/office/drawing/2010/main" val="0"/>
-              </a:ext>
-            </a:extLst>
-          </a:blip>
-          <a:srcRect/>
-          <a:stretch>
-            <a:fillRect/>
-          </a:stretch>
-        </p:blipFill>
-        <p:spPr bwMode="auto">
-          <a:xfrm>
-            <a:off x="2771800" y="4221088"/>
-            <a:ext cx="5905500" cy="2000250"/>
-          </a:xfrm>
-          <a:prstGeom prst="rect">
-            <a:avLst/>
-          </a:prstGeom>
-          <a:noFill/>
-          <a:ln>
-            <a:noFill/>
-          </a:ln>
-          <a:extLst>
-            <a:ext uri="{909E8E84-426E-40DD-AFC4-6F175D3DCCD1}">
-              <a14:hiddenFill xmlns:a14="http://schemas.microsoft.com/office/drawing/2010/main">
-                <a:solidFill>
-                  <a:schemeClr val="accent1"/>
-                </a:solidFill>
-              </a14:hiddenFill>
-            </a:ext>
-            <a:ext uri="{91240B29-F687-4F45-9708-019B960494DF}">
-              <a14:hiddenLine xmlns:a14="http://schemas.microsoft.com/office/drawing/2010/main" w="9525">
-                <a:solidFill>
-                  <a:schemeClr val="tx1"/>
-                </a:solidFill>
-                <a:miter lim="800000"/>
-                <a:headEnd/>
-                <a:tailEnd/>
-              </a14:hiddenLine>
-            </a:ext>
-          </a:extLst>
-        </p:spPr>
-      </p:pic>
+            <a:endParaRPr lang="de-DE" sz="4000" dirty="0" smtClean="0"/>
+          </a:p>
+          <a:p>
+            <a:pPr marL="0" indent="0" algn="ctr">
+              <a:buNone/>
+            </a:pPr>
+            <a:endParaRPr lang="de-DE" sz="4000" dirty="0"/>
+          </a:p>
+          <a:p>
+            <a:pPr marL="0" indent="0" algn="ctr">
+              <a:buNone/>
+            </a:pPr>
+            <a:endParaRPr lang="de-DE" sz="4000" dirty="0" smtClean="0"/>
+          </a:p>
+          <a:p>
+            <a:pPr marL="0" indent="0" algn="ctr">
+              <a:buNone/>
+            </a:pPr>
+            <a:r>
+              <a:rPr lang="de-DE" sz="4000" dirty="0" smtClean="0"/>
+              <a:t>Workflows</a:t>
+            </a:r>
+            <a:endParaRPr lang="de-DE" sz="4000" dirty="0"/>
+          </a:p>
+        </p:txBody>
+      </p:sp>
     </p:spTree>
     <p:extLst>
       <p:ext uri="{BB962C8B-B14F-4D97-AF65-F5344CB8AC3E}">
-        <p14:creationId xmlns:p14="http://schemas.microsoft.com/office/powerpoint/2010/main" val="2733612128"/>
+        <p14:creationId xmlns:p14="http://schemas.microsoft.com/office/powerpoint/2010/main" val="519444007"/>
       </p:ext>
     </p:extLst>
   </p:cSld>
@@ -5652,17 +5428,22 @@
           <a:lstStyle/>
           <a:p>
             <a:r>
-              <a:rPr lang="de-DE" dirty="0"/>
-              <a:t>Workflows - </a:t>
-            </a:r>
-            <a:r>
-              <a:rPr lang="de-DE" dirty="0" err="1"/>
-              <a:t>Gitflow</a:t>
-            </a:r>
-            <a:r>
-              <a:rPr lang="de-DE" dirty="0"/>
-              <a:t> Workflow</a:t>
-            </a:r>
+              <a:rPr lang="de-DE" dirty="0" err="1" smtClean="0"/>
+              <a:t>C</a:t>
+            </a:r>
+            <a:r>
+              <a:rPr lang="de-DE" dirty="0" err="1" smtClean="0"/>
+              <a:t>entralized</a:t>
+            </a:r>
+            <a:r>
+              <a:rPr lang="de-DE" dirty="0" smtClean="0"/>
+              <a:t> </a:t>
+            </a:r>
+            <a:r>
+              <a:rPr lang="de-DE" dirty="0" smtClean="0"/>
+              <a:t>Workflow</a:t>
+            </a:r>
+            <a:endParaRPr lang="de-DE" dirty="0"/>
           </a:p>
         </p:txBody>
       </p:sp>
@@ -5724,18 +5505,191 @@
         </p:nvSpPr>
         <p:spPr/>
         <p:txBody>
-          <a:bodyPr/>
-          <a:lstStyle/>
-          <a:p>
-            <a:endParaRPr lang="de-DE" dirty="0"/>
+          <a:bodyPr>
+            <a:normAutofit/>
+          </a:bodyPr>
+          <a:lstStyle/>
+          <a:p>
+            <a:r>
+              <a:rPr lang="de-DE" sz="2400" dirty="0" smtClean="0"/>
+              <a:t>lokale Kopie vom </a:t>
+            </a:r>
+            <a:br>
+              <a:rPr lang="de-DE" sz="2400" dirty="0" smtClean="0"/>
+            </a:br>
+            <a:r>
+              <a:rPr lang="de-DE" sz="2400" dirty="0" smtClean="0"/>
+              <a:t>ganzen Projekt</a:t>
+            </a:r>
+          </a:p>
+          <a:p>
+            <a:endParaRPr lang="de-DE" sz="2400" dirty="0" smtClean="0"/>
+          </a:p>
+          <a:p>
+            <a:r>
+              <a:rPr lang="de-DE" sz="2400" dirty="0" err="1" smtClean="0"/>
+              <a:t>Commits</a:t>
+            </a:r>
+            <a:r>
+              <a:rPr lang="de-DE" sz="2400" dirty="0" smtClean="0"/>
+              <a:t> werden auf der</a:t>
+            </a:r>
+            <a:br>
+              <a:rPr lang="de-DE" sz="2400" dirty="0" smtClean="0"/>
+            </a:br>
+            <a:r>
+              <a:rPr lang="de-DE" sz="2400" dirty="0"/>
+              <a:t>l</a:t>
+            </a:r>
+            <a:r>
+              <a:rPr lang="de-DE" sz="2400" dirty="0" smtClean="0"/>
+              <a:t>okalen Kopie ausgeführt</a:t>
+            </a:r>
+          </a:p>
+          <a:p>
+            <a:endParaRPr lang="de-DE" sz="2400" dirty="0" smtClean="0"/>
+          </a:p>
+          <a:p>
+            <a:r>
+              <a:rPr lang="de-DE" sz="2400" dirty="0" smtClean="0"/>
+              <a:t>Zur Veröffentlichung werden</a:t>
+            </a:r>
+            <a:br>
+              <a:rPr lang="de-DE" sz="2400" dirty="0" smtClean="0"/>
+            </a:br>
+            <a:r>
+              <a:rPr lang="de-DE" sz="2400" dirty="0" smtClean="0"/>
+              <a:t>die Veränderungen gepusht</a:t>
+            </a:r>
+            <a:endParaRPr lang="de-DE" sz="2400" dirty="0" smtClean="0"/>
+          </a:p>
+          <a:p>
+            <a:endParaRPr lang="de-DE" sz="2400" dirty="0"/>
+          </a:p>
+        </p:txBody>
+      </p:sp>
+      <p:sp>
+        <p:nvSpPr>
+          <p:cNvPr id="6" name="AutoShape 2" descr="Git Workflows: SVN-style Workflow"/>
+          <p:cNvSpPr>
+            <a:spLocks noChangeAspect="1" noChangeArrowheads="1"/>
+          </p:cNvSpPr>
+          <p:nvPr/>
+        </p:nvSpPr>
+        <p:spPr bwMode="auto">
+          <a:xfrm>
+            <a:off x="155575" y="-144463"/>
+            <a:ext cx="304800" cy="304801"/>
+          </a:xfrm>
+          <a:prstGeom prst="rect">
+            <a:avLst/>
+          </a:prstGeom>
+          <a:noFill/>
+          <a:extLst>
+            <a:ext uri="{909E8E84-426E-40DD-AFC4-6F175D3DCCD1}">
+              <a14:hiddenFill xmlns:a14="http://schemas.microsoft.com/office/drawing/2010/main">
+                <a:solidFill>
+                  <a:srgbClr val="FFFFFF"/>
+                </a:solidFill>
+              </a14:hiddenFill>
+            </a:ext>
+          </a:extLst>
+        </p:spPr>
+        <p:txBody>
+          <a:bodyPr vert="horz" wrap="square" lIns="91440" tIns="45720" rIns="91440" bIns="45720" numCol="1" anchor="t" anchorCtr="0" compatLnSpc="1">
+            <a:prstTxWarp prst="textNoShape">
+              <a:avLst/>
+            </a:prstTxWarp>
+          </a:bodyPr>
+          <a:lstStyle/>
+          <a:p>
+            <a:endParaRPr lang="de-DE"/>
+          </a:p>
+        </p:txBody>
+      </p:sp>
+      <p:sp>
+        <p:nvSpPr>
+          <p:cNvPr id="8" name="AutoShape 6" descr="Git Workflows: SVN-style Workflow"/>
+          <p:cNvSpPr>
+            <a:spLocks noChangeAspect="1" noChangeArrowheads="1"/>
+          </p:cNvSpPr>
+          <p:nvPr/>
+        </p:nvSpPr>
+        <p:spPr bwMode="auto">
+          <a:xfrm>
+            <a:off x="460375" y="160337"/>
+            <a:ext cx="304800" cy="304801"/>
+          </a:xfrm>
+          <a:prstGeom prst="rect">
+            <a:avLst/>
+          </a:prstGeom>
+          <a:noFill/>
+          <a:extLst>
+            <a:ext uri="{909E8E84-426E-40DD-AFC4-6F175D3DCCD1}">
+              <a14:hiddenFill xmlns:a14="http://schemas.microsoft.com/office/drawing/2010/main">
+                <a:solidFill>
+                  <a:srgbClr val="FFFFFF"/>
+                </a:solidFill>
+              </a14:hiddenFill>
+            </a:ext>
+          </a:extLst>
+        </p:spPr>
+        <p:txBody>
+          <a:bodyPr vert="horz" wrap="square" lIns="91440" tIns="45720" rIns="91440" bIns="45720" numCol="1" anchor="t" anchorCtr="0" compatLnSpc="1">
+            <a:prstTxWarp prst="textNoShape">
+              <a:avLst/>
+            </a:prstTxWarp>
+          </a:bodyPr>
+          <a:lstStyle/>
+          <a:p>
+            <a:endParaRPr lang="de-DE"/>
+          </a:p>
+        </p:txBody>
+      </p:sp>
+      <p:sp>
+        <p:nvSpPr>
+          <p:cNvPr id="9" name="AutoShape 8" descr="Git Workflows: SVN-style Workflow"/>
+          <p:cNvSpPr>
+            <a:spLocks noChangeAspect="1" noChangeArrowheads="1"/>
+          </p:cNvSpPr>
+          <p:nvPr/>
+        </p:nvSpPr>
+        <p:spPr bwMode="auto">
+          <a:xfrm>
+            <a:off x="612775" y="312737"/>
+            <a:ext cx="304800" cy="304801"/>
+          </a:xfrm>
+          <a:prstGeom prst="rect">
+            <a:avLst/>
+          </a:prstGeom>
+          <a:noFill/>
+          <a:extLst>
+            <a:ext uri="{909E8E84-426E-40DD-AFC4-6F175D3DCCD1}">
+              <a14:hiddenFill xmlns:a14="http://schemas.microsoft.com/office/drawing/2010/main">
+                <a:solidFill>
+                  <a:srgbClr val="FFFFFF"/>
+                </a:solidFill>
+              </a14:hiddenFill>
+            </a:ext>
+          </a:extLst>
+        </p:spPr>
+        <p:txBody>
+          <a:bodyPr vert="horz" wrap="square" lIns="91440" tIns="45720" rIns="91440" bIns="45720" numCol="1" anchor="t" anchorCtr="0" compatLnSpc="1">
+            <a:prstTxWarp prst="textNoShape">
+              <a:avLst/>
+            </a:prstTxWarp>
+          </a:bodyPr>
+          <a:lstStyle/>
+          <a:p>
+            <a:endParaRPr lang="de-DE"/>
           </a:p>
         </p:txBody>
       </p:sp>
       <p:pic>
         <p:nvPicPr>
-          <p:cNvPr id="3074" name="Picture 2"/>
+          <p:cNvPr id="7" name="Grafik 6"/>
           <p:cNvPicPr>
-            <a:picLocks noChangeAspect="1" noChangeArrowheads="1"/>
+            <a:picLocks noChangeAspect="1"/>
           </p:cNvPicPr>
           <p:nvPr/>
         </p:nvPicPr>
@@ -5747,42 +5701,18 @@
               </a:ext>
             </a:extLst>
           </a:blip>
-          <a:srcRect/>
           <a:stretch>
             <a:fillRect/>
           </a:stretch>
         </p:blipFill>
-        <p:spPr bwMode="auto">
+        <p:spPr>
           <a:xfrm>
-            <a:off x="2580456" y="3598887"/>
-            <a:ext cx="6096000" cy="2638425"/>
+            <a:off x="4964221" y="1289394"/>
+            <a:ext cx="3712235" cy="3291734"/>
           </a:xfrm>
           <a:prstGeom prst="rect">
             <a:avLst/>
           </a:prstGeom>
-          <a:noFill/>
-          <a:ln>
-            <a:noFill/>
-          </a:ln>
-          <a:extLst>
-            <a:ext uri="{909E8E84-426E-40DD-AFC4-6F175D3DCCD1}">
-              <a14:hiddenFill xmlns:a14="http://schemas.microsoft.com/office/drawing/2010/main">
-                <a:solidFill>
-                  <a:schemeClr val="accent1"/>
-                </a:solidFill>
-              </a14:hiddenFill>
-            </a:ext>
-            <a:ext uri="{91240B29-F687-4F45-9708-019B960494DF}">
-              <a14:hiddenLine xmlns:a14="http://schemas.microsoft.com/office/drawing/2010/main" w="9525">
-                <a:solidFill>
-                  <a:schemeClr val="tx1"/>
-                </a:solidFill>
-                <a:miter lim="800000"/>
-                <a:headEnd/>
-                <a:tailEnd/>
-              </a14:hiddenLine>
-            </a:ext>
-          </a:extLst>
         </p:spPr>
       </p:pic>
     </p:spTree>
@@ -5840,12 +5770,12 @@
           <a:lstStyle/>
           <a:p>
             <a:r>
-              <a:rPr lang="de-DE" dirty="0"/>
-              <a:t>Workflows - </a:t>
+              <a:rPr lang="de-DE" dirty="0" smtClean="0"/>
+              <a:t>Feature </a:t>
             </a:r>
             <a:r>
               <a:rPr lang="de-DE" dirty="0" err="1"/>
-              <a:t>Forking</a:t>
+              <a:t>Branch</a:t>
             </a:r>
             <a:r>
               <a:rPr lang="de-DE" dirty="0"/>
@@ -5912,21 +5842,122 @@
         </p:nvSpPr>
         <p:spPr/>
         <p:txBody>
-          <a:bodyPr/>
-          <a:lstStyle/>
-          <a:p>
-            <a:endParaRPr lang="de-DE" dirty="0" smtClean="0"/>
-          </a:p>
-          <a:p>
-            <a:endParaRPr lang="de-DE" dirty="0"/>
+          <a:bodyPr>
+            <a:normAutofit/>
+          </a:bodyPr>
+          <a:lstStyle/>
+          <a:p>
+            <a:r>
+              <a:rPr lang="de-DE" sz="2400" dirty="0" smtClean="0"/>
+              <a:t>Features werden in</a:t>
+            </a:r>
+            <a:br>
+              <a:rPr lang="de-DE" sz="2400" dirty="0" smtClean="0"/>
+            </a:br>
+            <a:r>
+              <a:rPr lang="de-DE" sz="2400" dirty="0" smtClean="0"/>
+              <a:t>separaten </a:t>
+            </a:r>
+            <a:r>
+              <a:rPr lang="de-DE" sz="2400" dirty="0" err="1" smtClean="0"/>
+              <a:t>Branches</a:t>
+            </a:r>
+            <a:r>
+              <a:rPr lang="de-DE" sz="2400" dirty="0" smtClean="0"/>
+              <a:t> </a:t>
+            </a:r>
+            <a:br>
+              <a:rPr lang="de-DE" sz="2400" dirty="0" smtClean="0"/>
+            </a:br>
+            <a:r>
+              <a:rPr lang="de-DE" sz="2400" dirty="0" smtClean="0"/>
+              <a:t>entwickelt</a:t>
+            </a:r>
+          </a:p>
+          <a:p>
+            <a:endParaRPr lang="de-DE" sz="2400" dirty="0"/>
+          </a:p>
+          <a:p>
+            <a:r>
+              <a:rPr lang="de-DE" sz="2400" dirty="0" smtClean="0"/>
+              <a:t>Entwicklung hat keine</a:t>
+            </a:r>
+            <a:br>
+              <a:rPr lang="de-DE" sz="2400" dirty="0" smtClean="0"/>
+            </a:br>
+            <a:r>
+              <a:rPr lang="de-DE" sz="2400" dirty="0" smtClean="0"/>
+              <a:t>Auswirkung auf den</a:t>
+            </a:r>
+            <a:br>
+              <a:rPr lang="de-DE" sz="2400" dirty="0" smtClean="0"/>
+            </a:br>
+            <a:r>
+              <a:rPr lang="de-DE" sz="2400" dirty="0" smtClean="0"/>
+              <a:t>Master </a:t>
+            </a:r>
+            <a:r>
+              <a:rPr lang="de-DE" sz="2400" dirty="0" err="1" smtClean="0"/>
+              <a:t>Branch</a:t>
+            </a:r>
+            <a:endParaRPr lang="de-DE" sz="2400" dirty="0" smtClean="0"/>
+          </a:p>
+          <a:p>
+            <a:endParaRPr lang="de-DE" sz="2400" dirty="0"/>
+          </a:p>
+          <a:p>
+            <a:r>
+              <a:rPr lang="de-DE" sz="2400" dirty="0" smtClean="0"/>
+              <a:t>Erweiterung: </a:t>
+            </a:r>
+            <a:r>
+              <a:rPr lang="de-DE" sz="2400" dirty="0" err="1" smtClean="0"/>
+              <a:t>Gitflow</a:t>
+            </a:r>
+            <a:r>
+              <a:rPr lang="de-DE" sz="2400" dirty="0" smtClean="0"/>
+              <a:t> Workflow</a:t>
+            </a:r>
+            <a:endParaRPr lang="de-DE" sz="2400" dirty="0"/>
+          </a:p>
+          <a:p>
+            <a:pPr lvl="1"/>
+            <a:r>
+              <a:rPr lang="de-DE" sz="2100" dirty="0"/>
+              <a:t>g</a:t>
+            </a:r>
+            <a:r>
+              <a:rPr lang="de-DE" sz="2100" dirty="0" smtClean="0"/>
+              <a:t>enauer festgelegte </a:t>
+            </a:r>
+            <a:r>
+              <a:rPr lang="de-DE" sz="2100" dirty="0" err="1" smtClean="0"/>
+              <a:t>Branches</a:t>
+            </a:r>
+            <a:r>
+              <a:rPr lang="de-DE" sz="2100" dirty="0" smtClean="0"/>
+              <a:t> (bspw. Master, Release, Feature, Bug,…)</a:t>
+            </a:r>
+          </a:p>
+          <a:p>
+            <a:endParaRPr lang="de-DE" sz="2400" dirty="0"/>
+          </a:p>
+          <a:p>
+            <a:endParaRPr lang="de-DE" sz="2400" dirty="0" smtClean="0"/>
+          </a:p>
+          <a:p>
+            <a:endParaRPr lang="de-DE" sz="2400" dirty="0" smtClean="0"/>
+          </a:p>
+          <a:p>
+            <a:endParaRPr lang="de-DE" sz="2400" dirty="0"/>
           </a:p>
         </p:txBody>
       </p:sp>
       <p:pic>
         <p:nvPicPr>
-          <p:cNvPr id="2049" name="Picture 1"/>
+          <p:cNvPr id="6" name="Grafik 5"/>
           <p:cNvPicPr>
-            <a:picLocks noChangeAspect="1" noChangeArrowheads="1"/>
+            <a:picLocks noChangeAspect="1"/>
           </p:cNvPicPr>
           <p:nvPr/>
         </p:nvPicPr>
@@ -5938,42 +5969,18 @@
               </a:ext>
             </a:extLst>
           </a:blip>
-          <a:srcRect/>
           <a:stretch>
             <a:fillRect/>
           </a:stretch>
         </p:blipFill>
-        <p:spPr bwMode="auto">
+        <p:spPr>
           <a:xfrm>
-            <a:off x="3851920" y="2655912"/>
-            <a:ext cx="4781550" cy="3581400"/>
+            <a:off x="3923928" y="1277171"/>
+            <a:ext cx="4763165" cy="2295845"/>
           </a:xfrm>
           <a:prstGeom prst="rect">
             <a:avLst/>
           </a:prstGeom>
-          <a:noFill/>
-          <a:ln>
-            <a:noFill/>
-          </a:ln>
-          <a:extLst>
-            <a:ext uri="{909E8E84-426E-40DD-AFC4-6F175D3DCCD1}">
-              <a14:hiddenFill xmlns:a14="http://schemas.microsoft.com/office/drawing/2010/main">
-                <a:solidFill>
-                  <a:schemeClr val="accent1"/>
-                </a:solidFill>
-              </a14:hiddenFill>
-            </a:ext>
-            <a:ext uri="{91240B29-F687-4F45-9708-019B960494DF}">
-              <a14:hiddenLine xmlns:a14="http://schemas.microsoft.com/office/drawing/2010/main" w="9525">
-                <a:solidFill>
-                  <a:schemeClr val="tx1"/>
-                </a:solidFill>
-                <a:miter lim="800000"/>
-                <a:headEnd/>
-                <a:tailEnd/>
-              </a14:hiddenLine>
-            </a:ext>
-          </a:extLst>
         </p:spPr>
       </p:pic>
     </p:spTree>
@@ -6031,11 +6038,402 @@
           <a:lstStyle/>
           <a:p>
             <a:r>
+              <a:rPr lang="de-DE" dirty="0" err="1" smtClean="0"/>
+              <a:t>Forking</a:t>
+            </a:r>
+            <a:r>
               <a:rPr lang="de-DE" dirty="0" smtClean="0"/>
-              <a:t>           - Befehlsübersicht</a:t>
-            </a:r>
+              <a:t> </a:t>
+            </a:r>
+            <a:r>
+              <a:rPr lang="de-DE" dirty="0"/>
+              <a:t>Workflow</a:t>
+            </a:r>
+          </a:p>
+        </p:txBody>
+      </p:sp>
+      <p:sp>
+        <p:nvSpPr>
+          <p:cNvPr id="3" name="Fußzeilenplatzhalter 2"/>
+          <p:cNvSpPr>
+            <a:spLocks noGrp="1"/>
+          </p:cNvSpPr>
+          <p:nvPr>
+            <p:ph type="ftr" sz="quarter" idx="11"/>
+          </p:nvPr>
+        </p:nvSpPr>
+        <p:spPr/>
+        <p:txBody>
+          <a:bodyPr/>
+          <a:lstStyle/>
+          <a:p>
+            <a:r>
+              <a:rPr lang="de-DE" smtClean="0"/>
+              <a:t>ePortfolio von Mehmet Ali Incekara</a:t>
+            </a:r>
+            <a:endParaRPr lang="de-DE"/>
+          </a:p>
+        </p:txBody>
+      </p:sp>
+      <p:sp>
+        <p:nvSpPr>
+          <p:cNvPr id="4" name="Foliennummernplatzhalter 3"/>
+          <p:cNvSpPr>
+            <a:spLocks noGrp="1"/>
+          </p:cNvSpPr>
+          <p:nvPr>
+            <p:ph type="sldNum" sz="quarter" idx="12"/>
+          </p:nvPr>
+        </p:nvSpPr>
+        <p:spPr/>
+        <p:txBody>
+          <a:bodyPr/>
+          <a:lstStyle/>
+          <a:p>
+            <a:fld id="{32988457-9EFF-4998-891D-85ECFB4B79A4}" type="slidenum">
+              <a:rPr lang="de-DE" smtClean="0"/>
+              <a:t>13</a:t>
+            </a:fld>
+            <a:endParaRPr lang="de-DE"/>
+          </a:p>
+        </p:txBody>
+      </p:sp>
+      <p:sp>
+        <p:nvSpPr>
+          <p:cNvPr id="5" name="Inhaltsplatzhalter 4"/>
+          <p:cNvSpPr>
+            <a:spLocks noGrp="1"/>
+          </p:cNvSpPr>
+          <p:nvPr>
+            <p:ph sz="quarter" idx="1"/>
+          </p:nvPr>
+        </p:nvSpPr>
+        <p:spPr/>
+        <p:txBody>
+          <a:bodyPr>
+            <a:normAutofit/>
+          </a:bodyPr>
+          <a:lstStyle/>
+          <a:p>
+            <a:r>
+              <a:rPr lang="de-DE" sz="2400" dirty="0" smtClean="0"/>
+              <a:t>Jeder Entwickler hat ein</a:t>
+            </a:r>
+            <a:br>
+              <a:rPr lang="de-DE" sz="2400" dirty="0" smtClean="0"/>
+            </a:br>
+            <a:r>
+              <a:rPr lang="de-DE" sz="2400" dirty="0" smtClean="0"/>
+              <a:t>privates lokales und ein</a:t>
+            </a:r>
+            <a:br>
+              <a:rPr lang="de-DE" sz="2400" dirty="0" smtClean="0"/>
+            </a:br>
+            <a:r>
+              <a:rPr lang="de-DE" sz="2400" dirty="0" smtClean="0"/>
+              <a:t>öffentliches Repository</a:t>
+            </a:r>
+            <a:br>
+              <a:rPr lang="de-DE" sz="2400" dirty="0" smtClean="0"/>
+            </a:br>
+            <a:r>
+              <a:rPr lang="de-DE" sz="2400" dirty="0" smtClean="0"/>
+              <a:t>zusätzlich</a:t>
+            </a:r>
+          </a:p>
+          <a:p>
+            <a:endParaRPr lang="de-DE" sz="2400" dirty="0" smtClean="0"/>
+          </a:p>
+          <a:p>
+            <a:r>
+              <a:rPr lang="de-DE" sz="2400" dirty="0" smtClean="0"/>
+              <a:t>Nur d</a:t>
+            </a:r>
+            <a:r>
+              <a:rPr lang="de-DE" sz="2400" dirty="0" smtClean="0"/>
+              <a:t>er Besitzer des </a:t>
+            </a:r>
+            <a:br>
+              <a:rPr lang="de-DE" sz="2400" dirty="0" smtClean="0"/>
+            </a:br>
+            <a:r>
+              <a:rPr lang="de-DE" sz="2400" dirty="0" smtClean="0"/>
+              <a:t>Projektes</a:t>
+            </a:r>
+            <a:r>
+              <a:rPr lang="de-DE" sz="2400" dirty="0"/>
+              <a:t> </a:t>
+            </a:r>
+            <a:r>
+              <a:rPr lang="de-DE" sz="2400" dirty="0" smtClean="0"/>
+              <a:t>kann das offizielle</a:t>
+            </a:r>
+            <a:br>
+              <a:rPr lang="de-DE" sz="2400" dirty="0" smtClean="0"/>
+            </a:br>
+            <a:r>
+              <a:rPr lang="de-DE" sz="2400" dirty="0" smtClean="0"/>
+              <a:t>Repository pushen</a:t>
+            </a:r>
+          </a:p>
+        </p:txBody>
+      </p:sp>
+      <p:pic>
+        <p:nvPicPr>
+          <p:cNvPr id="6" name="Grafik 5"/>
+          <p:cNvPicPr>
+            <a:picLocks noChangeAspect="1"/>
+          </p:cNvPicPr>
+          <p:nvPr/>
+        </p:nvPicPr>
+        <p:blipFill>
+          <a:blip r:embed="rId3">
+            <a:extLst>
+              <a:ext uri="{28A0092B-C50C-407E-A947-70E740481C1C}">
+                <a14:useLocalDpi xmlns:a14="http://schemas.microsoft.com/office/drawing/2010/main" val="0"/>
+              </a:ext>
+            </a:extLst>
+          </a:blip>
+          <a:stretch>
+            <a:fillRect/>
+          </a:stretch>
+        </p:blipFill>
+        <p:spPr>
+          <a:xfrm>
+            <a:off x="4428555" y="1243488"/>
+            <a:ext cx="4258245" cy="3049608"/>
+          </a:xfrm>
+          <a:prstGeom prst="rect">
+            <a:avLst/>
+          </a:prstGeom>
+        </p:spPr>
+      </p:pic>
+    </p:spTree>
+    <p:extLst>
+      <p:ext uri="{BB962C8B-B14F-4D97-AF65-F5344CB8AC3E}">
+        <p14:creationId xmlns:p14="http://schemas.microsoft.com/office/powerpoint/2010/main" val="2733612128"/>
+      </p:ext>
+    </p:extLst>
+  </p:cSld>
+  <p:clrMapOvr>
+    <a:masterClrMapping/>
+  </p:clrMapOvr>
+  <p:timing>
+    <p:tnLst>
+      <p:par>
+        <p:cTn id="1" dur="indefinite" restart="never" nodeType="tmRoot"/>
+      </p:par>
+    </p:tnLst>
+  </p:timing>
+</p:sld>
+</file>
+
+<file path=ppt/slides/slide14.xml><?xml version="1.0" encoding="utf-8"?>
+<p:sld xmlns:a="http://schemas.openxmlformats.org/drawingml/2006/main" xmlns:r="http://schemas.openxmlformats.org/officeDocument/2006/relationships" xmlns:p="http://schemas.openxmlformats.org/presentationml/2006/main">
+  <p:cSld>
+    <p:spTree>
+      <p:nvGrpSpPr>
+        <p:cNvPr id="1" name=""/>
+        <p:cNvGrpSpPr/>
+        <p:nvPr/>
+      </p:nvGrpSpPr>
+      <p:grpSpPr>
+        <a:xfrm>
+          <a:off x="0" y="0"/>
+          <a:ext cx="0" cy="0"/>
+          <a:chOff x="0" y="0"/>
+          <a:chExt cx="0" cy="0"/>
+        </a:xfrm>
+      </p:grpSpPr>
+      <p:sp>
+        <p:nvSpPr>
+          <p:cNvPr id="2" name="Titel 1"/>
+          <p:cNvSpPr>
+            <a:spLocks noGrp="1"/>
+          </p:cNvSpPr>
+          <p:nvPr>
+            <p:ph type="title"/>
+          </p:nvPr>
+        </p:nvSpPr>
+        <p:spPr/>
+        <p:txBody>
+          <a:bodyPr/>
+          <a:lstStyle/>
+          <a:p>
+            <a:endParaRPr lang="de-DE"/>
+          </a:p>
+        </p:txBody>
+      </p:sp>
+      <p:sp>
+        <p:nvSpPr>
+          <p:cNvPr id="3" name="Fußzeilenplatzhalter 2"/>
+          <p:cNvSpPr>
+            <a:spLocks noGrp="1"/>
+          </p:cNvSpPr>
+          <p:nvPr>
+            <p:ph type="ftr" sz="quarter" idx="11"/>
+          </p:nvPr>
+        </p:nvSpPr>
+        <p:spPr/>
+        <p:txBody>
+          <a:bodyPr/>
+          <a:lstStyle/>
+          <a:p>
+            <a:r>
+              <a:rPr lang="de-DE" smtClean="0"/>
+              <a:t>ePortfolio von Mehmet Ali Incekara</a:t>
+            </a:r>
+            <a:endParaRPr lang="de-DE"/>
+          </a:p>
+        </p:txBody>
+      </p:sp>
+      <p:sp>
+        <p:nvSpPr>
+          <p:cNvPr id="4" name="Foliennummernplatzhalter 3"/>
+          <p:cNvSpPr>
+            <a:spLocks noGrp="1"/>
+          </p:cNvSpPr>
+          <p:nvPr>
+            <p:ph type="sldNum" sz="quarter" idx="12"/>
+          </p:nvPr>
+        </p:nvSpPr>
+        <p:spPr/>
+        <p:txBody>
+          <a:bodyPr/>
+          <a:lstStyle/>
+          <a:p>
+            <a:fld id="{32988457-9EFF-4998-891D-85ECFB4B79A4}" type="slidenum">
+              <a:rPr lang="de-DE" smtClean="0"/>
+              <a:t>14</a:t>
+            </a:fld>
+            <a:endParaRPr lang="de-DE"/>
+          </a:p>
+        </p:txBody>
+      </p:sp>
+      <p:sp>
+        <p:nvSpPr>
+          <p:cNvPr id="5" name="Inhaltsplatzhalter 4"/>
+          <p:cNvSpPr>
+            <a:spLocks noGrp="1"/>
+          </p:cNvSpPr>
+          <p:nvPr>
+            <p:ph sz="quarter" idx="1"/>
+          </p:nvPr>
+        </p:nvSpPr>
+        <p:spPr/>
+        <p:txBody>
+          <a:bodyPr/>
+          <a:lstStyle/>
+          <a:p>
+            <a:pPr marL="0" indent="0" algn="ctr">
+              <a:buNone/>
+            </a:pPr>
+            <a:endParaRPr lang="de-DE" dirty="0" smtClean="0"/>
+          </a:p>
+          <a:p>
+            <a:pPr marL="0" indent="0" algn="ctr">
+              <a:buNone/>
+            </a:pPr>
             <a:endParaRPr lang="de-DE" dirty="0"/>
           </a:p>
+          <a:p>
+            <a:pPr marL="0" indent="0" algn="ctr">
+              <a:buNone/>
+            </a:pPr>
+            <a:endParaRPr lang="de-DE" dirty="0" smtClean="0"/>
+          </a:p>
+          <a:p>
+            <a:pPr marL="0" indent="0" algn="ctr">
+              <a:buNone/>
+            </a:pPr>
+            <a:endParaRPr lang="de-DE" dirty="0"/>
+          </a:p>
+          <a:p>
+            <a:pPr marL="0" indent="0" algn="ctr">
+              <a:buNone/>
+            </a:pPr>
+            <a:r>
+              <a:rPr lang="de-DE" sz="4000" dirty="0" smtClean="0"/>
+              <a:t>Demo, </a:t>
+            </a:r>
+            <a:r>
+              <a:rPr lang="de-DE" sz="4000" dirty="0" err="1" smtClean="0"/>
+              <a:t>enjoy</a:t>
+            </a:r>
+            <a:r>
+              <a:rPr lang="de-DE" sz="4000" dirty="0" smtClean="0"/>
+              <a:t> </a:t>
+            </a:r>
+            <a:r>
+              <a:rPr lang="de-DE" sz="4000" dirty="0" smtClean="0">
+                <a:sym typeface="Wingdings" panose="05000000000000000000" pitchFamily="2" charset="2"/>
+              </a:rPr>
+              <a:t></a:t>
+            </a:r>
+            <a:endParaRPr lang="de-DE" sz="4000" dirty="0" smtClean="0"/>
+          </a:p>
+        </p:txBody>
+      </p:sp>
+    </p:spTree>
+    <p:extLst>
+      <p:ext uri="{BB962C8B-B14F-4D97-AF65-F5344CB8AC3E}">
+        <p14:creationId xmlns:p14="http://schemas.microsoft.com/office/powerpoint/2010/main" val="2386628746"/>
+      </p:ext>
+    </p:extLst>
+  </p:cSld>
+  <p:clrMapOvr>
+    <a:masterClrMapping/>
+  </p:clrMapOvr>
+  <p:timing>
+    <p:tnLst>
+      <p:par>
+        <p:cTn id="1" dur="indefinite" restart="never" nodeType="tmRoot"/>
+      </p:par>
+    </p:tnLst>
+  </p:timing>
+</p:sld>
+</file>
+
+<file path=ppt/slides/slide15.xml><?xml version="1.0" encoding="utf-8"?>
+<p:sld xmlns:a="http://schemas.openxmlformats.org/drawingml/2006/main" xmlns:r="http://schemas.openxmlformats.org/officeDocument/2006/relationships" xmlns:p="http://schemas.openxmlformats.org/presentationml/2006/main">
+  <p:cSld>
+    <p:spTree>
+      <p:nvGrpSpPr>
+        <p:cNvPr id="1" name=""/>
+        <p:cNvGrpSpPr/>
+        <p:nvPr/>
+      </p:nvGrpSpPr>
+      <p:grpSpPr>
+        <a:xfrm>
+          <a:off x="0" y="0"/>
+          <a:ext cx="0" cy="0"/>
+          <a:chOff x="0" y="0"/>
+          <a:chExt cx="0" cy="0"/>
+        </a:xfrm>
+      </p:grpSpPr>
+      <p:sp>
+        <p:nvSpPr>
+          <p:cNvPr id="2" name="Titel 1"/>
+          <p:cNvSpPr>
+            <a:spLocks noGrp="1"/>
+          </p:cNvSpPr>
+          <p:nvPr>
+            <p:ph type="title"/>
+          </p:nvPr>
+        </p:nvSpPr>
+        <p:spPr/>
+        <p:txBody>
+          <a:bodyPr>
+            <a:normAutofit/>
+          </a:bodyPr>
+          <a:lstStyle/>
+          <a:p>
+            <a:r>
+              <a:rPr lang="de-DE" dirty="0" smtClean="0"/>
+              <a:t>Befehlsübersicht</a:t>
+            </a:r>
+            <a:endParaRPr lang="de-DE" dirty="0"/>
+          </a:p>
         </p:txBody>
       </p:sp>
       <p:sp>
@@ -6078,7 +6476,7 @@
           <a:p>
             <a:fld id="{32988457-9EFF-4998-891D-85ECFB4B79A4}" type="slidenum">
               <a:rPr lang="de-DE" smtClean="0"/>
-              <a:t>13</a:t>
+              <a:t>15</a:t>
             </a:fld>
             <a:endParaRPr lang="de-DE"/>
           </a:p>
@@ -6094,14 +6492,14 @@
             <p:ph sz="quarter" idx="1"/>
             <p:extLst>
               <p:ext uri="{D42A27DB-BD31-4B8C-83A1-F6EECF244321}">
-                <p14:modId xmlns:p14="http://schemas.microsoft.com/office/powerpoint/2010/main" val="1386026627"/>
+                <p14:modId xmlns:p14="http://schemas.microsoft.com/office/powerpoint/2010/main" val="2824905339"/>
               </p:ext>
             </p:extLst>
           </p:nvPr>
         </p:nvGraphicFramePr>
         <p:xfrm>
           <a:off x="457200" y="1219200"/>
-          <a:ext cx="8229600" cy="4998720"/>
+          <a:ext cx="8229600" cy="4897120"/>
         </p:xfrm>
         <a:graphic>
           <a:graphicData uri="http://schemas.openxmlformats.org/drawingml/2006/table">
@@ -6114,6 +6512,16 @@
                 <a:gridCol w="5482952"/>
               </a:tblGrid>
               <a:tr h="370840">
+                <a:tc>
+                  <a:txBody>
+                    <a:bodyPr/>
+                    <a:lstStyle/>
+                    <a:p>
+                      <a:endParaRPr lang="de-DE" sz="1500" dirty="0"/>
+                    </a:p>
+                  </a:txBody>
+                  <a:tcPr/>
+                </a:tc>
                 <a:tc>
                   <a:txBody>
                     <a:bodyPr/>
@@ -6132,22 +6540,22 @@
                   </a:txBody>
                   <a:tcPr/>
                 </a:tc>
+              </a:tr>
+              <a:tr h="370840">
                 <a:tc>
                   <a:txBody>
                     <a:bodyPr/>
                     <a:lstStyle/>
                     <a:p>
                       <a:r>
-                        <a:rPr lang="de-DE" sz="1500" dirty="0" smtClean="0"/>
-                        <a:t>Funktion</a:t>
+                        <a:rPr lang="de-DE" sz="1500" b="1" dirty="0" smtClean="0"/>
+                        <a:t>Konfiguration</a:t>
                       </a:r>
-                      <a:endParaRPr lang="de-DE" sz="1500" dirty="0"/>
+                      <a:endParaRPr lang="de-DE" sz="1500" b="1" dirty="0" smtClean="0"/>
                     </a:p>
                   </a:txBody>
                   <a:tcPr/>
                 </a:tc>
-              </a:tr>
-              <a:tr h="370840">
                 <a:tc>
                   <a:txBody>
                     <a:bodyPr/>
@@ -6217,18 +6625,30 @@
                   </a:txBody>
                   <a:tcPr/>
                 </a:tc>
+              </a:tr>
+              <a:tr h="370840">
                 <a:tc>
                   <a:txBody>
                     <a:bodyPr/>
                     <a:lstStyle/>
                     <a:p>
-                      <a:endParaRPr lang="de-DE" sz="1500" dirty="0"/>
+                      <a:r>
+                        <a:rPr lang="de-DE" sz="1500" b="1" baseline="0" dirty="0" smtClean="0"/>
+                        <a:t>Lokales </a:t>
+                      </a:r>
+                      <a:r>
+                        <a:rPr lang="de-DE" sz="1500" b="1" baseline="0" dirty="0" err="1" smtClean="0"/>
+                        <a:t>git</a:t>
+                      </a:r>
+                      <a:r>
+                        <a:rPr lang="de-DE" sz="1500" b="1" baseline="0" dirty="0" smtClean="0"/>
+                        <a:t>-Repository</a:t>
+                      </a:r>
+                      <a:endParaRPr lang="de-DE" sz="1500" b="1" baseline="0" dirty="0" smtClean="0"/>
                     </a:p>
                   </a:txBody>
                   <a:tcPr/>
                 </a:tc>
-              </a:tr>
-              <a:tr h="370840">
                 <a:tc>
                   <a:txBody>
                     <a:bodyPr/>
@@ -6319,18 +6739,39 @@
                   </a:txBody>
                   <a:tcPr/>
                 </a:tc>
+              </a:tr>
+              <a:tr h="370840">
                 <a:tc>
                   <a:txBody>
                     <a:bodyPr/>
                     <a:lstStyle/>
                     <a:p>
-                      <a:endParaRPr lang="de-DE" sz="1500" dirty="0"/>
+                      <a:pPr marL="0" marR="0" indent="0" algn="l" defTabSz="914400" rtl="0" eaLnBrk="1" fontAlgn="auto" latinLnBrk="0" hangingPunct="1">
+                        <a:lnSpc>
+                          <a:spcPct val="100000"/>
+                        </a:lnSpc>
+                        <a:spcBef>
+                          <a:spcPts val="0"/>
+                        </a:spcBef>
+                        <a:spcAft>
+                          <a:spcPts val="0"/>
+                        </a:spcAft>
+                        <a:buClrTx/>
+                        <a:buSzTx/>
+                        <a:buFontTx/>
+                        <a:buNone/>
+                        <a:tabLst/>
+                        <a:defRPr/>
+                      </a:pPr>
+                      <a:r>
+                        <a:rPr lang="de-DE" sz="1500" b="1" dirty="0" smtClean="0"/>
+                        <a:t>Vergleich</a:t>
+                      </a:r>
+                      <a:endParaRPr lang="de-DE" sz="1500" b="1" dirty="0" smtClean="0"/>
                     </a:p>
                   </a:txBody>
                   <a:tcPr/>
                 </a:tc>
-              </a:tr>
-              <a:tr h="370840">
                 <a:tc>
                   <a:txBody>
                     <a:bodyPr/>
@@ -6365,23 +6806,78 @@
                         <a:rPr lang="de-DE" sz="1500" baseline="0" dirty="0" err="1" smtClean="0"/>
                         <a:t>status</a:t>
                       </a:r>
-                      <a:endParaRPr lang="de-DE" sz="1500" dirty="0" smtClean="0"/>
+                      <a:endParaRPr lang="de-DE" sz="1500" baseline="0" dirty="0" smtClean="0"/>
                     </a:p>
-                  </a:txBody>
-                  <a:tcPr/>
-                </a:tc>
-                <a:tc>
-                  <a:txBody>
-                    <a:bodyPr/>
-                    <a:lstStyle/>
                     <a:p>
-                      <a:endParaRPr lang="de-DE" sz="1500" dirty="0"/>
+                      <a:pPr marL="0" marR="0" indent="0" algn="l" defTabSz="914400" rtl="0" eaLnBrk="1" fontAlgn="auto" latinLnBrk="0" hangingPunct="1">
+                        <a:lnSpc>
+                          <a:spcPct val="100000"/>
+                        </a:lnSpc>
+                        <a:spcBef>
+                          <a:spcPts val="0"/>
+                        </a:spcBef>
+                        <a:spcAft>
+                          <a:spcPts val="0"/>
+                        </a:spcAft>
+                        <a:buClrTx/>
+                        <a:buSzTx/>
+                        <a:buFontTx/>
+                        <a:buNone/>
+                        <a:tabLst/>
+                        <a:defRPr/>
+                      </a:pPr>
+                      <a:r>
+                        <a:rPr lang="de-DE" sz="1500" dirty="0" err="1" smtClean="0">
+                          <a:latin typeface="+mn-lt"/>
+                          <a:ea typeface="Arial Unicode MS" panose="020B0604020202020204" pitchFamily="34" charset="-128"/>
+                          <a:cs typeface="Arial Unicode MS" panose="020B0604020202020204" pitchFamily="34" charset="-128"/>
+                        </a:rPr>
+                        <a:t>git</a:t>
+                      </a:r>
+                      <a:r>
+                        <a:rPr lang="de-DE" sz="1500" dirty="0" smtClean="0">
+                          <a:latin typeface="+mn-lt"/>
+                          <a:ea typeface="Arial Unicode MS" panose="020B0604020202020204" pitchFamily="34" charset="-128"/>
+                          <a:cs typeface="Arial Unicode MS" panose="020B0604020202020204" pitchFamily="34" charset="-128"/>
+                        </a:rPr>
+                        <a:t> </a:t>
+                      </a:r>
+                      <a:r>
+                        <a:rPr lang="de-DE" sz="1500" dirty="0" err="1" smtClean="0">
+                          <a:latin typeface="+mn-lt"/>
+                          <a:ea typeface="Arial Unicode MS" panose="020B0604020202020204" pitchFamily="34" charset="-128"/>
+                          <a:cs typeface="Arial Unicode MS" panose="020B0604020202020204" pitchFamily="34" charset="-128"/>
+                        </a:rPr>
+                        <a:t>diff</a:t>
+                      </a:r>
+                      <a:r>
+                        <a:rPr lang="de-DE" sz="1500" dirty="0" smtClean="0">
+                          <a:latin typeface="+mn-lt"/>
+                          <a:ea typeface="Arial Unicode MS" panose="020B0604020202020204" pitchFamily="34" charset="-128"/>
+                          <a:cs typeface="Arial Unicode MS" panose="020B0604020202020204" pitchFamily="34" charset="-128"/>
+                        </a:rPr>
+                        <a:t> &lt;quell&gt;&lt;ziel&gt;</a:t>
+                      </a:r>
                     </a:p>
                   </a:txBody>
                   <a:tcPr/>
                 </a:tc>
               </a:tr>
               <a:tr h="370840">
+                <a:tc>
+                  <a:txBody>
+                    <a:bodyPr/>
+                    <a:lstStyle/>
+                    <a:p>
+                      <a:r>
+                        <a:rPr lang="de-DE" sz="1500" b="1" dirty="0" smtClean="0"/>
+                        <a:t>Lokales Repository</a:t>
+                      </a:r>
+                      <a:endParaRPr lang="de-DE" sz="1500" b="1" dirty="0" smtClean="0"/>
+                    </a:p>
+                  </a:txBody>
+                  <a:tcPr/>
+                </a:tc>
                 <a:tc>
                   <a:txBody>
                     <a:bodyPr/>
@@ -6433,9 +6929,37 @@
                       </a:r>
                       <a:r>
                         <a:rPr lang="de-DE" sz="1500" baseline="0" dirty="0" smtClean="0"/>
-                        <a:t> –m ‘ ‘</a:t>
+                        <a:t> –m ‘ </a:t>
                       </a:r>
+                      <a:r>
+                        <a:rPr lang="de-DE" sz="1500" baseline="0" dirty="0" smtClean="0"/>
+                        <a:t>‘</a:t>
+                      </a:r>
+                      <a:endParaRPr lang="de-DE" sz="1500" baseline="0" dirty="0" smtClean="0"/>
                     </a:p>
+                  </a:txBody>
+                  <a:tcPr/>
+                </a:tc>
+              </a:tr>
+              <a:tr h="370840">
+                <a:tc>
+                  <a:txBody>
+                    <a:bodyPr/>
+                    <a:lstStyle/>
+                    <a:p>
+                      <a:r>
+                        <a:rPr lang="de-DE" sz="1500" b="1" baseline="0" dirty="0" smtClean="0"/>
+                        <a:t>Öffentliches Repository</a:t>
+                      </a:r>
+                      <a:endParaRPr lang="de-DE" sz="1500" b="1" baseline="0" dirty="0" smtClean="0"/>
+                    </a:p>
+                  </a:txBody>
+                  <a:tcPr/>
+                </a:tc>
+                <a:tc>
+                  <a:txBody>
+                    <a:bodyPr/>
+                    <a:lstStyle/>
                     <a:p>
                       <a:pPr marL="0" marR="0" indent="0" algn="l" defTabSz="914400" rtl="0" eaLnBrk="1" fontAlgn="auto" latinLnBrk="0" hangingPunct="1">
                         <a:lnSpc>
@@ -6464,15 +6988,16 @@
                       </a:r>
                       <a:endParaRPr lang="de-DE" sz="1500" dirty="0" smtClean="0"/>
                     </a:p>
-                  </a:txBody>
-                  <a:tcPr/>
-                </a:tc>
-                <a:tc>
-                  <a:txBody>
-                    <a:bodyPr/>
-                    <a:lstStyle/>
                     <a:p>
-                      <a:endParaRPr lang="de-DE" sz="1500" dirty="0"/>
+                      <a:r>
+                        <a:rPr lang="de-DE" sz="1500" dirty="0" err="1" smtClean="0"/>
+                        <a:t>git</a:t>
+                      </a:r>
+                      <a:r>
+                        <a:rPr lang="de-DE" sz="1500" baseline="0" dirty="0" smtClean="0"/>
+                        <a:t> pull</a:t>
+                      </a:r>
+                      <a:endParaRPr lang="de-DE" sz="1500" baseline="0" dirty="0" smtClean="0"/>
                     </a:p>
                   </a:txBody>
                   <a:tcPr/>
@@ -6485,29 +7010,14 @@
                     <a:lstStyle/>
                     <a:p>
                       <a:r>
-                        <a:rPr lang="de-DE" sz="1500" dirty="0" err="1" smtClean="0"/>
-                        <a:t>git</a:t>
+                        <a:rPr lang="de-DE" sz="1500" b="1" dirty="0" smtClean="0"/>
+                        <a:t>Log-Ansicht</a:t>
                       </a:r>
-                      <a:r>
-                        <a:rPr lang="de-DE" sz="1500" baseline="0" dirty="0" smtClean="0"/>
-                        <a:t> pull</a:t>
-                      </a:r>
+                      <a:endParaRPr lang="de-DE" sz="1500" b="1" dirty="0" smtClean="0"/>
                     </a:p>
                   </a:txBody>
                   <a:tcPr/>
                 </a:tc>
-                <a:tc>
-                  <a:txBody>
-                    <a:bodyPr/>
-                    <a:lstStyle/>
-                    <a:p>
-                      <a:endParaRPr lang="de-DE" sz="1500" dirty="0"/>
-                    </a:p>
-                  </a:txBody>
-                  <a:tcPr/>
-                </a:tc>
-              </a:tr>
-              <a:tr h="370840">
                 <a:tc>
                   <a:txBody>
                     <a:bodyPr/>
@@ -6537,18 +7047,30 @@
                   </a:txBody>
                   <a:tcPr/>
                 </a:tc>
+              </a:tr>
+              <a:tr h="370840">
                 <a:tc>
                   <a:txBody>
                     <a:bodyPr/>
                     <a:lstStyle/>
                     <a:p>
-                      <a:endParaRPr lang="de-DE" sz="1500" dirty="0"/>
+                      <a:r>
+                        <a:rPr lang="de-DE" sz="1500" b="1" dirty="0" err="1" smtClean="0">
+                          <a:latin typeface="+mn-lt"/>
+                          <a:ea typeface="Arial Unicode MS" panose="020B0604020202020204" pitchFamily="34" charset="-128"/>
+                          <a:cs typeface="Arial Unicode MS" panose="020B0604020202020204" pitchFamily="34" charset="-128"/>
+                        </a:rPr>
+                        <a:t>Branch</a:t>
+                      </a:r>
+                      <a:endParaRPr lang="de-DE" sz="1500" b="1" dirty="0" smtClean="0">
+                        <a:latin typeface="+mn-lt"/>
+                        <a:ea typeface="Arial Unicode MS" panose="020B0604020202020204" pitchFamily="34" charset="-128"/>
+                        <a:cs typeface="Arial Unicode MS" panose="020B0604020202020204" pitchFamily="34" charset="-128"/>
+                      </a:endParaRPr>
                     </a:p>
                   </a:txBody>
                   <a:tcPr/>
                 </a:tc>
-              </a:tr>
-              <a:tr h="370840">
                 <a:tc>
                   <a:txBody>
                     <a:bodyPr/>
@@ -6763,50 +7285,11 @@
                         </a:rPr>
                         <a:t>&gt;</a:t>
                       </a:r>
-                    </a:p>
-                    <a:p>
-                      <a:r>
-                        <a:rPr lang="de-DE" sz="1500" dirty="0" err="1" smtClean="0">
-                          <a:latin typeface="+mn-lt"/>
-                          <a:ea typeface="Arial Unicode MS" panose="020B0604020202020204" pitchFamily="34" charset="-128"/>
-                          <a:cs typeface="Arial Unicode MS" panose="020B0604020202020204" pitchFamily="34" charset="-128"/>
-                        </a:rPr>
-                        <a:t>git</a:t>
-                      </a:r>
-                      <a:r>
-                        <a:rPr lang="de-DE" sz="1500" dirty="0" smtClean="0">
-                          <a:latin typeface="+mn-lt"/>
-                          <a:ea typeface="Arial Unicode MS" panose="020B0604020202020204" pitchFamily="34" charset="-128"/>
-                          <a:cs typeface="Arial Unicode MS" panose="020B0604020202020204" pitchFamily="34" charset="-128"/>
-                        </a:rPr>
-                        <a:t> </a:t>
-                      </a:r>
-                      <a:r>
-                        <a:rPr lang="de-DE" sz="1500" dirty="0" err="1" smtClean="0">
-                          <a:latin typeface="+mn-lt"/>
-                          <a:ea typeface="Arial Unicode MS" panose="020B0604020202020204" pitchFamily="34" charset="-128"/>
-                          <a:cs typeface="Arial Unicode MS" panose="020B0604020202020204" pitchFamily="34" charset="-128"/>
-                        </a:rPr>
-                        <a:t>diff</a:t>
-                      </a:r>
-                      <a:r>
-                        <a:rPr lang="de-DE" sz="1500" dirty="0" smtClean="0">
-                          <a:latin typeface="+mn-lt"/>
-                          <a:ea typeface="Arial Unicode MS" panose="020B0604020202020204" pitchFamily="34" charset="-128"/>
-                          <a:cs typeface="Arial Unicode MS" panose="020B0604020202020204" pitchFamily="34" charset="-128"/>
-                        </a:rPr>
-                        <a:t> &lt;quell&gt;&lt;ziel&gt;</a:t>
-                      </a:r>
-                    </a:p>
-                  </a:txBody>
-                  <a:tcPr/>
-                </a:tc>
-                <a:tc>
-                  <a:txBody>
-                    <a:bodyPr/>
-                    <a:lstStyle/>
-                    <a:p>
-                      <a:endParaRPr lang="de-DE" sz="1500" dirty="0"/>
+                      <a:endParaRPr lang="de-DE" sz="1500" dirty="0" smtClean="0">
+                        <a:latin typeface="+mn-lt"/>
+                        <a:ea typeface="Arial Unicode MS" panose="020B0604020202020204" pitchFamily="34" charset="-128"/>
+                        <a:cs typeface="Arial Unicode MS" panose="020B0604020202020204" pitchFamily="34" charset="-128"/>
+                      </a:endParaRPr>
                     </a:p>
                   </a:txBody>
                   <a:tcPr/>
@@ -6816,47 +7299,6 @@
           </a:graphicData>
         </a:graphic>
       </p:graphicFrame>
-      <p:pic>
-        <p:nvPicPr>
-          <p:cNvPr id="1026" name="Picture 2" descr="Logo"/>
-          <p:cNvPicPr>
-            <a:picLocks noChangeAspect="1" noChangeArrowheads="1"/>
-          </p:cNvPicPr>
-          <p:nvPr/>
-        </p:nvPicPr>
-        <p:blipFill>
-          <a:blip r:embed="rId2">
-            <a:extLst>
-              <a:ext uri="{28A0092B-C50C-407E-A947-70E740481C1C}">
-                <a14:useLocalDpi xmlns:a14="http://schemas.microsoft.com/office/drawing/2010/main" val="0"/>
-              </a:ext>
-            </a:extLst>
-          </a:blip>
-          <a:srcRect/>
-          <a:stretch>
-            <a:fillRect/>
-          </a:stretch>
-        </p:blipFill>
-        <p:spPr bwMode="auto">
-          <a:xfrm>
-            <a:off x="457200" y="519429"/>
-            <a:ext cx="1428750" cy="600076"/>
-          </a:xfrm>
-          <a:prstGeom prst="rect">
-            <a:avLst/>
-          </a:prstGeom>
-          <a:noFill/>
-          <a:extLst>
-            <a:ext uri="{909E8E84-426E-40DD-AFC4-6F175D3DCCD1}">
-              <a14:hiddenFill xmlns:a14="http://schemas.microsoft.com/office/drawing/2010/main">
-                <a:solidFill>
-                  <a:srgbClr val="FFFFFF"/>
-                </a:solidFill>
-              </a14:hiddenFill>
-            </a:ext>
-          </a:extLst>
-        </p:spPr>
-      </p:pic>
     </p:spTree>
     <p:extLst>
       <p:ext uri="{BB962C8B-B14F-4D97-AF65-F5344CB8AC3E}">
@@ -6877,7 +7319,7 @@
 </p:sld>
 </file>
 
-<file path=ppt/slides/slide14.xml><?xml version="1.0" encoding="utf-8"?>
+<file path=ppt/slides/slide16.xml><?xml version="1.0" encoding="utf-8"?>
 <p:sld xmlns:a="http://schemas.openxmlformats.org/drawingml/2006/main" xmlns:r="http://schemas.openxmlformats.org/officeDocument/2006/relationships" xmlns:p="http://schemas.openxmlformats.org/presentationml/2006/main">
   <p:cSld>
     <p:spTree>
@@ -6909,6 +7351,168 @@
           <a:bodyPr/>
           <a:lstStyle/>
           <a:p>
+            <a:endParaRPr lang="de-DE"/>
+          </a:p>
+        </p:txBody>
+      </p:sp>
+      <p:sp>
+        <p:nvSpPr>
+          <p:cNvPr id="3" name="Fußzeilenplatzhalter 2"/>
+          <p:cNvSpPr>
+            <a:spLocks noGrp="1"/>
+          </p:cNvSpPr>
+          <p:nvPr>
+            <p:ph type="ftr" sz="quarter" idx="11"/>
+          </p:nvPr>
+        </p:nvSpPr>
+        <p:spPr/>
+        <p:txBody>
+          <a:bodyPr/>
+          <a:lstStyle/>
+          <a:p>
+            <a:r>
+              <a:rPr lang="de-DE" smtClean="0"/>
+              <a:t>ePortfolio von Mehmet Ali Incekara</a:t>
+            </a:r>
+            <a:endParaRPr lang="de-DE"/>
+          </a:p>
+        </p:txBody>
+      </p:sp>
+      <p:sp>
+        <p:nvSpPr>
+          <p:cNvPr id="4" name="Foliennummernplatzhalter 3"/>
+          <p:cNvSpPr>
+            <a:spLocks noGrp="1"/>
+          </p:cNvSpPr>
+          <p:nvPr>
+            <p:ph type="sldNum" sz="quarter" idx="12"/>
+          </p:nvPr>
+        </p:nvSpPr>
+        <p:spPr/>
+        <p:txBody>
+          <a:bodyPr/>
+          <a:lstStyle/>
+          <a:p>
+            <a:fld id="{32988457-9EFF-4998-891D-85ECFB4B79A4}" type="slidenum">
+              <a:rPr lang="de-DE" smtClean="0"/>
+              <a:t>16</a:t>
+            </a:fld>
+            <a:endParaRPr lang="de-DE"/>
+          </a:p>
+        </p:txBody>
+      </p:sp>
+      <p:sp>
+        <p:nvSpPr>
+          <p:cNvPr id="5" name="Inhaltsplatzhalter 4"/>
+          <p:cNvSpPr>
+            <a:spLocks noGrp="1"/>
+          </p:cNvSpPr>
+          <p:nvPr>
+            <p:ph sz="quarter" idx="1"/>
+          </p:nvPr>
+        </p:nvSpPr>
+        <p:spPr/>
+        <p:txBody>
+          <a:bodyPr/>
+          <a:lstStyle/>
+          <a:p>
+            <a:pPr marL="0" indent="0" algn="ctr">
+              <a:buNone/>
+            </a:pPr>
+            <a:endParaRPr lang="de-DE" dirty="0" smtClean="0"/>
+          </a:p>
+          <a:p>
+            <a:pPr marL="0" indent="0" algn="ctr">
+              <a:buNone/>
+            </a:pPr>
+            <a:endParaRPr lang="de-DE" dirty="0"/>
+          </a:p>
+          <a:p>
+            <a:pPr marL="0" indent="0" algn="ctr">
+              <a:buNone/>
+            </a:pPr>
+            <a:endParaRPr lang="de-DE" dirty="0" smtClean="0"/>
+          </a:p>
+          <a:p>
+            <a:pPr marL="0" indent="0" algn="ctr">
+              <a:buNone/>
+            </a:pPr>
+            <a:endParaRPr lang="de-DE" dirty="0"/>
+          </a:p>
+          <a:p>
+            <a:pPr marL="0" indent="0" algn="ctr">
+              <a:buNone/>
+            </a:pPr>
+            <a:r>
+              <a:rPr lang="de-DE" sz="4000" dirty="0" err="1" smtClean="0"/>
+              <a:t>Your</a:t>
+            </a:r>
+            <a:r>
+              <a:rPr lang="de-DE" sz="4000" dirty="0" smtClean="0"/>
+              <a:t> turn </a:t>
+            </a:r>
+            <a:r>
+              <a:rPr lang="de-DE" sz="4000" dirty="0" smtClean="0">
+                <a:sym typeface="Wingdings" panose="05000000000000000000" pitchFamily="2" charset="2"/>
+              </a:rPr>
+              <a:t></a:t>
+            </a:r>
+            <a:endParaRPr lang="de-DE" sz="4000" dirty="0" smtClean="0"/>
+          </a:p>
+        </p:txBody>
+      </p:sp>
+    </p:spTree>
+    <p:extLst>
+      <p:ext uri="{BB962C8B-B14F-4D97-AF65-F5344CB8AC3E}">
+        <p14:creationId xmlns:p14="http://schemas.microsoft.com/office/powerpoint/2010/main" val="3615691201"/>
+      </p:ext>
+    </p:extLst>
+  </p:cSld>
+  <p:clrMapOvr>
+    <a:masterClrMapping/>
+  </p:clrMapOvr>
+  <p:timing>
+    <p:tnLst>
+      <p:par>
+        <p:cTn id="1" dur="indefinite" restart="never" nodeType="tmRoot"/>
+      </p:par>
+    </p:tnLst>
+  </p:timing>
+</p:sld>
+</file>
+
+<file path=ppt/slides/slide17.xml><?xml version="1.0" encoding="utf-8"?>
+<p:sld xmlns:a="http://schemas.openxmlformats.org/drawingml/2006/main" xmlns:r="http://schemas.openxmlformats.org/officeDocument/2006/relationships" xmlns:p="http://schemas.openxmlformats.org/presentationml/2006/main">
+  <p:cSld>
+    <p:spTree>
+      <p:nvGrpSpPr>
+        <p:cNvPr id="1" name=""/>
+        <p:cNvGrpSpPr/>
+        <p:nvPr/>
+      </p:nvGrpSpPr>
+      <p:grpSpPr>
+        <a:xfrm>
+          <a:off x="0" y="0"/>
+          <a:ext cx="0" cy="0"/>
+          <a:chOff x="0" y="0"/>
+          <a:chExt cx="0" cy="0"/>
+        </a:xfrm>
+      </p:grpSpPr>
+      <p:sp>
+        <p:nvSpPr>
+          <p:cNvPr id="2" name="Titel 1"/>
+          <p:cNvSpPr>
+            <a:spLocks noGrp="1"/>
+          </p:cNvSpPr>
+          <p:nvPr>
+            <p:ph type="title"/>
+          </p:nvPr>
+        </p:nvSpPr>
+        <p:spPr/>
+        <p:txBody>
+          <a:bodyPr/>
+          <a:lstStyle/>
+          <a:p>
             <a:r>
               <a:rPr lang="de-DE" dirty="0" smtClean="0"/>
               <a:t>Quellen</a:t>
@@ -6957,7 +7561,7 @@
           <a:p>
             <a:fld id="{32988457-9EFF-4998-891D-85ECFB4B79A4}" type="slidenum">
               <a:rPr lang="de-DE" smtClean="0"/>
-              <a:t>14</a:t>
+              <a:t>17</a:t>
             </a:fld>
             <a:endParaRPr lang="de-DE"/>
           </a:p>
@@ -6973,10 +7577,15 @@
             <p:ph sz="quarter" idx="1"/>
           </p:nvPr>
         </p:nvSpPr>
-        <p:spPr/>
+        <p:spPr>
+          <a:xfrm>
+            <a:off x="457200" y="1219200"/>
+            <a:ext cx="8435280" cy="4937760"/>
+          </a:xfrm>
+        </p:spPr>
         <p:txBody>
           <a:bodyPr>
-            <a:normAutofit/>
+            <a:normAutofit fontScale="92500" lnSpcReduction="20000"/>
           </a:bodyPr>
           <a:lstStyle/>
           <a:p>
@@ -6984,11 +7593,11 @@
               <a:buNone/>
             </a:pPr>
             <a:r>
-              <a:rPr lang="de-DE" sz="2000" dirty="0" err="1" smtClean="0"/>
+              <a:rPr lang="de-DE" sz="2000" b="1" dirty="0" err="1" smtClean="0"/>
               <a:t>git</a:t>
             </a:r>
             <a:r>
-              <a:rPr lang="de-DE" sz="2000" dirty="0" smtClean="0"/>
+              <a:rPr lang="de-DE" sz="2000" b="1" dirty="0" smtClean="0"/>
               <a:t>:</a:t>
             </a:r>
           </a:p>
@@ -7052,22 +7661,27 @@
             </a:r>
             <a:r>
               <a:rPr lang="de-DE" sz="2000" dirty="0" smtClean="0"/>
-              <a:t>rogerdudler.github.io/git-guide/index.de.html</a:t>
-            </a:r>
+              <a:t>rogerdudler.github.io/git-guide/index.de.html </a:t>
+            </a:r>
+            <a:r>
+              <a:rPr lang="de-DE" sz="1200" dirty="0" smtClean="0"/>
+              <a:t>(11.10.2015)</a:t>
+            </a:r>
+            <a:endParaRPr lang="de-DE" sz="1200" dirty="0" smtClean="0"/>
           </a:p>
           <a:p>
             <a:pPr marL="0" indent="0">
               <a:buNone/>
             </a:pPr>
             <a:r>
-              <a:rPr lang="de-DE" sz="2000" dirty="0" err="1" smtClean="0"/>
+              <a:rPr lang="de-DE" sz="2000" b="1" dirty="0" err="1" smtClean="0"/>
               <a:t>GitHub</a:t>
             </a:r>
             <a:r>
-              <a:rPr lang="de-DE" sz="2000" dirty="0"/>
+              <a:rPr lang="de-DE" sz="2000" b="1" dirty="0"/>
               <a:t>:</a:t>
             </a:r>
-            <a:endParaRPr lang="de-DE" sz="2000" dirty="0" smtClean="0"/>
+            <a:endParaRPr lang="de-DE" sz="2000" b="1" dirty="0" smtClean="0"/>
           </a:p>
           <a:p>
             <a:r>
@@ -7076,8 +7690,13 @@
             </a:r>
             <a:r>
               <a:rPr lang="de-DE" sz="2000" dirty="0" smtClean="0"/>
-              <a:t>/</a:t>
-            </a:r>
+              <a:t>/ </a:t>
+            </a:r>
+            <a:r>
+              <a:rPr lang="de-DE" sz="1100" dirty="0" smtClean="0"/>
+              <a:t>(12.10.2015)</a:t>
+            </a:r>
+            <a:endParaRPr lang="de-DE" sz="2000" dirty="0" smtClean="0"/>
           </a:p>
           <a:p>
             <a:r>
@@ -7086,7 +7705,11 @@
             </a:r>
             <a:r>
               <a:rPr lang="de-DE" sz="2000" dirty="0" smtClean="0"/>
-              <a:t>github.com/features</a:t>
+              <a:t>github.com/features </a:t>
+            </a:r>
+            <a:r>
+              <a:rPr lang="de-DE" sz="1100" dirty="0" smtClean="0"/>
+              <a:t>(12.10.2015)</a:t>
             </a:r>
           </a:p>
           <a:p>
@@ -7094,10 +7717,34 @@
               <a:buNone/>
             </a:pPr>
             <a:r>
-              <a:rPr lang="de-DE" sz="2000" dirty="0" smtClean="0"/>
+              <a:rPr lang="de-DE" sz="2000" b="1" dirty="0" smtClean="0"/>
+              <a:t>Workflows:</a:t>
+            </a:r>
+          </a:p>
+          <a:p>
+            <a:r>
+              <a:rPr lang="de-DE" sz="2000" dirty="0"/>
+              <a:t>https://www.atlassian.com/git/tutorials/comparing-workflows/centralized-workflow </a:t>
+            </a:r>
+            <a:r>
+              <a:rPr lang="de-DE" sz="1100" dirty="0"/>
+              <a:t>(15.10.2015</a:t>
+            </a:r>
+            <a:r>
+              <a:rPr lang="de-DE" sz="1100" dirty="0" smtClean="0"/>
+              <a:t>)</a:t>
+            </a:r>
+            <a:endParaRPr lang="de-DE" sz="2000" b="1" dirty="0" smtClean="0"/>
+          </a:p>
+          <a:p>
+            <a:pPr marL="0" indent="0">
+              <a:buNone/>
+            </a:pPr>
+            <a:r>
+              <a:rPr lang="de-DE" sz="2000" b="1" dirty="0" smtClean="0"/>
               <a:t>Bilder:</a:t>
             </a:r>
-            <a:endParaRPr lang="de-DE" sz="2000" dirty="0"/>
+            <a:endParaRPr lang="de-DE" sz="2000" b="1" dirty="0"/>
           </a:p>
           <a:p>
             <a:r>
@@ -7106,8 +7753,45 @@
             </a:r>
             <a:r>
               <a:rPr lang="de-DE" sz="2000" dirty="0" smtClean="0"/>
-              <a:t>git-scm.com/figures/18333fig0103-tn.png</a:t>
-            </a:r>
+              <a:t>git-scm.com/figures/18333fig0103-tn.png </a:t>
+            </a:r>
+            <a:r>
+              <a:rPr lang="de-DE" sz="1200" dirty="0" smtClean="0"/>
+              <a:t>(11.10.2015)</a:t>
+            </a:r>
+          </a:p>
+          <a:p>
+            <a:r>
+              <a:rPr lang="de-DE" sz="2000" dirty="0"/>
+              <a:t>https://de.wikipedia.org/wiki/GitHub#/</a:t>
+            </a:r>
+            <a:r>
+              <a:rPr lang="de-DE" sz="2000" dirty="0" smtClean="0"/>
+              <a:t>media/File:GitHub_logo_2013.svg </a:t>
+            </a:r>
+            <a:r>
+              <a:rPr lang="de-DE" sz="1200" dirty="0" smtClean="0"/>
+              <a:t>(14.19.2015)</a:t>
+            </a:r>
+          </a:p>
+          <a:p>
+            <a:r>
+              <a:rPr lang="de-DE" sz="2000" dirty="0"/>
+              <a:t>https://de.wikipedia.org/wiki/Git#/</a:t>
+            </a:r>
+            <a:r>
+              <a:rPr lang="de-DE" sz="2000" dirty="0" smtClean="0"/>
+              <a:t>media/File:Git-logo.svg </a:t>
+            </a:r>
+            <a:r>
+              <a:rPr lang="de-DE" sz="1200" dirty="0"/>
+              <a:t>(14.19.2015</a:t>
+            </a:r>
+            <a:r>
+              <a:rPr lang="de-DE" sz="1200" dirty="0" smtClean="0"/>
+              <a:t>)</a:t>
+            </a:r>
+            <a:endParaRPr lang="de-DE" sz="1200" dirty="0" smtClean="0"/>
           </a:p>
           <a:p>
             <a:r>
@@ -7116,13 +7800,11 @@
             </a:r>
             <a:r>
               <a:rPr lang="de-DE" sz="2000" dirty="0" smtClean="0"/>
-              <a:t>git-scm.com/figures/18333fig0106-tn.png</a:t>
-            </a:r>
-          </a:p>
-          <a:p>
-            <a:r>
-              <a:rPr lang="de-DE" sz="2000" dirty="0"/>
-              <a:t>https://www.atlassian.com/git/tutorials/comparing-workflows/centralized-workflow</a:t>
+              <a:t>git-scm.com/figures/18333fig0106-tn.png </a:t>
+            </a:r>
+            <a:r>
+              <a:rPr lang="de-DE" sz="1100" dirty="0" smtClean="0"/>
+              <a:t>(11.10.2015)</a:t>
             </a:r>
             <a:endParaRPr lang="de-DE" sz="2000" dirty="0" smtClean="0"/>
           </a:p>
@@ -7135,6 +7817,167 @@
     <p:extLst>
       <p:ext uri="{BB962C8B-B14F-4D97-AF65-F5344CB8AC3E}">
         <p14:creationId xmlns:p14="http://schemas.microsoft.com/office/powerpoint/2010/main" val="1184464537"/>
+      </p:ext>
+    </p:extLst>
+  </p:cSld>
+  <p:clrMapOvr>
+    <a:masterClrMapping/>
+  </p:clrMapOvr>
+  <p:timing>
+    <p:tnLst>
+      <p:par>
+        <p:cTn id="1" dur="indefinite" restart="never" nodeType="tmRoot"/>
+      </p:par>
+    </p:tnLst>
+  </p:timing>
+</p:sld>
+</file>
+
+<file path=ppt/slides/slide18.xml><?xml version="1.0" encoding="utf-8"?>
+<p:sld xmlns:a="http://schemas.openxmlformats.org/drawingml/2006/main" xmlns:r="http://schemas.openxmlformats.org/officeDocument/2006/relationships" xmlns:p="http://schemas.openxmlformats.org/presentationml/2006/main">
+  <p:cSld>
+    <p:spTree>
+      <p:nvGrpSpPr>
+        <p:cNvPr id="1" name=""/>
+        <p:cNvGrpSpPr/>
+        <p:nvPr/>
+      </p:nvGrpSpPr>
+      <p:grpSpPr>
+        <a:xfrm>
+          <a:off x="0" y="0"/>
+          <a:ext cx="0" cy="0"/>
+          <a:chOff x="0" y="0"/>
+          <a:chExt cx="0" cy="0"/>
+        </a:xfrm>
+      </p:grpSpPr>
+      <p:sp>
+        <p:nvSpPr>
+          <p:cNvPr id="2" name="Titel 1"/>
+          <p:cNvSpPr>
+            <a:spLocks noGrp="1"/>
+          </p:cNvSpPr>
+          <p:nvPr>
+            <p:ph type="title"/>
+          </p:nvPr>
+        </p:nvSpPr>
+        <p:spPr/>
+        <p:txBody>
+          <a:bodyPr/>
+          <a:lstStyle/>
+          <a:p>
+            <a:endParaRPr lang="de-DE"/>
+          </a:p>
+        </p:txBody>
+      </p:sp>
+      <p:sp>
+        <p:nvSpPr>
+          <p:cNvPr id="3" name="Fußzeilenplatzhalter 2"/>
+          <p:cNvSpPr>
+            <a:spLocks noGrp="1"/>
+          </p:cNvSpPr>
+          <p:nvPr>
+            <p:ph type="ftr" sz="quarter" idx="11"/>
+          </p:nvPr>
+        </p:nvSpPr>
+        <p:spPr/>
+        <p:txBody>
+          <a:bodyPr/>
+          <a:lstStyle/>
+          <a:p>
+            <a:r>
+              <a:rPr lang="de-DE" smtClean="0"/>
+              <a:t>ePortfolio von Mehmet Ali Incekara</a:t>
+            </a:r>
+            <a:endParaRPr lang="de-DE"/>
+          </a:p>
+        </p:txBody>
+      </p:sp>
+      <p:sp>
+        <p:nvSpPr>
+          <p:cNvPr id="4" name="Foliennummernplatzhalter 3"/>
+          <p:cNvSpPr>
+            <a:spLocks noGrp="1"/>
+          </p:cNvSpPr>
+          <p:nvPr>
+            <p:ph type="sldNum" sz="quarter" idx="12"/>
+          </p:nvPr>
+        </p:nvSpPr>
+        <p:spPr/>
+        <p:txBody>
+          <a:bodyPr/>
+          <a:lstStyle/>
+          <a:p>
+            <a:fld id="{32988457-9EFF-4998-891D-85ECFB4B79A4}" type="slidenum">
+              <a:rPr lang="de-DE" smtClean="0"/>
+              <a:t>18</a:t>
+            </a:fld>
+            <a:endParaRPr lang="de-DE"/>
+          </a:p>
+        </p:txBody>
+      </p:sp>
+      <p:sp>
+        <p:nvSpPr>
+          <p:cNvPr id="5" name="Inhaltsplatzhalter 4"/>
+          <p:cNvSpPr>
+            <a:spLocks noGrp="1"/>
+          </p:cNvSpPr>
+          <p:nvPr>
+            <p:ph sz="quarter" idx="1"/>
+          </p:nvPr>
+        </p:nvSpPr>
+        <p:spPr/>
+        <p:txBody>
+          <a:bodyPr/>
+          <a:lstStyle/>
+          <a:p>
+            <a:pPr marL="0" indent="0" algn="ctr">
+              <a:buNone/>
+            </a:pPr>
+            <a:endParaRPr lang="de-DE" dirty="0" smtClean="0"/>
+          </a:p>
+          <a:p>
+            <a:pPr marL="0" indent="0" algn="ctr">
+              <a:buNone/>
+            </a:pPr>
+            <a:endParaRPr lang="de-DE" dirty="0" smtClean="0"/>
+          </a:p>
+          <a:p>
+            <a:pPr marL="0" indent="0" algn="ctr">
+              <a:buNone/>
+            </a:pPr>
+            <a:r>
+              <a:rPr lang="de-DE" dirty="0" smtClean="0"/>
+              <a:t>Vielen Dank für Eure Aufmerksamkeit,</a:t>
+            </a:r>
+          </a:p>
+          <a:p>
+            <a:pPr marL="0" indent="0" algn="ctr">
+              <a:buNone/>
+            </a:pPr>
+            <a:endParaRPr lang="de-DE" dirty="0"/>
+          </a:p>
+          <a:p>
+            <a:pPr marL="0" indent="0" algn="ctr">
+              <a:buNone/>
+            </a:pPr>
+            <a:r>
+              <a:rPr lang="de-DE" dirty="0" smtClean="0"/>
+              <a:t>Fragen ? </a:t>
+            </a:r>
+            <a:r>
+              <a:rPr lang="de-DE" dirty="0" smtClean="0">
+                <a:sym typeface="Wingdings" panose="05000000000000000000" pitchFamily="2" charset="2"/>
+              </a:rPr>
+              <a:t></a:t>
+            </a:r>
+            <a:endParaRPr lang="de-DE" dirty="0"/>
+          </a:p>
+        </p:txBody>
+      </p:sp>
+    </p:spTree>
+    <p:extLst>
+      <p:ext uri="{BB962C8B-B14F-4D97-AF65-F5344CB8AC3E}">
+        <p14:creationId xmlns:p14="http://schemas.microsoft.com/office/powerpoint/2010/main" val="3137022672"/>
       </p:ext>
     </p:extLst>
   </p:cSld>
@@ -7204,7 +8047,7 @@
         <p:spPr/>
         <p:txBody>
           <a:bodyPr>
-            <a:normAutofit fontScale="92500" lnSpcReduction="20000"/>
+            <a:normAutofit fontScale="92500" lnSpcReduction="10000"/>
           </a:bodyPr>
           <a:lstStyle/>
           <a:p>
@@ -7216,6 +8059,10 @@
               <a:rPr lang="de-DE" dirty="0" err="1" smtClean="0"/>
               <a:t>git</a:t>
             </a:r>
+            <a:r>
+              <a:rPr lang="de-DE" dirty="0" smtClean="0"/>
+              <a:t>	</a:t>
+            </a:r>
             <a:endParaRPr lang="de-DE" dirty="0" smtClean="0"/>
           </a:p>
           <a:p>
@@ -7227,6 +8074,7 @@
               <a:rPr lang="de-DE" dirty="0" smtClean="0"/>
               <a:t>Idee</a:t>
             </a:r>
+            <a:endParaRPr lang="de-DE" dirty="0" smtClean="0"/>
           </a:p>
           <a:p>
             <a:pPr marL="788670" lvl="1" indent="-514350">
@@ -7319,22 +8167,11 @@
             </a:r>
             <a:r>
               <a:rPr lang="de-DE" dirty="0"/>
-              <a:t> Workflow</a:t>
-            </a:r>
-            <a:endParaRPr lang="de-DE" dirty="0" smtClean="0"/>
-          </a:p>
-          <a:p>
-            <a:pPr marL="788670" lvl="1" indent="-514350">
-              <a:buFont typeface="+mj-lt"/>
-              <a:buAutoNum type="arabicPeriod"/>
-            </a:pPr>
-            <a:r>
-              <a:rPr lang="de-DE" dirty="0" err="1"/>
-              <a:t>Gitflow</a:t>
-            </a:r>
-            <a:r>
-              <a:rPr lang="de-DE" dirty="0"/>
-              <a:t> Workflow</a:t>
+              <a:t> </a:t>
+            </a:r>
+            <a:r>
+              <a:rPr lang="de-DE" dirty="0" smtClean="0"/>
+              <a:t>Workflow</a:t>
             </a:r>
             <a:endParaRPr lang="de-DE" dirty="0" smtClean="0"/>
           </a:p>
@@ -7460,31 +8297,6 @@
       </p:grpSpPr>
       <p:sp>
         <p:nvSpPr>
-          <p:cNvPr id="2" name="Titel 1"/>
-          <p:cNvSpPr>
-            <a:spLocks noGrp="1"/>
-          </p:cNvSpPr>
-          <p:nvPr>
-            <p:ph type="title"/>
-          </p:nvPr>
-        </p:nvSpPr>
-        <p:spPr/>
-        <p:txBody>
-          <a:bodyPr>
-            <a:normAutofit/>
-          </a:bodyPr>
-          <a:lstStyle/>
-          <a:p>
-            <a:r>
-              <a:rPr lang="de-DE" dirty="0" smtClean="0"/>
-              <a:t>           - Idee</a:t>
-            </a:r>
-            <a:endParaRPr lang="de-DE" dirty="0"/>
-          </a:p>
-        </p:txBody>
-      </p:sp>
-      <p:sp>
-        <p:nvSpPr>
           <p:cNvPr id="3" name="Fußzeilenplatzhalter 2"/>
           <p:cNvSpPr>
             <a:spLocks noGrp="1"/>
@@ -7499,14 +8311,10 @@
           <a:lstStyle/>
           <a:p>
             <a:r>
-              <a:rPr lang="de-DE" dirty="0" err="1" smtClean="0"/>
-              <a:t>ePortfolio</a:t>
-            </a:r>
-            <a:r>
-              <a:rPr lang="de-DE" dirty="0" smtClean="0"/>
-              <a:t> von Mehmet Ali Incekara</a:t>
-            </a:r>
-            <a:endParaRPr lang="de-DE" dirty="0"/>
+              <a:rPr lang="de-DE" smtClean="0"/>
+              <a:t>ePortfolio von Mehmet Ali Incekara</a:t>
+            </a:r>
+            <a:endParaRPr lang="de-DE"/>
           </a:p>
         </p:txBody>
       </p:sp>
@@ -7533,48 +8341,16 @@
           </a:p>
         </p:txBody>
       </p:sp>
-      <p:sp>
-        <p:nvSpPr>
-          <p:cNvPr id="5" name="Inhaltsplatzhalter 4"/>
-          <p:cNvSpPr>
-            <a:spLocks noGrp="1"/>
-          </p:cNvSpPr>
-          <p:nvPr>
-            <p:ph sz="quarter" idx="1"/>
-          </p:nvPr>
-        </p:nvSpPr>
-        <p:spPr>
-          <a:xfrm>
-            <a:off x="2750804" y="6021288"/>
-            <a:ext cx="3642392" cy="319864"/>
-          </a:xfrm>
-        </p:spPr>
-        <p:txBody>
-          <a:bodyPr>
-            <a:normAutofit fontScale="70000" lnSpcReduction="20000"/>
-          </a:bodyPr>
-          <a:lstStyle/>
-          <a:p>
-            <a:pPr marL="0" indent="0">
-              <a:buNone/>
-            </a:pPr>
-            <a:r>
-              <a:rPr lang="de-DE" dirty="0" smtClean="0"/>
-              <a:t>verteiltes Versionsverwaltungssystem </a:t>
-            </a:r>
-          </a:p>
-        </p:txBody>
-      </p:sp>
       <p:pic>
         <p:nvPicPr>
-          <p:cNvPr id="1026" name="Picture 2" descr="Logo"/>
+          <p:cNvPr id="3074" name="Picture 2" descr="Logo"/>
           <p:cNvPicPr>
             <a:picLocks noChangeAspect="1" noChangeArrowheads="1"/>
           </p:cNvPicPr>
           <p:nvPr/>
         </p:nvPicPr>
         <p:blipFill>
-          <a:blip r:embed="rId3">
+          <a:blip r:embed="rId2">
             <a:extLst>
               <a:ext uri="{28A0092B-C50C-407E-A947-70E740481C1C}">
                 <a14:useLocalDpi xmlns:a14="http://schemas.microsoft.com/office/drawing/2010/main" val="0"/>
@@ -7588,8 +8364,8 @@
         </p:blipFill>
         <p:spPr bwMode="auto">
           <a:xfrm>
-            <a:off x="457200" y="519429"/>
-            <a:ext cx="1428750" cy="600076"/>
+            <a:off x="2691580" y="2643043"/>
+            <a:ext cx="3760840" cy="1571914"/>
           </a:xfrm>
           <a:prstGeom prst="rect">
             <a:avLst/>
@@ -7606,6 +8382,154 @@
           </a:extLst>
         </p:spPr>
       </p:pic>
+    </p:spTree>
+    <p:extLst>
+      <p:ext uri="{BB962C8B-B14F-4D97-AF65-F5344CB8AC3E}">
+        <p14:creationId xmlns:p14="http://schemas.microsoft.com/office/powerpoint/2010/main" val="3752332931"/>
+      </p:ext>
+    </p:extLst>
+  </p:cSld>
+  <p:clrMapOvr>
+    <a:masterClrMapping/>
+  </p:clrMapOvr>
+  <p:timing>
+    <p:tnLst>
+      <p:par>
+        <p:cTn id="1" dur="indefinite" restart="never" nodeType="tmRoot"/>
+      </p:par>
+    </p:tnLst>
+  </p:timing>
+</p:sld>
+</file>
+
+<file path=ppt/slides/slide4.xml><?xml version="1.0" encoding="utf-8"?>
+<p:sld xmlns:a="http://schemas.openxmlformats.org/drawingml/2006/main" xmlns:r="http://schemas.openxmlformats.org/officeDocument/2006/relationships" xmlns:p="http://schemas.openxmlformats.org/presentationml/2006/main">
+  <p:cSld>
+    <p:spTree>
+      <p:nvGrpSpPr>
+        <p:cNvPr id="1" name=""/>
+        <p:cNvGrpSpPr/>
+        <p:nvPr/>
+      </p:nvGrpSpPr>
+      <p:grpSpPr>
+        <a:xfrm>
+          <a:off x="0" y="0"/>
+          <a:ext cx="0" cy="0"/>
+          <a:chOff x="0" y="0"/>
+          <a:chExt cx="0" cy="0"/>
+        </a:xfrm>
+      </p:grpSpPr>
+      <p:sp>
+        <p:nvSpPr>
+          <p:cNvPr id="2" name="Titel 1"/>
+          <p:cNvSpPr>
+            <a:spLocks noGrp="1"/>
+          </p:cNvSpPr>
+          <p:nvPr>
+            <p:ph type="title"/>
+          </p:nvPr>
+        </p:nvSpPr>
+        <p:spPr/>
+        <p:txBody>
+          <a:bodyPr>
+            <a:normAutofit/>
+          </a:bodyPr>
+          <a:lstStyle/>
+          <a:p>
+            <a:r>
+              <a:rPr lang="de-DE" dirty="0"/>
+              <a:t>I</a:t>
+            </a:r>
+            <a:r>
+              <a:rPr lang="de-DE" dirty="0" smtClean="0"/>
+              <a:t>dee</a:t>
+            </a:r>
+            <a:endParaRPr lang="de-DE" dirty="0"/>
+          </a:p>
+        </p:txBody>
+      </p:sp>
+      <p:sp>
+        <p:nvSpPr>
+          <p:cNvPr id="3" name="Fußzeilenplatzhalter 2"/>
+          <p:cNvSpPr>
+            <a:spLocks noGrp="1"/>
+          </p:cNvSpPr>
+          <p:nvPr>
+            <p:ph type="ftr" sz="quarter" idx="11"/>
+          </p:nvPr>
+        </p:nvSpPr>
+        <p:spPr/>
+        <p:txBody>
+          <a:bodyPr/>
+          <a:lstStyle/>
+          <a:p>
+            <a:r>
+              <a:rPr lang="de-DE" dirty="0" err="1" smtClean="0"/>
+              <a:t>ePortfolio</a:t>
+            </a:r>
+            <a:r>
+              <a:rPr lang="de-DE" dirty="0" smtClean="0"/>
+              <a:t> von Mehmet Ali Incekara</a:t>
+            </a:r>
+            <a:endParaRPr lang="de-DE" dirty="0"/>
+          </a:p>
+        </p:txBody>
+      </p:sp>
+      <p:sp>
+        <p:nvSpPr>
+          <p:cNvPr id="4" name="Foliennummernplatzhalter 3"/>
+          <p:cNvSpPr>
+            <a:spLocks noGrp="1"/>
+          </p:cNvSpPr>
+          <p:nvPr>
+            <p:ph type="sldNum" sz="quarter" idx="12"/>
+          </p:nvPr>
+        </p:nvSpPr>
+        <p:spPr/>
+        <p:txBody>
+          <a:bodyPr/>
+          <a:lstStyle/>
+          <a:p>
+            <a:fld id="{32988457-9EFF-4998-891D-85ECFB4B79A4}" type="slidenum">
+              <a:rPr lang="de-DE" smtClean="0"/>
+              <a:t>4</a:t>
+            </a:fld>
+            <a:endParaRPr lang="de-DE"/>
+          </a:p>
+        </p:txBody>
+      </p:sp>
+      <p:sp>
+        <p:nvSpPr>
+          <p:cNvPr id="5" name="Inhaltsplatzhalter 4"/>
+          <p:cNvSpPr>
+            <a:spLocks noGrp="1"/>
+          </p:cNvSpPr>
+          <p:nvPr>
+            <p:ph sz="quarter" idx="1"/>
+          </p:nvPr>
+        </p:nvSpPr>
+        <p:spPr>
+          <a:xfrm>
+            <a:off x="2750804" y="6021288"/>
+            <a:ext cx="3642392" cy="319864"/>
+          </a:xfrm>
+        </p:spPr>
+        <p:txBody>
+          <a:bodyPr>
+            <a:normAutofit fontScale="70000" lnSpcReduction="20000"/>
+          </a:bodyPr>
+          <a:lstStyle/>
+          <a:p>
+            <a:pPr marL="0" indent="0">
+              <a:buNone/>
+            </a:pPr>
+            <a:r>
+              <a:rPr lang="de-DE" dirty="0" smtClean="0"/>
+              <a:t>verteiltes Versionsverwaltungssystem </a:t>
+            </a:r>
+          </a:p>
+        </p:txBody>
+      </p:sp>
       <p:pic>
         <p:nvPicPr>
           <p:cNvPr id="8" name="Picture 2" descr="http://git-scm.com/figures/18333fig0103-tn.png"/>
@@ -7615,7 +8539,7 @@
           <p:nvPr/>
         </p:nvPicPr>
         <p:blipFill>
-          <a:blip r:embed="rId4">
+          <a:blip r:embed="rId3">
             <a:extLst>
               <a:ext uri="{28A0092B-C50C-407E-A947-70E740481C1C}">
                 <a14:useLocalDpi xmlns:a14="http://schemas.microsoft.com/office/drawing/2010/main" val="0"/>
@@ -7667,7 +8591,7 @@
 </p:sld>
 </file>
 
-<file path=ppt/slides/slide4.xml><?xml version="1.0" encoding="utf-8"?>
+<file path=ppt/slides/slide5.xml><?xml version="1.0" encoding="utf-8"?>
 <p:sld xmlns:a="http://schemas.openxmlformats.org/drawingml/2006/main" xmlns:r="http://schemas.openxmlformats.org/officeDocument/2006/relationships" xmlns:p="http://schemas.openxmlformats.org/presentationml/2006/main">
   <p:cSld>
     <p:spTree>
@@ -7703,7 +8627,7 @@
           <a:p>
             <a:r>
               <a:rPr lang="de-DE" dirty="0" smtClean="0"/>
-              <a:t>           - Eigenschaften</a:t>
+              <a:t>Eigenschaften</a:t>
             </a:r>
             <a:endParaRPr lang="de-DE" dirty="0"/>
           </a:p>
@@ -7749,7 +8673,7 @@
           <a:p>
             <a:fld id="{32988457-9EFF-4998-891D-85ECFB4B79A4}" type="slidenum">
               <a:rPr lang="de-DE" smtClean="0"/>
-              <a:t>4</a:t>
+              <a:t>5</a:t>
             </a:fld>
             <a:endParaRPr lang="de-DE"/>
           </a:p>
@@ -7767,15 +8691,17 @@
         </p:nvSpPr>
         <p:spPr/>
         <p:txBody>
-          <a:bodyPr/>
-          <a:lstStyle/>
-          <a:p>
-            <a:r>
-              <a:rPr lang="de-DE" dirty="0"/>
+          <a:bodyPr>
+            <a:normAutofit/>
+          </a:bodyPr>
+          <a:lstStyle/>
+          <a:p>
+            <a:r>
+              <a:rPr lang="de-DE" sz="2400" dirty="0"/>
               <a:t>n</a:t>
             </a:r>
             <a:r>
-              <a:rPr lang="de-DE" dirty="0" smtClean="0"/>
+              <a:rPr lang="de-DE" sz="2400" dirty="0" smtClean="0"/>
               <a:t>icht-lineare Entwicklung</a:t>
             </a:r>
           </a:p>
@@ -7783,103 +8709,62 @@
             <a:pPr marL="0" indent="0">
               <a:buNone/>
             </a:pPr>
-            <a:endParaRPr lang="de-DE" dirty="0"/>
-          </a:p>
-          <a:p>
-            <a:r>
-              <a:rPr lang="de-DE" dirty="0"/>
+            <a:endParaRPr lang="de-DE" sz="2400" dirty="0"/>
+          </a:p>
+          <a:p>
+            <a:r>
+              <a:rPr lang="de-DE" sz="2400" dirty="0"/>
               <a:t>v</a:t>
             </a:r>
             <a:r>
-              <a:rPr lang="de-DE" dirty="0" smtClean="0"/>
+              <a:rPr lang="de-DE" sz="2400" dirty="0" smtClean="0"/>
               <a:t>erteilte Entwicklung</a:t>
             </a:r>
           </a:p>
           <a:p>
-            <a:endParaRPr lang="de-DE" dirty="0"/>
-          </a:p>
-          <a:p>
-            <a:r>
-              <a:rPr lang="de-DE" dirty="0" smtClean="0"/>
+            <a:endParaRPr lang="de-DE" sz="2400" dirty="0"/>
+          </a:p>
+          <a:p>
+            <a:r>
+              <a:rPr lang="de-DE" sz="2400" dirty="0" smtClean="0"/>
               <a:t>Datentransfer zwischen </a:t>
             </a:r>
             <a:r>
-              <a:rPr lang="de-DE" dirty="0" err="1" smtClean="0"/>
+              <a:rPr lang="de-DE" sz="2400" dirty="0" err="1" smtClean="0"/>
               <a:t>Repositories</a:t>
             </a:r>
-            <a:endParaRPr lang="de-DE" dirty="0" smtClean="0"/>
-          </a:p>
-          <a:p>
-            <a:endParaRPr lang="de-DE" dirty="0"/>
-          </a:p>
-          <a:p>
-            <a:r>
-              <a:rPr lang="de-DE" dirty="0" smtClean="0"/>
+            <a:endParaRPr lang="de-DE" sz="2400" dirty="0" smtClean="0"/>
+          </a:p>
+          <a:p>
+            <a:endParaRPr lang="de-DE" sz="2400" dirty="0"/>
+          </a:p>
+          <a:p>
+            <a:r>
+              <a:rPr lang="de-DE" sz="2400" dirty="0" smtClean="0"/>
               <a:t>kryptografische </a:t>
             </a:r>
             <a:r>
-              <a:rPr lang="de-DE" dirty="0"/>
+              <a:rPr lang="de-DE" sz="2400" dirty="0"/>
               <a:t>Sicherheit der </a:t>
             </a:r>
             <a:r>
-              <a:rPr lang="de-DE" dirty="0" smtClean="0"/>
+              <a:rPr lang="de-DE" sz="2400" dirty="0" smtClean="0"/>
               <a:t>Historie</a:t>
             </a:r>
-            <a:endParaRPr lang="de-DE" dirty="0"/>
-          </a:p>
-          <a:p>
-            <a:endParaRPr lang="de-DE" dirty="0" smtClean="0"/>
-          </a:p>
-          <a:p>
-            <a:r>
-              <a:rPr lang="de-DE" dirty="0" smtClean="0"/>
+            <a:endParaRPr lang="de-DE" sz="2400" dirty="0"/>
+          </a:p>
+          <a:p>
+            <a:endParaRPr lang="de-DE" sz="2400" dirty="0" smtClean="0"/>
+          </a:p>
+          <a:p>
+            <a:r>
+              <a:rPr lang="de-DE" sz="2400" dirty="0" smtClean="0"/>
               <a:t>effiziente Bearbeitung von großen Projekten</a:t>
             </a:r>
-            <a:endParaRPr lang="de-DE" dirty="0"/>
-          </a:p>
-        </p:txBody>
-      </p:sp>
-      <p:pic>
-        <p:nvPicPr>
-          <p:cNvPr id="1026" name="Picture 2" descr="Logo"/>
-          <p:cNvPicPr>
-            <a:picLocks noChangeAspect="1" noChangeArrowheads="1"/>
-          </p:cNvPicPr>
-          <p:nvPr/>
-        </p:nvPicPr>
-        <p:blipFill>
-          <a:blip r:embed="rId3">
-            <a:extLst>
-              <a:ext uri="{28A0092B-C50C-407E-A947-70E740481C1C}">
-                <a14:useLocalDpi xmlns:a14="http://schemas.microsoft.com/office/drawing/2010/main" val="0"/>
-              </a:ext>
-            </a:extLst>
-          </a:blip>
-          <a:srcRect/>
-          <a:stretch>
-            <a:fillRect/>
-          </a:stretch>
-        </p:blipFill>
-        <p:spPr bwMode="auto">
-          <a:xfrm>
-            <a:off x="457200" y="519429"/>
-            <a:ext cx="1428750" cy="600076"/>
-          </a:xfrm>
-          <a:prstGeom prst="rect">
-            <a:avLst/>
-          </a:prstGeom>
-          <a:noFill/>
-          <a:extLst>
-            <a:ext uri="{909E8E84-426E-40DD-AFC4-6F175D3DCCD1}">
-              <a14:hiddenFill xmlns:a14="http://schemas.microsoft.com/office/drawing/2010/main">
-                <a:solidFill>
-                  <a:srgbClr val="FFFFFF"/>
-                </a:solidFill>
-              </a14:hiddenFill>
-            </a:ext>
-          </a:extLst>
-        </p:spPr>
-      </p:pic>
+            <a:endParaRPr lang="de-DE" sz="2400" dirty="0"/>
+          </a:p>
+        </p:txBody>
+      </p:sp>
     </p:spTree>
     <p:extLst>
       <p:ext uri="{BB962C8B-B14F-4D97-AF65-F5344CB8AC3E}">
@@ -8195,7 +9080,7 @@
 </p:sld>
 </file>
 
-<file path=ppt/slides/slide5.xml><?xml version="1.0" encoding="utf-8"?>
+<file path=ppt/slides/slide6.xml><?xml version="1.0" encoding="utf-8"?>
 <p:sld xmlns:a="http://schemas.openxmlformats.org/drawingml/2006/main" xmlns:r="http://schemas.openxmlformats.org/officeDocument/2006/relationships" xmlns:p="http://schemas.openxmlformats.org/presentationml/2006/main">
   <p:cSld>
     <p:spTree>
@@ -8231,7 +9116,7 @@
           <a:p>
             <a:r>
               <a:rPr lang="de-DE" dirty="0" smtClean="0"/>
-              <a:t>           - Funktionsweise</a:t>
+              <a:t>Funktionsweise</a:t>
             </a:r>
             <a:endParaRPr lang="de-DE" dirty="0"/>
           </a:p>
@@ -8277,7 +9162,7 @@
           <a:p>
             <a:fld id="{32988457-9EFF-4998-891D-85ECFB4B79A4}" type="slidenum">
               <a:rPr lang="de-DE" smtClean="0"/>
-              <a:t>5</a:t>
+              <a:t>6</a:t>
             </a:fld>
             <a:endParaRPr lang="de-DE"/>
           </a:p>
@@ -8404,15 +9289,7 @@
                       </a:r>
                       <a:r>
                         <a:rPr lang="de-DE" sz="1400" b="0" baseline="0" dirty="0" smtClean="0"/>
-                        <a:t>Dateien(Snapshots) </a:t>
-                      </a:r>
-                      <a:r>
-                        <a:rPr lang="de-DE" sz="1400" b="0" baseline="0" dirty="0" smtClean="0"/>
-                        <a:t>für den nächsten </a:t>
-                      </a:r>
-                      <a:r>
-                        <a:rPr lang="de-DE" sz="1400" b="0" baseline="0" dirty="0" smtClean="0"/>
-                        <a:t>Commit</a:t>
+                        <a:t>Dateien(Snapshots) für den nächsten Commit</a:t>
                       </a:r>
                       <a:endParaRPr lang="de-DE" sz="1400" b="0" dirty="0"/>
                     </a:p>
@@ -8473,11 +9350,7 @@
                       </a:r>
                       <a:r>
                         <a:rPr lang="de-DE" sz="1400" b="0" baseline="0" dirty="0" smtClean="0"/>
-                        <a:t>Snapshots </a:t>
-                      </a:r>
-                      <a:r>
-                        <a:rPr lang="de-DE" sz="1400" b="0" baseline="0" dirty="0" smtClean="0"/>
-                        <a:t>werden dauerhaft im </a:t>
+                        <a:t>Snapshots werden dauerhaft im </a:t>
                       </a:r>
                       <a:r>
                         <a:rPr lang="de-DE" sz="1400" b="0" baseline="0" dirty="0" err="1" smtClean="0"/>
@@ -8499,7 +9372,7 @@
       </p:graphicFrame>
       <p:pic>
         <p:nvPicPr>
-          <p:cNvPr id="1026" name="Picture 2" descr="Logo"/>
+          <p:cNvPr id="3076" name="Picture 4" descr="http://git-scm.com/figures/18333fig0106-tn.png"/>
           <p:cNvPicPr>
             <a:picLocks noChangeAspect="1" noChangeArrowheads="1"/>
           </p:cNvPicPr>
@@ -8507,47 +9380,6 @@
         </p:nvPicPr>
         <p:blipFill>
           <a:blip r:embed="rId2">
-            <a:extLst>
-              <a:ext uri="{28A0092B-C50C-407E-A947-70E740481C1C}">
-                <a14:useLocalDpi xmlns:a14="http://schemas.microsoft.com/office/drawing/2010/main" val="0"/>
-              </a:ext>
-            </a:extLst>
-          </a:blip>
-          <a:srcRect/>
-          <a:stretch>
-            <a:fillRect/>
-          </a:stretch>
-        </p:blipFill>
-        <p:spPr bwMode="auto">
-          <a:xfrm>
-            <a:off x="457200" y="519429"/>
-            <a:ext cx="1428750" cy="600076"/>
-          </a:xfrm>
-          <a:prstGeom prst="rect">
-            <a:avLst/>
-          </a:prstGeom>
-          <a:noFill/>
-          <a:extLst>
-            <a:ext uri="{909E8E84-426E-40DD-AFC4-6F175D3DCCD1}">
-              <a14:hiddenFill xmlns:a14="http://schemas.microsoft.com/office/drawing/2010/main">
-                <a:solidFill>
-                  <a:srgbClr val="FFFFFF"/>
-                </a:solidFill>
-              </a14:hiddenFill>
-            </a:ext>
-          </a:extLst>
-        </p:spPr>
-      </p:pic>
-      <p:pic>
-        <p:nvPicPr>
-          <p:cNvPr id="3076" name="Picture 4" descr="http://git-scm.com/figures/18333fig0106-tn.png"/>
-          <p:cNvPicPr>
-            <a:picLocks noChangeAspect="1" noChangeArrowheads="1"/>
-          </p:cNvPicPr>
-          <p:nvPr/>
-        </p:nvPicPr>
-        <p:blipFill>
-          <a:blip r:embed="rId3">
             <a:extLst>
               <a:ext uri="{28A0092B-C50C-407E-A947-70E740481C1C}">
                 <a14:useLocalDpi xmlns:a14="http://schemas.microsoft.com/office/drawing/2010/main" val="0"/>
@@ -8599,7 +9431,7 @@
 </p:sld>
 </file>
 
-<file path=ppt/slides/slide6.xml><?xml version="1.0" encoding="utf-8"?>
+<file path=ppt/slides/slide7.xml><?xml version="1.0" encoding="utf-8"?>
 <p:sld xmlns:a="http://schemas.openxmlformats.org/drawingml/2006/main" xmlns:r="http://schemas.openxmlformats.org/officeDocument/2006/relationships" xmlns:p="http://schemas.openxmlformats.org/presentationml/2006/main">
   <p:cSld>
     <p:spTree>
@@ -8618,39 +9450,6 @@
       </p:grpSpPr>
       <p:sp>
         <p:nvSpPr>
-          <p:cNvPr id="2" name="Titel 1"/>
-          <p:cNvSpPr>
-            <a:spLocks noGrp="1"/>
-          </p:cNvSpPr>
-          <p:nvPr>
-            <p:ph type="title"/>
-          </p:nvPr>
-        </p:nvSpPr>
-        <p:spPr/>
-        <p:txBody>
-          <a:bodyPr>
-            <a:normAutofit/>
-          </a:bodyPr>
-          <a:lstStyle/>
-          <a:p>
-            <a:r>
-              <a:rPr lang="de-DE" dirty="0" smtClean="0"/>
-              <a:t>            </a:t>
-            </a:r>
-            <a:r>
-              <a:rPr lang="de-DE" dirty="0"/>
-              <a:t> </a:t>
-            </a:r>
-            <a:r>
-              <a:rPr lang="de-DE" dirty="0" smtClean="0"/>
-              <a:t>   - Idee</a:t>
-            </a:r>
-            <a:endParaRPr lang="de-DE" dirty="0"/>
-          </a:p>
-        </p:txBody>
-      </p:sp>
-      <p:sp>
-        <p:nvSpPr>
           <p:cNvPr id="3" name="Fußzeilenplatzhalter 2"/>
           <p:cNvSpPr>
             <a:spLocks noGrp="1"/>
@@ -8689,124 +9488,35 @@
           <a:p>
             <a:fld id="{32988457-9EFF-4998-891D-85ECFB4B79A4}" type="slidenum">
               <a:rPr lang="de-DE" smtClean="0"/>
-              <a:t>6</a:t>
+              <a:t>7</a:t>
             </a:fld>
             <a:endParaRPr lang="de-DE"/>
           </a:p>
         </p:txBody>
       </p:sp>
-      <p:sp>
-        <p:nvSpPr>
-          <p:cNvPr id="5" name="Inhaltsplatzhalter 4"/>
-          <p:cNvSpPr>
-            <a:spLocks noGrp="1"/>
-          </p:cNvSpPr>
-          <p:nvPr>
-            <p:ph sz="quarter" idx="1"/>
-          </p:nvPr>
-        </p:nvSpPr>
-        <p:spPr/>
-        <p:txBody>
-          <a:bodyPr/>
-          <a:lstStyle/>
-          <a:p>
-            <a:r>
-              <a:rPr lang="de-DE" dirty="0" smtClean="0"/>
-              <a:t>webbasierter </a:t>
-            </a:r>
-            <a:r>
-              <a:rPr lang="de-DE" dirty="0" err="1" smtClean="0"/>
-              <a:t>Hostingservice</a:t>
-            </a:r>
-            <a:r>
-              <a:rPr lang="de-DE" dirty="0" smtClean="0"/>
-              <a:t> </a:t>
-            </a:r>
-          </a:p>
-          <a:p>
-            <a:endParaRPr lang="de-DE" dirty="0" smtClean="0"/>
-          </a:p>
-          <a:p>
-            <a:r>
-              <a:rPr lang="de-DE" dirty="0" err="1" smtClean="0"/>
-              <a:t>Git</a:t>
-            </a:r>
-            <a:r>
-              <a:rPr lang="de-DE" dirty="0" smtClean="0"/>
-              <a:t> als grafische Oberfläche</a:t>
-            </a:r>
-          </a:p>
-          <a:p>
-            <a:endParaRPr lang="de-DE" dirty="0" smtClean="0"/>
-          </a:p>
-          <a:p>
-            <a:r>
-              <a:rPr lang="de-DE" dirty="0" smtClean="0"/>
-              <a:t>Erweiterung um Komponenten von Sozialen Netzwerken</a:t>
-            </a:r>
-          </a:p>
-          <a:p>
-            <a:endParaRPr lang="de-DE" dirty="0" smtClean="0"/>
-          </a:p>
-          <a:p>
-            <a:r>
-              <a:rPr lang="de-DE" dirty="0" smtClean="0"/>
-              <a:t>Tools für Projektmanagement</a:t>
-            </a:r>
-          </a:p>
-          <a:p>
-            <a:endParaRPr lang="de-DE" dirty="0"/>
-          </a:p>
-          <a:p>
-            <a:r>
-              <a:rPr lang="de-DE" dirty="0" smtClean="0"/>
-              <a:t>Alternativen: </a:t>
-            </a:r>
-            <a:r>
-              <a:rPr lang="de-DE" dirty="0" err="1" smtClean="0"/>
-              <a:t>Gitlab</a:t>
-            </a:r>
-            <a:r>
-              <a:rPr lang="de-DE" dirty="0" smtClean="0"/>
-              <a:t>, </a:t>
-            </a:r>
-            <a:r>
-              <a:rPr lang="de-DE" dirty="0" err="1" smtClean="0"/>
-              <a:t>Bitbucket</a:t>
-            </a:r>
-            <a:r>
-              <a:rPr lang="de-DE" dirty="0" smtClean="0"/>
-              <a:t>, …</a:t>
-            </a:r>
-            <a:endParaRPr lang="de-DE" dirty="0"/>
-          </a:p>
-        </p:txBody>
-      </p:sp>
       <p:pic>
         <p:nvPicPr>
-          <p:cNvPr id="2050" name="Picture 2" descr="GitHub logo 2013 padded.svg"/>
+          <p:cNvPr id="1026" name="Picture 2" descr="http://og.github.com/mark/github-mark@1200x630.png"/>
           <p:cNvPicPr>
             <a:picLocks noChangeAspect="1" noChangeArrowheads="1"/>
           </p:cNvPicPr>
           <p:nvPr/>
         </p:nvPicPr>
-        <p:blipFill>
-          <a:blip r:embed="rId2">
+        <p:blipFill rotWithShape="1">
+          <a:blip r:embed="rId2" cstate="print">
             <a:extLst>
               <a:ext uri="{28A0092B-C50C-407E-A947-70E740481C1C}">
                 <a14:useLocalDpi xmlns:a14="http://schemas.microsoft.com/office/drawing/2010/main" val="0"/>
               </a:ext>
             </a:extLst>
           </a:blip>
-          <a:srcRect/>
-          <a:stretch>
-            <a:fillRect/>
-          </a:stretch>
+          <a:srcRect l="22793" r="22059"/>
+          <a:stretch/>
         </p:blipFill>
         <p:spPr bwMode="auto">
           <a:xfrm>
-            <a:off x="457200" y="405600"/>
-            <a:ext cx="2095500" cy="619126"/>
+            <a:off x="5724128" y="2572431"/>
+            <a:ext cx="1800200" cy="1713138"/>
           </a:xfrm>
           <a:prstGeom prst="rect">
             <a:avLst/>
@@ -8823,6 +9533,244 @@
           </a:extLst>
         </p:spPr>
       </p:pic>
+      <p:pic>
+        <p:nvPicPr>
+          <p:cNvPr id="1028" name="Picture 4" descr="GitHub logo 2013.svg"/>
+          <p:cNvPicPr>
+            <a:picLocks noChangeAspect="1" noChangeArrowheads="1"/>
+          </p:cNvPicPr>
+          <p:nvPr/>
+        </p:nvPicPr>
+        <p:blipFill>
+          <a:blip r:embed="rId3">
+            <a:extLst>
+              <a:ext uri="{28A0092B-C50C-407E-A947-70E740481C1C}">
+                <a14:useLocalDpi xmlns:a14="http://schemas.microsoft.com/office/drawing/2010/main" val="0"/>
+              </a:ext>
+            </a:extLst>
+          </a:blip>
+          <a:srcRect/>
+          <a:stretch>
+            <a:fillRect/>
+          </a:stretch>
+        </p:blipFill>
+        <p:spPr bwMode="auto">
+          <a:xfrm>
+            <a:off x="1574608" y="2917420"/>
+            <a:ext cx="3789480" cy="1023160"/>
+          </a:xfrm>
+          <a:prstGeom prst="rect">
+            <a:avLst/>
+          </a:prstGeom>
+          <a:noFill/>
+          <a:extLst>
+            <a:ext uri="{909E8E84-426E-40DD-AFC4-6F175D3DCCD1}">
+              <a14:hiddenFill xmlns:a14="http://schemas.microsoft.com/office/drawing/2010/main">
+                <a:solidFill>
+                  <a:srgbClr val="FFFFFF"/>
+                </a:solidFill>
+              </a14:hiddenFill>
+            </a:ext>
+          </a:extLst>
+        </p:spPr>
+      </p:pic>
+    </p:spTree>
+    <p:extLst>
+      <p:ext uri="{BB962C8B-B14F-4D97-AF65-F5344CB8AC3E}">
+        <p14:creationId xmlns:p14="http://schemas.microsoft.com/office/powerpoint/2010/main" val="3324190970"/>
+      </p:ext>
+    </p:extLst>
+  </p:cSld>
+  <p:clrMapOvr>
+    <a:masterClrMapping/>
+  </p:clrMapOvr>
+  <p:timing>
+    <p:tnLst>
+      <p:par>
+        <p:cTn id="1" dur="indefinite" restart="never" nodeType="tmRoot"/>
+      </p:par>
+    </p:tnLst>
+  </p:timing>
+</p:sld>
+</file>
+
+<file path=ppt/slides/slide8.xml><?xml version="1.0" encoding="utf-8"?>
+<p:sld xmlns:a="http://schemas.openxmlformats.org/drawingml/2006/main" xmlns:r="http://schemas.openxmlformats.org/officeDocument/2006/relationships" xmlns:p="http://schemas.openxmlformats.org/presentationml/2006/main">
+  <p:cSld>
+    <p:spTree>
+      <p:nvGrpSpPr>
+        <p:cNvPr id="1" name=""/>
+        <p:cNvGrpSpPr/>
+        <p:nvPr/>
+      </p:nvGrpSpPr>
+      <p:grpSpPr>
+        <a:xfrm>
+          <a:off x="0" y="0"/>
+          <a:ext cx="0" cy="0"/>
+          <a:chOff x="0" y="0"/>
+          <a:chExt cx="0" cy="0"/>
+        </a:xfrm>
+      </p:grpSpPr>
+      <p:sp>
+        <p:nvSpPr>
+          <p:cNvPr id="2" name="Titel 1"/>
+          <p:cNvSpPr>
+            <a:spLocks noGrp="1"/>
+          </p:cNvSpPr>
+          <p:nvPr>
+            <p:ph type="title"/>
+          </p:nvPr>
+        </p:nvSpPr>
+        <p:spPr/>
+        <p:txBody>
+          <a:bodyPr>
+            <a:normAutofit/>
+          </a:bodyPr>
+          <a:lstStyle/>
+          <a:p>
+            <a:r>
+              <a:rPr lang="de-DE" dirty="0" smtClean="0"/>
+              <a:t>Idee</a:t>
+            </a:r>
+            <a:endParaRPr lang="de-DE" dirty="0"/>
+          </a:p>
+        </p:txBody>
+      </p:sp>
+      <p:sp>
+        <p:nvSpPr>
+          <p:cNvPr id="3" name="Fußzeilenplatzhalter 2"/>
+          <p:cNvSpPr>
+            <a:spLocks noGrp="1"/>
+          </p:cNvSpPr>
+          <p:nvPr>
+            <p:ph type="ftr" sz="quarter" idx="11"/>
+          </p:nvPr>
+        </p:nvSpPr>
+        <p:spPr/>
+        <p:txBody>
+          <a:bodyPr/>
+          <a:lstStyle/>
+          <a:p>
+            <a:r>
+              <a:rPr lang="de-DE" smtClean="0"/>
+              <a:t>ePortfolio von Mehmet Ali Incekara</a:t>
+            </a:r>
+            <a:endParaRPr lang="de-DE"/>
+          </a:p>
+        </p:txBody>
+      </p:sp>
+      <p:sp>
+        <p:nvSpPr>
+          <p:cNvPr id="4" name="Foliennummernplatzhalter 3"/>
+          <p:cNvSpPr>
+            <a:spLocks noGrp="1"/>
+          </p:cNvSpPr>
+          <p:nvPr>
+            <p:ph type="sldNum" sz="quarter" idx="12"/>
+          </p:nvPr>
+        </p:nvSpPr>
+        <p:spPr/>
+        <p:txBody>
+          <a:bodyPr/>
+          <a:lstStyle/>
+          <a:p>
+            <a:fld id="{32988457-9EFF-4998-891D-85ECFB4B79A4}" type="slidenum">
+              <a:rPr lang="de-DE" smtClean="0"/>
+              <a:t>8</a:t>
+            </a:fld>
+            <a:endParaRPr lang="de-DE"/>
+          </a:p>
+        </p:txBody>
+      </p:sp>
+      <p:sp>
+        <p:nvSpPr>
+          <p:cNvPr id="5" name="Inhaltsplatzhalter 4"/>
+          <p:cNvSpPr>
+            <a:spLocks noGrp="1"/>
+          </p:cNvSpPr>
+          <p:nvPr>
+            <p:ph sz="quarter" idx="1"/>
+          </p:nvPr>
+        </p:nvSpPr>
+        <p:spPr/>
+        <p:txBody>
+          <a:bodyPr>
+            <a:normAutofit/>
+          </a:bodyPr>
+          <a:lstStyle/>
+          <a:p>
+            <a:r>
+              <a:rPr lang="de-DE" sz="2400" dirty="0" smtClean="0"/>
+              <a:t>webbasierter </a:t>
+            </a:r>
+            <a:r>
+              <a:rPr lang="de-DE" sz="2400" dirty="0" err="1" smtClean="0"/>
+              <a:t>Hostingservice</a:t>
+            </a:r>
+            <a:r>
+              <a:rPr lang="de-DE" sz="2400" dirty="0" smtClean="0"/>
+              <a:t> </a:t>
+            </a:r>
+          </a:p>
+          <a:p>
+            <a:endParaRPr lang="de-DE" sz="2400" dirty="0" smtClean="0"/>
+          </a:p>
+          <a:p>
+            <a:r>
+              <a:rPr lang="de-DE" sz="2400" dirty="0" err="1" smtClean="0"/>
+              <a:t>Git</a:t>
+            </a:r>
+            <a:r>
+              <a:rPr lang="de-DE" sz="2400" dirty="0" smtClean="0"/>
+              <a:t> als grafische Oberfläche</a:t>
+            </a:r>
+          </a:p>
+          <a:p>
+            <a:endParaRPr lang="de-DE" sz="2400" dirty="0" smtClean="0"/>
+          </a:p>
+          <a:p>
+            <a:r>
+              <a:rPr lang="de-DE" sz="2400" dirty="0" smtClean="0"/>
+              <a:t>Erweiterung um Komponenten von Sozialen Netzwerken</a:t>
+            </a:r>
+          </a:p>
+          <a:p>
+            <a:endParaRPr lang="de-DE" sz="2400" dirty="0" smtClean="0"/>
+          </a:p>
+          <a:p>
+            <a:r>
+              <a:rPr lang="de-DE" sz="2400" dirty="0" smtClean="0"/>
+              <a:t>Tools für Projektmanagement</a:t>
+            </a:r>
+          </a:p>
+          <a:p>
+            <a:endParaRPr lang="de-DE" sz="2400" dirty="0"/>
+          </a:p>
+          <a:p>
+            <a:r>
+              <a:rPr lang="de-DE" sz="2400" dirty="0" smtClean="0"/>
+              <a:t>Alternativen: </a:t>
+            </a:r>
+            <a:r>
+              <a:rPr lang="de-DE" sz="2400" dirty="0" err="1" smtClean="0"/>
+              <a:t>Gitlab</a:t>
+            </a:r>
+            <a:r>
+              <a:rPr lang="de-DE" sz="2400" dirty="0" smtClean="0"/>
+              <a:t>, </a:t>
+            </a:r>
+            <a:r>
+              <a:rPr lang="de-DE" sz="2400" dirty="0" err="1" smtClean="0"/>
+              <a:t>Bitbucket</a:t>
+            </a:r>
+            <a:r>
+              <a:rPr lang="de-DE" sz="2400" dirty="0" smtClean="0"/>
+              <a:t>, …</a:t>
+            </a:r>
+            <a:endParaRPr lang="de-DE" sz="2400" dirty="0"/>
+          </a:p>
+        </p:txBody>
+      </p:sp>
     </p:spTree>
     <p:extLst>
       <p:ext uri="{BB962C8B-B14F-4D97-AF65-F5344CB8AC3E}">
@@ -9153,7 +10101,7 @@
 </p:sld>
 </file>
 
-<file path=ppt/slides/slide7.xml><?xml version="1.0" encoding="utf-8"?>
+<file path=ppt/slides/slide9.xml><?xml version="1.0" encoding="utf-8"?>
 <p:sld xmlns:a="http://schemas.openxmlformats.org/drawingml/2006/main" xmlns:r="http://schemas.openxmlformats.org/officeDocument/2006/relationships" xmlns:p="http://schemas.openxmlformats.org/presentationml/2006/main">
   <p:cSld>
     <p:spTree>
@@ -9189,15 +10137,7 @@
           <a:p>
             <a:r>
               <a:rPr lang="de-DE" dirty="0" smtClean="0"/>
-              <a:t>            </a:t>
-            </a:r>
-            <a:r>
-              <a:rPr lang="de-DE" dirty="0"/>
-              <a:t> </a:t>
-            </a:r>
-            <a:r>
-              <a:rPr lang="de-DE" dirty="0" smtClean="0"/>
-              <a:t>   - Nutzung</a:t>
+              <a:t>Nutzung</a:t>
             </a:r>
             <a:endParaRPr lang="de-DE" dirty="0"/>
           </a:p>
@@ -9243,7 +10183,7 @@
           <a:p>
             <a:fld id="{32988457-9EFF-4998-891D-85ECFB4B79A4}" type="slidenum">
               <a:rPr lang="de-DE" smtClean="0"/>
-              <a:t>7</a:t>
+              <a:t>9</a:t>
             </a:fld>
             <a:endParaRPr lang="de-DE"/>
           </a:p>
@@ -9285,7 +10225,7 @@
       </p:sp>
       <p:pic>
         <p:nvPicPr>
-          <p:cNvPr id="2050" name="Picture 2" descr="GitHub logo 2013 padded.svg"/>
+          <p:cNvPr id="1027" name="Picture 3" descr="C:\Users\mincekara\Desktop\2015-10-12 14_18_26-GitHub · Where software is built.png"/>
           <p:cNvPicPr>
             <a:picLocks noChangeAspect="1" noChangeArrowheads="1"/>
           </p:cNvPicPr>
@@ -9306,48 +10246,7 @@
         </p:blipFill>
         <p:spPr bwMode="auto">
           <a:xfrm>
-            <a:off x="457200" y="405600"/>
-            <a:ext cx="2095500" cy="619126"/>
-          </a:xfrm>
-          <a:prstGeom prst="rect">
-            <a:avLst/>
-          </a:prstGeom>
-          <a:noFill/>
-          <a:extLst>
-            <a:ext uri="{909E8E84-426E-40DD-AFC4-6F175D3DCCD1}">
-              <a14:hiddenFill xmlns:a14="http://schemas.microsoft.com/office/drawing/2010/main">
-                <a:solidFill>
-                  <a:srgbClr val="FFFFFF"/>
-                </a:solidFill>
-              </a14:hiddenFill>
-            </a:ext>
-          </a:extLst>
-        </p:spPr>
-      </p:pic>
-      <p:pic>
-        <p:nvPicPr>
-          <p:cNvPr id="1027" name="Picture 3" descr="C:\Users\mincekara\Desktop\2015-10-12 14_18_26-GitHub · Where software is built.png"/>
-          <p:cNvPicPr>
-            <a:picLocks noChangeAspect="1" noChangeArrowheads="1"/>
-          </p:cNvPicPr>
-          <p:nvPr/>
-        </p:nvPicPr>
-        <p:blipFill>
-          <a:blip r:embed="rId4">
-            <a:extLst>
-              <a:ext uri="{28A0092B-C50C-407E-A947-70E740481C1C}">
-                <a14:useLocalDpi xmlns:a14="http://schemas.microsoft.com/office/drawing/2010/main" val="0"/>
-              </a:ext>
-            </a:extLst>
-          </a:blip>
-          <a:srcRect/>
-          <a:stretch>
-            <a:fillRect/>
-          </a:stretch>
-        </p:blipFill>
-        <p:spPr bwMode="auto">
-          <a:xfrm>
-            <a:off x="179512" y="1393255"/>
+            <a:off x="179513" y="2519140"/>
             <a:ext cx="8784975" cy="1819721"/>
           </a:xfrm>
           <a:prstGeom prst="rect">
@@ -9369,497 +10268,6 @@
     <p:extLst>
       <p:ext uri="{BB962C8B-B14F-4D97-AF65-F5344CB8AC3E}">
         <p14:creationId xmlns:p14="http://schemas.microsoft.com/office/powerpoint/2010/main" val="2026319212"/>
-      </p:ext>
-    </p:extLst>
-  </p:cSld>
-  <p:clrMapOvr>
-    <a:masterClrMapping/>
-  </p:clrMapOvr>
-  <p:timing>
-    <p:tnLst>
-      <p:par>
-        <p:cTn id="1" dur="indefinite" restart="never" nodeType="tmRoot"/>
-      </p:par>
-    </p:tnLst>
-  </p:timing>
-</p:sld>
-</file>
-
-<file path=ppt/slides/slide8.xml><?xml version="1.0" encoding="utf-8"?>
-<p:sld xmlns:a="http://schemas.openxmlformats.org/drawingml/2006/main" xmlns:r="http://schemas.openxmlformats.org/officeDocument/2006/relationships" xmlns:p="http://schemas.openxmlformats.org/presentationml/2006/main">
-  <p:cSld>
-    <p:spTree>
-      <p:nvGrpSpPr>
-        <p:cNvPr id="1" name=""/>
-        <p:cNvGrpSpPr/>
-        <p:nvPr/>
-      </p:nvGrpSpPr>
-      <p:grpSpPr>
-        <a:xfrm>
-          <a:off x="0" y="0"/>
-          <a:ext cx="0" cy="0"/>
-          <a:chOff x="0" y="0"/>
-          <a:chExt cx="0" cy="0"/>
-        </a:xfrm>
-      </p:grpSpPr>
-      <p:sp>
-        <p:nvSpPr>
-          <p:cNvPr id="2" name="Titel 1"/>
-          <p:cNvSpPr>
-            <a:spLocks noGrp="1"/>
-          </p:cNvSpPr>
-          <p:nvPr>
-            <p:ph type="title"/>
-          </p:nvPr>
-        </p:nvSpPr>
-        <p:spPr/>
-        <p:txBody>
-          <a:bodyPr>
-            <a:normAutofit/>
-          </a:bodyPr>
-          <a:lstStyle/>
-          <a:p>
-            <a:r>
-              <a:rPr lang="de-DE" dirty="0" smtClean="0"/>
-              <a:t>Workflows</a:t>
-            </a:r>
-            <a:endParaRPr lang="de-DE" dirty="0"/>
-          </a:p>
-        </p:txBody>
-      </p:sp>
-      <p:sp>
-        <p:nvSpPr>
-          <p:cNvPr id="3" name="Fußzeilenplatzhalter 2"/>
-          <p:cNvSpPr>
-            <a:spLocks noGrp="1"/>
-          </p:cNvSpPr>
-          <p:nvPr>
-            <p:ph type="ftr" sz="quarter" idx="11"/>
-          </p:nvPr>
-        </p:nvSpPr>
-        <p:spPr/>
-        <p:txBody>
-          <a:bodyPr/>
-          <a:lstStyle/>
-          <a:p>
-            <a:r>
-              <a:rPr lang="de-DE" smtClean="0"/>
-              <a:t>ePortfolio von Mehmet Ali Incekara</a:t>
-            </a:r>
-            <a:endParaRPr lang="de-DE"/>
-          </a:p>
-        </p:txBody>
-      </p:sp>
-      <p:sp>
-        <p:nvSpPr>
-          <p:cNvPr id="4" name="Foliennummernplatzhalter 3"/>
-          <p:cNvSpPr>
-            <a:spLocks noGrp="1"/>
-          </p:cNvSpPr>
-          <p:nvPr>
-            <p:ph type="sldNum" sz="quarter" idx="12"/>
-          </p:nvPr>
-        </p:nvSpPr>
-        <p:spPr/>
-        <p:txBody>
-          <a:bodyPr/>
-          <a:lstStyle/>
-          <a:p>
-            <a:fld id="{32988457-9EFF-4998-891D-85ECFB4B79A4}" type="slidenum">
-              <a:rPr lang="de-DE" smtClean="0"/>
-              <a:t>8</a:t>
-            </a:fld>
-            <a:endParaRPr lang="de-DE"/>
-          </a:p>
-        </p:txBody>
-      </p:sp>
-      <p:sp>
-        <p:nvSpPr>
-          <p:cNvPr id="5" name="Inhaltsplatzhalter 4"/>
-          <p:cNvSpPr>
-            <a:spLocks noGrp="1"/>
-          </p:cNvSpPr>
-          <p:nvPr>
-            <p:ph sz="quarter" idx="1"/>
-          </p:nvPr>
-        </p:nvSpPr>
-        <p:spPr/>
-        <p:txBody>
-          <a:bodyPr/>
-          <a:lstStyle/>
-          <a:p>
-            <a:pPr marL="0" indent="0">
-              <a:buNone/>
-            </a:pPr>
-            <a:endParaRPr lang="de-DE" dirty="0"/>
-          </a:p>
-        </p:txBody>
-      </p:sp>
-    </p:spTree>
-    <p:extLst>
-      <p:ext uri="{BB962C8B-B14F-4D97-AF65-F5344CB8AC3E}">
-        <p14:creationId xmlns:p14="http://schemas.microsoft.com/office/powerpoint/2010/main" val="1173658711"/>
-      </p:ext>
-    </p:extLst>
-  </p:cSld>
-  <p:clrMapOvr>
-    <a:masterClrMapping/>
-  </p:clrMapOvr>
-  <p:timing>
-    <p:tnLst>
-      <p:par>
-        <p:cTn id="1" dur="indefinite" restart="never" nodeType="tmRoot"/>
-      </p:par>
-    </p:tnLst>
-  </p:timing>
-</p:sld>
-</file>
-
-<file path=ppt/slides/slide9.xml><?xml version="1.0" encoding="utf-8"?>
-<p:sld xmlns:a="http://schemas.openxmlformats.org/drawingml/2006/main" xmlns:r="http://schemas.openxmlformats.org/officeDocument/2006/relationships" xmlns:p="http://schemas.openxmlformats.org/presentationml/2006/main">
-  <p:cSld>
-    <p:spTree>
-      <p:nvGrpSpPr>
-        <p:cNvPr id="1" name=""/>
-        <p:cNvGrpSpPr/>
-        <p:nvPr/>
-      </p:nvGrpSpPr>
-      <p:grpSpPr>
-        <a:xfrm>
-          <a:off x="0" y="0"/>
-          <a:ext cx="0" cy="0"/>
-          <a:chOff x="0" y="0"/>
-          <a:chExt cx="0" cy="0"/>
-        </a:xfrm>
-      </p:grpSpPr>
-      <p:sp>
-        <p:nvSpPr>
-          <p:cNvPr id="2" name="Titel 1"/>
-          <p:cNvSpPr>
-            <a:spLocks noGrp="1"/>
-          </p:cNvSpPr>
-          <p:nvPr>
-            <p:ph type="title"/>
-          </p:nvPr>
-        </p:nvSpPr>
-        <p:spPr/>
-        <p:txBody>
-          <a:bodyPr>
-            <a:normAutofit/>
-          </a:bodyPr>
-          <a:lstStyle/>
-          <a:p>
-            <a:r>
-              <a:rPr lang="de-DE" dirty="0" smtClean="0"/>
-              <a:t>Workflows – </a:t>
-            </a:r>
-            <a:r>
-              <a:rPr lang="de-DE" dirty="0" err="1" smtClean="0"/>
-              <a:t>Centralized</a:t>
-            </a:r>
-            <a:r>
-              <a:rPr lang="de-DE" dirty="0" smtClean="0"/>
-              <a:t> Workflow</a:t>
-            </a:r>
-            <a:endParaRPr lang="de-DE" dirty="0"/>
-          </a:p>
-        </p:txBody>
-      </p:sp>
-      <p:sp>
-        <p:nvSpPr>
-          <p:cNvPr id="3" name="Fußzeilenplatzhalter 2"/>
-          <p:cNvSpPr>
-            <a:spLocks noGrp="1"/>
-          </p:cNvSpPr>
-          <p:nvPr>
-            <p:ph type="ftr" sz="quarter" idx="11"/>
-          </p:nvPr>
-        </p:nvSpPr>
-        <p:spPr/>
-        <p:txBody>
-          <a:bodyPr/>
-          <a:lstStyle/>
-          <a:p>
-            <a:r>
-              <a:rPr lang="de-DE" smtClean="0"/>
-              <a:t>ePortfolio von Mehmet Ali Incekara</a:t>
-            </a:r>
-            <a:endParaRPr lang="de-DE"/>
-          </a:p>
-        </p:txBody>
-      </p:sp>
-      <p:sp>
-        <p:nvSpPr>
-          <p:cNvPr id="4" name="Foliennummernplatzhalter 3"/>
-          <p:cNvSpPr>
-            <a:spLocks noGrp="1"/>
-          </p:cNvSpPr>
-          <p:nvPr>
-            <p:ph type="sldNum" sz="quarter" idx="12"/>
-          </p:nvPr>
-        </p:nvSpPr>
-        <p:spPr/>
-        <p:txBody>
-          <a:bodyPr/>
-          <a:lstStyle/>
-          <a:p>
-            <a:fld id="{32988457-9EFF-4998-891D-85ECFB4B79A4}" type="slidenum">
-              <a:rPr lang="de-DE" smtClean="0"/>
-              <a:t>9</a:t>
-            </a:fld>
-            <a:endParaRPr lang="de-DE"/>
-          </a:p>
-        </p:txBody>
-      </p:sp>
-      <p:sp>
-        <p:nvSpPr>
-          <p:cNvPr id="5" name="Inhaltsplatzhalter 4"/>
-          <p:cNvSpPr>
-            <a:spLocks noGrp="1"/>
-          </p:cNvSpPr>
-          <p:nvPr>
-            <p:ph sz="quarter" idx="1"/>
-          </p:nvPr>
-        </p:nvSpPr>
-        <p:spPr/>
-        <p:txBody>
-          <a:bodyPr/>
-          <a:lstStyle/>
-          <a:p>
-            <a:r>
-              <a:rPr lang="de-DE" dirty="0" err="1" smtClean="0"/>
-              <a:t>Sad</a:t>
-            </a:r>
-            <a:endParaRPr lang="de-DE" dirty="0" smtClean="0"/>
-          </a:p>
-          <a:p>
-            <a:r>
-              <a:rPr lang="de-DE" dirty="0" err="1" smtClean="0"/>
-              <a:t>Asd</a:t>
-            </a:r>
-            <a:endParaRPr lang="de-DE" dirty="0" smtClean="0"/>
-          </a:p>
-          <a:p>
-            <a:r>
-              <a:rPr lang="de-DE" dirty="0" err="1" smtClean="0"/>
-              <a:t>Asd</a:t>
-            </a:r>
-            <a:endParaRPr lang="de-DE" dirty="0" smtClean="0"/>
-          </a:p>
-          <a:p>
-            <a:r>
-              <a:rPr lang="de-DE" dirty="0" smtClean="0"/>
-              <a:t>As</a:t>
-            </a:r>
-          </a:p>
-          <a:p>
-            <a:r>
-              <a:rPr lang="de-DE" dirty="0" smtClean="0"/>
-              <a:t>Das</a:t>
-            </a:r>
-          </a:p>
-          <a:p>
-            <a:r>
-              <a:rPr lang="de-DE" dirty="0" smtClean="0"/>
-              <a:t>D</a:t>
-            </a:r>
-          </a:p>
-          <a:p>
-            <a:r>
-              <a:rPr lang="de-DE" dirty="0" err="1" smtClean="0"/>
-              <a:t>Asd</a:t>
-            </a:r>
-            <a:endParaRPr lang="de-DE" dirty="0" smtClean="0"/>
-          </a:p>
-          <a:p>
-            <a:r>
-              <a:rPr lang="de-DE" dirty="0" smtClean="0"/>
-              <a:t>As</a:t>
-            </a:r>
-          </a:p>
-          <a:p>
-            <a:endParaRPr lang="de-DE" dirty="0" smtClean="0"/>
-          </a:p>
-          <a:p>
-            <a:endParaRPr lang="de-DE" dirty="0"/>
-          </a:p>
-        </p:txBody>
-      </p:sp>
-      <p:sp>
-        <p:nvSpPr>
-          <p:cNvPr id="6" name="AutoShape 2" descr="Git Workflows: SVN-style Workflow"/>
-          <p:cNvSpPr>
-            <a:spLocks noChangeAspect="1" noChangeArrowheads="1"/>
-          </p:cNvSpPr>
-          <p:nvPr/>
-        </p:nvSpPr>
-        <p:spPr bwMode="auto">
-          <a:xfrm>
-            <a:off x="155575" y="-144463"/>
-            <a:ext cx="304800" cy="304801"/>
-          </a:xfrm>
-          <a:prstGeom prst="rect">
-            <a:avLst/>
-          </a:prstGeom>
-          <a:noFill/>
-          <a:extLst>
-            <a:ext uri="{909E8E84-426E-40DD-AFC4-6F175D3DCCD1}">
-              <a14:hiddenFill xmlns:a14="http://schemas.microsoft.com/office/drawing/2010/main">
-                <a:solidFill>
-                  <a:srgbClr val="FFFFFF"/>
-                </a:solidFill>
-              </a14:hiddenFill>
-            </a:ext>
-          </a:extLst>
-        </p:spPr>
-        <p:txBody>
-          <a:bodyPr vert="horz" wrap="square" lIns="91440" tIns="45720" rIns="91440" bIns="45720" numCol="1" anchor="t" anchorCtr="0" compatLnSpc="1">
-            <a:prstTxWarp prst="textNoShape">
-              <a:avLst/>
-            </a:prstTxWarp>
-          </a:bodyPr>
-          <a:lstStyle/>
-          <a:p>
-            <a:endParaRPr lang="de-DE"/>
-          </a:p>
-        </p:txBody>
-      </p:sp>
-      <p:sp>
-        <p:nvSpPr>
-          <p:cNvPr id="8" name="AutoShape 6" descr="Git Workflows: SVN-style Workflow"/>
-          <p:cNvSpPr>
-            <a:spLocks noChangeAspect="1" noChangeArrowheads="1"/>
-          </p:cNvSpPr>
-          <p:nvPr/>
-        </p:nvSpPr>
-        <p:spPr bwMode="auto">
-          <a:xfrm>
-            <a:off x="460375" y="160337"/>
-            <a:ext cx="304800" cy="304801"/>
-          </a:xfrm>
-          <a:prstGeom prst="rect">
-            <a:avLst/>
-          </a:prstGeom>
-          <a:noFill/>
-          <a:extLst>
-            <a:ext uri="{909E8E84-426E-40DD-AFC4-6F175D3DCCD1}">
-              <a14:hiddenFill xmlns:a14="http://schemas.microsoft.com/office/drawing/2010/main">
-                <a:solidFill>
-                  <a:srgbClr val="FFFFFF"/>
-                </a:solidFill>
-              </a14:hiddenFill>
-            </a:ext>
-          </a:extLst>
-        </p:spPr>
-        <p:txBody>
-          <a:bodyPr vert="horz" wrap="square" lIns="91440" tIns="45720" rIns="91440" bIns="45720" numCol="1" anchor="t" anchorCtr="0" compatLnSpc="1">
-            <a:prstTxWarp prst="textNoShape">
-              <a:avLst/>
-            </a:prstTxWarp>
-          </a:bodyPr>
-          <a:lstStyle/>
-          <a:p>
-            <a:endParaRPr lang="de-DE"/>
-          </a:p>
-        </p:txBody>
-      </p:sp>
-      <p:sp>
-        <p:nvSpPr>
-          <p:cNvPr id="9" name="AutoShape 8" descr="Git Workflows: SVN-style Workflow"/>
-          <p:cNvSpPr>
-            <a:spLocks noChangeAspect="1" noChangeArrowheads="1"/>
-          </p:cNvSpPr>
-          <p:nvPr/>
-        </p:nvSpPr>
-        <p:spPr bwMode="auto">
-          <a:xfrm>
-            <a:off x="612775" y="312737"/>
-            <a:ext cx="304800" cy="304801"/>
-          </a:xfrm>
-          <a:prstGeom prst="rect">
-            <a:avLst/>
-          </a:prstGeom>
-          <a:noFill/>
-          <a:extLst>
-            <a:ext uri="{909E8E84-426E-40DD-AFC4-6F175D3DCCD1}">
-              <a14:hiddenFill xmlns:a14="http://schemas.microsoft.com/office/drawing/2010/main">
-                <a:solidFill>
-                  <a:srgbClr val="FFFFFF"/>
-                </a:solidFill>
-              </a14:hiddenFill>
-            </a:ext>
-          </a:extLst>
-        </p:spPr>
-        <p:txBody>
-          <a:bodyPr vert="horz" wrap="square" lIns="91440" tIns="45720" rIns="91440" bIns="45720" numCol="1" anchor="t" anchorCtr="0" compatLnSpc="1">
-            <a:prstTxWarp prst="textNoShape">
-              <a:avLst/>
-            </a:prstTxWarp>
-          </a:bodyPr>
-          <a:lstStyle/>
-          <a:p>
-            <a:endParaRPr lang="de-DE"/>
-          </a:p>
-        </p:txBody>
-      </p:sp>
-      <p:pic>
-        <p:nvPicPr>
-          <p:cNvPr id="5130" name="Picture 10"/>
-          <p:cNvPicPr>
-            <a:picLocks noChangeAspect="1" noChangeArrowheads="1"/>
-          </p:cNvPicPr>
-          <p:nvPr/>
-        </p:nvPicPr>
-        <p:blipFill>
-          <a:blip r:embed="rId3">
-            <a:extLst>
-              <a:ext uri="{28A0092B-C50C-407E-A947-70E740481C1C}">
-                <a14:useLocalDpi xmlns:a14="http://schemas.microsoft.com/office/drawing/2010/main" val="0"/>
-              </a:ext>
-            </a:extLst>
-          </a:blip>
-          <a:srcRect/>
-          <a:stretch>
-            <a:fillRect/>
-          </a:stretch>
-        </p:blipFill>
-        <p:spPr bwMode="auto">
-          <a:xfrm>
-            <a:off x="4355976" y="3071858"/>
-            <a:ext cx="4257675" cy="3124200"/>
-          </a:xfrm>
-          <a:prstGeom prst="rect">
-            <a:avLst/>
-          </a:prstGeom>
-          <a:noFill/>
-          <a:ln>
-            <a:noFill/>
-          </a:ln>
-          <a:extLst>
-            <a:ext uri="{909E8E84-426E-40DD-AFC4-6F175D3DCCD1}">
-              <a14:hiddenFill xmlns:a14="http://schemas.microsoft.com/office/drawing/2010/main">
-                <a:solidFill>
-                  <a:schemeClr val="accent1"/>
-                </a:solidFill>
-              </a14:hiddenFill>
-            </a:ext>
-            <a:ext uri="{91240B29-F687-4F45-9708-019B960494DF}">
-              <a14:hiddenLine xmlns:a14="http://schemas.microsoft.com/office/drawing/2010/main" w="9525">
-                <a:solidFill>
-                  <a:schemeClr val="tx1"/>
-                </a:solidFill>
-                <a:miter lim="800000"/>
-                <a:headEnd/>
-                <a:tailEnd/>
-              </a14:hiddenLine>
-            </a:ext>
-          </a:extLst>
-        </p:spPr>
-      </p:pic>
-    </p:spTree>
-    <p:extLst>
-      <p:ext uri="{BB962C8B-B14F-4D97-AF65-F5344CB8AC3E}">
-        <p14:creationId xmlns:p14="http://schemas.microsoft.com/office/powerpoint/2010/main" val="2733612128"/>
       </p:ext>
     </p:extLst>
   </p:cSld>

</xml_diff>

<commit_message>
Beispielaufgabe zum Umgang mit GitHub
</commit_message>
<xml_diff>
--- a/Git-und-GitHub.pptx
+++ b/Git-und-GitHub.pptx
@@ -126,7 +126,7 @@
   </p:defaultTextStyle>
   <p:extLst>
     <p:ext uri="{EFAFB233-063F-42B5-8137-9DF3F51BA10A}">
-      <p15:sldGuideLst xmlns:p15="http://schemas.microsoft.com/office/powerpoint/2012/main">
+      <p15:sldGuideLst xmlns:p15="http://schemas.microsoft.com/office/powerpoint/2012/main" xmlns="">
         <p15:guide id="1" orient="horz" pos="2160">
           <p15:clr>
             <a:srgbClr val="A4A3A4"/>
@@ -225,7 +225,7 @@
           <a:p>
             <a:fld id="{D33A1A6D-234A-42C6-88C5-85D1460EE3B8}" type="datetimeFigureOut">
               <a:rPr lang="de-DE" smtClean="0"/>
-              <a:t>14.10.2015</a:t>
+              <a:t>15.10.2015</a:t>
             </a:fld>
             <a:endParaRPr lang="de-DE"/>
           </a:p>
@@ -1579,7 +1579,7 @@
           <a:p>
             <a:fld id="{D74EE171-6FB9-44C2-999A-3C78585CC55F}" type="datetime1">
               <a:rPr lang="de-DE" smtClean="0"/>
-              <a:t>14.10.2015</a:t>
+              <a:t>15.10.2015</a:t>
             </a:fld>
             <a:endParaRPr lang="de-DE"/>
           </a:p>
@@ -1942,7 +1942,7 @@
           <a:p>
             <a:fld id="{966EF4C5-04F6-4CAA-916B-E3B314346F2C}" type="datetime1">
               <a:rPr lang="de-DE" smtClean="0"/>
-              <a:t>14.10.2015</a:t>
+              <a:t>15.10.2015</a:t>
             </a:fld>
             <a:endParaRPr lang="de-DE"/>
           </a:p>
@@ -2121,7 +2121,7 @@
           <a:p>
             <a:fld id="{D4A1C9C1-76E8-482F-AC38-46CD1EA3A4C9}" type="datetime1">
               <a:rPr lang="de-DE" smtClean="0"/>
-              <a:t>14.10.2015</a:t>
+              <a:t>15.10.2015</a:t>
             </a:fld>
             <a:endParaRPr lang="de-DE"/>
           </a:p>
@@ -2360,7 +2360,7 @@
           <a:p>
             <a:fld id="{09957CAC-BFF1-498D-82E7-9462D790BC9E}" type="datetime1">
               <a:rPr lang="de-DE" smtClean="0"/>
-              <a:t>14.10.2015</a:t>
+              <a:t>15.10.2015</a:t>
             </a:fld>
             <a:endParaRPr lang="de-DE"/>
           </a:p>
@@ -2633,7 +2633,7 @@
           <a:p>
             <a:fld id="{67E9C1B2-C123-4CB8-B829-0B1DE6516455}" type="datetime1">
               <a:rPr lang="de-DE" smtClean="0"/>
-              <a:t>14.10.2015</a:t>
+              <a:t>15.10.2015</a:t>
             </a:fld>
             <a:endParaRPr lang="de-DE"/>
           </a:p>
@@ -2857,7 +2857,7 @@
           <a:p>
             <a:fld id="{5F82951D-51DD-43CB-9395-2CD87029427A}" type="datetime1">
               <a:rPr lang="de-DE" smtClean="0"/>
-              <a:t>14.10.2015</a:t>
+              <a:t>15.10.2015</a:t>
             </a:fld>
             <a:endParaRPr lang="de-DE"/>
           </a:p>
@@ -3213,7 +3213,7 @@
           <a:p>
             <a:fld id="{F75640B3-CD2F-468A-9D6A-8FCCA521EAD8}" type="datetime1">
               <a:rPr lang="de-DE" smtClean="0"/>
-              <a:t>14.10.2015</a:t>
+              <a:t>15.10.2015</a:t>
             </a:fld>
             <a:endParaRPr lang="de-DE"/>
           </a:p>
@@ -3449,7 +3449,7 @@
           <a:p>
             <a:fld id="{66B70435-1AE2-40EE-BD35-BF23134777A3}" type="datetime1">
               <a:rPr lang="de-DE" smtClean="0"/>
-              <a:t>14.10.2015</a:t>
+              <a:t>15.10.2015</a:t>
             </a:fld>
             <a:endParaRPr lang="de-DE"/>
           </a:p>
@@ -3593,7 +3593,7 @@
           <a:p>
             <a:fld id="{8264DE6B-16CC-45D3-A85A-C342E3C400B1}" type="datetime1">
               <a:rPr lang="de-DE" smtClean="0"/>
-              <a:t>14.10.2015</a:t>
+              <a:t>15.10.2015</a:t>
             </a:fld>
             <a:endParaRPr lang="de-DE"/>
           </a:p>
@@ -3874,7 +3874,7 @@
           <a:p>
             <a:fld id="{3012F5FB-2D99-4EE6-8329-8BC403EF3BB7}" type="datetime1">
               <a:rPr lang="de-DE" smtClean="0"/>
-              <a:t>14.10.2015</a:t>
+              <a:t>15.10.2015</a:t>
             </a:fld>
             <a:endParaRPr lang="de-DE"/>
           </a:p>
@@ -4285,7 +4285,7 @@
           <a:p>
             <a:fld id="{4ACBB3FE-65F3-496E-9475-85FAF27CCA0A}" type="datetime1">
               <a:rPr lang="de-DE" smtClean="0"/>
-              <a:t>14.10.2015</a:t>
+              <a:t>15.10.2015</a:t>
             </a:fld>
             <a:endParaRPr lang="de-DE"/>
           </a:p>
@@ -4627,7 +4627,7 @@
           <a:p>
             <a:fld id="{1198494A-36A3-42DF-97C6-C12EB15310DD}" type="datetime1">
               <a:rPr lang="de-DE" smtClean="0"/>
-              <a:t>14.10.2015</a:t>
+              <a:t>15.10.2015</a:t>
             </a:fld>
             <a:endParaRPr lang="de-DE"/>
           </a:p>
@@ -5429,19 +5429,11 @@
           <a:p>
             <a:r>
               <a:rPr lang="de-DE" dirty="0" err="1" smtClean="0"/>
-              <a:t>C</a:t>
-            </a:r>
-            <a:r>
-              <a:rPr lang="de-DE" dirty="0" err="1" smtClean="0"/>
-              <a:t>entralized</a:t>
+              <a:t>Centralized</a:t>
             </a:r>
             <a:r>
               <a:rPr lang="de-DE" dirty="0" smtClean="0"/>
-              <a:t> </a:t>
-            </a:r>
-            <a:r>
-              <a:rPr lang="de-DE" dirty="0" smtClean="0"/>
-              <a:t>Workflow</a:t>
+              <a:t> Workflow</a:t>
             </a:r>
             <a:endParaRPr lang="de-DE" dirty="0"/>
           </a:p>
@@ -5561,7 +5553,6 @@
               <a:rPr lang="de-DE" sz="2400" dirty="0" smtClean="0"/>
               <a:t>die Veränderungen gepusht</a:t>
             </a:r>
-            <a:endParaRPr lang="de-DE" sz="2400" dirty="0" smtClean="0"/>
           </a:p>
           <a:p>
             <a:endParaRPr lang="de-DE" sz="2400" dirty="0"/>
@@ -6147,11 +6138,7 @@
           <a:p>
             <a:r>
               <a:rPr lang="de-DE" sz="2400" dirty="0" smtClean="0"/>
-              <a:t>Nur d</a:t>
-            </a:r>
-            <a:r>
-              <a:rPr lang="de-DE" sz="2400" dirty="0" smtClean="0"/>
-              <a:t>er Besitzer des </a:t>
+              <a:t>Nur der Besitzer des </a:t>
             </a:r>
             <a:br>
               <a:rPr lang="de-DE" sz="2400" dirty="0" smtClean="0"/>
@@ -6551,7 +6538,6 @@
                         <a:rPr lang="de-DE" sz="1500" b="1" dirty="0" smtClean="0"/>
                         <a:t>Konfiguration</a:t>
                       </a:r>
-                      <a:endParaRPr lang="de-DE" sz="1500" b="1" dirty="0" smtClean="0"/>
                     </a:p>
                   </a:txBody>
                   <a:tcPr/>
@@ -6644,7 +6630,6 @@
                         <a:rPr lang="de-DE" sz="1500" b="1" baseline="0" dirty="0" smtClean="0"/>
                         <a:t>-Repository</a:t>
                       </a:r>
-                      <a:endParaRPr lang="de-DE" sz="1500" b="1" baseline="0" dirty="0" smtClean="0"/>
                     </a:p>
                   </a:txBody>
                   <a:tcPr/>
@@ -6767,7 +6752,6 @@
                         <a:rPr lang="de-DE" sz="1500" b="1" dirty="0" smtClean="0"/>
                         <a:t>Vergleich</a:t>
                       </a:r>
-                      <a:endParaRPr lang="de-DE" sz="1500" b="1" dirty="0" smtClean="0"/>
                     </a:p>
                   </a:txBody>
                   <a:tcPr/>
@@ -6873,7 +6857,6 @@
                         <a:rPr lang="de-DE" sz="1500" b="1" dirty="0" smtClean="0"/>
                         <a:t>Lokales Repository</a:t>
                       </a:r>
-                      <a:endParaRPr lang="de-DE" sz="1500" b="1" dirty="0" smtClean="0"/>
                     </a:p>
                   </a:txBody>
                   <a:tcPr/>
@@ -6929,13 +6912,8 @@
                       </a:r>
                       <a:r>
                         <a:rPr lang="de-DE" sz="1500" baseline="0" dirty="0" smtClean="0"/>
-                        <a:t> –m ‘ </a:t>
+                        <a:t> –m ‘ ‘</a:t>
                       </a:r>
-                      <a:r>
-                        <a:rPr lang="de-DE" sz="1500" baseline="0" dirty="0" smtClean="0"/>
-                        <a:t>‘</a:t>
-                      </a:r>
-                      <a:endParaRPr lang="de-DE" sz="1500" baseline="0" dirty="0" smtClean="0"/>
                     </a:p>
                   </a:txBody>
                   <a:tcPr/>
@@ -6951,7 +6929,6 @@
                         <a:rPr lang="de-DE" sz="1500" b="1" baseline="0" dirty="0" smtClean="0"/>
                         <a:t>Öffentliches Repository</a:t>
                       </a:r>
-                      <a:endParaRPr lang="de-DE" sz="1500" b="1" baseline="0" dirty="0" smtClean="0"/>
                     </a:p>
                   </a:txBody>
                   <a:tcPr/>
@@ -6997,7 +6974,6 @@
                         <a:rPr lang="de-DE" sz="1500" baseline="0" dirty="0" smtClean="0"/>
                         <a:t> pull</a:t>
                       </a:r>
-                      <a:endParaRPr lang="de-DE" sz="1500" baseline="0" dirty="0" smtClean="0"/>
                     </a:p>
                   </a:txBody>
                   <a:tcPr/>
@@ -7013,7 +6989,6 @@
                         <a:rPr lang="de-DE" sz="1500" b="1" dirty="0" smtClean="0"/>
                         <a:t>Log-Ansicht</a:t>
                       </a:r>
-                      <a:endParaRPr lang="de-DE" sz="1500" b="1" dirty="0" smtClean="0"/>
                     </a:p>
                   </a:txBody>
                   <a:tcPr/>
@@ -7285,11 +7260,6 @@
                         </a:rPr>
                         <a:t>&gt;</a:t>
                       </a:r>
-                      <a:endParaRPr lang="de-DE" sz="1500" dirty="0" smtClean="0">
-                        <a:latin typeface="+mn-lt"/>
-                        <a:ea typeface="Arial Unicode MS" panose="020B0604020202020204" pitchFamily="34" charset="-128"/>
-                        <a:cs typeface="Arial Unicode MS" panose="020B0604020202020204" pitchFamily="34" charset="-128"/>
-                      </a:endParaRPr>
                     </a:p>
                   </a:txBody>
                   <a:tcPr/>
@@ -7667,7 +7637,6 @@
               <a:rPr lang="de-DE" sz="1200" dirty="0" smtClean="0"/>
               <a:t>(11.10.2015)</a:t>
             </a:r>
-            <a:endParaRPr lang="de-DE" sz="1200" dirty="0" smtClean="0"/>
           </a:p>
           <a:p>
             <a:pPr marL="0" indent="0">
@@ -7791,7 +7760,6 @@
               <a:rPr lang="de-DE" sz="1200" dirty="0" smtClean="0"/>
               <a:t>)</a:t>
             </a:r>
-            <a:endParaRPr lang="de-DE" sz="1200" dirty="0" smtClean="0"/>
           </a:p>
           <a:p>
             <a:r>
@@ -8063,7 +8031,6 @@
               <a:rPr lang="de-DE" dirty="0" smtClean="0"/>
               <a:t>	</a:t>
             </a:r>
-            <a:endParaRPr lang="de-DE" dirty="0" smtClean="0"/>
           </a:p>
           <a:p>
             <a:pPr marL="788670" lvl="1" indent="-514350">
@@ -8074,7 +8041,6 @@
               <a:rPr lang="de-DE" dirty="0" smtClean="0"/>
               <a:t>Idee</a:t>
             </a:r>
-            <a:endParaRPr lang="de-DE" dirty="0" smtClean="0"/>
           </a:p>
           <a:p>
             <a:pPr marL="788670" lvl="1" indent="-514350">
@@ -8173,7 +8139,6 @@
               <a:rPr lang="de-DE" dirty="0" smtClean="0"/>
               <a:t>Workflow</a:t>
             </a:r>
-            <a:endParaRPr lang="de-DE" dirty="0" smtClean="0"/>
           </a:p>
           <a:p>
             <a:pPr marL="788670" lvl="1" indent="-514350">
@@ -8731,7 +8696,7 @@
             </a:r>
             <a:r>
               <a:rPr lang="de-DE" sz="2400" dirty="0" err="1" smtClean="0"/>
-              <a:t>Repositories</a:t>
+              <a:t>Repositoriy‘s</a:t>
             </a:r>
             <a:endParaRPr lang="de-DE" sz="2400" dirty="0" smtClean="0"/>
           </a:p>
@@ -9704,25 +9669,30 @@
               <a:t>webbasierter </a:t>
             </a:r>
             <a:r>
+              <a:rPr lang="de-DE" sz="2400" dirty="0" smtClean="0"/>
+              <a:t>Hosting Service </a:t>
+            </a:r>
+            <a:endParaRPr lang="de-DE" sz="2400" dirty="0" smtClean="0"/>
+          </a:p>
+          <a:p>
+            <a:endParaRPr lang="de-DE" sz="2400" dirty="0" smtClean="0"/>
+          </a:p>
+          <a:p>
+            <a:r>
+              <a:rPr lang="de-DE" sz="2400" dirty="0" err="1"/>
+              <a:t>g</a:t>
+            </a:r>
+            <a:r>
               <a:rPr lang="de-DE" sz="2400" dirty="0" err="1" smtClean="0"/>
-              <a:t>Hostingservice</a:t>
+              <a:t>it</a:t>
             </a:r>
             <a:r>
               <a:rPr lang="de-DE" sz="2400" dirty="0" smtClean="0"/>
               <a:t> </a:t>
             </a:r>
-          </a:p>
-          <a:p>
-            <a:endParaRPr lang="de-DE" sz="2400" dirty="0" smtClean="0"/>
-          </a:p>
-          <a:p>
-            <a:r>
-              <a:rPr lang="de-DE" sz="2400" dirty="0" err="1" smtClean="0"/>
-              <a:t>Git</a:t>
-            </a:r>
             <a:r>
               <a:rPr lang="de-DE" sz="2400" dirty="0" smtClean="0"/>
-              <a:t> als grafische Oberfläche</a:t>
+              <a:t>als grafische Oberfläche</a:t>
             </a:r>
           </a:p>
           <a:p>

</xml_diff>

<commit_message>
Version 1.2 vom Tutorial
</commit_message>
<xml_diff>
--- a/Git-und-GitHub.pptx
+++ b/Git-und-GitHub.pptx
@@ -126,7 +126,7 @@
   </p:defaultTextStyle>
   <p:extLst>
     <p:ext uri="{EFAFB233-063F-42B5-8137-9DF3F51BA10A}">
-      <p15:sldGuideLst xmlns:p15="http://schemas.microsoft.com/office/powerpoint/2012/main" xmlns="">
+      <p15:sldGuideLst xmlns="" xmlns:p15="http://schemas.microsoft.com/office/powerpoint/2012/main">
         <p15:guide id="1" orient="horz" pos="2160">
           <p15:clr>
             <a:srgbClr val="A4A3A4"/>
@@ -225,7 +225,7 @@
           <a:p>
             <a:fld id="{D33A1A6D-234A-42C6-88C5-85D1460EE3B8}" type="datetimeFigureOut">
               <a:rPr lang="de-DE" smtClean="0"/>
-              <a:t>15.10.2015</a:t>
+              <a:t>18.10.2015</a:t>
             </a:fld>
             <a:endParaRPr lang="de-DE"/>
           </a:p>
@@ -1579,7 +1579,7 @@
           <a:p>
             <a:fld id="{D74EE171-6FB9-44C2-999A-3C78585CC55F}" type="datetime1">
               <a:rPr lang="de-DE" smtClean="0"/>
-              <a:t>15.10.2015</a:t>
+              <a:t>18.10.2015</a:t>
             </a:fld>
             <a:endParaRPr lang="de-DE"/>
           </a:p>
@@ -1942,7 +1942,7 @@
           <a:p>
             <a:fld id="{966EF4C5-04F6-4CAA-916B-E3B314346F2C}" type="datetime1">
               <a:rPr lang="de-DE" smtClean="0"/>
-              <a:t>15.10.2015</a:t>
+              <a:t>18.10.2015</a:t>
             </a:fld>
             <a:endParaRPr lang="de-DE"/>
           </a:p>
@@ -2121,7 +2121,7 @@
           <a:p>
             <a:fld id="{D4A1C9C1-76E8-482F-AC38-46CD1EA3A4C9}" type="datetime1">
               <a:rPr lang="de-DE" smtClean="0"/>
-              <a:t>15.10.2015</a:t>
+              <a:t>18.10.2015</a:t>
             </a:fld>
             <a:endParaRPr lang="de-DE"/>
           </a:p>
@@ -2360,7 +2360,7 @@
           <a:p>
             <a:fld id="{09957CAC-BFF1-498D-82E7-9462D790BC9E}" type="datetime1">
               <a:rPr lang="de-DE" smtClean="0"/>
-              <a:t>15.10.2015</a:t>
+              <a:t>18.10.2015</a:t>
             </a:fld>
             <a:endParaRPr lang="de-DE"/>
           </a:p>
@@ -2633,7 +2633,7 @@
           <a:p>
             <a:fld id="{67E9C1B2-C123-4CB8-B829-0B1DE6516455}" type="datetime1">
               <a:rPr lang="de-DE" smtClean="0"/>
-              <a:t>15.10.2015</a:t>
+              <a:t>18.10.2015</a:t>
             </a:fld>
             <a:endParaRPr lang="de-DE"/>
           </a:p>
@@ -2857,7 +2857,7 @@
           <a:p>
             <a:fld id="{5F82951D-51DD-43CB-9395-2CD87029427A}" type="datetime1">
               <a:rPr lang="de-DE" smtClean="0"/>
-              <a:t>15.10.2015</a:t>
+              <a:t>18.10.2015</a:t>
             </a:fld>
             <a:endParaRPr lang="de-DE"/>
           </a:p>
@@ -3213,7 +3213,7 @@
           <a:p>
             <a:fld id="{F75640B3-CD2F-468A-9D6A-8FCCA521EAD8}" type="datetime1">
               <a:rPr lang="de-DE" smtClean="0"/>
-              <a:t>15.10.2015</a:t>
+              <a:t>18.10.2015</a:t>
             </a:fld>
             <a:endParaRPr lang="de-DE"/>
           </a:p>
@@ -3449,7 +3449,7 @@
           <a:p>
             <a:fld id="{66B70435-1AE2-40EE-BD35-BF23134777A3}" type="datetime1">
               <a:rPr lang="de-DE" smtClean="0"/>
-              <a:t>15.10.2015</a:t>
+              <a:t>18.10.2015</a:t>
             </a:fld>
             <a:endParaRPr lang="de-DE"/>
           </a:p>
@@ -3593,7 +3593,7 @@
           <a:p>
             <a:fld id="{8264DE6B-16CC-45D3-A85A-C342E3C400B1}" type="datetime1">
               <a:rPr lang="de-DE" smtClean="0"/>
-              <a:t>15.10.2015</a:t>
+              <a:t>18.10.2015</a:t>
             </a:fld>
             <a:endParaRPr lang="de-DE"/>
           </a:p>
@@ -3874,7 +3874,7 @@
           <a:p>
             <a:fld id="{3012F5FB-2D99-4EE6-8329-8BC403EF3BB7}" type="datetime1">
               <a:rPr lang="de-DE" smtClean="0"/>
-              <a:t>15.10.2015</a:t>
+              <a:t>18.10.2015</a:t>
             </a:fld>
             <a:endParaRPr lang="de-DE"/>
           </a:p>
@@ -4285,7 +4285,7 @@
           <a:p>
             <a:fld id="{4ACBB3FE-65F3-496E-9475-85FAF27CCA0A}" type="datetime1">
               <a:rPr lang="de-DE" smtClean="0"/>
-              <a:t>15.10.2015</a:t>
+              <a:t>18.10.2015</a:t>
             </a:fld>
             <a:endParaRPr lang="de-DE"/>
           </a:p>
@@ -4627,7 +4627,7 @@
           <a:p>
             <a:fld id="{1198494A-36A3-42DF-97C6-C12EB15310DD}" type="datetime1">
               <a:rPr lang="de-DE" smtClean="0"/>
-              <a:t>15.10.2015</a:t>
+              <a:t>18.10.2015</a:t>
             </a:fld>
             <a:endParaRPr lang="de-DE"/>
           </a:p>
@@ -9666,13 +9666,8 @@
           <a:p>
             <a:r>
               <a:rPr lang="de-DE" sz="2400" dirty="0" smtClean="0"/>
-              <a:t>webbasierter </a:t>
-            </a:r>
-            <a:r>
-              <a:rPr lang="de-DE" sz="2400" dirty="0" smtClean="0"/>
-              <a:t>Hosting Service </a:t>
-            </a:r>
-            <a:endParaRPr lang="de-DE" sz="2400" dirty="0" smtClean="0"/>
+              <a:t>webbasierter Hosting Service </a:t>
+            </a:r>
           </a:p>
           <a:p>
             <a:endParaRPr lang="de-DE" sz="2400" dirty="0" smtClean="0"/>
@@ -9688,11 +9683,7 @@
             </a:r>
             <a:r>
               <a:rPr lang="de-DE" sz="2400" dirty="0" smtClean="0"/>
-              <a:t> </a:t>
-            </a:r>
-            <a:r>
-              <a:rPr lang="de-DE" sz="2400" dirty="0" smtClean="0"/>
-              <a:t>als grafische Oberfläche</a:t>
+              <a:t> als grafische Oberfläche</a:t>
             </a:r>
           </a:p>
           <a:p>

</xml_diff>